<commit_message>
add data and modify PPT of part 3
</commit_message>
<xml_diff>
--- a/PPTGroup10.pptx
+++ b/PPTGroup10.pptx
@@ -124,7 +124,2807 @@
       </a:defRPr>
     </a:lvl9pPr>
   </p:defaultTextStyle>
+  <p:extLst>
+    <p:ext uri="{EFAFB233-063F-42B5-8137-9DF3F51BA10A}">
+      <p15:sldGuideLst xmlns:p15="http://schemas.microsoft.com/office/powerpoint/2012/main"/>
+    </p:ext>
+  </p:extLst>
 </p:presentation>
+</file>
+
+<file path=ppt/charts/chart1.xml><?xml version="1.0" encoding="utf-8"?>
+<c:chartSpace xmlns:c="http://schemas.openxmlformats.org/drawingml/2006/chart" xmlns:a="http://schemas.openxmlformats.org/drawingml/2006/main" xmlns:r="http://schemas.openxmlformats.org/officeDocument/2006/relationships">
+  <c:date1904 val="0"/>
+  <c:lang val="en-US"/>
+  <c:roundedCorners val="0"/>
+  <mc:AlternateContent xmlns:mc="http://schemas.openxmlformats.org/markup-compatibility/2006">
+    <mc:Choice xmlns:c14="http://schemas.microsoft.com/office/drawing/2007/8/2/chart" Requires="c14">
+      <c14:style val="102"/>
+    </mc:Choice>
+    <mc:Fallback>
+      <c:style val="2"/>
+    </mc:Fallback>
+  </mc:AlternateContent>
+  <c:chart>
+    <c:title>
+      <c:tx>
+        <c:rich>
+          <a:bodyPr rot="0" spcFirstLastPara="1" vertOverflow="ellipsis" vert="horz" wrap="square" anchor="ctr" anchorCtr="1"/>
+          <a:lstStyle/>
+          <a:p>
+            <a:pPr>
+              <a:defRPr sz="1862" b="0" i="0" u="none" strike="noStrike" kern="1200" spc="0" baseline="0">
+                <a:solidFill>
+                  <a:schemeClr val="tx1">
+                    <a:lumMod val="65000"/>
+                    <a:lumOff val="35000"/>
+                  </a:schemeClr>
+                </a:solidFill>
+                <a:latin typeface="+mn-lt"/>
+                <a:ea typeface="+mn-ea"/>
+                <a:cs typeface="+mn-cs"/>
+              </a:defRPr>
+            </a:pPr>
+            <a:r>
+              <a:rPr lang="en-US" dirty="0" smtClean="0"/>
+              <a:t>Letter Recognition</a:t>
+            </a:r>
+            <a:endParaRPr lang="en-US" dirty="0"/>
+          </a:p>
+        </c:rich>
+      </c:tx>
+      <c:layout/>
+      <c:overlay val="0"/>
+      <c:spPr>
+        <a:noFill/>
+        <a:ln>
+          <a:noFill/>
+        </a:ln>
+        <a:effectLst/>
+      </c:spPr>
+      <c:txPr>
+        <a:bodyPr rot="0" spcFirstLastPara="1" vertOverflow="ellipsis" vert="horz" wrap="square" anchor="ctr" anchorCtr="1"/>
+        <a:lstStyle/>
+        <a:p>
+          <a:pPr>
+            <a:defRPr sz="1862" b="0" i="0" u="none" strike="noStrike" kern="1200" spc="0" baseline="0">
+              <a:solidFill>
+                <a:schemeClr val="tx1">
+                  <a:lumMod val="65000"/>
+                  <a:lumOff val="35000"/>
+                </a:schemeClr>
+              </a:solidFill>
+              <a:latin typeface="+mn-lt"/>
+              <a:ea typeface="+mn-ea"/>
+              <a:cs typeface="+mn-cs"/>
+            </a:defRPr>
+          </a:pPr>
+          <a:endParaRPr lang="en-US"/>
+        </a:p>
+      </c:txPr>
+    </c:title>
+    <c:autoTitleDeleted val="0"/>
+    <c:plotArea>
+      <c:layout/>
+      <c:barChart>
+        <c:barDir val="col"/>
+        <c:grouping val="clustered"/>
+        <c:varyColors val="0"/>
+        <c:ser>
+          <c:idx val="0"/>
+          <c:order val="0"/>
+          <c:tx>
+            <c:strRef>
+              <c:f>Sheet1!$B$1</c:f>
+              <c:strCache>
+                <c:ptCount val="1"/>
+                <c:pt idx="0">
+                  <c:v>Correctness</c:v>
+                </c:pt>
+              </c:strCache>
+            </c:strRef>
+          </c:tx>
+          <c:spPr>
+            <a:solidFill>
+              <a:schemeClr val="accent1"/>
+            </a:solidFill>
+            <a:ln>
+              <a:noFill/>
+            </a:ln>
+            <a:effectLst/>
+          </c:spPr>
+          <c:invertIfNegative val="0"/>
+          <c:cat>
+            <c:strRef>
+              <c:f>Sheet1!$A$2:$A$6</c:f>
+              <c:strCache>
+                <c:ptCount val="5"/>
+                <c:pt idx="0">
+                  <c:v>Default</c:v>
+                </c:pt>
+                <c:pt idx="1">
+                  <c:v>L=0.6</c:v>
+                </c:pt>
+                <c:pt idx="2">
+                  <c:v>N=200</c:v>
+                </c:pt>
+                <c:pt idx="3">
+                  <c:v>E=10</c:v>
+                </c:pt>
+                <c:pt idx="4">
+                  <c:v>E=30</c:v>
+                </c:pt>
+              </c:strCache>
+            </c:strRef>
+          </c:cat>
+          <c:val>
+            <c:numRef>
+              <c:f>Sheet1!$B$2:$B$6</c:f>
+              <c:numCache>
+                <c:formatCode>General</c:formatCode>
+                <c:ptCount val="5"/>
+                <c:pt idx="0">
+                  <c:v>82.56</c:v>
+                </c:pt>
+                <c:pt idx="1">
+                  <c:v>81.23</c:v>
+                </c:pt>
+                <c:pt idx="2">
+                  <c:v>82.77500000000001</c:v>
+                </c:pt>
+                <c:pt idx="3">
+                  <c:v>82.56</c:v>
+                </c:pt>
+                <c:pt idx="4">
+                  <c:v>82.56</c:v>
+                </c:pt>
+              </c:numCache>
+            </c:numRef>
+          </c:val>
+        </c:ser>
+        <c:ser>
+          <c:idx val="1"/>
+          <c:order val="1"/>
+          <c:tx>
+            <c:strRef>
+              <c:f>Sheet1!$C$1</c:f>
+              <c:strCache>
+                <c:ptCount val="1"/>
+                <c:pt idx="0">
+                  <c:v>Root relative squared error</c:v>
+                </c:pt>
+              </c:strCache>
+            </c:strRef>
+          </c:tx>
+          <c:spPr>
+            <a:solidFill>
+              <a:schemeClr val="accent2"/>
+            </a:solidFill>
+            <a:ln>
+              <a:noFill/>
+            </a:ln>
+            <a:effectLst/>
+          </c:spPr>
+          <c:invertIfNegative val="0"/>
+          <c:cat>
+            <c:strRef>
+              <c:f>Sheet1!$A$2:$A$6</c:f>
+              <c:strCache>
+                <c:ptCount val="5"/>
+                <c:pt idx="0">
+                  <c:v>Default</c:v>
+                </c:pt>
+                <c:pt idx="1">
+                  <c:v>L=0.6</c:v>
+                </c:pt>
+                <c:pt idx="2">
+                  <c:v>N=200</c:v>
+                </c:pt>
+                <c:pt idx="3">
+                  <c:v>E=10</c:v>
+                </c:pt>
+                <c:pt idx="4">
+                  <c:v>E=30</c:v>
+                </c:pt>
+              </c:strCache>
+            </c:strRef>
+          </c:cat>
+          <c:val>
+            <c:numRef>
+              <c:f>Sheet1!$C$2:$C$6</c:f>
+              <c:numCache>
+                <c:formatCode>General</c:formatCode>
+                <c:ptCount val="5"/>
+                <c:pt idx="0">
+                  <c:v>56.0979</c:v>
+                </c:pt>
+                <c:pt idx="1">
+                  <c:v>59.0282</c:v>
+                </c:pt>
+                <c:pt idx="2">
+                  <c:v>55.1429</c:v>
+                </c:pt>
+                <c:pt idx="3">
+                  <c:v>56.0979</c:v>
+                </c:pt>
+                <c:pt idx="4">
+                  <c:v>56.0979</c:v>
+                </c:pt>
+              </c:numCache>
+            </c:numRef>
+          </c:val>
+        </c:ser>
+        <c:dLbls>
+          <c:showLegendKey val="0"/>
+          <c:showVal val="0"/>
+          <c:showCatName val="0"/>
+          <c:showSerName val="0"/>
+          <c:showPercent val="0"/>
+          <c:showBubbleSize val="0"/>
+        </c:dLbls>
+        <c:gapWidth val="219"/>
+        <c:overlap val="-27"/>
+        <c:axId val="-751382672"/>
+        <c:axId val="-751380352"/>
+      </c:barChart>
+      <c:catAx>
+        <c:axId val="-751382672"/>
+        <c:scaling>
+          <c:orientation val="minMax"/>
+        </c:scaling>
+        <c:delete val="0"/>
+        <c:axPos val="b"/>
+        <c:numFmt formatCode="General" sourceLinked="1"/>
+        <c:majorTickMark val="none"/>
+        <c:minorTickMark val="none"/>
+        <c:tickLblPos val="nextTo"/>
+        <c:spPr>
+          <a:noFill/>
+          <a:ln w="9525" cap="flat" cmpd="sng" algn="ctr">
+            <a:solidFill>
+              <a:schemeClr val="tx1">
+                <a:lumMod val="15000"/>
+                <a:lumOff val="85000"/>
+              </a:schemeClr>
+            </a:solidFill>
+            <a:round/>
+          </a:ln>
+          <a:effectLst/>
+        </c:spPr>
+        <c:txPr>
+          <a:bodyPr rot="-60000000" spcFirstLastPara="1" vertOverflow="ellipsis" vert="horz" wrap="square" anchor="ctr" anchorCtr="1"/>
+          <a:lstStyle/>
+          <a:p>
+            <a:pPr>
+              <a:defRPr sz="1197" b="0" i="0" u="none" strike="noStrike" kern="1200" baseline="0">
+                <a:solidFill>
+                  <a:schemeClr val="tx1">
+                    <a:lumMod val="65000"/>
+                    <a:lumOff val="35000"/>
+                  </a:schemeClr>
+                </a:solidFill>
+                <a:latin typeface="+mn-lt"/>
+                <a:ea typeface="+mn-ea"/>
+                <a:cs typeface="+mn-cs"/>
+              </a:defRPr>
+            </a:pPr>
+            <a:endParaRPr lang="en-US"/>
+          </a:p>
+        </c:txPr>
+        <c:crossAx val="-751380352"/>
+        <c:crosses val="autoZero"/>
+        <c:auto val="1"/>
+        <c:lblAlgn val="ctr"/>
+        <c:lblOffset val="100"/>
+        <c:noMultiLvlLbl val="0"/>
+      </c:catAx>
+      <c:valAx>
+        <c:axId val="-751380352"/>
+        <c:scaling>
+          <c:orientation val="minMax"/>
+        </c:scaling>
+        <c:delete val="0"/>
+        <c:axPos val="l"/>
+        <c:majorGridlines>
+          <c:spPr>
+            <a:ln w="9525" cap="flat" cmpd="sng" algn="ctr">
+              <a:solidFill>
+                <a:schemeClr val="tx1">
+                  <a:lumMod val="15000"/>
+                  <a:lumOff val="85000"/>
+                </a:schemeClr>
+              </a:solidFill>
+              <a:round/>
+            </a:ln>
+            <a:effectLst/>
+          </c:spPr>
+        </c:majorGridlines>
+        <c:majorTickMark val="none"/>
+        <c:minorTickMark val="none"/>
+        <c:tickLblPos val="nextTo"/>
+        <c:spPr>
+          <a:noFill/>
+          <a:ln>
+            <a:noFill/>
+          </a:ln>
+          <a:effectLst/>
+        </c:spPr>
+        <c:txPr>
+          <a:bodyPr rot="-60000000" spcFirstLastPara="1" vertOverflow="ellipsis" vert="horz" wrap="square" anchor="ctr" anchorCtr="1"/>
+          <a:lstStyle/>
+          <a:p>
+            <a:pPr>
+              <a:defRPr sz="1197" b="0" i="0" u="none" strike="noStrike" kern="1200" baseline="0">
+                <a:solidFill>
+                  <a:schemeClr val="tx1">
+                    <a:lumMod val="65000"/>
+                    <a:lumOff val="35000"/>
+                  </a:schemeClr>
+                </a:solidFill>
+                <a:latin typeface="+mn-lt"/>
+                <a:ea typeface="+mn-ea"/>
+                <a:cs typeface="+mn-cs"/>
+              </a:defRPr>
+            </a:pPr>
+            <a:endParaRPr lang="en-US"/>
+          </a:p>
+        </c:txPr>
+        <c:crossAx val="-751382672"/>
+        <c:crosses val="autoZero"/>
+        <c:crossBetween val="between"/>
+      </c:valAx>
+      <c:spPr>
+        <a:noFill/>
+        <a:ln>
+          <a:noFill/>
+        </a:ln>
+        <a:effectLst/>
+      </c:spPr>
+    </c:plotArea>
+    <c:legend>
+      <c:legendPos val="b"/>
+      <c:layout/>
+      <c:overlay val="0"/>
+      <c:spPr>
+        <a:noFill/>
+        <a:ln>
+          <a:noFill/>
+        </a:ln>
+        <a:effectLst/>
+      </c:spPr>
+      <c:txPr>
+        <a:bodyPr rot="0" spcFirstLastPara="1" vertOverflow="ellipsis" vert="horz" wrap="square" anchor="ctr" anchorCtr="1"/>
+        <a:lstStyle/>
+        <a:p>
+          <a:pPr>
+            <a:defRPr sz="1197" b="0" i="0" u="none" strike="noStrike" kern="1200" baseline="0">
+              <a:solidFill>
+                <a:schemeClr val="tx1">
+                  <a:lumMod val="65000"/>
+                  <a:lumOff val="35000"/>
+                </a:schemeClr>
+              </a:solidFill>
+              <a:latin typeface="+mn-lt"/>
+              <a:ea typeface="+mn-ea"/>
+              <a:cs typeface="+mn-cs"/>
+            </a:defRPr>
+          </a:pPr>
+          <a:endParaRPr lang="en-US"/>
+        </a:p>
+      </c:txPr>
+    </c:legend>
+    <c:plotVisOnly val="1"/>
+    <c:dispBlanksAs val="gap"/>
+    <c:showDLblsOverMax val="0"/>
+  </c:chart>
+  <c:spPr>
+    <a:noFill/>
+    <a:ln>
+      <a:noFill/>
+    </a:ln>
+    <a:effectLst/>
+  </c:spPr>
+  <c:txPr>
+    <a:bodyPr/>
+    <a:lstStyle/>
+    <a:p>
+      <a:pPr>
+        <a:defRPr/>
+      </a:pPr>
+      <a:endParaRPr lang="en-US"/>
+    </a:p>
+  </c:txPr>
+  <c:externalData r:id="rId3">
+    <c:autoUpdate val="0"/>
+  </c:externalData>
+</c:chartSpace>
+</file>
+
+<file path=ppt/charts/chart2.xml><?xml version="1.0" encoding="utf-8"?>
+<c:chartSpace xmlns:c="http://schemas.openxmlformats.org/drawingml/2006/chart" xmlns:a="http://schemas.openxmlformats.org/drawingml/2006/main" xmlns:r="http://schemas.openxmlformats.org/officeDocument/2006/relationships">
+  <c:date1904 val="0"/>
+  <c:lang val="en-US"/>
+  <c:roundedCorners val="0"/>
+  <mc:AlternateContent xmlns:mc="http://schemas.openxmlformats.org/markup-compatibility/2006">
+    <mc:Choice xmlns:c14="http://schemas.microsoft.com/office/drawing/2007/8/2/chart" Requires="c14">
+      <c14:style val="102"/>
+    </mc:Choice>
+    <mc:Fallback>
+      <c:style val="2"/>
+    </mc:Fallback>
+  </mc:AlternateContent>
+  <c:chart>
+    <c:title>
+      <c:tx>
+        <c:rich>
+          <a:bodyPr rot="0" spcFirstLastPara="1" vertOverflow="ellipsis" vert="horz" wrap="square" anchor="ctr" anchorCtr="1"/>
+          <a:lstStyle/>
+          <a:p>
+            <a:pPr>
+              <a:defRPr sz="1862" b="0" i="0" u="none" strike="noStrike" kern="1200" spc="0" baseline="0">
+                <a:solidFill>
+                  <a:schemeClr val="tx1">
+                    <a:lumMod val="65000"/>
+                    <a:lumOff val="35000"/>
+                  </a:schemeClr>
+                </a:solidFill>
+                <a:latin typeface="+mn-lt"/>
+                <a:ea typeface="+mn-ea"/>
+                <a:cs typeface="+mn-cs"/>
+              </a:defRPr>
+            </a:pPr>
+            <a:r>
+              <a:rPr lang="en-US" dirty="0" smtClean="0"/>
+              <a:t>Digit </a:t>
+            </a:r>
+            <a:r>
+              <a:rPr lang="en-US" dirty="0" smtClean="0"/>
+              <a:t>Recognition</a:t>
+            </a:r>
+            <a:endParaRPr lang="en-US" dirty="0"/>
+          </a:p>
+        </c:rich>
+      </c:tx>
+      <c:layout/>
+      <c:overlay val="0"/>
+      <c:spPr>
+        <a:noFill/>
+        <a:ln>
+          <a:noFill/>
+        </a:ln>
+        <a:effectLst/>
+      </c:spPr>
+      <c:txPr>
+        <a:bodyPr rot="0" spcFirstLastPara="1" vertOverflow="ellipsis" vert="horz" wrap="square" anchor="ctr" anchorCtr="1"/>
+        <a:lstStyle/>
+        <a:p>
+          <a:pPr>
+            <a:defRPr sz="1862" b="0" i="0" u="none" strike="noStrike" kern="1200" spc="0" baseline="0">
+              <a:solidFill>
+                <a:schemeClr val="tx1">
+                  <a:lumMod val="65000"/>
+                  <a:lumOff val="35000"/>
+                </a:schemeClr>
+              </a:solidFill>
+              <a:latin typeface="+mn-lt"/>
+              <a:ea typeface="+mn-ea"/>
+              <a:cs typeface="+mn-cs"/>
+            </a:defRPr>
+          </a:pPr>
+          <a:endParaRPr lang="en-US"/>
+        </a:p>
+      </c:txPr>
+    </c:title>
+    <c:autoTitleDeleted val="0"/>
+    <c:plotArea>
+      <c:layout/>
+      <c:barChart>
+        <c:barDir val="col"/>
+        <c:grouping val="clustered"/>
+        <c:varyColors val="0"/>
+        <c:ser>
+          <c:idx val="0"/>
+          <c:order val="0"/>
+          <c:tx>
+            <c:strRef>
+              <c:f>Sheet1!$B$1</c:f>
+              <c:strCache>
+                <c:ptCount val="1"/>
+                <c:pt idx="0">
+                  <c:v>Correctness</c:v>
+                </c:pt>
+              </c:strCache>
+            </c:strRef>
+          </c:tx>
+          <c:spPr>
+            <a:solidFill>
+              <a:schemeClr val="accent1"/>
+            </a:solidFill>
+            <a:ln>
+              <a:noFill/>
+            </a:ln>
+            <a:effectLst/>
+          </c:spPr>
+          <c:invertIfNegative val="0"/>
+          <c:cat>
+            <c:strRef>
+              <c:f>Sheet1!$A$2:$A$6</c:f>
+              <c:strCache>
+                <c:ptCount val="5"/>
+                <c:pt idx="0">
+                  <c:v>Default</c:v>
+                </c:pt>
+                <c:pt idx="1">
+                  <c:v>L=0.6</c:v>
+                </c:pt>
+                <c:pt idx="2">
+                  <c:v>N=200</c:v>
+                </c:pt>
+                <c:pt idx="3">
+                  <c:v>E=10</c:v>
+                </c:pt>
+                <c:pt idx="4">
+                  <c:v>E=30</c:v>
+                </c:pt>
+              </c:strCache>
+            </c:strRef>
+          </c:cat>
+          <c:val>
+            <c:numRef>
+              <c:f>Sheet1!$B$2:$B$6</c:f>
+              <c:numCache>
+                <c:formatCode>General</c:formatCode>
+                <c:ptCount val="5"/>
+                <c:pt idx="0">
+                  <c:v>92.73</c:v>
+                </c:pt>
+                <c:pt idx="1">
+                  <c:v>74.77</c:v>
+                </c:pt>
+                <c:pt idx="2">
+                  <c:v>93.27</c:v>
+                </c:pt>
+                <c:pt idx="3">
+                  <c:v>92.73</c:v>
+                </c:pt>
+                <c:pt idx="4">
+                  <c:v>92.73</c:v>
+                </c:pt>
+              </c:numCache>
+            </c:numRef>
+          </c:val>
+        </c:ser>
+        <c:ser>
+          <c:idx val="1"/>
+          <c:order val="1"/>
+          <c:tx>
+            <c:strRef>
+              <c:f>Sheet1!$C$1</c:f>
+              <c:strCache>
+                <c:ptCount val="1"/>
+                <c:pt idx="0">
+                  <c:v>Root relative squared error</c:v>
+                </c:pt>
+              </c:strCache>
+            </c:strRef>
+          </c:tx>
+          <c:spPr>
+            <a:solidFill>
+              <a:schemeClr val="accent2"/>
+            </a:solidFill>
+            <a:ln>
+              <a:noFill/>
+            </a:ln>
+            <a:effectLst/>
+          </c:spPr>
+          <c:invertIfNegative val="0"/>
+          <c:cat>
+            <c:strRef>
+              <c:f>Sheet1!$A$2:$A$6</c:f>
+              <c:strCache>
+                <c:ptCount val="5"/>
+                <c:pt idx="0">
+                  <c:v>Default</c:v>
+                </c:pt>
+                <c:pt idx="1">
+                  <c:v>L=0.6</c:v>
+                </c:pt>
+                <c:pt idx="2">
+                  <c:v>N=200</c:v>
+                </c:pt>
+                <c:pt idx="3">
+                  <c:v>E=10</c:v>
+                </c:pt>
+                <c:pt idx="4">
+                  <c:v>E=30</c:v>
+                </c:pt>
+              </c:strCache>
+            </c:strRef>
+          </c:cat>
+          <c:val>
+            <c:numRef>
+              <c:f>Sheet1!$C$2:$C$6</c:f>
+              <c:numCache>
+                <c:formatCode>General</c:formatCode>
+                <c:ptCount val="5"/>
+                <c:pt idx="0">
+                  <c:v>38.5267</c:v>
+                </c:pt>
+                <c:pt idx="1">
+                  <c:v>74.6975</c:v>
+                </c:pt>
+                <c:pt idx="2">
+                  <c:v>37.2382</c:v>
+                </c:pt>
+                <c:pt idx="3">
+                  <c:v>38.5267</c:v>
+                </c:pt>
+                <c:pt idx="4">
+                  <c:v>38.5267</c:v>
+                </c:pt>
+              </c:numCache>
+            </c:numRef>
+          </c:val>
+        </c:ser>
+        <c:dLbls>
+          <c:showLegendKey val="0"/>
+          <c:showVal val="0"/>
+          <c:showCatName val="0"/>
+          <c:showSerName val="0"/>
+          <c:showPercent val="0"/>
+          <c:showBubbleSize val="0"/>
+        </c:dLbls>
+        <c:gapWidth val="219"/>
+        <c:overlap val="-27"/>
+        <c:axId val="-747980992"/>
+        <c:axId val="-747978672"/>
+      </c:barChart>
+      <c:catAx>
+        <c:axId val="-747980992"/>
+        <c:scaling>
+          <c:orientation val="minMax"/>
+        </c:scaling>
+        <c:delete val="0"/>
+        <c:axPos val="b"/>
+        <c:numFmt formatCode="General" sourceLinked="1"/>
+        <c:majorTickMark val="none"/>
+        <c:minorTickMark val="none"/>
+        <c:tickLblPos val="nextTo"/>
+        <c:spPr>
+          <a:noFill/>
+          <a:ln w="9525" cap="flat" cmpd="sng" algn="ctr">
+            <a:solidFill>
+              <a:schemeClr val="tx1">
+                <a:lumMod val="15000"/>
+                <a:lumOff val="85000"/>
+              </a:schemeClr>
+            </a:solidFill>
+            <a:round/>
+          </a:ln>
+          <a:effectLst/>
+        </c:spPr>
+        <c:txPr>
+          <a:bodyPr rot="-60000000" spcFirstLastPara="1" vertOverflow="ellipsis" vert="horz" wrap="square" anchor="ctr" anchorCtr="1"/>
+          <a:lstStyle/>
+          <a:p>
+            <a:pPr>
+              <a:defRPr sz="1197" b="0" i="0" u="none" strike="noStrike" kern="1200" baseline="0">
+                <a:solidFill>
+                  <a:schemeClr val="tx1">
+                    <a:lumMod val="65000"/>
+                    <a:lumOff val="35000"/>
+                  </a:schemeClr>
+                </a:solidFill>
+                <a:latin typeface="+mn-lt"/>
+                <a:ea typeface="+mn-ea"/>
+                <a:cs typeface="+mn-cs"/>
+              </a:defRPr>
+            </a:pPr>
+            <a:endParaRPr lang="en-US"/>
+          </a:p>
+        </c:txPr>
+        <c:crossAx val="-747978672"/>
+        <c:crosses val="autoZero"/>
+        <c:auto val="1"/>
+        <c:lblAlgn val="ctr"/>
+        <c:lblOffset val="100"/>
+        <c:noMultiLvlLbl val="0"/>
+      </c:catAx>
+      <c:valAx>
+        <c:axId val="-747978672"/>
+        <c:scaling>
+          <c:orientation val="minMax"/>
+        </c:scaling>
+        <c:delete val="0"/>
+        <c:axPos val="l"/>
+        <c:majorGridlines>
+          <c:spPr>
+            <a:ln w="9525" cap="flat" cmpd="sng" algn="ctr">
+              <a:solidFill>
+                <a:schemeClr val="tx1">
+                  <a:lumMod val="15000"/>
+                  <a:lumOff val="85000"/>
+                </a:schemeClr>
+              </a:solidFill>
+              <a:round/>
+            </a:ln>
+            <a:effectLst/>
+          </c:spPr>
+        </c:majorGridlines>
+        <c:majorTickMark val="none"/>
+        <c:minorTickMark val="none"/>
+        <c:tickLblPos val="nextTo"/>
+        <c:spPr>
+          <a:noFill/>
+          <a:ln>
+            <a:noFill/>
+          </a:ln>
+          <a:effectLst/>
+        </c:spPr>
+        <c:txPr>
+          <a:bodyPr rot="-60000000" spcFirstLastPara="1" vertOverflow="ellipsis" vert="horz" wrap="square" anchor="ctr" anchorCtr="1"/>
+          <a:lstStyle/>
+          <a:p>
+            <a:pPr>
+              <a:defRPr sz="1197" b="0" i="0" u="none" strike="noStrike" kern="1200" baseline="0">
+                <a:solidFill>
+                  <a:schemeClr val="tx1">
+                    <a:lumMod val="65000"/>
+                    <a:lumOff val="35000"/>
+                  </a:schemeClr>
+                </a:solidFill>
+                <a:latin typeface="+mn-lt"/>
+                <a:ea typeface="+mn-ea"/>
+                <a:cs typeface="+mn-cs"/>
+              </a:defRPr>
+            </a:pPr>
+            <a:endParaRPr lang="en-US"/>
+          </a:p>
+        </c:txPr>
+        <c:crossAx val="-747980992"/>
+        <c:crosses val="autoZero"/>
+        <c:crossBetween val="between"/>
+      </c:valAx>
+      <c:spPr>
+        <a:noFill/>
+        <a:ln>
+          <a:noFill/>
+        </a:ln>
+        <a:effectLst/>
+      </c:spPr>
+    </c:plotArea>
+    <c:legend>
+      <c:legendPos val="b"/>
+      <c:layout/>
+      <c:overlay val="0"/>
+      <c:spPr>
+        <a:noFill/>
+        <a:ln>
+          <a:noFill/>
+        </a:ln>
+        <a:effectLst/>
+      </c:spPr>
+      <c:txPr>
+        <a:bodyPr rot="0" spcFirstLastPara="1" vertOverflow="ellipsis" vert="horz" wrap="square" anchor="ctr" anchorCtr="1"/>
+        <a:lstStyle/>
+        <a:p>
+          <a:pPr>
+            <a:defRPr sz="1197" b="0" i="0" u="none" strike="noStrike" kern="1200" baseline="0">
+              <a:solidFill>
+                <a:schemeClr val="tx1">
+                  <a:lumMod val="65000"/>
+                  <a:lumOff val="35000"/>
+                </a:schemeClr>
+              </a:solidFill>
+              <a:latin typeface="+mn-lt"/>
+              <a:ea typeface="+mn-ea"/>
+              <a:cs typeface="+mn-cs"/>
+            </a:defRPr>
+          </a:pPr>
+          <a:endParaRPr lang="en-US"/>
+        </a:p>
+      </c:txPr>
+    </c:legend>
+    <c:plotVisOnly val="1"/>
+    <c:dispBlanksAs val="gap"/>
+    <c:showDLblsOverMax val="0"/>
+  </c:chart>
+  <c:spPr>
+    <a:noFill/>
+    <a:ln>
+      <a:noFill/>
+    </a:ln>
+    <a:effectLst/>
+  </c:spPr>
+  <c:txPr>
+    <a:bodyPr/>
+    <a:lstStyle/>
+    <a:p>
+      <a:pPr>
+        <a:defRPr/>
+      </a:pPr>
+      <a:endParaRPr lang="en-US"/>
+    </a:p>
+  </c:txPr>
+  <c:externalData r:id="rId3">
+    <c:autoUpdate val="0"/>
+  </c:externalData>
+</c:chartSpace>
+</file>
+
+<file path=ppt/charts/chart3.xml><?xml version="1.0" encoding="utf-8"?>
+<c:chartSpace xmlns:c="http://schemas.openxmlformats.org/drawingml/2006/chart" xmlns:a="http://schemas.openxmlformats.org/drawingml/2006/main" xmlns:r="http://schemas.openxmlformats.org/officeDocument/2006/relationships">
+  <c:date1904 val="0"/>
+  <c:lang val="en-US"/>
+  <c:roundedCorners val="0"/>
+  <mc:AlternateContent xmlns:mc="http://schemas.openxmlformats.org/markup-compatibility/2006">
+    <mc:Choice xmlns:c14="http://schemas.microsoft.com/office/drawing/2007/8/2/chart" Requires="c14">
+      <c14:style val="102"/>
+    </mc:Choice>
+    <mc:Fallback>
+      <c:style val="2"/>
+    </mc:Fallback>
+  </mc:AlternateContent>
+  <c:chart>
+    <c:title>
+      <c:layout/>
+      <c:overlay val="0"/>
+      <c:spPr>
+        <a:noFill/>
+        <a:ln>
+          <a:noFill/>
+        </a:ln>
+        <a:effectLst/>
+      </c:spPr>
+      <c:txPr>
+        <a:bodyPr rot="0" spcFirstLastPara="1" vertOverflow="ellipsis" vert="horz" wrap="square" anchor="ctr" anchorCtr="1"/>
+        <a:lstStyle/>
+        <a:p>
+          <a:pPr>
+            <a:defRPr sz="1862" b="0" i="0" u="none" strike="noStrike" kern="1200" spc="0" baseline="0">
+              <a:solidFill>
+                <a:schemeClr val="tx1">
+                  <a:lumMod val="65000"/>
+                  <a:lumOff val="35000"/>
+                </a:schemeClr>
+              </a:solidFill>
+              <a:latin typeface="+mn-lt"/>
+              <a:ea typeface="+mn-ea"/>
+              <a:cs typeface="+mn-cs"/>
+            </a:defRPr>
+          </a:pPr>
+          <a:endParaRPr lang="en-US"/>
+        </a:p>
+      </c:txPr>
+    </c:title>
+    <c:autoTitleDeleted val="0"/>
+    <c:plotArea>
+      <c:layout/>
+      <c:barChart>
+        <c:barDir val="col"/>
+        <c:grouping val="clustered"/>
+        <c:varyColors val="0"/>
+        <c:ser>
+          <c:idx val="0"/>
+          <c:order val="0"/>
+          <c:tx>
+            <c:strRef>
+              <c:f>Sheet1!$B$1</c:f>
+              <c:strCache>
+                <c:ptCount val="1"/>
+                <c:pt idx="0">
+                  <c:v>Correctness</c:v>
+                </c:pt>
+              </c:strCache>
+            </c:strRef>
+          </c:tx>
+          <c:spPr>
+            <a:solidFill>
+              <a:schemeClr val="accent1"/>
+            </a:solidFill>
+            <a:ln>
+              <a:noFill/>
+            </a:ln>
+            <a:effectLst/>
+          </c:spPr>
+          <c:invertIfNegative val="0"/>
+          <c:cat>
+            <c:strRef>
+              <c:f>Sheet1!$A$2:$A$3</c:f>
+              <c:strCache>
+                <c:ptCount val="2"/>
+                <c:pt idx="0">
+                  <c:v>1st</c:v>
+                </c:pt>
+                <c:pt idx="1">
+                  <c:v>2nd</c:v>
+                </c:pt>
+              </c:strCache>
+            </c:strRef>
+          </c:cat>
+          <c:val>
+            <c:numRef>
+              <c:f>Sheet1!$B$2:$B$3</c:f>
+              <c:numCache>
+                <c:formatCode>General</c:formatCode>
+                <c:ptCount val="2"/>
+                <c:pt idx="0">
+                  <c:v>74.77</c:v>
+                </c:pt>
+                <c:pt idx="1">
+                  <c:v>98.36239999999999</c:v>
+                </c:pt>
+              </c:numCache>
+            </c:numRef>
+          </c:val>
+        </c:ser>
+        <c:ser>
+          <c:idx val="1"/>
+          <c:order val="1"/>
+          <c:tx>
+            <c:strRef>
+              <c:f>Sheet1!$C$1</c:f>
+              <c:strCache>
+                <c:ptCount val="1"/>
+                <c:pt idx="0">
+                  <c:v>Root relative squared error</c:v>
+                </c:pt>
+              </c:strCache>
+            </c:strRef>
+          </c:tx>
+          <c:spPr>
+            <a:solidFill>
+              <a:schemeClr val="accent2"/>
+            </a:solidFill>
+            <a:ln>
+              <a:noFill/>
+            </a:ln>
+            <a:effectLst/>
+          </c:spPr>
+          <c:invertIfNegative val="0"/>
+          <c:cat>
+            <c:strRef>
+              <c:f>Sheet1!$A$2:$A$3</c:f>
+              <c:strCache>
+                <c:ptCount val="2"/>
+                <c:pt idx="0">
+                  <c:v>1st</c:v>
+                </c:pt>
+                <c:pt idx="1">
+                  <c:v>2nd</c:v>
+                </c:pt>
+              </c:strCache>
+            </c:strRef>
+          </c:cat>
+          <c:val>
+            <c:numRef>
+              <c:f>Sheet1!$C$2:$C$3</c:f>
+              <c:numCache>
+                <c:formatCode>General</c:formatCode>
+                <c:ptCount val="2"/>
+                <c:pt idx="0">
+                  <c:v>74.6975</c:v>
+                </c:pt>
+                <c:pt idx="1">
+                  <c:v>17.857</c:v>
+                </c:pt>
+              </c:numCache>
+            </c:numRef>
+          </c:val>
+        </c:ser>
+        <c:dLbls>
+          <c:showLegendKey val="0"/>
+          <c:showVal val="0"/>
+          <c:showCatName val="0"/>
+          <c:showSerName val="0"/>
+          <c:showPercent val="0"/>
+          <c:showBubbleSize val="0"/>
+        </c:dLbls>
+        <c:gapWidth val="219"/>
+        <c:overlap val="-27"/>
+        <c:axId val="-749252624"/>
+        <c:axId val="-749093536"/>
+      </c:barChart>
+      <c:catAx>
+        <c:axId val="-749252624"/>
+        <c:scaling>
+          <c:orientation val="minMax"/>
+        </c:scaling>
+        <c:delete val="0"/>
+        <c:axPos val="b"/>
+        <c:numFmt formatCode="General" sourceLinked="1"/>
+        <c:majorTickMark val="none"/>
+        <c:minorTickMark val="none"/>
+        <c:tickLblPos val="nextTo"/>
+        <c:spPr>
+          <a:noFill/>
+          <a:ln w="9525" cap="flat" cmpd="sng" algn="ctr">
+            <a:solidFill>
+              <a:schemeClr val="tx1">
+                <a:lumMod val="15000"/>
+                <a:lumOff val="85000"/>
+              </a:schemeClr>
+            </a:solidFill>
+            <a:round/>
+          </a:ln>
+          <a:effectLst/>
+        </c:spPr>
+        <c:txPr>
+          <a:bodyPr rot="-60000000" spcFirstLastPara="1" vertOverflow="ellipsis" vert="horz" wrap="square" anchor="ctr" anchorCtr="1"/>
+          <a:lstStyle/>
+          <a:p>
+            <a:pPr>
+              <a:defRPr sz="1197" b="0" i="0" u="none" strike="noStrike" kern="1200" baseline="0">
+                <a:solidFill>
+                  <a:schemeClr val="tx1">
+                    <a:lumMod val="65000"/>
+                    <a:lumOff val="35000"/>
+                  </a:schemeClr>
+                </a:solidFill>
+                <a:latin typeface="+mn-lt"/>
+                <a:ea typeface="+mn-ea"/>
+                <a:cs typeface="+mn-cs"/>
+              </a:defRPr>
+            </a:pPr>
+            <a:endParaRPr lang="en-US"/>
+          </a:p>
+        </c:txPr>
+        <c:crossAx val="-749093536"/>
+        <c:crosses val="autoZero"/>
+        <c:auto val="1"/>
+        <c:lblAlgn val="ctr"/>
+        <c:lblOffset val="100"/>
+        <c:noMultiLvlLbl val="0"/>
+      </c:catAx>
+      <c:valAx>
+        <c:axId val="-749093536"/>
+        <c:scaling>
+          <c:orientation val="minMax"/>
+        </c:scaling>
+        <c:delete val="0"/>
+        <c:axPos val="l"/>
+        <c:majorGridlines>
+          <c:spPr>
+            <a:ln w="9525" cap="flat" cmpd="sng" algn="ctr">
+              <a:solidFill>
+                <a:schemeClr val="tx1">
+                  <a:lumMod val="15000"/>
+                  <a:lumOff val="85000"/>
+                </a:schemeClr>
+              </a:solidFill>
+              <a:round/>
+            </a:ln>
+            <a:effectLst/>
+          </c:spPr>
+        </c:majorGridlines>
+        <c:majorTickMark val="none"/>
+        <c:minorTickMark val="none"/>
+        <c:tickLblPos val="nextTo"/>
+        <c:spPr>
+          <a:noFill/>
+          <a:ln>
+            <a:noFill/>
+          </a:ln>
+          <a:effectLst/>
+        </c:spPr>
+        <c:txPr>
+          <a:bodyPr rot="-60000000" spcFirstLastPara="1" vertOverflow="ellipsis" vert="horz" wrap="square" anchor="ctr" anchorCtr="1"/>
+          <a:lstStyle/>
+          <a:p>
+            <a:pPr>
+              <a:defRPr sz="1197" b="0" i="0" u="none" strike="noStrike" kern="1200" baseline="0">
+                <a:solidFill>
+                  <a:schemeClr val="tx1">
+                    <a:lumMod val="65000"/>
+                    <a:lumOff val="35000"/>
+                  </a:schemeClr>
+                </a:solidFill>
+                <a:latin typeface="+mn-lt"/>
+                <a:ea typeface="+mn-ea"/>
+                <a:cs typeface="+mn-cs"/>
+              </a:defRPr>
+            </a:pPr>
+            <a:endParaRPr lang="en-US"/>
+          </a:p>
+        </c:txPr>
+        <c:crossAx val="-749252624"/>
+        <c:crosses val="autoZero"/>
+        <c:crossBetween val="between"/>
+      </c:valAx>
+      <c:spPr>
+        <a:noFill/>
+        <a:ln>
+          <a:noFill/>
+        </a:ln>
+        <a:effectLst/>
+      </c:spPr>
+    </c:plotArea>
+    <c:legend>
+      <c:legendPos val="b"/>
+      <c:layout/>
+      <c:overlay val="0"/>
+      <c:spPr>
+        <a:noFill/>
+        <a:ln>
+          <a:noFill/>
+        </a:ln>
+        <a:effectLst/>
+      </c:spPr>
+      <c:txPr>
+        <a:bodyPr rot="0" spcFirstLastPara="1" vertOverflow="ellipsis" vert="horz" wrap="square" anchor="ctr" anchorCtr="1"/>
+        <a:lstStyle/>
+        <a:p>
+          <a:pPr>
+            <a:defRPr sz="1197" b="0" i="0" u="none" strike="noStrike" kern="1200" baseline="0">
+              <a:solidFill>
+                <a:schemeClr val="tx1">
+                  <a:lumMod val="65000"/>
+                  <a:lumOff val="35000"/>
+                </a:schemeClr>
+              </a:solidFill>
+              <a:latin typeface="+mn-lt"/>
+              <a:ea typeface="+mn-ea"/>
+              <a:cs typeface="+mn-cs"/>
+            </a:defRPr>
+          </a:pPr>
+          <a:endParaRPr lang="en-US"/>
+        </a:p>
+      </c:txPr>
+    </c:legend>
+    <c:plotVisOnly val="1"/>
+    <c:dispBlanksAs val="gap"/>
+    <c:showDLblsOverMax val="0"/>
+  </c:chart>
+  <c:spPr>
+    <a:noFill/>
+    <a:ln>
+      <a:noFill/>
+    </a:ln>
+    <a:effectLst/>
+  </c:spPr>
+  <c:txPr>
+    <a:bodyPr/>
+    <a:lstStyle/>
+    <a:p>
+      <a:pPr>
+        <a:defRPr/>
+      </a:pPr>
+      <a:endParaRPr lang="en-US"/>
+    </a:p>
+  </c:txPr>
+  <c:externalData r:id="rId3">
+    <c:autoUpdate val="0"/>
+  </c:externalData>
+</c:chartSpace>
+</file>
+
+<file path=ppt/charts/colors1.xml><?xml version="1.0" encoding="utf-8"?>
+<cs:colorStyle xmlns:cs="http://schemas.microsoft.com/office/drawing/2012/chartStyle" xmlns:a="http://schemas.openxmlformats.org/drawingml/2006/main" meth="cycle" id="10">
+  <a:schemeClr val="accent1"/>
+  <a:schemeClr val="accent2"/>
+  <a:schemeClr val="accent3"/>
+  <a:schemeClr val="accent4"/>
+  <a:schemeClr val="accent5"/>
+  <a:schemeClr val="accent6"/>
+  <cs:variation/>
+  <cs:variation>
+    <a:lumMod val="60000"/>
+  </cs:variation>
+  <cs:variation>
+    <a:lumMod val="80000"/>
+    <a:lumOff val="20000"/>
+  </cs:variation>
+  <cs:variation>
+    <a:lumMod val="80000"/>
+  </cs:variation>
+  <cs:variation>
+    <a:lumMod val="60000"/>
+    <a:lumOff val="40000"/>
+  </cs:variation>
+  <cs:variation>
+    <a:lumMod val="50000"/>
+  </cs:variation>
+  <cs:variation>
+    <a:lumMod val="70000"/>
+    <a:lumOff val="30000"/>
+  </cs:variation>
+  <cs:variation>
+    <a:lumMod val="70000"/>
+  </cs:variation>
+  <cs:variation>
+    <a:lumMod val="50000"/>
+    <a:lumOff val="50000"/>
+  </cs:variation>
+</cs:colorStyle>
+</file>
+
+<file path=ppt/charts/colors2.xml><?xml version="1.0" encoding="utf-8"?>
+<cs:colorStyle xmlns:cs="http://schemas.microsoft.com/office/drawing/2012/chartStyle" xmlns:a="http://schemas.openxmlformats.org/drawingml/2006/main" meth="cycle" id="10">
+  <a:schemeClr val="accent1"/>
+  <a:schemeClr val="accent2"/>
+  <a:schemeClr val="accent3"/>
+  <a:schemeClr val="accent4"/>
+  <a:schemeClr val="accent5"/>
+  <a:schemeClr val="accent6"/>
+  <cs:variation/>
+  <cs:variation>
+    <a:lumMod val="60000"/>
+  </cs:variation>
+  <cs:variation>
+    <a:lumMod val="80000"/>
+    <a:lumOff val="20000"/>
+  </cs:variation>
+  <cs:variation>
+    <a:lumMod val="80000"/>
+  </cs:variation>
+  <cs:variation>
+    <a:lumMod val="60000"/>
+    <a:lumOff val="40000"/>
+  </cs:variation>
+  <cs:variation>
+    <a:lumMod val="50000"/>
+  </cs:variation>
+  <cs:variation>
+    <a:lumMod val="70000"/>
+    <a:lumOff val="30000"/>
+  </cs:variation>
+  <cs:variation>
+    <a:lumMod val="70000"/>
+  </cs:variation>
+  <cs:variation>
+    <a:lumMod val="50000"/>
+    <a:lumOff val="50000"/>
+  </cs:variation>
+</cs:colorStyle>
+</file>
+
+<file path=ppt/charts/colors3.xml><?xml version="1.0" encoding="utf-8"?>
+<cs:colorStyle xmlns:cs="http://schemas.microsoft.com/office/drawing/2012/chartStyle" xmlns:a="http://schemas.openxmlformats.org/drawingml/2006/main" meth="cycle" id="10">
+  <a:schemeClr val="accent1"/>
+  <a:schemeClr val="accent2"/>
+  <a:schemeClr val="accent3"/>
+  <a:schemeClr val="accent4"/>
+  <a:schemeClr val="accent5"/>
+  <a:schemeClr val="accent6"/>
+  <cs:variation/>
+  <cs:variation>
+    <a:lumMod val="60000"/>
+  </cs:variation>
+  <cs:variation>
+    <a:lumMod val="80000"/>
+    <a:lumOff val="20000"/>
+  </cs:variation>
+  <cs:variation>
+    <a:lumMod val="80000"/>
+  </cs:variation>
+  <cs:variation>
+    <a:lumMod val="60000"/>
+    <a:lumOff val="40000"/>
+  </cs:variation>
+  <cs:variation>
+    <a:lumMod val="50000"/>
+  </cs:variation>
+  <cs:variation>
+    <a:lumMod val="70000"/>
+    <a:lumOff val="30000"/>
+  </cs:variation>
+  <cs:variation>
+    <a:lumMod val="70000"/>
+  </cs:variation>
+  <cs:variation>
+    <a:lumMod val="50000"/>
+    <a:lumOff val="50000"/>
+  </cs:variation>
+</cs:colorStyle>
+</file>
+
+<file path=ppt/charts/style1.xml><?xml version="1.0" encoding="utf-8"?>
+<cs:chartStyle xmlns:cs="http://schemas.microsoft.com/office/drawing/2012/chartStyle" xmlns:a="http://schemas.openxmlformats.org/drawingml/2006/main" id="201">
+  <cs:axisTitle>
+    <cs:lnRef idx="0"/>
+    <cs:fillRef idx="0"/>
+    <cs:effectRef idx="0"/>
+    <cs:fontRef idx="minor">
+      <a:schemeClr val="tx1">
+        <a:lumMod val="65000"/>
+        <a:lumOff val="35000"/>
+      </a:schemeClr>
+    </cs:fontRef>
+    <cs:defRPr sz="1330" kern="1200"/>
+  </cs:axisTitle>
+  <cs:categoryAxis>
+    <cs:lnRef idx="0"/>
+    <cs:fillRef idx="0"/>
+    <cs:effectRef idx="0"/>
+    <cs:fontRef idx="minor">
+      <a:schemeClr val="tx1">
+        <a:lumMod val="65000"/>
+        <a:lumOff val="35000"/>
+      </a:schemeClr>
+    </cs:fontRef>
+    <cs:spPr>
+      <a:ln w="9525" cap="flat" cmpd="sng" algn="ctr">
+        <a:solidFill>
+          <a:schemeClr val="tx1">
+            <a:lumMod val="15000"/>
+            <a:lumOff val="85000"/>
+          </a:schemeClr>
+        </a:solidFill>
+        <a:round/>
+      </a:ln>
+    </cs:spPr>
+    <cs:defRPr sz="1197" kern="1200"/>
+  </cs:categoryAxis>
+  <cs:chartArea mods="allowNoFillOverride allowNoLineOverride">
+    <cs:lnRef idx="0"/>
+    <cs:fillRef idx="0"/>
+    <cs:effectRef idx="0"/>
+    <cs:fontRef idx="minor">
+      <a:schemeClr val="tx1"/>
+    </cs:fontRef>
+    <cs:spPr>
+      <a:solidFill>
+        <a:schemeClr val="bg1"/>
+      </a:solidFill>
+      <a:ln w="9525" cap="flat" cmpd="sng" algn="ctr">
+        <a:solidFill>
+          <a:schemeClr val="tx1">
+            <a:lumMod val="15000"/>
+            <a:lumOff val="85000"/>
+          </a:schemeClr>
+        </a:solidFill>
+        <a:round/>
+      </a:ln>
+    </cs:spPr>
+    <cs:defRPr sz="1330" kern="1200"/>
+  </cs:chartArea>
+  <cs:dataLabel>
+    <cs:lnRef idx="0"/>
+    <cs:fillRef idx="0"/>
+    <cs:effectRef idx="0"/>
+    <cs:fontRef idx="minor">
+      <a:schemeClr val="tx1">
+        <a:lumMod val="75000"/>
+        <a:lumOff val="25000"/>
+      </a:schemeClr>
+    </cs:fontRef>
+    <cs:defRPr sz="1197" kern="1200"/>
+  </cs:dataLabel>
+  <cs:dataLabelCallout>
+    <cs:lnRef idx="0"/>
+    <cs:fillRef idx="0"/>
+    <cs:effectRef idx="0"/>
+    <cs:fontRef idx="minor">
+      <a:schemeClr val="dk1">
+        <a:lumMod val="65000"/>
+        <a:lumOff val="35000"/>
+      </a:schemeClr>
+    </cs:fontRef>
+    <cs:spPr>
+      <a:solidFill>
+        <a:schemeClr val="lt1"/>
+      </a:solidFill>
+      <a:ln>
+        <a:solidFill>
+          <a:schemeClr val="dk1">
+            <a:lumMod val="25000"/>
+            <a:lumOff val="75000"/>
+          </a:schemeClr>
+        </a:solidFill>
+      </a:ln>
+    </cs:spPr>
+    <cs:defRPr sz="1197" kern="1200"/>
+    <cs:bodyPr rot="0" spcFirstLastPara="1" vertOverflow="clip" horzOverflow="clip" vert="horz" wrap="square" lIns="36576" tIns="18288" rIns="36576" bIns="18288" anchor="ctr" anchorCtr="1">
+      <a:spAutoFit/>
+    </cs:bodyPr>
+  </cs:dataLabelCallout>
+  <cs:dataPoint>
+    <cs:lnRef idx="0"/>
+    <cs:fillRef idx="1">
+      <cs:styleClr val="auto"/>
+    </cs:fillRef>
+    <cs:effectRef idx="0"/>
+    <cs:fontRef idx="minor">
+      <a:schemeClr val="tx1"/>
+    </cs:fontRef>
+  </cs:dataPoint>
+  <cs:dataPoint3D>
+    <cs:lnRef idx="0"/>
+    <cs:fillRef idx="1">
+      <cs:styleClr val="auto"/>
+    </cs:fillRef>
+    <cs:effectRef idx="0"/>
+    <cs:fontRef idx="minor">
+      <a:schemeClr val="tx1"/>
+    </cs:fontRef>
+  </cs:dataPoint3D>
+  <cs:dataPointLine>
+    <cs:lnRef idx="0">
+      <cs:styleClr val="auto"/>
+    </cs:lnRef>
+    <cs:fillRef idx="1"/>
+    <cs:effectRef idx="0"/>
+    <cs:fontRef idx="minor">
+      <a:schemeClr val="tx1"/>
+    </cs:fontRef>
+    <cs:spPr>
+      <a:ln w="28575" cap="rnd">
+        <a:solidFill>
+          <a:schemeClr val="phClr"/>
+        </a:solidFill>
+        <a:round/>
+      </a:ln>
+    </cs:spPr>
+  </cs:dataPointLine>
+  <cs:dataPointMarker>
+    <cs:lnRef idx="0">
+      <cs:styleClr val="auto"/>
+    </cs:lnRef>
+    <cs:fillRef idx="1">
+      <cs:styleClr val="auto"/>
+    </cs:fillRef>
+    <cs:effectRef idx="0"/>
+    <cs:fontRef idx="minor">
+      <a:schemeClr val="tx1"/>
+    </cs:fontRef>
+    <cs:spPr>
+      <a:ln w="9525">
+        <a:solidFill>
+          <a:schemeClr val="phClr"/>
+        </a:solidFill>
+      </a:ln>
+    </cs:spPr>
+  </cs:dataPointMarker>
+  <cs:dataPointMarkerLayout symbol="circle" size="5"/>
+  <cs:dataPointWireframe>
+    <cs:lnRef idx="0">
+      <cs:styleClr val="auto"/>
+    </cs:lnRef>
+    <cs:fillRef idx="1"/>
+    <cs:effectRef idx="0"/>
+    <cs:fontRef idx="minor">
+      <a:schemeClr val="tx1"/>
+    </cs:fontRef>
+    <cs:spPr>
+      <a:ln w="9525" cap="rnd">
+        <a:solidFill>
+          <a:schemeClr val="phClr"/>
+        </a:solidFill>
+        <a:round/>
+      </a:ln>
+    </cs:spPr>
+  </cs:dataPointWireframe>
+  <cs:dataTable>
+    <cs:lnRef idx="0"/>
+    <cs:fillRef idx="0"/>
+    <cs:effectRef idx="0"/>
+    <cs:fontRef idx="minor">
+      <a:schemeClr val="tx1">
+        <a:lumMod val="65000"/>
+        <a:lumOff val="35000"/>
+      </a:schemeClr>
+    </cs:fontRef>
+    <cs:spPr>
+      <a:noFill/>
+      <a:ln w="9525" cap="flat" cmpd="sng" algn="ctr">
+        <a:solidFill>
+          <a:schemeClr val="tx1">
+            <a:lumMod val="15000"/>
+            <a:lumOff val="85000"/>
+          </a:schemeClr>
+        </a:solidFill>
+        <a:round/>
+      </a:ln>
+    </cs:spPr>
+    <cs:defRPr sz="1197" kern="1200"/>
+  </cs:dataTable>
+  <cs:downBar>
+    <cs:lnRef idx="0"/>
+    <cs:fillRef idx="0"/>
+    <cs:effectRef idx="0"/>
+    <cs:fontRef idx="minor">
+      <a:schemeClr val="dk1"/>
+    </cs:fontRef>
+    <cs:spPr>
+      <a:solidFill>
+        <a:schemeClr val="dk1">
+          <a:lumMod val="65000"/>
+          <a:lumOff val="35000"/>
+        </a:schemeClr>
+      </a:solidFill>
+      <a:ln w="9525">
+        <a:solidFill>
+          <a:schemeClr val="tx1">
+            <a:lumMod val="65000"/>
+            <a:lumOff val="35000"/>
+          </a:schemeClr>
+        </a:solidFill>
+      </a:ln>
+    </cs:spPr>
+  </cs:downBar>
+  <cs:dropLine>
+    <cs:lnRef idx="0"/>
+    <cs:fillRef idx="0"/>
+    <cs:effectRef idx="0"/>
+    <cs:fontRef idx="minor">
+      <a:schemeClr val="tx1"/>
+    </cs:fontRef>
+    <cs:spPr>
+      <a:ln w="9525" cap="flat" cmpd="sng" algn="ctr">
+        <a:solidFill>
+          <a:schemeClr val="tx1">
+            <a:lumMod val="35000"/>
+            <a:lumOff val="65000"/>
+          </a:schemeClr>
+        </a:solidFill>
+        <a:round/>
+      </a:ln>
+    </cs:spPr>
+  </cs:dropLine>
+  <cs:errorBar>
+    <cs:lnRef idx="0"/>
+    <cs:fillRef idx="0"/>
+    <cs:effectRef idx="0"/>
+    <cs:fontRef idx="minor">
+      <a:schemeClr val="tx1"/>
+    </cs:fontRef>
+    <cs:spPr>
+      <a:ln w="9525" cap="flat" cmpd="sng" algn="ctr">
+        <a:solidFill>
+          <a:schemeClr val="tx1">
+            <a:lumMod val="65000"/>
+            <a:lumOff val="35000"/>
+          </a:schemeClr>
+        </a:solidFill>
+        <a:round/>
+      </a:ln>
+    </cs:spPr>
+  </cs:errorBar>
+  <cs:floor>
+    <cs:lnRef idx="0"/>
+    <cs:fillRef idx="0"/>
+    <cs:effectRef idx="0"/>
+    <cs:fontRef idx="minor">
+      <a:schemeClr val="tx1"/>
+    </cs:fontRef>
+    <cs:spPr>
+      <a:noFill/>
+      <a:ln>
+        <a:noFill/>
+      </a:ln>
+    </cs:spPr>
+  </cs:floor>
+  <cs:gridlineMajor>
+    <cs:lnRef idx="0"/>
+    <cs:fillRef idx="0"/>
+    <cs:effectRef idx="0"/>
+    <cs:fontRef idx="minor">
+      <a:schemeClr val="tx1"/>
+    </cs:fontRef>
+    <cs:spPr>
+      <a:ln w="9525" cap="flat" cmpd="sng" algn="ctr">
+        <a:solidFill>
+          <a:schemeClr val="tx1">
+            <a:lumMod val="15000"/>
+            <a:lumOff val="85000"/>
+          </a:schemeClr>
+        </a:solidFill>
+        <a:round/>
+      </a:ln>
+    </cs:spPr>
+  </cs:gridlineMajor>
+  <cs:gridlineMinor>
+    <cs:lnRef idx="0"/>
+    <cs:fillRef idx="0"/>
+    <cs:effectRef idx="0"/>
+    <cs:fontRef idx="minor">
+      <a:schemeClr val="tx1"/>
+    </cs:fontRef>
+    <cs:spPr>
+      <a:ln w="9525" cap="flat" cmpd="sng" algn="ctr">
+        <a:solidFill>
+          <a:schemeClr val="tx1">
+            <a:lumMod val="5000"/>
+            <a:lumOff val="95000"/>
+          </a:schemeClr>
+        </a:solidFill>
+        <a:round/>
+      </a:ln>
+    </cs:spPr>
+  </cs:gridlineMinor>
+  <cs:hiLoLine>
+    <cs:lnRef idx="0"/>
+    <cs:fillRef idx="0"/>
+    <cs:effectRef idx="0"/>
+    <cs:fontRef idx="minor">
+      <a:schemeClr val="tx1"/>
+    </cs:fontRef>
+    <cs:spPr>
+      <a:ln w="9525" cap="flat" cmpd="sng" algn="ctr">
+        <a:solidFill>
+          <a:schemeClr val="tx1">
+            <a:lumMod val="75000"/>
+            <a:lumOff val="25000"/>
+          </a:schemeClr>
+        </a:solidFill>
+        <a:round/>
+      </a:ln>
+    </cs:spPr>
+  </cs:hiLoLine>
+  <cs:leaderLine>
+    <cs:lnRef idx="0"/>
+    <cs:fillRef idx="0"/>
+    <cs:effectRef idx="0"/>
+    <cs:fontRef idx="minor">
+      <a:schemeClr val="tx1"/>
+    </cs:fontRef>
+    <cs:spPr>
+      <a:ln w="9525" cap="flat" cmpd="sng" algn="ctr">
+        <a:solidFill>
+          <a:schemeClr val="tx1">
+            <a:lumMod val="35000"/>
+            <a:lumOff val="65000"/>
+          </a:schemeClr>
+        </a:solidFill>
+        <a:round/>
+      </a:ln>
+    </cs:spPr>
+  </cs:leaderLine>
+  <cs:legend>
+    <cs:lnRef idx="0"/>
+    <cs:fillRef idx="0"/>
+    <cs:effectRef idx="0"/>
+    <cs:fontRef idx="minor">
+      <a:schemeClr val="tx1">
+        <a:lumMod val="65000"/>
+        <a:lumOff val="35000"/>
+      </a:schemeClr>
+    </cs:fontRef>
+    <cs:defRPr sz="1197" kern="1200"/>
+  </cs:legend>
+  <cs:plotArea mods="allowNoFillOverride allowNoLineOverride">
+    <cs:lnRef idx="0"/>
+    <cs:fillRef idx="0"/>
+    <cs:effectRef idx="0"/>
+    <cs:fontRef idx="minor">
+      <a:schemeClr val="tx1"/>
+    </cs:fontRef>
+  </cs:plotArea>
+  <cs:plotArea3D mods="allowNoFillOverride allowNoLineOverride">
+    <cs:lnRef idx="0"/>
+    <cs:fillRef idx="0"/>
+    <cs:effectRef idx="0"/>
+    <cs:fontRef idx="minor">
+      <a:schemeClr val="tx1"/>
+    </cs:fontRef>
+  </cs:plotArea3D>
+  <cs:seriesAxis>
+    <cs:lnRef idx="0"/>
+    <cs:fillRef idx="0"/>
+    <cs:effectRef idx="0"/>
+    <cs:fontRef idx="minor">
+      <a:schemeClr val="tx1">
+        <a:lumMod val="65000"/>
+        <a:lumOff val="35000"/>
+      </a:schemeClr>
+    </cs:fontRef>
+    <cs:defRPr sz="1197" kern="1200"/>
+  </cs:seriesAxis>
+  <cs:seriesLine>
+    <cs:lnRef idx="0"/>
+    <cs:fillRef idx="0"/>
+    <cs:effectRef idx="0"/>
+    <cs:fontRef idx="minor">
+      <a:schemeClr val="tx1"/>
+    </cs:fontRef>
+    <cs:spPr>
+      <a:ln w="9525" cap="flat" cmpd="sng" algn="ctr">
+        <a:solidFill>
+          <a:schemeClr val="tx1">
+            <a:lumMod val="35000"/>
+            <a:lumOff val="65000"/>
+          </a:schemeClr>
+        </a:solidFill>
+        <a:round/>
+      </a:ln>
+    </cs:spPr>
+  </cs:seriesLine>
+  <cs:title>
+    <cs:lnRef idx="0"/>
+    <cs:fillRef idx="0"/>
+    <cs:effectRef idx="0"/>
+    <cs:fontRef idx="minor">
+      <a:schemeClr val="tx1">
+        <a:lumMod val="65000"/>
+        <a:lumOff val="35000"/>
+      </a:schemeClr>
+    </cs:fontRef>
+    <cs:defRPr sz="1862" b="0" kern="1200" spc="0" baseline="0"/>
+  </cs:title>
+  <cs:trendline>
+    <cs:lnRef idx="0">
+      <cs:styleClr val="auto"/>
+    </cs:lnRef>
+    <cs:fillRef idx="0"/>
+    <cs:effectRef idx="0"/>
+    <cs:fontRef idx="minor">
+      <a:schemeClr val="tx1"/>
+    </cs:fontRef>
+    <cs:spPr>
+      <a:ln w="19050" cap="rnd">
+        <a:solidFill>
+          <a:schemeClr val="phClr"/>
+        </a:solidFill>
+        <a:prstDash val="sysDot"/>
+      </a:ln>
+    </cs:spPr>
+  </cs:trendline>
+  <cs:trendlineLabel>
+    <cs:lnRef idx="0"/>
+    <cs:fillRef idx="0"/>
+    <cs:effectRef idx="0"/>
+    <cs:fontRef idx="minor">
+      <a:schemeClr val="tx1">
+        <a:lumMod val="65000"/>
+        <a:lumOff val="35000"/>
+      </a:schemeClr>
+    </cs:fontRef>
+    <cs:defRPr sz="1197" kern="1200"/>
+  </cs:trendlineLabel>
+  <cs:upBar>
+    <cs:lnRef idx="0"/>
+    <cs:fillRef idx="0"/>
+    <cs:effectRef idx="0"/>
+    <cs:fontRef idx="minor">
+      <a:schemeClr val="dk1"/>
+    </cs:fontRef>
+    <cs:spPr>
+      <a:solidFill>
+        <a:schemeClr val="lt1"/>
+      </a:solidFill>
+      <a:ln w="9525">
+        <a:solidFill>
+          <a:schemeClr val="tx1">
+            <a:lumMod val="15000"/>
+            <a:lumOff val="85000"/>
+          </a:schemeClr>
+        </a:solidFill>
+      </a:ln>
+    </cs:spPr>
+  </cs:upBar>
+  <cs:valueAxis>
+    <cs:lnRef idx="0"/>
+    <cs:fillRef idx="0"/>
+    <cs:effectRef idx="0"/>
+    <cs:fontRef idx="minor">
+      <a:schemeClr val="tx1">
+        <a:lumMod val="65000"/>
+        <a:lumOff val="35000"/>
+      </a:schemeClr>
+    </cs:fontRef>
+    <cs:defRPr sz="1197" kern="1200"/>
+  </cs:valueAxis>
+  <cs:wall>
+    <cs:lnRef idx="0"/>
+    <cs:fillRef idx="0"/>
+    <cs:effectRef idx="0"/>
+    <cs:fontRef idx="minor">
+      <a:schemeClr val="tx1"/>
+    </cs:fontRef>
+    <cs:spPr>
+      <a:noFill/>
+      <a:ln>
+        <a:noFill/>
+      </a:ln>
+    </cs:spPr>
+  </cs:wall>
+</cs:chartStyle>
+</file>
+
+<file path=ppt/charts/style2.xml><?xml version="1.0" encoding="utf-8"?>
+<cs:chartStyle xmlns:cs="http://schemas.microsoft.com/office/drawing/2012/chartStyle" xmlns:a="http://schemas.openxmlformats.org/drawingml/2006/main" id="201">
+  <cs:axisTitle>
+    <cs:lnRef idx="0"/>
+    <cs:fillRef idx="0"/>
+    <cs:effectRef idx="0"/>
+    <cs:fontRef idx="minor">
+      <a:schemeClr val="tx1">
+        <a:lumMod val="65000"/>
+        <a:lumOff val="35000"/>
+      </a:schemeClr>
+    </cs:fontRef>
+    <cs:defRPr sz="1330" kern="1200"/>
+  </cs:axisTitle>
+  <cs:categoryAxis>
+    <cs:lnRef idx="0"/>
+    <cs:fillRef idx="0"/>
+    <cs:effectRef idx="0"/>
+    <cs:fontRef idx="minor">
+      <a:schemeClr val="tx1">
+        <a:lumMod val="65000"/>
+        <a:lumOff val="35000"/>
+      </a:schemeClr>
+    </cs:fontRef>
+    <cs:spPr>
+      <a:ln w="9525" cap="flat" cmpd="sng" algn="ctr">
+        <a:solidFill>
+          <a:schemeClr val="tx1">
+            <a:lumMod val="15000"/>
+            <a:lumOff val="85000"/>
+          </a:schemeClr>
+        </a:solidFill>
+        <a:round/>
+      </a:ln>
+    </cs:spPr>
+    <cs:defRPr sz="1197" kern="1200"/>
+  </cs:categoryAxis>
+  <cs:chartArea mods="allowNoFillOverride allowNoLineOverride">
+    <cs:lnRef idx="0"/>
+    <cs:fillRef idx="0"/>
+    <cs:effectRef idx="0"/>
+    <cs:fontRef idx="minor">
+      <a:schemeClr val="tx1"/>
+    </cs:fontRef>
+    <cs:spPr>
+      <a:solidFill>
+        <a:schemeClr val="bg1"/>
+      </a:solidFill>
+      <a:ln w="9525" cap="flat" cmpd="sng" algn="ctr">
+        <a:solidFill>
+          <a:schemeClr val="tx1">
+            <a:lumMod val="15000"/>
+            <a:lumOff val="85000"/>
+          </a:schemeClr>
+        </a:solidFill>
+        <a:round/>
+      </a:ln>
+    </cs:spPr>
+    <cs:defRPr sz="1330" kern="1200"/>
+  </cs:chartArea>
+  <cs:dataLabel>
+    <cs:lnRef idx="0"/>
+    <cs:fillRef idx="0"/>
+    <cs:effectRef idx="0"/>
+    <cs:fontRef idx="minor">
+      <a:schemeClr val="tx1">
+        <a:lumMod val="75000"/>
+        <a:lumOff val="25000"/>
+      </a:schemeClr>
+    </cs:fontRef>
+    <cs:defRPr sz="1197" kern="1200"/>
+  </cs:dataLabel>
+  <cs:dataLabelCallout>
+    <cs:lnRef idx="0"/>
+    <cs:fillRef idx="0"/>
+    <cs:effectRef idx="0"/>
+    <cs:fontRef idx="minor">
+      <a:schemeClr val="dk1">
+        <a:lumMod val="65000"/>
+        <a:lumOff val="35000"/>
+      </a:schemeClr>
+    </cs:fontRef>
+    <cs:spPr>
+      <a:solidFill>
+        <a:schemeClr val="lt1"/>
+      </a:solidFill>
+      <a:ln>
+        <a:solidFill>
+          <a:schemeClr val="dk1">
+            <a:lumMod val="25000"/>
+            <a:lumOff val="75000"/>
+          </a:schemeClr>
+        </a:solidFill>
+      </a:ln>
+    </cs:spPr>
+    <cs:defRPr sz="1197" kern="1200"/>
+    <cs:bodyPr rot="0" spcFirstLastPara="1" vertOverflow="clip" horzOverflow="clip" vert="horz" wrap="square" lIns="36576" tIns="18288" rIns="36576" bIns="18288" anchor="ctr" anchorCtr="1">
+      <a:spAutoFit/>
+    </cs:bodyPr>
+  </cs:dataLabelCallout>
+  <cs:dataPoint>
+    <cs:lnRef idx="0"/>
+    <cs:fillRef idx="1">
+      <cs:styleClr val="auto"/>
+    </cs:fillRef>
+    <cs:effectRef idx="0"/>
+    <cs:fontRef idx="minor">
+      <a:schemeClr val="tx1"/>
+    </cs:fontRef>
+  </cs:dataPoint>
+  <cs:dataPoint3D>
+    <cs:lnRef idx="0"/>
+    <cs:fillRef idx="1">
+      <cs:styleClr val="auto"/>
+    </cs:fillRef>
+    <cs:effectRef idx="0"/>
+    <cs:fontRef idx="minor">
+      <a:schemeClr val="tx1"/>
+    </cs:fontRef>
+  </cs:dataPoint3D>
+  <cs:dataPointLine>
+    <cs:lnRef idx="0">
+      <cs:styleClr val="auto"/>
+    </cs:lnRef>
+    <cs:fillRef idx="1"/>
+    <cs:effectRef idx="0"/>
+    <cs:fontRef idx="minor">
+      <a:schemeClr val="tx1"/>
+    </cs:fontRef>
+    <cs:spPr>
+      <a:ln w="28575" cap="rnd">
+        <a:solidFill>
+          <a:schemeClr val="phClr"/>
+        </a:solidFill>
+        <a:round/>
+      </a:ln>
+    </cs:spPr>
+  </cs:dataPointLine>
+  <cs:dataPointMarker>
+    <cs:lnRef idx="0">
+      <cs:styleClr val="auto"/>
+    </cs:lnRef>
+    <cs:fillRef idx="1">
+      <cs:styleClr val="auto"/>
+    </cs:fillRef>
+    <cs:effectRef idx="0"/>
+    <cs:fontRef idx="minor">
+      <a:schemeClr val="tx1"/>
+    </cs:fontRef>
+    <cs:spPr>
+      <a:ln w="9525">
+        <a:solidFill>
+          <a:schemeClr val="phClr"/>
+        </a:solidFill>
+      </a:ln>
+    </cs:spPr>
+  </cs:dataPointMarker>
+  <cs:dataPointMarkerLayout symbol="circle" size="5"/>
+  <cs:dataPointWireframe>
+    <cs:lnRef idx="0">
+      <cs:styleClr val="auto"/>
+    </cs:lnRef>
+    <cs:fillRef idx="1"/>
+    <cs:effectRef idx="0"/>
+    <cs:fontRef idx="minor">
+      <a:schemeClr val="tx1"/>
+    </cs:fontRef>
+    <cs:spPr>
+      <a:ln w="9525" cap="rnd">
+        <a:solidFill>
+          <a:schemeClr val="phClr"/>
+        </a:solidFill>
+        <a:round/>
+      </a:ln>
+    </cs:spPr>
+  </cs:dataPointWireframe>
+  <cs:dataTable>
+    <cs:lnRef idx="0"/>
+    <cs:fillRef idx="0"/>
+    <cs:effectRef idx="0"/>
+    <cs:fontRef idx="minor">
+      <a:schemeClr val="tx1">
+        <a:lumMod val="65000"/>
+        <a:lumOff val="35000"/>
+      </a:schemeClr>
+    </cs:fontRef>
+    <cs:spPr>
+      <a:noFill/>
+      <a:ln w="9525" cap="flat" cmpd="sng" algn="ctr">
+        <a:solidFill>
+          <a:schemeClr val="tx1">
+            <a:lumMod val="15000"/>
+            <a:lumOff val="85000"/>
+          </a:schemeClr>
+        </a:solidFill>
+        <a:round/>
+      </a:ln>
+    </cs:spPr>
+    <cs:defRPr sz="1197" kern="1200"/>
+  </cs:dataTable>
+  <cs:downBar>
+    <cs:lnRef idx="0"/>
+    <cs:fillRef idx="0"/>
+    <cs:effectRef idx="0"/>
+    <cs:fontRef idx="minor">
+      <a:schemeClr val="dk1"/>
+    </cs:fontRef>
+    <cs:spPr>
+      <a:solidFill>
+        <a:schemeClr val="dk1">
+          <a:lumMod val="65000"/>
+          <a:lumOff val="35000"/>
+        </a:schemeClr>
+      </a:solidFill>
+      <a:ln w="9525">
+        <a:solidFill>
+          <a:schemeClr val="tx1">
+            <a:lumMod val="65000"/>
+            <a:lumOff val="35000"/>
+          </a:schemeClr>
+        </a:solidFill>
+      </a:ln>
+    </cs:spPr>
+  </cs:downBar>
+  <cs:dropLine>
+    <cs:lnRef idx="0"/>
+    <cs:fillRef idx="0"/>
+    <cs:effectRef idx="0"/>
+    <cs:fontRef idx="minor">
+      <a:schemeClr val="tx1"/>
+    </cs:fontRef>
+    <cs:spPr>
+      <a:ln w="9525" cap="flat" cmpd="sng" algn="ctr">
+        <a:solidFill>
+          <a:schemeClr val="tx1">
+            <a:lumMod val="35000"/>
+            <a:lumOff val="65000"/>
+          </a:schemeClr>
+        </a:solidFill>
+        <a:round/>
+      </a:ln>
+    </cs:spPr>
+  </cs:dropLine>
+  <cs:errorBar>
+    <cs:lnRef idx="0"/>
+    <cs:fillRef idx="0"/>
+    <cs:effectRef idx="0"/>
+    <cs:fontRef idx="minor">
+      <a:schemeClr val="tx1"/>
+    </cs:fontRef>
+    <cs:spPr>
+      <a:ln w="9525" cap="flat" cmpd="sng" algn="ctr">
+        <a:solidFill>
+          <a:schemeClr val="tx1">
+            <a:lumMod val="65000"/>
+            <a:lumOff val="35000"/>
+          </a:schemeClr>
+        </a:solidFill>
+        <a:round/>
+      </a:ln>
+    </cs:spPr>
+  </cs:errorBar>
+  <cs:floor>
+    <cs:lnRef idx="0"/>
+    <cs:fillRef idx="0"/>
+    <cs:effectRef idx="0"/>
+    <cs:fontRef idx="minor">
+      <a:schemeClr val="tx1"/>
+    </cs:fontRef>
+    <cs:spPr>
+      <a:noFill/>
+      <a:ln>
+        <a:noFill/>
+      </a:ln>
+    </cs:spPr>
+  </cs:floor>
+  <cs:gridlineMajor>
+    <cs:lnRef idx="0"/>
+    <cs:fillRef idx="0"/>
+    <cs:effectRef idx="0"/>
+    <cs:fontRef idx="minor">
+      <a:schemeClr val="tx1"/>
+    </cs:fontRef>
+    <cs:spPr>
+      <a:ln w="9525" cap="flat" cmpd="sng" algn="ctr">
+        <a:solidFill>
+          <a:schemeClr val="tx1">
+            <a:lumMod val="15000"/>
+            <a:lumOff val="85000"/>
+          </a:schemeClr>
+        </a:solidFill>
+        <a:round/>
+      </a:ln>
+    </cs:spPr>
+  </cs:gridlineMajor>
+  <cs:gridlineMinor>
+    <cs:lnRef idx="0"/>
+    <cs:fillRef idx="0"/>
+    <cs:effectRef idx="0"/>
+    <cs:fontRef idx="minor">
+      <a:schemeClr val="tx1"/>
+    </cs:fontRef>
+    <cs:spPr>
+      <a:ln w="9525" cap="flat" cmpd="sng" algn="ctr">
+        <a:solidFill>
+          <a:schemeClr val="tx1">
+            <a:lumMod val="5000"/>
+            <a:lumOff val="95000"/>
+          </a:schemeClr>
+        </a:solidFill>
+        <a:round/>
+      </a:ln>
+    </cs:spPr>
+  </cs:gridlineMinor>
+  <cs:hiLoLine>
+    <cs:lnRef idx="0"/>
+    <cs:fillRef idx="0"/>
+    <cs:effectRef idx="0"/>
+    <cs:fontRef idx="minor">
+      <a:schemeClr val="tx1"/>
+    </cs:fontRef>
+    <cs:spPr>
+      <a:ln w="9525" cap="flat" cmpd="sng" algn="ctr">
+        <a:solidFill>
+          <a:schemeClr val="tx1">
+            <a:lumMod val="75000"/>
+            <a:lumOff val="25000"/>
+          </a:schemeClr>
+        </a:solidFill>
+        <a:round/>
+      </a:ln>
+    </cs:spPr>
+  </cs:hiLoLine>
+  <cs:leaderLine>
+    <cs:lnRef idx="0"/>
+    <cs:fillRef idx="0"/>
+    <cs:effectRef idx="0"/>
+    <cs:fontRef idx="minor">
+      <a:schemeClr val="tx1"/>
+    </cs:fontRef>
+    <cs:spPr>
+      <a:ln w="9525" cap="flat" cmpd="sng" algn="ctr">
+        <a:solidFill>
+          <a:schemeClr val="tx1">
+            <a:lumMod val="35000"/>
+            <a:lumOff val="65000"/>
+          </a:schemeClr>
+        </a:solidFill>
+        <a:round/>
+      </a:ln>
+    </cs:spPr>
+  </cs:leaderLine>
+  <cs:legend>
+    <cs:lnRef idx="0"/>
+    <cs:fillRef idx="0"/>
+    <cs:effectRef idx="0"/>
+    <cs:fontRef idx="minor">
+      <a:schemeClr val="tx1">
+        <a:lumMod val="65000"/>
+        <a:lumOff val="35000"/>
+      </a:schemeClr>
+    </cs:fontRef>
+    <cs:defRPr sz="1197" kern="1200"/>
+  </cs:legend>
+  <cs:plotArea mods="allowNoFillOverride allowNoLineOverride">
+    <cs:lnRef idx="0"/>
+    <cs:fillRef idx="0"/>
+    <cs:effectRef idx="0"/>
+    <cs:fontRef idx="minor">
+      <a:schemeClr val="tx1"/>
+    </cs:fontRef>
+  </cs:plotArea>
+  <cs:plotArea3D mods="allowNoFillOverride allowNoLineOverride">
+    <cs:lnRef idx="0"/>
+    <cs:fillRef idx="0"/>
+    <cs:effectRef idx="0"/>
+    <cs:fontRef idx="minor">
+      <a:schemeClr val="tx1"/>
+    </cs:fontRef>
+  </cs:plotArea3D>
+  <cs:seriesAxis>
+    <cs:lnRef idx="0"/>
+    <cs:fillRef idx="0"/>
+    <cs:effectRef idx="0"/>
+    <cs:fontRef idx="minor">
+      <a:schemeClr val="tx1">
+        <a:lumMod val="65000"/>
+        <a:lumOff val="35000"/>
+      </a:schemeClr>
+    </cs:fontRef>
+    <cs:defRPr sz="1197" kern="1200"/>
+  </cs:seriesAxis>
+  <cs:seriesLine>
+    <cs:lnRef idx="0"/>
+    <cs:fillRef idx="0"/>
+    <cs:effectRef idx="0"/>
+    <cs:fontRef idx="minor">
+      <a:schemeClr val="tx1"/>
+    </cs:fontRef>
+    <cs:spPr>
+      <a:ln w="9525" cap="flat" cmpd="sng" algn="ctr">
+        <a:solidFill>
+          <a:schemeClr val="tx1">
+            <a:lumMod val="35000"/>
+            <a:lumOff val="65000"/>
+          </a:schemeClr>
+        </a:solidFill>
+        <a:round/>
+      </a:ln>
+    </cs:spPr>
+  </cs:seriesLine>
+  <cs:title>
+    <cs:lnRef idx="0"/>
+    <cs:fillRef idx="0"/>
+    <cs:effectRef idx="0"/>
+    <cs:fontRef idx="minor">
+      <a:schemeClr val="tx1">
+        <a:lumMod val="65000"/>
+        <a:lumOff val="35000"/>
+      </a:schemeClr>
+    </cs:fontRef>
+    <cs:defRPr sz="1862" b="0" kern="1200" spc="0" baseline="0"/>
+  </cs:title>
+  <cs:trendline>
+    <cs:lnRef idx="0">
+      <cs:styleClr val="auto"/>
+    </cs:lnRef>
+    <cs:fillRef idx="0"/>
+    <cs:effectRef idx="0"/>
+    <cs:fontRef idx="minor">
+      <a:schemeClr val="tx1"/>
+    </cs:fontRef>
+    <cs:spPr>
+      <a:ln w="19050" cap="rnd">
+        <a:solidFill>
+          <a:schemeClr val="phClr"/>
+        </a:solidFill>
+        <a:prstDash val="sysDot"/>
+      </a:ln>
+    </cs:spPr>
+  </cs:trendline>
+  <cs:trendlineLabel>
+    <cs:lnRef idx="0"/>
+    <cs:fillRef idx="0"/>
+    <cs:effectRef idx="0"/>
+    <cs:fontRef idx="minor">
+      <a:schemeClr val="tx1">
+        <a:lumMod val="65000"/>
+        <a:lumOff val="35000"/>
+      </a:schemeClr>
+    </cs:fontRef>
+    <cs:defRPr sz="1197" kern="1200"/>
+  </cs:trendlineLabel>
+  <cs:upBar>
+    <cs:lnRef idx="0"/>
+    <cs:fillRef idx="0"/>
+    <cs:effectRef idx="0"/>
+    <cs:fontRef idx="minor">
+      <a:schemeClr val="dk1"/>
+    </cs:fontRef>
+    <cs:spPr>
+      <a:solidFill>
+        <a:schemeClr val="lt1"/>
+      </a:solidFill>
+      <a:ln w="9525">
+        <a:solidFill>
+          <a:schemeClr val="tx1">
+            <a:lumMod val="15000"/>
+            <a:lumOff val="85000"/>
+          </a:schemeClr>
+        </a:solidFill>
+      </a:ln>
+    </cs:spPr>
+  </cs:upBar>
+  <cs:valueAxis>
+    <cs:lnRef idx="0"/>
+    <cs:fillRef idx="0"/>
+    <cs:effectRef idx="0"/>
+    <cs:fontRef idx="minor">
+      <a:schemeClr val="tx1">
+        <a:lumMod val="65000"/>
+        <a:lumOff val="35000"/>
+      </a:schemeClr>
+    </cs:fontRef>
+    <cs:defRPr sz="1197" kern="1200"/>
+  </cs:valueAxis>
+  <cs:wall>
+    <cs:lnRef idx="0"/>
+    <cs:fillRef idx="0"/>
+    <cs:effectRef idx="0"/>
+    <cs:fontRef idx="minor">
+      <a:schemeClr val="tx1"/>
+    </cs:fontRef>
+    <cs:spPr>
+      <a:noFill/>
+      <a:ln>
+        <a:noFill/>
+      </a:ln>
+    </cs:spPr>
+  </cs:wall>
+</cs:chartStyle>
+</file>
+
+<file path=ppt/charts/style3.xml><?xml version="1.0" encoding="utf-8"?>
+<cs:chartStyle xmlns:cs="http://schemas.microsoft.com/office/drawing/2012/chartStyle" xmlns:a="http://schemas.openxmlformats.org/drawingml/2006/main" id="201">
+  <cs:axisTitle>
+    <cs:lnRef idx="0"/>
+    <cs:fillRef idx="0"/>
+    <cs:effectRef idx="0"/>
+    <cs:fontRef idx="minor">
+      <a:schemeClr val="tx1">
+        <a:lumMod val="65000"/>
+        <a:lumOff val="35000"/>
+      </a:schemeClr>
+    </cs:fontRef>
+    <cs:defRPr sz="1330" kern="1200"/>
+  </cs:axisTitle>
+  <cs:categoryAxis>
+    <cs:lnRef idx="0"/>
+    <cs:fillRef idx="0"/>
+    <cs:effectRef idx="0"/>
+    <cs:fontRef idx="minor">
+      <a:schemeClr val="tx1">
+        <a:lumMod val="65000"/>
+        <a:lumOff val="35000"/>
+      </a:schemeClr>
+    </cs:fontRef>
+    <cs:spPr>
+      <a:ln w="9525" cap="flat" cmpd="sng" algn="ctr">
+        <a:solidFill>
+          <a:schemeClr val="tx1">
+            <a:lumMod val="15000"/>
+            <a:lumOff val="85000"/>
+          </a:schemeClr>
+        </a:solidFill>
+        <a:round/>
+      </a:ln>
+    </cs:spPr>
+    <cs:defRPr sz="1197" kern="1200"/>
+  </cs:categoryAxis>
+  <cs:chartArea mods="allowNoFillOverride allowNoLineOverride">
+    <cs:lnRef idx="0"/>
+    <cs:fillRef idx="0"/>
+    <cs:effectRef idx="0"/>
+    <cs:fontRef idx="minor">
+      <a:schemeClr val="tx1"/>
+    </cs:fontRef>
+    <cs:spPr>
+      <a:solidFill>
+        <a:schemeClr val="bg1"/>
+      </a:solidFill>
+      <a:ln w="9525" cap="flat" cmpd="sng" algn="ctr">
+        <a:solidFill>
+          <a:schemeClr val="tx1">
+            <a:lumMod val="15000"/>
+            <a:lumOff val="85000"/>
+          </a:schemeClr>
+        </a:solidFill>
+        <a:round/>
+      </a:ln>
+    </cs:spPr>
+    <cs:defRPr sz="1330" kern="1200"/>
+  </cs:chartArea>
+  <cs:dataLabel>
+    <cs:lnRef idx="0"/>
+    <cs:fillRef idx="0"/>
+    <cs:effectRef idx="0"/>
+    <cs:fontRef idx="minor">
+      <a:schemeClr val="tx1">
+        <a:lumMod val="75000"/>
+        <a:lumOff val="25000"/>
+      </a:schemeClr>
+    </cs:fontRef>
+    <cs:defRPr sz="1197" kern="1200"/>
+  </cs:dataLabel>
+  <cs:dataLabelCallout>
+    <cs:lnRef idx="0"/>
+    <cs:fillRef idx="0"/>
+    <cs:effectRef idx="0"/>
+    <cs:fontRef idx="minor">
+      <a:schemeClr val="dk1">
+        <a:lumMod val="65000"/>
+        <a:lumOff val="35000"/>
+      </a:schemeClr>
+    </cs:fontRef>
+    <cs:spPr>
+      <a:solidFill>
+        <a:schemeClr val="lt1"/>
+      </a:solidFill>
+      <a:ln>
+        <a:solidFill>
+          <a:schemeClr val="dk1">
+            <a:lumMod val="25000"/>
+            <a:lumOff val="75000"/>
+          </a:schemeClr>
+        </a:solidFill>
+      </a:ln>
+    </cs:spPr>
+    <cs:defRPr sz="1197" kern="1200"/>
+    <cs:bodyPr rot="0" spcFirstLastPara="1" vertOverflow="clip" horzOverflow="clip" vert="horz" wrap="square" lIns="36576" tIns="18288" rIns="36576" bIns="18288" anchor="ctr" anchorCtr="1">
+      <a:spAutoFit/>
+    </cs:bodyPr>
+  </cs:dataLabelCallout>
+  <cs:dataPoint>
+    <cs:lnRef idx="0"/>
+    <cs:fillRef idx="1">
+      <cs:styleClr val="auto"/>
+    </cs:fillRef>
+    <cs:effectRef idx="0"/>
+    <cs:fontRef idx="minor">
+      <a:schemeClr val="tx1"/>
+    </cs:fontRef>
+  </cs:dataPoint>
+  <cs:dataPoint3D>
+    <cs:lnRef idx="0"/>
+    <cs:fillRef idx="1">
+      <cs:styleClr val="auto"/>
+    </cs:fillRef>
+    <cs:effectRef idx="0"/>
+    <cs:fontRef idx="minor">
+      <a:schemeClr val="tx1"/>
+    </cs:fontRef>
+  </cs:dataPoint3D>
+  <cs:dataPointLine>
+    <cs:lnRef idx="0">
+      <cs:styleClr val="auto"/>
+    </cs:lnRef>
+    <cs:fillRef idx="1"/>
+    <cs:effectRef idx="0"/>
+    <cs:fontRef idx="minor">
+      <a:schemeClr val="tx1"/>
+    </cs:fontRef>
+    <cs:spPr>
+      <a:ln w="28575" cap="rnd">
+        <a:solidFill>
+          <a:schemeClr val="phClr"/>
+        </a:solidFill>
+        <a:round/>
+      </a:ln>
+    </cs:spPr>
+  </cs:dataPointLine>
+  <cs:dataPointMarker>
+    <cs:lnRef idx="0">
+      <cs:styleClr val="auto"/>
+    </cs:lnRef>
+    <cs:fillRef idx="1">
+      <cs:styleClr val="auto"/>
+    </cs:fillRef>
+    <cs:effectRef idx="0"/>
+    <cs:fontRef idx="minor">
+      <a:schemeClr val="tx1"/>
+    </cs:fontRef>
+    <cs:spPr>
+      <a:ln w="9525">
+        <a:solidFill>
+          <a:schemeClr val="phClr"/>
+        </a:solidFill>
+      </a:ln>
+    </cs:spPr>
+  </cs:dataPointMarker>
+  <cs:dataPointMarkerLayout symbol="circle" size="5"/>
+  <cs:dataPointWireframe>
+    <cs:lnRef idx="0">
+      <cs:styleClr val="auto"/>
+    </cs:lnRef>
+    <cs:fillRef idx="1"/>
+    <cs:effectRef idx="0"/>
+    <cs:fontRef idx="minor">
+      <a:schemeClr val="tx1"/>
+    </cs:fontRef>
+    <cs:spPr>
+      <a:ln w="9525" cap="rnd">
+        <a:solidFill>
+          <a:schemeClr val="phClr"/>
+        </a:solidFill>
+        <a:round/>
+      </a:ln>
+    </cs:spPr>
+  </cs:dataPointWireframe>
+  <cs:dataTable>
+    <cs:lnRef idx="0"/>
+    <cs:fillRef idx="0"/>
+    <cs:effectRef idx="0"/>
+    <cs:fontRef idx="minor">
+      <a:schemeClr val="tx1">
+        <a:lumMod val="65000"/>
+        <a:lumOff val="35000"/>
+      </a:schemeClr>
+    </cs:fontRef>
+    <cs:spPr>
+      <a:noFill/>
+      <a:ln w="9525" cap="flat" cmpd="sng" algn="ctr">
+        <a:solidFill>
+          <a:schemeClr val="tx1">
+            <a:lumMod val="15000"/>
+            <a:lumOff val="85000"/>
+          </a:schemeClr>
+        </a:solidFill>
+        <a:round/>
+      </a:ln>
+    </cs:spPr>
+    <cs:defRPr sz="1197" kern="1200"/>
+  </cs:dataTable>
+  <cs:downBar>
+    <cs:lnRef idx="0"/>
+    <cs:fillRef idx="0"/>
+    <cs:effectRef idx="0"/>
+    <cs:fontRef idx="minor">
+      <a:schemeClr val="dk1"/>
+    </cs:fontRef>
+    <cs:spPr>
+      <a:solidFill>
+        <a:schemeClr val="dk1">
+          <a:lumMod val="65000"/>
+          <a:lumOff val="35000"/>
+        </a:schemeClr>
+      </a:solidFill>
+      <a:ln w="9525">
+        <a:solidFill>
+          <a:schemeClr val="tx1">
+            <a:lumMod val="65000"/>
+            <a:lumOff val="35000"/>
+          </a:schemeClr>
+        </a:solidFill>
+      </a:ln>
+    </cs:spPr>
+  </cs:downBar>
+  <cs:dropLine>
+    <cs:lnRef idx="0"/>
+    <cs:fillRef idx="0"/>
+    <cs:effectRef idx="0"/>
+    <cs:fontRef idx="minor">
+      <a:schemeClr val="tx1"/>
+    </cs:fontRef>
+    <cs:spPr>
+      <a:ln w="9525" cap="flat" cmpd="sng" algn="ctr">
+        <a:solidFill>
+          <a:schemeClr val="tx1">
+            <a:lumMod val="35000"/>
+            <a:lumOff val="65000"/>
+          </a:schemeClr>
+        </a:solidFill>
+        <a:round/>
+      </a:ln>
+    </cs:spPr>
+  </cs:dropLine>
+  <cs:errorBar>
+    <cs:lnRef idx="0"/>
+    <cs:fillRef idx="0"/>
+    <cs:effectRef idx="0"/>
+    <cs:fontRef idx="minor">
+      <a:schemeClr val="tx1"/>
+    </cs:fontRef>
+    <cs:spPr>
+      <a:ln w="9525" cap="flat" cmpd="sng" algn="ctr">
+        <a:solidFill>
+          <a:schemeClr val="tx1">
+            <a:lumMod val="65000"/>
+            <a:lumOff val="35000"/>
+          </a:schemeClr>
+        </a:solidFill>
+        <a:round/>
+      </a:ln>
+    </cs:spPr>
+  </cs:errorBar>
+  <cs:floor>
+    <cs:lnRef idx="0"/>
+    <cs:fillRef idx="0"/>
+    <cs:effectRef idx="0"/>
+    <cs:fontRef idx="minor">
+      <a:schemeClr val="tx1"/>
+    </cs:fontRef>
+    <cs:spPr>
+      <a:noFill/>
+      <a:ln>
+        <a:noFill/>
+      </a:ln>
+    </cs:spPr>
+  </cs:floor>
+  <cs:gridlineMajor>
+    <cs:lnRef idx="0"/>
+    <cs:fillRef idx="0"/>
+    <cs:effectRef idx="0"/>
+    <cs:fontRef idx="minor">
+      <a:schemeClr val="tx1"/>
+    </cs:fontRef>
+    <cs:spPr>
+      <a:ln w="9525" cap="flat" cmpd="sng" algn="ctr">
+        <a:solidFill>
+          <a:schemeClr val="tx1">
+            <a:lumMod val="15000"/>
+            <a:lumOff val="85000"/>
+          </a:schemeClr>
+        </a:solidFill>
+        <a:round/>
+      </a:ln>
+    </cs:spPr>
+  </cs:gridlineMajor>
+  <cs:gridlineMinor>
+    <cs:lnRef idx="0"/>
+    <cs:fillRef idx="0"/>
+    <cs:effectRef idx="0"/>
+    <cs:fontRef idx="minor">
+      <a:schemeClr val="tx1"/>
+    </cs:fontRef>
+    <cs:spPr>
+      <a:ln w="9525" cap="flat" cmpd="sng" algn="ctr">
+        <a:solidFill>
+          <a:schemeClr val="tx1">
+            <a:lumMod val="5000"/>
+            <a:lumOff val="95000"/>
+          </a:schemeClr>
+        </a:solidFill>
+        <a:round/>
+      </a:ln>
+    </cs:spPr>
+  </cs:gridlineMinor>
+  <cs:hiLoLine>
+    <cs:lnRef idx="0"/>
+    <cs:fillRef idx="0"/>
+    <cs:effectRef idx="0"/>
+    <cs:fontRef idx="minor">
+      <a:schemeClr val="tx1"/>
+    </cs:fontRef>
+    <cs:spPr>
+      <a:ln w="9525" cap="flat" cmpd="sng" algn="ctr">
+        <a:solidFill>
+          <a:schemeClr val="tx1">
+            <a:lumMod val="75000"/>
+            <a:lumOff val="25000"/>
+          </a:schemeClr>
+        </a:solidFill>
+        <a:round/>
+      </a:ln>
+    </cs:spPr>
+  </cs:hiLoLine>
+  <cs:leaderLine>
+    <cs:lnRef idx="0"/>
+    <cs:fillRef idx="0"/>
+    <cs:effectRef idx="0"/>
+    <cs:fontRef idx="minor">
+      <a:schemeClr val="tx1"/>
+    </cs:fontRef>
+    <cs:spPr>
+      <a:ln w="9525" cap="flat" cmpd="sng" algn="ctr">
+        <a:solidFill>
+          <a:schemeClr val="tx1">
+            <a:lumMod val="35000"/>
+            <a:lumOff val="65000"/>
+          </a:schemeClr>
+        </a:solidFill>
+        <a:round/>
+      </a:ln>
+    </cs:spPr>
+  </cs:leaderLine>
+  <cs:legend>
+    <cs:lnRef idx="0"/>
+    <cs:fillRef idx="0"/>
+    <cs:effectRef idx="0"/>
+    <cs:fontRef idx="minor">
+      <a:schemeClr val="tx1">
+        <a:lumMod val="65000"/>
+        <a:lumOff val="35000"/>
+      </a:schemeClr>
+    </cs:fontRef>
+    <cs:defRPr sz="1197" kern="1200"/>
+  </cs:legend>
+  <cs:plotArea mods="allowNoFillOverride allowNoLineOverride">
+    <cs:lnRef idx="0"/>
+    <cs:fillRef idx="0"/>
+    <cs:effectRef idx="0"/>
+    <cs:fontRef idx="minor">
+      <a:schemeClr val="tx1"/>
+    </cs:fontRef>
+  </cs:plotArea>
+  <cs:plotArea3D mods="allowNoFillOverride allowNoLineOverride">
+    <cs:lnRef idx="0"/>
+    <cs:fillRef idx="0"/>
+    <cs:effectRef idx="0"/>
+    <cs:fontRef idx="minor">
+      <a:schemeClr val="tx1"/>
+    </cs:fontRef>
+  </cs:plotArea3D>
+  <cs:seriesAxis>
+    <cs:lnRef idx="0"/>
+    <cs:fillRef idx="0"/>
+    <cs:effectRef idx="0"/>
+    <cs:fontRef idx="minor">
+      <a:schemeClr val="tx1">
+        <a:lumMod val="65000"/>
+        <a:lumOff val="35000"/>
+      </a:schemeClr>
+    </cs:fontRef>
+    <cs:defRPr sz="1197" kern="1200"/>
+  </cs:seriesAxis>
+  <cs:seriesLine>
+    <cs:lnRef idx="0"/>
+    <cs:fillRef idx="0"/>
+    <cs:effectRef idx="0"/>
+    <cs:fontRef idx="minor">
+      <a:schemeClr val="tx1"/>
+    </cs:fontRef>
+    <cs:spPr>
+      <a:ln w="9525" cap="flat" cmpd="sng" algn="ctr">
+        <a:solidFill>
+          <a:schemeClr val="tx1">
+            <a:lumMod val="35000"/>
+            <a:lumOff val="65000"/>
+          </a:schemeClr>
+        </a:solidFill>
+        <a:round/>
+      </a:ln>
+    </cs:spPr>
+  </cs:seriesLine>
+  <cs:title>
+    <cs:lnRef idx="0"/>
+    <cs:fillRef idx="0"/>
+    <cs:effectRef idx="0"/>
+    <cs:fontRef idx="minor">
+      <a:schemeClr val="tx1">
+        <a:lumMod val="65000"/>
+        <a:lumOff val="35000"/>
+      </a:schemeClr>
+    </cs:fontRef>
+    <cs:defRPr sz="1862" b="0" kern="1200" spc="0" baseline="0"/>
+  </cs:title>
+  <cs:trendline>
+    <cs:lnRef idx="0">
+      <cs:styleClr val="auto"/>
+    </cs:lnRef>
+    <cs:fillRef idx="0"/>
+    <cs:effectRef idx="0"/>
+    <cs:fontRef idx="minor">
+      <a:schemeClr val="tx1"/>
+    </cs:fontRef>
+    <cs:spPr>
+      <a:ln w="19050" cap="rnd">
+        <a:solidFill>
+          <a:schemeClr val="phClr"/>
+        </a:solidFill>
+        <a:prstDash val="sysDot"/>
+      </a:ln>
+    </cs:spPr>
+  </cs:trendline>
+  <cs:trendlineLabel>
+    <cs:lnRef idx="0"/>
+    <cs:fillRef idx="0"/>
+    <cs:effectRef idx="0"/>
+    <cs:fontRef idx="minor">
+      <a:schemeClr val="tx1">
+        <a:lumMod val="65000"/>
+        <a:lumOff val="35000"/>
+      </a:schemeClr>
+    </cs:fontRef>
+    <cs:defRPr sz="1197" kern="1200"/>
+  </cs:trendlineLabel>
+  <cs:upBar>
+    <cs:lnRef idx="0"/>
+    <cs:fillRef idx="0"/>
+    <cs:effectRef idx="0"/>
+    <cs:fontRef idx="minor">
+      <a:schemeClr val="dk1"/>
+    </cs:fontRef>
+    <cs:spPr>
+      <a:solidFill>
+        <a:schemeClr val="lt1"/>
+      </a:solidFill>
+      <a:ln w="9525">
+        <a:solidFill>
+          <a:schemeClr val="tx1">
+            <a:lumMod val="15000"/>
+            <a:lumOff val="85000"/>
+          </a:schemeClr>
+        </a:solidFill>
+      </a:ln>
+    </cs:spPr>
+  </cs:upBar>
+  <cs:valueAxis>
+    <cs:lnRef idx="0"/>
+    <cs:fillRef idx="0"/>
+    <cs:effectRef idx="0"/>
+    <cs:fontRef idx="minor">
+      <a:schemeClr val="tx1">
+        <a:lumMod val="65000"/>
+        <a:lumOff val="35000"/>
+      </a:schemeClr>
+    </cs:fontRef>
+    <cs:defRPr sz="1197" kern="1200"/>
+  </cs:valueAxis>
+  <cs:wall>
+    <cs:lnRef idx="0"/>
+    <cs:fillRef idx="0"/>
+    <cs:effectRef idx="0"/>
+    <cs:fontRef idx="minor">
+      <a:schemeClr val="tx1"/>
+    </cs:fontRef>
+    <cs:spPr>
+      <a:noFill/>
+      <a:ln>
+        <a:noFill/>
+      </a:ln>
+    </cs:spPr>
+  </cs:wall>
+</cs:chartStyle>
 </file>
 
 <file path=ppt/notesMasters/notesMaster1.xml><?xml version="1.0" encoding="utf-8"?>
@@ -209,7 +3009,7 @@
           <a:p>
             <a:fld id="{921DB55A-F66E-884C-A409-CC81ACA880E7}" type="datetimeFigureOut">
               <a:rPr lang="en-US" smtClean="0"/>
-              <a:t>11/22/16</a:t>
+              <a:t>11/26/16</a:t>
             </a:fld>
             <a:endParaRPr lang="en-US"/>
           </a:p>
@@ -765,7 +3565,7 @@
             <a:fld id="{B61BEF0D-F0BB-DE4B-95CE-6DB70DBA9567}" type="datetimeFigureOut">
               <a:rPr lang="en-US" dirty="0"/>
               <a:pPr/>
-              <a:t>11/22/16</a:t>
+              <a:t>11/26/16</a:t>
             </a:fld>
             <a:endParaRPr lang="en-US" dirty="0"/>
           </a:p>
@@ -1100,7 +3900,7 @@
             <a:fld id="{B61BEF0D-F0BB-DE4B-95CE-6DB70DBA9567}" type="datetimeFigureOut">
               <a:rPr lang="en-US" dirty="0"/>
               <a:pPr/>
-              <a:t>11/22/16</a:t>
+              <a:t>11/26/16</a:t>
             </a:fld>
             <a:endParaRPr lang="en-US" dirty="0"/>
           </a:p>
@@ -1498,7 +4298,7 @@
             <a:fld id="{B61BEF0D-F0BB-DE4B-95CE-6DB70DBA9567}" type="datetimeFigureOut">
               <a:rPr lang="en-US" dirty="0"/>
               <a:pPr/>
-              <a:t>11/22/16</a:t>
+              <a:t>11/26/16</a:t>
             </a:fld>
             <a:endParaRPr lang="en-US" dirty="0"/>
           </a:p>
@@ -1831,7 +4631,7 @@
             <a:fld id="{B61BEF0D-F0BB-DE4B-95CE-6DB70DBA9567}" type="datetimeFigureOut">
               <a:rPr lang="en-US" dirty="0"/>
               <a:pPr/>
-              <a:t>11/22/16</a:t>
+              <a:t>11/26/16</a:t>
             </a:fld>
             <a:endParaRPr lang="en-US" dirty="0"/>
           </a:p>
@@ -2148,7 +4948,7 @@
             <a:fld id="{B61BEF0D-F0BB-DE4B-95CE-6DB70DBA9567}" type="datetimeFigureOut">
               <a:rPr lang="en-US" dirty="0"/>
               <a:pPr/>
-              <a:t>11/22/16</a:t>
+              <a:t>11/26/16</a:t>
             </a:fld>
             <a:endParaRPr lang="en-US" dirty="0"/>
           </a:p>
@@ -2541,7 +5341,7 @@
             <a:fld id="{B61BEF0D-F0BB-DE4B-95CE-6DB70DBA9567}" type="datetimeFigureOut">
               <a:rPr lang="en-US" dirty="0"/>
               <a:pPr/>
-              <a:t>11/22/16</a:t>
+              <a:t>11/26/16</a:t>
             </a:fld>
             <a:endParaRPr lang="en-US" dirty="0"/>
           </a:p>
@@ -2795,7 +5595,7 @@
             <a:fld id="{B61BEF0D-F0BB-DE4B-95CE-6DB70DBA9567}" type="datetimeFigureOut">
               <a:rPr lang="en-US" dirty="0"/>
               <a:pPr/>
-              <a:t>11/22/16</a:t>
+              <a:t>11/26/16</a:t>
             </a:fld>
             <a:endParaRPr lang="en-US" dirty="0"/>
           </a:p>
@@ -3054,7 +5854,7 @@
             <a:fld id="{B61BEF0D-F0BB-DE4B-95CE-6DB70DBA9567}" type="datetimeFigureOut">
               <a:rPr lang="en-US" dirty="0"/>
               <a:pPr/>
-              <a:t>11/22/16</a:t>
+              <a:t>11/26/16</a:t>
             </a:fld>
             <a:endParaRPr lang="en-US" dirty="0"/>
           </a:p>
@@ -3313,7 +6113,7 @@
             <a:fld id="{B61BEF0D-F0BB-DE4B-95CE-6DB70DBA9567}" type="datetimeFigureOut">
               <a:rPr lang="en-US" dirty="0"/>
               <a:pPr/>
-              <a:t>11/22/16</a:t>
+              <a:t>11/26/16</a:t>
             </a:fld>
             <a:endParaRPr lang="en-US" dirty="0"/>
           </a:p>
@@ -3639,7 +6439,7 @@
             <a:fld id="{B61BEF0D-F0BB-DE4B-95CE-6DB70DBA9567}" type="datetimeFigureOut">
               <a:rPr lang="en-US" dirty="0"/>
               <a:pPr/>
-              <a:t>11/22/16</a:t>
+              <a:t>11/26/16</a:t>
             </a:fld>
             <a:endParaRPr lang="en-US" dirty="0"/>
           </a:p>
@@ -3959,7 +6759,7 @@
             <a:fld id="{B61BEF0D-F0BB-DE4B-95CE-6DB70DBA9567}" type="datetimeFigureOut">
               <a:rPr lang="en-US" dirty="0"/>
               <a:pPr/>
-              <a:t>11/22/16</a:t>
+              <a:t>11/26/16</a:t>
             </a:fld>
             <a:endParaRPr lang="en-US" dirty="0"/>
           </a:p>
@@ -4413,7 +7213,7 @@
             <a:fld id="{B61BEF0D-F0BB-DE4B-95CE-6DB70DBA9567}" type="datetimeFigureOut">
               <a:rPr lang="en-US" dirty="0"/>
               <a:pPr/>
-              <a:t>11/22/16</a:t>
+              <a:t>11/26/16</a:t>
             </a:fld>
             <a:endParaRPr lang="en-US" dirty="0"/>
           </a:p>
@@ -4615,7 +7415,7 @@
             <a:fld id="{B61BEF0D-F0BB-DE4B-95CE-6DB70DBA9567}" type="datetimeFigureOut">
               <a:rPr lang="en-US" dirty="0"/>
               <a:pPr/>
-              <a:t>11/22/16</a:t>
+              <a:t>11/26/16</a:t>
             </a:fld>
             <a:endParaRPr lang="en-US" dirty="0"/>
           </a:p>
@@ -4789,7 +7589,7 @@
             <a:fld id="{B61BEF0D-F0BB-DE4B-95CE-6DB70DBA9567}" type="datetimeFigureOut">
               <a:rPr lang="en-US" dirty="0"/>
               <a:pPr/>
-              <a:t>11/22/16</a:t>
+              <a:t>11/26/16</a:t>
             </a:fld>
             <a:endParaRPr lang="en-US" dirty="0"/>
           </a:p>
@@ -5119,7 +7919,7 @@
             <a:fld id="{B61BEF0D-F0BB-DE4B-95CE-6DB70DBA9567}" type="datetimeFigureOut">
               <a:rPr lang="en-US" dirty="0"/>
               <a:pPr/>
-              <a:t>11/22/16</a:t>
+              <a:t>11/26/16</a:t>
             </a:fld>
             <a:endParaRPr lang="en-US" dirty="0"/>
           </a:p>
@@ -5461,7 +8261,7 @@
             <a:fld id="{B61BEF0D-F0BB-DE4B-95CE-6DB70DBA9567}" type="datetimeFigureOut">
               <a:rPr lang="en-US" dirty="0"/>
               <a:pPr/>
-              <a:t>11/22/16</a:t>
+              <a:t>11/26/16</a:t>
             </a:fld>
             <a:endParaRPr lang="en-US" dirty="0"/>
           </a:p>
@@ -7575,7 +10375,7 @@
             <a:fld id="{B61BEF0D-F0BB-DE4B-95CE-6DB70DBA9567}" type="datetimeFigureOut">
               <a:rPr lang="en-US" dirty="0"/>
               <a:pPr/>
-              <a:t>11/22/16</a:t>
+              <a:t>11/26/16</a:t>
             </a:fld>
             <a:endParaRPr lang="en-US" dirty="0"/>
           </a:p>
@@ -8116,7 +10916,6 @@
               <a:rPr lang="en-US" sz="4400" dirty="0"/>
               <a:t>Hand-written Digits Classification and Letter Recognition</a:t>
             </a:r>
-            <a:endParaRPr lang="en-US" sz="4400" dirty="0"/>
           </a:p>
         </p:txBody>
       </p:sp>
@@ -8438,43 +11237,43 @@
       </p:grpSpPr>
       <p:sp>
         <p:nvSpPr>
-          <p:cNvPr id="2" name="Title 1"/>
+          <p:cNvPr id="4" name="Title 3"/>
           <p:cNvSpPr>
             <a:spLocks noGrp="1"/>
           </p:cNvSpPr>
           <p:nvPr>
-            <p:ph type="title"/>
+            <p:ph type="ctrTitle"/>
           </p:nvPr>
         </p:nvSpPr>
         <p:spPr/>
         <p:txBody>
-          <a:bodyPr>
-            <a:normAutofit/>
-          </a:bodyPr>
+          <a:bodyPr/>
           <a:lstStyle/>
           <a:p>
-            <a:endParaRPr lang="en-US" sz="4400" dirty="0"/>
+            <a:r>
+              <a:rPr lang="en-US" dirty="0" smtClean="0"/>
+              <a:t>Test result analysis</a:t>
+            </a:r>
+            <a:endParaRPr lang="en-US" dirty="0"/>
           </a:p>
         </p:txBody>
       </p:sp>
       <p:sp>
         <p:nvSpPr>
-          <p:cNvPr id="3" name="Content Placeholder 2"/>
+          <p:cNvPr id="5" name="Subtitle 4"/>
           <p:cNvSpPr>
             <a:spLocks noGrp="1"/>
           </p:cNvSpPr>
           <p:nvPr>
-            <p:ph idx="1"/>
+            <p:ph type="subTitle" idx="1"/>
           </p:nvPr>
         </p:nvSpPr>
         <p:spPr/>
         <p:txBody>
-          <a:bodyPr>
-            <a:normAutofit/>
-          </a:bodyPr>
+          <a:bodyPr/>
           <a:lstStyle/>
           <a:p>
-            <a:endParaRPr lang="en-US" sz="2800" dirty="0"/>
+            <a:endParaRPr lang="en-US"/>
           </a:p>
         </p:txBody>
       </p:sp>
@@ -8532,6 +11331,10 @@
           </a:bodyPr>
           <a:lstStyle/>
           <a:p>
+            <a:r>
+              <a:rPr lang="en-US" sz="4400" dirty="0" smtClean="0"/>
+              <a:t>Multilayer Perceptron</a:t>
+            </a:r>
             <a:endParaRPr lang="en-US" sz="4400" dirty="0"/>
           </a:p>
         </p:txBody>
@@ -8552,6 +11355,300 @@
             <a:normAutofit/>
           </a:bodyPr>
           <a:lstStyle/>
+          <a:p>
+            <a:r>
+              <a:rPr lang="en-US" sz="2800" dirty="0" smtClean="0"/>
+              <a:t>-L 0.3 </a:t>
+            </a:r>
+            <a:r>
+              <a:rPr lang="mr-IN" sz="2800" dirty="0" smtClean="0"/>
+              <a:t>-</a:t>
+            </a:r>
+            <a:r>
+              <a:rPr lang="en-US" sz="2800" dirty="0" smtClean="0"/>
+              <a:t>M 0.2 </a:t>
+            </a:r>
+            <a:r>
+              <a:rPr lang="mr-IN" sz="2800" dirty="0" smtClean="0"/>
+              <a:t>-</a:t>
+            </a:r>
+            <a:r>
+              <a:rPr lang="en-US" sz="2800" dirty="0" smtClean="0"/>
+              <a:t>N 500 </a:t>
+            </a:r>
+            <a:r>
+              <a:rPr lang="mr-IN" sz="2800" dirty="0" smtClean="0"/>
+              <a:t>-</a:t>
+            </a:r>
+            <a:r>
+              <a:rPr lang="en-US" sz="2800" dirty="0" smtClean="0"/>
+              <a:t>V 0 </a:t>
+            </a:r>
+            <a:r>
+              <a:rPr lang="mr-IN" sz="2800" dirty="0" smtClean="0"/>
+              <a:t>-</a:t>
+            </a:r>
+            <a:r>
+              <a:rPr lang="en-US" sz="2800" dirty="0" smtClean="0"/>
+              <a:t>S 0 </a:t>
+            </a:r>
+            <a:r>
+              <a:rPr lang="mr-IN" sz="2800" dirty="0" smtClean="0"/>
+              <a:t>-</a:t>
+            </a:r>
+            <a:r>
+              <a:rPr lang="en-US" sz="2800" dirty="0" smtClean="0"/>
+              <a:t>E 20 </a:t>
+            </a:r>
+            <a:r>
+              <a:rPr lang="mr-IN" sz="2800" dirty="0" smtClean="0"/>
+              <a:t>-</a:t>
+            </a:r>
+            <a:r>
+              <a:rPr lang="en-US" sz="2800" dirty="0" smtClean="0"/>
+              <a:t>H a</a:t>
+            </a:r>
+          </a:p>
+          <a:p>
+            <a:r>
+              <a:rPr lang="en-US" sz="2800" dirty="0"/>
+              <a:t>-L </a:t>
+            </a:r>
+            <a:r>
+              <a:rPr lang="en-US" sz="2800" dirty="0" smtClean="0"/>
+              <a:t>0.6 </a:t>
+            </a:r>
+            <a:r>
+              <a:rPr lang="mr-IN" sz="2800" dirty="0"/>
+              <a:t>-</a:t>
+            </a:r>
+            <a:r>
+              <a:rPr lang="en-US" sz="2800" dirty="0"/>
+              <a:t>M 0.2 </a:t>
+            </a:r>
+            <a:r>
+              <a:rPr lang="mr-IN" sz="2800" dirty="0"/>
+              <a:t>-</a:t>
+            </a:r>
+            <a:r>
+              <a:rPr lang="en-US" sz="2800" dirty="0"/>
+              <a:t>N 500 </a:t>
+            </a:r>
+            <a:r>
+              <a:rPr lang="mr-IN" sz="2800" dirty="0"/>
+              <a:t>-</a:t>
+            </a:r>
+            <a:r>
+              <a:rPr lang="en-US" sz="2800" dirty="0"/>
+              <a:t>V 0 </a:t>
+            </a:r>
+            <a:r>
+              <a:rPr lang="mr-IN" sz="2800" dirty="0"/>
+              <a:t>-</a:t>
+            </a:r>
+            <a:r>
+              <a:rPr lang="en-US" sz="2800" dirty="0"/>
+              <a:t>S 0 </a:t>
+            </a:r>
+            <a:r>
+              <a:rPr lang="mr-IN" sz="2800" dirty="0"/>
+              <a:t>-</a:t>
+            </a:r>
+            <a:r>
+              <a:rPr lang="en-US" sz="2800" dirty="0"/>
+              <a:t>E 20 </a:t>
+            </a:r>
+            <a:r>
+              <a:rPr lang="mr-IN" sz="2800" dirty="0"/>
+              <a:t>-</a:t>
+            </a:r>
+            <a:r>
+              <a:rPr lang="en-US" sz="2800" dirty="0"/>
+              <a:t>H a</a:t>
+            </a:r>
+          </a:p>
+          <a:p>
+            <a:r>
+              <a:rPr lang="en-US" sz="2800" dirty="0"/>
+              <a:t>-L 0.3 </a:t>
+            </a:r>
+            <a:r>
+              <a:rPr lang="mr-IN" sz="2800" dirty="0"/>
+              <a:t>-</a:t>
+            </a:r>
+            <a:r>
+              <a:rPr lang="en-US" sz="2800" dirty="0"/>
+              <a:t>M 0.2 </a:t>
+            </a:r>
+            <a:r>
+              <a:rPr lang="mr-IN" sz="2800" dirty="0"/>
+              <a:t>-</a:t>
+            </a:r>
+            <a:r>
+              <a:rPr lang="en-US" sz="2800" dirty="0"/>
+              <a:t>N </a:t>
+            </a:r>
+            <a:r>
+              <a:rPr lang="en-US" sz="2800" dirty="0" smtClean="0"/>
+              <a:t>200 </a:t>
+            </a:r>
+            <a:r>
+              <a:rPr lang="mr-IN" sz="2800" dirty="0"/>
+              <a:t>-</a:t>
+            </a:r>
+            <a:r>
+              <a:rPr lang="en-US" sz="2800" dirty="0"/>
+              <a:t>V 0 </a:t>
+            </a:r>
+            <a:r>
+              <a:rPr lang="mr-IN" sz="2800" dirty="0"/>
+              <a:t>-</a:t>
+            </a:r>
+            <a:r>
+              <a:rPr lang="en-US" sz="2800" dirty="0"/>
+              <a:t>S 0 </a:t>
+            </a:r>
+            <a:r>
+              <a:rPr lang="mr-IN" sz="2800" dirty="0"/>
+              <a:t>-</a:t>
+            </a:r>
+            <a:r>
+              <a:rPr lang="en-US" sz="2800" dirty="0"/>
+              <a:t>E 20 </a:t>
+            </a:r>
+            <a:r>
+              <a:rPr lang="mr-IN" sz="2800" dirty="0"/>
+              <a:t>-</a:t>
+            </a:r>
+            <a:r>
+              <a:rPr lang="en-US" sz="2800" dirty="0"/>
+              <a:t>H a</a:t>
+            </a:r>
+          </a:p>
+          <a:p>
+            <a:r>
+              <a:rPr lang="en-US" sz="2800" dirty="0"/>
+              <a:t>-L 0.3 </a:t>
+            </a:r>
+            <a:r>
+              <a:rPr lang="mr-IN" sz="2800" dirty="0"/>
+              <a:t>-</a:t>
+            </a:r>
+            <a:r>
+              <a:rPr lang="en-US" sz="2800" dirty="0"/>
+              <a:t>M 0.2 </a:t>
+            </a:r>
+            <a:r>
+              <a:rPr lang="mr-IN" sz="2800" dirty="0"/>
+              <a:t>-</a:t>
+            </a:r>
+            <a:r>
+              <a:rPr lang="en-US" sz="2800" dirty="0"/>
+              <a:t>N </a:t>
+            </a:r>
+            <a:r>
+              <a:rPr lang="en-US" sz="2800" dirty="0" smtClean="0"/>
+              <a:t>500 </a:t>
+            </a:r>
+            <a:r>
+              <a:rPr lang="mr-IN" sz="2800" dirty="0"/>
+              <a:t>-</a:t>
+            </a:r>
+            <a:r>
+              <a:rPr lang="en-US" sz="2800" dirty="0"/>
+              <a:t>V 0 </a:t>
+            </a:r>
+            <a:r>
+              <a:rPr lang="mr-IN" sz="2800" dirty="0"/>
+              <a:t>-</a:t>
+            </a:r>
+            <a:r>
+              <a:rPr lang="en-US" sz="2800" dirty="0"/>
+              <a:t>S 0 </a:t>
+            </a:r>
+            <a:r>
+              <a:rPr lang="mr-IN" sz="2800" dirty="0"/>
+              <a:t>-</a:t>
+            </a:r>
+            <a:r>
+              <a:rPr lang="en-US" sz="2800" dirty="0"/>
+              <a:t>E </a:t>
+            </a:r>
+            <a:r>
+              <a:rPr lang="en-US" sz="2800" dirty="0" smtClean="0"/>
+              <a:t>10 </a:t>
+            </a:r>
+            <a:r>
+              <a:rPr lang="mr-IN" sz="2800" dirty="0"/>
+              <a:t>-</a:t>
+            </a:r>
+            <a:r>
+              <a:rPr lang="en-US" sz="2800" dirty="0"/>
+              <a:t>H a</a:t>
+            </a:r>
+          </a:p>
+          <a:p>
+            <a:r>
+              <a:rPr lang="en-US" sz="2800" dirty="0"/>
+              <a:t>-L 0.3 </a:t>
+            </a:r>
+            <a:r>
+              <a:rPr lang="mr-IN" sz="2800" dirty="0"/>
+              <a:t>-</a:t>
+            </a:r>
+            <a:r>
+              <a:rPr lang="en-US" sz="2800" dirty="0"/>
+              <a:t>M 0.2 </a:t>
+            </a:r>
+            <a:r>
+              <a:rPr lang="mr-IN" sz="2800" dirty="0"/>
+              <a:t>-</a:t>
+            </a:r>
+            <a:r>
+              <a:rPr lang="en-US" sz="2800" dirty="0"/>
+              <a:t>N </a:t>
+            </a:r>
+            <a:r>
+              <a:rPr lang="en-US" sz="2800" dirty="0" smtClean="0"/>
+              <a:t>500 </a:t>
+            </a:r>
+            <a:r>
+              <a:rPr lang="mr-IN" sz="2800" dirty="0"/>
+              <a:t>-</a:t>
+            </a:r>
+            <a:r>
+              <a:rPr lang="en-US" sz="2800" dirty="0"/>
+              <a:t>V 0 </a:t>
+            </a:r>
+            <a:r>
+              <a:rPr lang="mr-IN" sz="2800" dirty="0"/>
+              <a:t>-</a:t>
+            </a:r>
+            <a:r>
+              <a:rPr lang="en-US" sz="2800" dirty="0"/>
+              <a:t>S 0 </a:t>
+            </a:r>
+            <a:r>
+              <a:rPr lang="mr-IN" sz="2800" dirty="0"/>
+              <a:t>-</a:t>
+            </a:r>
+            <a:r>
+              <a:rPr lang="en-US" sz="2800" dirty="0"/>
+              <a:t>E </a:t>
+            </a:r>
+            <a:r>
+              <a:rPr lang="en-US" sz="2800" dirty="0" smtClean="0"/>
+              <a:t>30 </a:t>
+            </a:r>
+            <a:r>
+              <a:rPr lang="mr-IN" sz="2800" dirty="0"/>
+              <a:t>-</a:t>
+            </a:r>
+            <a:r>
+              <a:rPr lang="en-US" sz="2800" dirty="0"/>
+              <a:t>H a</a:t>
+            </a:r>
+          </a:p>
           <a:p>
             <a:endParaRPr lang="en-US" sz="2800" dirty="0"/>
           </a:p>
@@ -8607,35 +11704,55 @@
         <p:spPr/>
         <p:txBody>
           <a:bodyPr>
-            <a:normAutofit/>
+            <a:normAutofit fontScale="90000"/>
           </a:bodyPr>
           <a:lstStyle/>
           <a:p>
+            <a:r>
+              <a:rPr lang="en-US" sz="4400" dirty="0"/>
+              <a:t>Test Results </a:t>
+            </a:r>
+            <a:r>
+              <a:rPr lang="en-US" sz="4400" dirty="0" smtClean="0"/>
+              <a:t>w/ </a:t>
+            </a:r>
+            <a:r>
+              <a:rPr lang="en-US" sz="4400" dirty="0"/>
+              <a:t>Different </a:t>
+            </a:r>
+            <a:r>
+              <a:rPr lang="en-US" sz="4400" dirty="0" smtClean="0"/>
+              <a:t>Parameters</a:t>
+            </a:r>
             <a:endParaRPr lang="en-US" sz="4400" dirty="0"/>
           </a:p>
         </p:txBody>
       </p:sp>
-      <p:sp>
-        <p:nvSpPr>
-          <p:cNvPr id="3" name="Content Placeholder 2"/>
-          <p:cNvSpPr>
-            <a:spLocks noGrp="1"/>
-          </p:cNvSpPr>
+      <p:graphicFrame>
+        <p:nvGraphicFramePr>
+          <p:cNvPr id="4" name="Content Placeholder 3"/>
+          <p:cNvGraphicFramePr>
+            <a:graphicFrameLocks noGrp="1"/>
+          </p:cNvGraphicFramePr>
           <p:nvPr>
             <p:ph idx="1"/>
+            <p:extLst>
+              <p:ext uri="{D42A27DB-BD31-4B8C-83A1-F6EECF244321}">
+                <p14:modId xmlns:p14="http://schemas.microsoft.com/office/powerpoint/2010/main" val="1918265136"/>
+              </p:ext>
+            </p:extLst>
           </p:nvPr>
-        </p:nvSpPr>
-        <p:spPr/>
-        <p:txBody>
-          <a:bodyPr>
-            <a:normAutofit/>
-          </a:bodyPr>
-          <a:lstStyle/>
-          <a:p>
-            <a:endParaRPr lang="en-US" sz="2800" dirty="0"/>
-          </a:p>
-        </p:txBody>
-      </p:sp>
+        </p:nvGraphicFramePr>
+        <p:xfrm>
+          <a:off x="2589213" y="2133600"/>
+          <a:ext cx="8915400" cy="3778250"/>
+        </p:xfrm>
+        <a:graphic>
+          <a:graphicData uri="http://schemas.openxmlformats.org/drawingml/2006/chart">
+            <c:chart xmlns:c="http://schemas.openxmlformats.org/drawingml/2006/chart" xmlns:r="http://schemas.openxmlformats.org/officeDocument/2006/relationships" r:id="rId2"/>
+          </a:graphicData>
+        </a:graphic>
+      </p:graphicFrame>
     </p:spTree>
     <p:extLst>
       <p:ext uri="{BB962C8B-B14F-4D97-AF65-F5344CB8AC3E}">
@@ -8690,31 +11807,525 @@
           </a:bodyPr>
           <a:lstStyle/>
           <a:p>
+            <a:r>
+              <a:rPr lang="en-US" sz="4400" dirty="0" smtClean="0"/>
+              <a:t>Least Correct Class</a:t>
+            </a:r>
             <a:endParaRPr lang="en-US" sz="4400" dirty="0"/>
           </a:p>
         </p:txBody>
       </p:sp>
-      <p:sp>
-        <p:nvSpPr>
-          <p:cNvPr id="3" name="Content Placeholder 2"/>
-          <p:cNvSpPr>
-            <a:spLocks noGrp="1"/>
-          </p:cNvSpPr>
+      <p:graphicFrame>
+        <p:nvGraphicFramePr>
+          <p:cNvPr id="4" name="Content Placeholder 3"/>
+          <p:cNvGraphicFramePr>
+            <a:graphicFrameLocks noGrp="1"/>
+          </p:cNvGraphicFramePr>
           <p:nvPr>
             <p:ph idx="1"/>
+            <p:extLst>
+              <p:ext uri="{D42A27DB-BD31-4B8C-83A1-F6EECF244321}">
+                <p14:modId xmlns:p14="http://schemas.microsoft.com/office/powerpoint/2010/main" val="2071942186"/>
+              </p:ext>
+            </p:extLst>
           </p:nvPr>
-        </p:nvSpPr>
-        <p:spPr/>
-        <p:txBody>
-          <a:bodyPr>
-            <a:normAutofit/>
-          </a:bodyPr>
-          <a:lstStyle/>
-          <a:p>
-            <a:endParaRPr lang="en-US" sz="2800" dirty="0"/>
-          </a:p>
-        </p:txBody>
-      </p:sp>
+        </p:nvGraphicFramePr>
+        <p:xfrm>
+          <a:off x="2589213" y="2133600"/>
+          <a:ext cx="8915400" cy="3708400"/>
+        </p:xfrm>
+        <a:graphic>
+          <a:graphicData uri="http://schemas.openxmlformats.org/drawingml/2006/table">
+            <a:tbl>
+              <a:tblPr firstRow="1" bandRow="1">
+                <a:tableStyleId>{5C22544A-7EE6-4342-B048-85BDC9FD1C3A}</a:tableStyleId>
+              </a:tblPr>
+              <a:tblGrid>
+                <a:gridCol w="2971800"/>
+                <a:gridCol w="2971800"/>
+                <a:gridCol w="2971800"/>
+              </a:tblGrid>
+              <a:tr h="370840">
+                <a:tc>
+                  <a:txBody>
+                    <a:bodyPr/>
+                    <a:lstStyle/>
+                    <a:p>
+                      <a:r>
+                        <a:rPr lang="en-US" dirty="0" smtClean="0"/>
+                        <a:t>Parameters</a:t>
+                      </a:r>
+                      <a:endParaRPr lang="en-US" dirty="0"/>
+                    </a:p>
+                  </a:txBody>
+                  <a:tcPr/>
+                </a:tc>
+                <a:tc>
+                  <a:txBody>
+                    <a:bodyPr/>
+                    <a:lstStyle/>
+                    <a:p>
+                      <a:r>
+                        <a:rPr lang="en-US" dirty="0" smtClean="0"/>
+                        <a:t>Class</a:t>
+                      </a:r>
+                      <a:r>
+                        <a:rPr lang="en-US" baseline="0" dirty="0" smtClean="0"/>
+                        <a:t> (character)</a:t>
+                      </a:r>
+                      <a:endParaRPr lang="en-US" dirty="0"/>
+                    </a:p>
+                  </a:txBody>
+                  <a:tcPr/>
+                </a:tc>
+                <a:tc>
+                  <a:txBody>
+                    <a:bodyPr/>
+                    <a:lstStyle/>
+                    <a:p>
+                      <a:r>
+                        <a:rPr lang="en-US" dirty="0" smtClean="0"/>
+                        <a:t>Correctness</a:t>
+                      </a:r>
+                      <a:endParaRPr lang="en-US" dirty="0"/>
+                    </a:p>
+                  </a:txBody>
+                  <a:tcPr/>
+                </a:tc>
+              </a:tr>
+              <a:tr h="370840">
+                <a:tc rowSpan="3">
+                  <a:txBody>
+                    <a:bodyPr/>
+                    <a:lstStyle/>
+                    <a:p>
+                      <a:pPr algn="ctr"/>
+                      <a:r>
+                        <a:rPr lang="en-US" dirty="0" smtClean="0"/>
+                        <a:t>Default</a:t>
+                      </a:r>
+                      <a:endParaRPr lang="en-US" dirty="0"/>
+                    </a:p>
+                  </a:txBody>
+                  <a:tcPr anchor="ctr"/>
+                </a:tc>
+                <a:tc>
+                  <a:txBody>
+                    <a:bodyPr/>
+                    <a:lstStyle/>
+                    <a:p>
+                      <a:pPr algn="ctr"/>
+                      <a:r>
+                        <a:rPr lang="en-US" dirty="0" smtClean="0"/>
+                        <a:t>G</a:t>
+                      </a:r>
+                      <a:endParaRPr lang="en-US" dirty="0"/>
+                    </a:p>
+                  </a:txBody>
+                  <a:tcPr anchor="ctr"/>
+                </a:tc>
+                <a:tc>
+                  <a:txBody>
+                    <a:bodyPr/>
+                    <a:lstStyle/>
+                    <a:p>
+                      <a:pPr algn="ctr"/>
+                      <a:r>
+                        <a:rPr lang="en-US" dirty="0" smtClean="0"/>
+                        <a:t>69%</a:t>
+                      </a:r>
+                      <a:endParaRPr lang="en-US" dirty="0"/>
+                    </a:p>
+                  </a:txBody>
+                  <a:tcPr anchor="ctr"/>
+                </a:tc>
+              </a:tr>
+              <a:tr h="370840">
+                <a:tc vMerge="1">
+                  <a:txBody>
+                    <a:bodyPr/>
+                    <a:lstStyle/>
+                    <a:p>
+                      <a:pPr algn="ctr"/>
+                      <a:endParaRPr lang="en-US" dirty="0"/>
+                    </a:p>
+                  </a:txBody>
+                  <a:tcPr anchor="ctr"/>
+                </a:tc>
+                <a:tc>
+                  <a:txBody>
+                    <a:bodyPr/>
+                    <a:lstStyle/>
+                    <a:p>
+                      <a:pPr algn="ctr"/>
+                      <a:r>
+                        <a:rPr lang="en-US" dirty="0" smtClean="0"/>
+                        <a:t>H</a:t>
+                      </a:r>
+                      <a:endParaRPr lang="en-US" dirty="0"/>
+                    </a:p>
+                  </a:txBody>
+                  <a:tcPr anchor="ctr"/>
+                </a:tc>
+                <a:tc>
+                  <a:txBody>
+                    <a:bodyPr/>
+                    <a:lstStyle/>
+                    <a:p>
+                      <a:pPr algn="ctr"/>
+                      <a:r>
+                        <a:rPr lang="en-US" dirty="0" smtClean="0"/>
+                        <a:t>64.4%</a:t>
+                      </a:r>
+                      <a:endParaRPr lang="en-US" dirty="0"/>
+                    </a:p>
+                  </a:txBody>
+                  <a:tcPr anchor="ctr"/>
+                </a:tc>
+              </a:tr>
+              <a:tr h="370840">
+                <a:tc vMerge="1">
+                  <a:txBody>
+                    <a:bodyPr/>
+                    <a:lstStyle/>
+                    <a:p>
+                      <a:pPr algn="ctr"/>
+                      <a:endParaRPr lang="en-US" dirty="0"/>
+                    </a:p>
+                  </a:txBody>
+                  <a:tcPr anchor="ctr"/>
+                </a:tc>
+                <a:tc>
+                  <a:txBody>
+                    <a:bodyPr/>
+                    <a:lstStyle/>
+                    <a:p>
+                      <a:pPr algn="ctr"/>
+                      <a:r>
+                        <a:rPr lang="en-US" dirty="0" smtClean="0"/>
+                        <a:t>S</a:t>
+                      </a:r>
+                      <a:endParaRPr lang="en-US" dirty="0"/>
+                    </a:p>
+                  </a:txBody>
+                  <a:tcPr anchor="ctr"/>
+                </a:tc>
+                <a:tc>
+                  <a:txBody>
+                    <a:bodyPr/>
+                    <a:lstStyle/>
+                    <a:p>
+                      <a:pPr algn="ctr"/>
+                      <a:r>
+                        <a:rPr lang="en-US" dirty="0" smtClean="0"/>
+                        <a:t>65%</a:t>
+                      </a:r>
+                      <a:endParaRPr lang="en-US" dirty="0"/>
+                    </a:p>
+                  </a:txBody>
+                  <a:tcPr anchor="ctr"/>
+                </a:tc>
+              </a:tr>
+              <a:tr h="370840">
+                <a:tc rowSpan="3">
+                  <a:txBody>
+                    <a:bodyPr/>
+                    <a:lstStyle/>
+                    <a:p>
+                      <a:pPr marL="0" marR="0" indent="0" algn="ctr" defTabSz="457200" rtl="0" eaLnBrk="1" fontAlgn="auto" latinLnBrk="0" hangingPunct="1">
+                        <a:lnSpc>
+                          <a:spcPct val="100000"/>
+                        </a:lnSpc>
+                        <a:spcBef>
+                          <a:spcPts val="0"/>
+                        </a:spcBef>
+                        <a:spcAft>
+                          <a:spcPts val="0"/>
+                        </a:spcAft>
+                        <a:buClrTx/>
+                        <a:buSzTx/>
+                        <a:buFontTx/>
+                        <a:buNone/>
+                        <a:tabLst/>
+                        <a:defRPr/>
+                      </a:pPr>
+                      <a:r>
+                        <a:rPr lang="en-US" dirty="0" smtClean="0"/>
+                        <a:t>L=0.6</a:t>
+                      </a:r>
+                    </a:p>
+                  </a:txBody>
+                  <a:tcPr anchor="ctr"/>
+                </a:tc>
+                <a:tc>
+                  <a:txBody>
+                    <a:bodyPr/>
+                    <a:lstStyle/>
+                    <a:p>
+                      <a:pPr algn="ctr"/>
+                      <a:r>
+                        <a:rPr lang="en-US" dirty="0" smtClean="0"/>
+                        <a:t>G</a:t>
+                      </a:r>
+                      <a:endParaRPr lang="en-US" dirty="0"/>
+                    </a:p>
+                  </a:txBody>
+                  <a:tcPr anchor="ctr"/>
+                </a:tc>
+                <a:tc>
+                  <a:txBody>
+                    <a:bodyPr/>
+                    <a:lstStyle/>
+                    <a:p>
+                      <a:pPr algn="ctr"/>
+                      <a:r>
+                        <a:rPr lang="en-US" dirty="0" smtClean="0"/>
+                        <a:t>68.2%</a:t>
+                      </a:r>
+                      <a:endParaRPr lang="en-US" dirty="0"/>
+                    </a:p>
+                  </a:txBody>
+                  <a:tcPr anchor="ctr"/>
+                </a:tc>
+              </a:tr>
+              <a:tr h="370840">
+                <a:tc vMerge="1">
+                  <a:txBody>
+                    <a:bodyPr/>
+                    <a:lstStyle/>
+                    <a:p>
+                      <a:pPr algn="ctr"/>
+                      <a:endParaRPr lang="en-US" dirty="0"/>
+                    </a:p>
+                  </a:txBody>
+                  <a:tcPr anchor="ctr"/>
+                </a:tc>
+                <a:tc>
+                  <a:txBody>
+                    <a:bodyPr/>
+                    <a:lstStyle/>
+                    <a:p>
+                      <a:pPr algn="ctr"/>
+                      <a:r>
+                        <a:rPr lang="en-US" dirty="0" smtClean="0"/>
+                        <a:t>H</a:t>
+                      </a:r>
+                      <a:endParaRPr lang="en-US" dirty="0"/>
+                    </a:p>
+                  </a:txBody>
+                  <a:tcPr anchor="ctr"/>
+                </a:tc>
+                <a:tc>
+                  <a:txBody>
+                    <a:bodyPr/>
+                    <a:lstStyle/>
+                    <a:p>
+                      <a:pPr algn="ctr"/>
+                      <a:r>
+                        <a:rPr lang="en-US" dirty="0" smtClean="0"/>
+                        <a:t>69.1%</a:t>
+                      </a:r>
+                      <a:endParaRPr lang="en-US" dirty="0"/>
+                    </a:p>
+                  </a:txBody>
+                  <a:tcPr anchor="ctr"/>
+                </a:tc>
+              </a:tr>
+              <a:tr h="370840">
+                <a:tc vMerge="1">
+                  <a:txBody>
+                    <a:bodyPr/>
+                    <a:lstStyle/>
+                    <a:p>
+                      <a:pPr algn="ctr"/>
+                      <a:endParaRPr lang="en-US" dirty="0"/>
+                    </a:p>
+                  </a:txBody>
+                  <a:tcPr anchor="ctr"/>
+                </a:tc>
+                <a:tc>
+                  <a:txBody>
+                    <a:bodyPr/>
+                    <a:lstStyle/>
+                    <a:p>
+                      <a:pPr algn="ctr"/>
+                      <a:r>
+                        <a:rPr lang="en-US" dirty="0" smtClean="0"/>
+                        <a:t>S</a:t>
+                      </a:r>
+                      <a:endParaRPr lang="en-US" dirty="0"/>
+                    </a:p>
+                  </a:txBody>
+                  <a:tcPr anchor="ctr"/>
+                </a:tc>
+                <a:tc>
+                  <a:txBody>
+                    <a:bodyPr/>
+                    <a:lstStyle/>
+                    <a:p>
+                      <a:pPr algn="ctr"/>
+                      <a:r>
+                        <a:rPr lang="en-US" dirty="0" smtClean="0"/>
+                        <a:t>64%</a:t>
+                      </a:r>
+                      <a:endParaRPr lang="en-US" dirty="0"/>
+                    </a:p>
+                  </a:txBody>
+                  <a:tcPr anchor="ctr"/>
+                </a:tc>
+              </a:tr>
+              <a:tr h="370840">
+                <a:tc rowSpan="3">
+                  <a:txBody>
+                    <a:bodyPr/>
+                    <a:lstStyle/>
+                    <a:p>
+                      <a:pPr marL="0" marR="0" indent="0" algn="ctr" defTabSz="457200" rtl="0" eaLnBrk="1" fontAlgn="auto" latinLnBrk="0" hangingPunct="1">
+                        <a:lnSpc>
+                          <a:spcPct val="100000"/>
+                        </a:lnSpc>
+                        <a:spcBef>
+                          <a:spcPts val="0"/>
+                        </a:spcBef>
+                        <a:spcAft>
+                          <a:spcPts val="0"/>
+                        </a:spcAft>
+                        <a:buClrTx/>
+                        <a:buSzTx/>
+                        <a:buFontTx/>
+                        <a:buNone/>
+                        <a:tabLst/>
+                        <a:defRPr/>
+                      </a:pPr>
+                      <a:r>
+                        <a:rPr lang="en-US" dirty="0" smtClean="0"/>
+                        <a:t>N=200</a:t>
+                      </a:r>
+                    </a:p>
+                  </a:txBody>
+                  <a:tcPr anchor="ctr"/>
+                </a:tc>
+                <a:tc>
+                  <a:txBody>
+                    <a:bodyPr/>
+                    <a:lstStyle/>
+                    <a:p>
+                      <a:pPr algn="ctr"/>
+                      <a:r>
+                        <a:rPr lang="en-US" dirty="0" smtClean="0"/>
+                        <a:t>G</a:t>
+                      </a:r>
+                      <a:endParaRPr lang="en-US" dirty="0"/>
+                    </a:p>
+                  </a:txBody>
+                  <a:tcPr anchor="ctr"/>
+                </a:tc>
+                <a:tc>
+                  <a:txBody>
+                    <a:bodyPr/>
+                    <a:lstStyle/>
+                    <a:p>
+                      <a:pPr algn="ctr"/>
+                      <a:r>
+                        <a:rPr lang="en-US" dirty="0" smtClean="0"/>
+                        <a:t>69.3%</a:t>
+                      </a:r>
+                      <a:endParaRPr lang="en-US" dirty="0"/>
+                    </a:p>
+                  </a:txBody>
+                  <a:tcPr anchor="ctr"/>
+                </a:tc>
+              </a:tr>
+              <a:tr h="370840">
+                <a:tc vMerge="1">
+                  <a:txBody>
+                    <a:bodyPr/>
+                    <a:lstStyle/>
+                    <a:p>
+                      <a:pPr algn="ctr"/>
+                      <a:endParaRPr lang="en-US" dirty="0"/>
+                    </a:p>
+                  </a:txBody>
+                  <a:tcPr anchor="ctr"/>
+                </a:tc>
+                <a:tc>
+                  <a:txBody>
+                    <a:bodyPr/>
+                    <a:lstStyle/>
+                    <a:p>
+                      <a:pPr algn="ctr"/>
+                      <a:r>
+                        <a:rPr lang="en-US" dirty="0" smtClean="0"/>
+                        <a:t>H</a:t>
+                      </a:r>
+                      <a:endParaRPr lang="en-US" dirty="0"/>
+                    </a:p>
+                  </a:txBody>
+                  <a:tcPr anchor="ctr"/>
+                </a:tc>
+                <a:tc>
+                  <a:txBody>
+                    <a:bodyPr/>
+                    <a:lstStyle/>
+                    <a:p>
+                      <a:pPr algn="ctr"/>
+                      <a:r>
+                        <a:rPr lang="en-US" dirty="0" smtClean="0"/>
+                        <a:t>65.1%</a:t>
+                      </a:r>
+                      <a:endParaRPr lang="en-US" dirty="0"/>
+                    </a:p>
+                  </a:txBody>
+                  <a:tcPr anchor="ctr"/>
+                </a:tc>
+              </a:tr>
+              <a:tr h="370840">
+                <a:tc vMerge="1">
+                  <a:txBody>
+                    <a:bodyPr/>
+                    <a:lstStyle/>
+                    <a:p>
+                      <a:pPr algn="ctr"/>
+                      <a:endParaRPr lang="en-US" dirty="0"/>
+                    </a:p>
+                  </a:txBody>
+                  <a:tcPr anchor="ctr"/>
+                </a:tc>
+                <a:tc>
+                  <a:txBody>
+                    <a:bodyPr/>
+                    <a:lstStyle/>
+                    <a:p>
+                      <a:pPr algn="ctr"/>
+                      <a:r>
+                        <a:rPr lang="en-US" dirty="0" smtClean="0"/>
+                        <a:t>S</a:t>
+                      </a:r>
+                      <a:endParaRPr lang="en-US" dirty="0"/>
+                    </a:p>
+                  </a:txBody>
+                  <a:tcPr anchor="ctr"/>
+                </a:tc>
+                <a:tc>
+                  <a:txBody>
+                    <a:bodyPr/>
+                    <a:lstStyle/>
+                    <a:p>
+                      <a:pPr algn="ctr"/>
+                      <a:r>
+                        <a:rPr lang="en-US" dirty="0" smtClean="0"/>
+                        <a:t>64.4%</a:t>
+                      </a:r>
+                      <a:endParaRPr lang="en-US" dirty="0"/>
+                    </a:p>
+                  </a:txBody>
+                  <a:tcPr anchor="ctr"/>
+                </a:tc>
+              </a:tr>
+            </a:tbl>
+          </a:graphicData>
+        </a:graphic>
+      </p:graphicFrame>
     </p:spTree>
     <p:extLst>
       <p:ext uri="{BB962C8B-B14F-4D97-AF65-F5344CB8AC3E}">
@@ -8752,9 +12363,34 @@
           <a:chExt cx="0" cy="0"/>
         </a:xfrm>
       </p:grpSpPr>
+      <p:graphicFrame>
+        <p:nvGraphicFramePr>
+          <p:cNvPr id="4" name="Content Placeholder 3"/>
+          <p:cNvGraphicFramePr>
+            <a:graphicFrameLocks noGrp="1"/>
+          </p:cNvGraphicFramePr>
+          <p:nvPr>
+            <p:ph idx="1"/>
+            <p:extLst>
+              <p:ext uri="{D42A27DB-BD31-4B8C-83A1-F6EECF244321}">
+                <p14:modId xmlns:p14="http://schemas.microsoft.com/office/powerpoint/2010/main" val="1967832537"/>
+              </p:ext>
+            </p:extLst>
+          </p:nvPr>
+        </p:nvGraphicFramePr>
+        <p:xfrm>
+          <a:off x="2589213" y="2133600"/>
+          <a:ext cx="8915400" cy="3778250"/>
+        </p:xfrm>
+        <a:graphic>
+          <a:graphicData uri="http://schemas.openxmlformats.org/drawingml/2006/chart">
+            <c:chart xmlns:c="http://schemas.openxmlformats.org/drawingml/2006/chart" xmlns:r="http://schemas.openxmlformats.org/officeDocument/2006/relationships" r:id="rId2"/>
+          </a:graphicData>
+        </a:graphic>
+      </p:graphicFrame>
       <p:sp>
         <p:nvSpPr>
-          <p:cNvPr id="2" name="Title 1"/>
+          <p:cNvPr id="5" name="Title 1"/>
           <p:cNvSpPr>
             <a:spLocks noGrp="1"/>
           </p:cNvSpPr>
@@ -8765,32 +12401,27 @@
         <p:spPr/>
         <p:txBody>
           <a:bodyPr>
-            <a:normAutofit/>
+            <a:normAutofit fontScale="90000"/>
           </a:bodyPr>
           <a:lstStyle/>
           <a:p>
+            <a:r>
+              <a:rPr lang="en-US" sz="4400" dirty="0"/>
+              <a:t>Test Results </a:t>
+            </a:r>
+            <a:r>
+              <a:rPr lang="en-US" sz="4400" dirty="0" smtClean="0"/>
+              <a:t>w/ </a:t>
+            </a:r>
+            <a:r>
+              <a:rPr lang="en-US" sz="4400" dirty="0"/>
+              <a:t>Different </a:t>
+            </a:r>
+            <a:r>
+              <a:rPr lang="en-US" sz="4400" dirty="0" smtClean="0"/>
+              <a:t>Parameters</a:t>
+            </a:r>
             <a:endParaRPr lang="en-US" sz="4400" dirty="0"/>
-          </a:p>
-        </p:txBody>
-      </p:sp>
-      <p:sp>
-        <p:nvSpPr>
-          <p:cNvPr id="3" name="Content Placeholder 2"/>
-          <p:cNvSpPr>
-            <a:spLocks noGrp="1"/>
-          </p:cNvSpPr>
-          <p:nvPr>
-            <p:ph idx="1"/>
-          </p:nvPr>
-        </p:nvSpPr>
-        <p:spPr/>
-        <p:txBody>
-          <a:bodyPr>
-            <a:normAutofit/>
-          </a:bodyPr>
-          <a:lstStyle/>
-          <a:p>
-            <a:endParaRPr lang="en-US" sz="2800" dirty="0"/>
           </a:p>
         </p:txBody>
       </p:sp>
@@ -8848,31 +12479,39 @@
           </a:bodyPr>
           <a:lstStyle/>
           <a:p>
+            <a:r>
+              <a:rPr lang="en-US" sz="4400" dirty="0" smtClean="0"/>
+              <a:t>Special case: L=0.6 (Digit)</a:t>
+            </a:r>
             <a:endParaRPr lang="en-US" sz="4400" dirty="0"/>
           </a:p>
         </p:txBody>
       </p:sp>
-      <p:sp>
-        <p:nvSpPr>
-          <p:cNvPr id="3" name="Content Placeholder 2"/>
-          <p:cNvSpPr>
-            <a:spLocks noGrp="1"/>
-          </p:cNvSpPr>
+      <p:graphicFrame>
+        <p:nvGraphicFramePr>
+          <p:cNvPr id="4" name="Content Placeholder 3"/>
+          <p:cNvGraphicFramePr>
+            <a:graphicFrameLocks noGrp="1"/>
+          </p:cNvGraphicFramePr>
           <p:nvPr>
             <p:ph idx="1"/>
+            <p:extLst>
+              <p:ext uri="{D42A27DB-BD31-4B8C-83A1-F6EECF244321}">
+                <p14:modId xmlns:p14="http://schemas.microsoft.com/office/powerpoint/2010/main" val="1081213686"/>
+              </p:ext>
+            </p:extLst>
           </p:nvPr>
-        </p:nvSpPr>
-        <p:spPr/>
-        <p:txBody>
-          <a:bodyPr>
-            <a:normAutofit/>
-          </a:bodyPr>
-          <a:lstStyle/>
-          <a:p>
-            <a:endParaRPr lang="en-US" sz="2800" dirty="0"/>
-          </a:p>
-        </p:txBody>
-      </p:sp>
+        </p:nvGraphicFramePr>
+        <p:xfrm>
+          <a:off x="2589213" y="2133600"/>
+          <a:ext cx="8915400" cy="3778250"/>
+        </p:xfrm>
+        <a:graphic>
+          <a:graphicData uri="http://schemas.openxmlformats.org/drawingml/2006/chart">
+            <c:chart xmlns:c="http://schemas.openxmlformats.org/drawingml/2006/chart" xmlns:r="http://schemas.openxmlformats.org/officeDocument/2006/relationships" r:id="rId2"/>
+          </a:graphicData>
+        </a:graphic>
+      </p:graphicFrame>
     </p:spTree>
     <p:extLst>
       <p:ext uri="{BB962C8B-B14F-4D97-AF65-F5344CB8AC3E}">

</xml_diff>

<commit_message>
edit ppt by adding procedure and test result for SVM
</commit_message>
<xml_diff>
--- a/PPTGroup10.pptx
+++ b/PPTGroup10.pptx
@@ -14,18 +14,18 @@
     <p:sldId id="274" r:id="rId5"/>
     <p:sldId id="260" r:id="rId6"/>
     <p:sldId id="261" r:id="rId7"/>
-    <p:sldId id="262" r:id="rId8"/>
-    <p:sldId id="263" r:id="rId9"/>
-    <p:sldId id="264" r:id="rId10"/>
-    <p:sldId id="265" r:id="rId11"/>
-    <p:sldId id="266" r:id="rId12"/>
-    <p:sldId id="267" r:id="rId13"/>
-    <p:sldId id="268" r:id="rId14"/>
-    <p:sldId id="269" r:id="rId15"/>
-    <p:sldId id="270" r:id="rId16"/>
-    <p:sldId id="271" r:id="rId17"/>
-    <p:sldId id="272" r:id="rId18"/>
-    <p:sldId id="273" r:id="rId19"/>
+    <p:sldId id="266" r:id="rId8"/>
+    <p:sldId id="262" r:id="rId9"/>
+    <p:sldId id="268" r:id="rId10"/>
+    <p:sldId id="269" r:id="rId11"/>
+    <p:sldId id="270" r:id="rId12"/>
+    <p:sldId id="271" r:id="rId13"/>
+    <p:sldId id="272" r:id="rId14"/>
+    <p:sldId id="273" r:id="rId15"/>
+    <p:sldId id="279" r:id="rId16"/>
+    <p:sldId id="275" r:id="rId17"/>
+    <p:sldId id="276" r:id="rId18"/>
+    <p:sldId id="280" r:id="rId19"/>
   </p:sldIdLst>
   <p:sldSz cx="12192000" cy="6858000"/>
   <p:notesSz cx="6858000" cy="9144000"/>
@@ -364,11 +364,11 @@
         </c:dLbls>
         <c:gapWidth val="219"/>
         <c:overlap val="-27"/>
-        <c:axId val="-751382672"/>
-        <c:axId val="-751380352"/>
+        <c:axId val="-2125816960"/>
+        <c:axId val="-2121412352"/>
       </c:barChart>
       <c:catAx>
-        <c:axId val="-751382672"/>
+        <c:axId val="-2125816960"/>
         <c:scaling>
           <c:orientation val="minMax"/>
         </c:scaling>
@@ -411,7 +411,7 @@
             <a:endParaRPr lang="en-US"/>
           </a:p>
         </c:txPr>
-        <c:crossAx val="-751380352"/>
+        <c:crossAx val="-2121412352"/>
         <c:crosses val="autoZero"/>
         <c:auto val="1"/>
         <c:lblAlgn val="ctr"/>
@@ -419,7 +419,7 @@
         <c:noMultiLvlLbl val="0"/>
       </c:catAx>
       <c:valAx>
-        <c:axId val="-751380352"/>
+        <c:axId val="-2121412352"/>
         <c:scaling>
           <c:orientation val="minMax"/>
         </c:scaling>
@@ -439,6 +439,7 @@
             <a:effectLst/>
           </c:spPr>
         </c:majorGridlines>
+        <c:numFmt formatCode="General" sourceLinked="0"/>
         <c:majorTickMark val="none"/>
         <c:minorTickMark val="none"/>
         <c:tickLblPos val="nextTo"/>
@@ -469,7 +470,7 @@
             <a:endParaRPr lang="en-US"/>
           </a:p>
         </c:txPr>
-        <c:crossAx val="-751382672"/>
+        <c:crossAx val="-2125816960"/>
         <c:crosses val="autoZero"/>
         <c:crossBetween val="between"/>
       </c:valAx>
@@ -575,17 +576,12 @@
             </a:pPr>
             <a:r>
               <a:rPr lang="en-US" dirty="0" smtClean="0"/>
-              <a:t>Digit </a:t>
-            </a:r>
-            <a:r>
-              <a:rPr lang="en-US" dirty="0" smtClean="0"/>
-              <a:t>Recognition</a:t>
+              <a:t>Digit Recognition</a:t>
             </a:r>
             <a:endParaRPr lang="en-US" dirty="0"/>
           </a:p>
         </c:rich>
       </c:tx>
-      <c:layout/>
       <c:overlay val="0"/>
       <c:spPr>
         <a:noFill/>
@@ -776,11 +772,11 @@
         </c:dLbls>
         <c:gapWidth val="219"/>
         <c:overlap val="-27"/>
-        <c:axId val="-747980992"/>
-        <c:axId val="-747978672"/>
+        <c:axId val="2071556896"/>
+        <c:axId val="-2123514816"/>
       </c:barChart>
       <c:catAx>
-        <c:axId val="-747980992"/>
+        <c:axId val="2071556896"/>
         <c:scaling>
           <c:orientation val="minMax"/>
         </c:scaling>
@@ -823,7 +819,7 @@
             <a:endParaRPr lang="en-US"/>
           </a:p>
         </c:txPr>
-        <c:crossAx val="-747978672"/>
+        <c:crossAx val="-2123514816"/>
         <c:crosses val="autoZero"/>
         <c:auto val="1"/>
         <c:lblAlgn val="ctr"/>
@@ -831,7 +827,7 @@
         <c:noMultiLvlLbl val="0"/>
       </c:catAx>
       <c:valAx>
-        <c:axId val="-747978672"/>
+        <c:axId val="-2123514816"/>
         <c:scaling>
           <c:orientation val="minMax"/>
         </c:scaling>
@@ -851,6 +847,7 @@
             <a:effectLst/>
           </c:spPr>
         </c:majorGridlines>
+        <c:numFmt formatCode="General" sourceLinked="0"/>
         <c:majorTickMark val="none"/>
         <c:minorTickMark val="none"/>
         <c:tickLblPos val="nextTo"/>
@@ -881,7 +878,7 @@
             <a:endParaRPr lang="en-US"/>
           </a:p>
         </c:txPr>
-        <c:crossAx val="-747980992"/>
+        <c:crossAx val="2071556896"/>
         <c:crosses val="autoZero"/>
         <c:crossBetween val="between"/>
       </c:valAx>
@@ -895,7 +892,6 @@
     </c:plotArea>
     <c:legend>
       <c:legendPos val="b"/>
-      <c:layout/>
       <c:overlay val="0"/>
       <c:spPr>
         <a:noFill/>
@@ -967,7 +963,6 @@
   </mc:AlternateContent>
   <c:chart>
     <c:title>
-      <c:layout/>
       <c:overlay val="0"/>
       <c:spPr>
         <a:noFill/>
@@ -1052,7 +1047,7 @@
                   <c:v>74.77</c:v>
                 </c:pt>
                 <c:pt idx="1">
-                  <c:v>98.36239999999999</c:v>
+                  <c:v>98.36239999999998</c:v>
                 </c:pt>
               </c:numCache>
             </c:numRef>
@@ -1122,11 +1117,11 @@
         </c:dLbls>
         <c:gapWidth val="219"/>
         <c:overlap val="-27"/>
-        <c:axId val="-749252624"/>
-        <c:axId val="-749093536"/>
+        <c:axId val="-2123914480"/>
+        <c:axId val="-2130071632"/>
       </c:barChart>
       <c:catAx>
-        <c:axId val="-749252624"/>
+        <c:axId val="-2123914480"/>
         <c:scaling>
           <c:orientation val="minMax"/>
         </c:scaling>
@@ -1169,7 +1164,7 @@
             <a:endParaRPr lang="en-US"/>
           </a:p>
         </c:txPr>
-        <c:crossAx val="-749093536"/>
+        <c:crossAx val="-2130071632"/>
         <c:crosses val="autoZero"/>
         <c:auto val="1"/>
         <c:lblAlgn val="ctr"/>
@@ -1177,7 +1172,7 @@
         <c:noMultiLvlLbl val="0"/>
       </c:catAx>
       <c:valAx>
-        <c:axId val="-749093536"/>
+        <c:axId val="-2130071632"/>
         <c:scaling>
           <c:orientation val="minMax"/>
         </c:scaling>
@@ -1197,6 +1192,7 @@
             <a:effectLst/>
           </c:spPr>
         </c:majorGridlines>
+        <c:numFmt formatCode="General" sourceLinked="0"/>
         <c:majorTickMark val="none"/>
         <c:minorTickMark val="none"/>
         <c:tickLblPos val="nextTo"/>
@@ -1227,7 +1223,7 @@
             <a:endParaRPr lang="en-US"/>
           </a:p>
         </c:txPr>
-        <c:crossAx val="-749252624"/>
+        <c:crossAx val="-2123914480"/>
         <c:crosses val="autoZero"/>
         <c:crossBetween val="between"/>
       </c:valAx>
@@ -1241,7 +1237,804 @@
     </c:plotArea>
     <c:legend>
       <c:legendPos val="b"/>
+      <c:overlay val="0"/>
+      <c:spPr>
+        <a:noFill/>
+        <a:ln>
+          <a:noFill/>
+        </a:ln>
+        <a:effectLst/>
+      </c:spPr>
+      <c:txPr>
+        <a:bodyPr rot="0" spcFirstLastPara="1" vertOverflow="ellipsis" vert="horz" wrap="square" anchor="ctr" anchorCtr="1"/>
+        <a:lstStyle/>
+        <a:p>
+          <a:pPr>
+            <a:defRPr sz="1197" b="0" i="0" u="none" strike="noStrike" kern="1200" baseline="0">
+              <a:solidFill>
+                <a:schemeClr val="tx1">
+                  <a:lumMod val="65000"/>
+                  <a:lumOff val="35000"/>
+                </a:schemeClr>
+              </a:solidFill>
+              <a:latin typeface="+mn-lt"/>
+              <a:ea typeface="+mn-ea"/>
+              <a:cs typeface="+mn-cs"/>
+            </a:defRPr>
+          </a:pPr>
+          <a:endParaRPr lang="en-US"/>
+        </a:p>
+      </c:txPr>
+    </c:legend>
+    <c:plotVisOnly val="1"/>
+    <c:dispBlanksAs val="gap"/>
+    <c:showDLblsOverMax val="0"/>
+  </c:chart>
+  <c:spPr>
+    <a:noFill/>
+    <a:ln>
+      <a:noFill/>
+    </a:ln>
+    <a:effectLst/>
+  </c:spPr>
+  <c:txPr>
+    <a:bodyPr/>
+    <a:lstStyle/>
+    <a:p>
+      <a:pPr>
+        <a:defRPr/>
+      </a:pPr>
+      <a:endParaRPr lang="en-US"/>
+    </a:p>
+  </c:txPr>
+  <c:externalData r:id="rId3">
+    <c:autoUpdate val="0"/>
+  </c:externalData>
+</c:chartSpace>
+</file>
+
+<file path=ppt/charts/chart4.xml><?xml version="1.0" encoding="utf-8"?>
+<c:chartSpace xmlns:c="http://schemas.openxmlformats.org/drawingml/2006/chart" xmlns:a="http://schemas.openxmlformats.org/drawingml/2006/main" xmlns:r="http://schemas.openxmlformats.org/officeDocument/2006/relationships">
+  <c:date1904 val="0"/>
+  <c:lang val="en-US"/>
+  <c:roundedCorners val="0"/>
+  <mc:AlternateContent xmlns:mc="http://schemas.openxmlformats.org/markup-compatibility/2006">
+    <mc:Choice xmlns:c14="http://schemas.microsoft.com/office/drawing/2007/8/2/chart" Requires="c14">
+      <c14:style val="102"/>
+    </mc:Choice>
+    <mc:Fallback>
+      <c:style val="2"/>
+    </mc:Fallback>
+  </mc:AlternateContent>
+  <c:chart>
+    <c:title>
+      <c:tx>
+        <c:rich>
+          <a:bodyPr rot="0" spcFirstLastPara="1" vertOverflow="ellipsis" vert="horz" wrap="square" anchor="ctr" anchorCtr="1"/>
+          <a:lstStyle/>
+          <a:p>
+            <a:pPr>
+              <a:defRPr sz="1862" b="0" i="0" u="none" strike="noStrike" kern="1200" spc="0" baseline="0">
+                <a:solidFill>
+                  <a:schemeClr val="tx1">
+                    <a:lumMod val="65000"/>
+                    <a:lumOff val="35000"/>
+                  </a:schemeClr>
+                </a:solidFill>
+                <a:latin typeface="+mn-lt"/>
+                <a:ea typeface="+mn-ea"/>
+                <a:cs typeface="+mn-cs"/>
+              </a:defRPr>
+            </a:pPr>
+            <a:r>
+              <a:rPr lang="en-US" dirty="0" smtClean="0"/>
+              <a:t>Letter Recognition</a:t>
+            </a:r>
+            <a:endParaRPr lang="en-US" dirty="0"/>
+          </a:p>
+        </c:rich>
+      </c:tx>
+      <c:overlay val="0"/>
+      <c:spPr>
+        <a:noFill/>
+        <a:ln>
+          <a:noFill/>
+        </a:ln>
+        <a:effectLst/>
+      </c:spPr>
+      <c:txPr>
+        <a:bodyPr rot="0" spcFirstLastPara="1" vertOverflow="ellipsis" vert="horz" wrap="square" anchor="ctr" anchorCtr="1"/>
+        <a:lstStyle/>
+        <a:p>
+          <a:pPr>
+            <a:defRPr sz="1862" b="0" i="0" u="none" strike="noStrike" kern="1200" spc="0" baseline="0">
+              <a:solidFill>
+                <a:schemeClr val="tx1">
+                  <a:lumMod val="65000"/>
+                  <a:lumOff val="35000"/>
+                </a:schemeClr>
+              </a:solidFill>
+              <a:latin typeface="+mn-lt"/>
+              <a:ea typeface="+mn-ea"/>
+              <a:cs typeface="+mn-cs"/>
+            </a:defRPr>
+          </a:pPr>
+          <a:endParaRPr lang="en-US"/>
+        </a:p>
+      </c:txPr>
+    </c:title>
+    <c:autoTitleDeleted val="0"/>
+    <c:plotArea>
       <c:layout/>
+      <c:barChart>
+        <c:barDir val="col"/>
+        <c:grouping val="clustered"/>
+        <c:varyColors val="0"/>
+        <c:ser>
+          <c:idx val="0"/>
+          <c:order val="0"/>
+          <c:tx>
+            <c:strRef>
+              <c:f>Sheet1!$B$1</c:f>
+              <c:strCache>
+                <c:ptCount val="1"/>
+                <c:pt idx="0">
+                  <c:v>Correctness</c:v>
+                </c:pt>
+              </c:strCache>
+            </c:strRef>
+          </c:tx>
+          <c:spPr>
+            <a:solidFill>
+              <a:schemeClr val="accent1"/>
+            </a:solidFill>
+            <a:ln>
+              <a:noFill/>
+            </a:ln>
+            <a:effectLst/>
+          </c:spPr>
+          <c:invertIfNegative val="0"/>
+          <c:cat>
+            <c:strRef>
+              <c:f>Sheet1!$A$2:$A$5</c:f>
+              <c:strCache>
+                <c:ptCount val="4"/>
+                <c:pt idx="0">
+                  <c:v>C=0.5</c:v>
+                </c:pt>
+                <c:pt idx="1">
+                  <c:v>C=1.0</c:v>
+                </c:pt>
+                <c:pt idx="2">
+                  <c:v>C=1.5</c:v>
+                </c:pt>
+                <c:pt idx="3">
+                  <c:v>C=2.0</c:v>
+                </c:pt>
+              </c:strCache>
+            </c:strRef>
+          </c:cat>
+          <c:val>
+            <c:numRef>
+              <c:f>Sheet1!$B$2:$B$5</c:f>
+              <c:numCache>
+                <c:formatCode>General</c:formatCode>
+                <c:ptCount val="4"/>
+                <c:pt idx="0">
+                  <c:v>80.739</c:v>
+                </c:pt>
+                <c:pt idx="1">
+                  <c:v>82.37909999999998</c:v>
+                </c:pt>
+                <c:pt idx="2">
+                  <c:v>83.1542</c:v>
+                </c:pt>
+                <c:pt idx="3">
+                  <c:v>83.6092</c:v>
+                </c:pt>
+              </c:numCache>
+            </c:numRef>
+          </c:val>
+        </c:ser>
+        <c:ser>
+          <c:idx val="1"/>
+          <c:order val="1"/>
+          <c:tx>
+            <c:strRef>
+              <c:f>Sheet1!$C$1</c:f>
+              <c:strCache>
+                <c:ptCount val="1"/>
+                <c:pt idx="0">
+                  <c:v>Root relative squared error</c:v>
+                </c:pt>
+              </c:strCache>
+            </c:strRef>
+          </c:tx>
+          <c:spPr>
+            <a:solidFill>
+              <a:schemeClr val="accent2"/>
+            </a:solidFill>
+            <a:ln>
+              <a:noFill/>
+            </a:ln>
+            <a:effectLst/>
+          </c:spPr>
+          <c:invertIfNegative val="0"/>
+          <c:cat>
+            <c:strRef>
+              <c:f>Sheet1!$A$2:$A$5</c:f>
+              <c:strCache>
+                <c:ptCount val="4"/>
+                <c:pt idx="0">
+                  <c:v>C=0.5</c:v>
+                </c:pt>
+                <c:pt idx="1">
+                  <c:v>C=1.0</c:v>
+                </c:pt>
+                <c:pt idx="2">
+                  <c:v>C=1.5</c:v>
+                </c:pt>
+                <c:pt idx="3">
+                  <c:v>C=2.0</c:v>
+                </c:pt>
+              </c:strCache>
+            </c:strRef>
+          </c:cat>
+          <c:val>
+            <c:numRef>
+              <c:f>Sheet1!$C$2:$C$5</c:f>
+              <c:numCache>
+                <c:formatCode>General</c:formatCode>
+                <c:ptCount val="4"/>
+                <c:pt idx="0">
+                  <c:v>96.8279</c:v>
+                </c:pt>
+                <c:pt idx="1">
+                  <c:v>96.7869</c:v>
+                </c:pt>
+                <c:pt idx="2">
+                  <c:v>96.7669</c:v>
+                </c:pt>
+                <c:pt idx="3">
+                  <c:v>96.7546</c:v>
+                </c:pt>
+              </c:numCache>
+            </c:numRef>
+          </c:val>
+        </c:ser>
+        <c:dLbls>
+          <c:showLegendKey val="0"/>
+          <c:showVal val="0"/>
+          <c:showCatName val="0"/>
+          <c:showSerName val="0"/>
+          <c:showPercent val="0"/>
+          <c:showBubbleSize val="0"/>
+        </c:dLbls>
+        <c:gapWidth val="219"/>
+        <c:overlap val="-27"/>
+        <c:axId val="-2097139088"/>
+        <c:axId val="-2126366944"/>
+      </c:barChart>
+      <c:catAx>
+        <c:axId val="-2097139088"/>
+        <c:scaling>
+          <c:orientation val="minMax"/>
+        </c:scaling>
+        <c:delete val="0"/>
+        <c:axPos val="b"/>
+        <c:numFmt formatCode="General" sourceLinked="1"/>
+        <c:majorTickMark val="none"/>
+        <c:minorTickMark val="none"/>
+        <c:tickLblPos val="nextTo"/>
+        <c:spPr>
+          <a:noFill/>
+          <a:ln w="9525" cap="flat" cmpd="sng" algn="ctr">
+            <a:solidFill>
+              <a:schemeClr val="tx1">
+                <a:lumMod val="15000"/>
+                <a:lumOff val="85000"/>
+              </a:schemeClr>
+            </a:solidFill>
+            <a:round/>
+          </a:ln>
+          <a:effectLst/>
+        </c:spPr>
+        <c:txPr>
+          <a:bodyPr rot="-60000000" spcFirstLastPara="1" vertOverflow="ellipsis" vert="horz" wrap="square" anchor="ctr" anchorCtr="1"/>
+          <a:lstStyle/>
+          <a:p>
+            <a:pPr>
+              <a:defRPr sz="1197" b="0" i="0" u="none" strike="noStrike" kern="1200" baseline="0">
+                <a:solidFill>
+                  <a:schemeClr val="tx1">
+                    <a:lumMod val="65000"/>
+                    <a:lumOff val="35000"/>
+                  </a:schemeClr>
+                </a:solidFill>
+                <a:latin typeface="+mn-lt"/>
+                <a:ea typeface="+mn-ea"/>
+                <a:cs typeface="+mn-cs"/>
+              </a:defRPr>
+            </a:pPr>
+            <a:endParaRPr lang="en-US"/>
+          </a:p>
+        </c:txPr>
+        <c:crossAx val="-2126366944"/>
+        <c:crosses val="autoZero"/>
+        <c:auto val="1"/>
+        <c:lblAlgn val="ctr"/>
+        <c:lblOffset val="100"/>
+        <c:noMultiLvlLbl val="0"/>
+      </c:catAx>
+      <c:valAx>
+        <c:axId val="-2126366944"/>
+        <c:scaling>
+          <c:orientation val="minMax"/>
+        </c:scaling>
+        <c:delete val="0"/>
+        <c:axPos val="l"/>
+        <c:majorGridlines>
+          <c:spPr>
+            <a:ln w="9525" cap="flat" cmpd="sng" algn="ctr">
+              <a:solidFill>
+                <a:schemeClr val="tx1">
+                  <a:lumMod val="15000"/>
+                  <a:lumOff val="85000"/>
+                </a:schemeClr>
+              </a:solidFill>
+              <a:round/>
+            </a:ln>
+            <a:effectLst/>
+          </c:spPr>
+        </c:majorGridlines>
+        <c:numFmt formatCode="General" sourceLinked="0"/>
+        <c:majorTickMark val="none"/>
+        <c:minorTickMark val="none"/>
+        <c:tickLblPos val="nextTo"/>
+        <c:spPr>
+          <a:noFill/>
+          <a:ln>
+            <a:noFill/>
+          </a:ln>
+          <a:effectLst/>
+        </c:spPr>
+        <c:txPr>
+          <a:bodyPr rot="-60000000" spcFirstLastPara="1" vertOverflow="ellipsis" vert="horz" wrap="square" anchor="ctr" anchorCtr="1"/>
+          <a:lstStyle/>
+          <a:p>
+            <a:pPr>
+              <a:defRPr sz="1197" b="0" i="0" u="none" strike="noStrike" kern="1200" baseline="0">
+                <a:solidFill>
+                  <a:schemeClr val="tx1">
+                    <a:lumMod val="65000"/>
+                    <a:lumOff val="35000"/>
+                  </a:schemeClr>
+                </a:solidFill>
+                <a:latin typeface="+mn-lt"/>
+                <a:ea typeface="+mn-ea"/>
+                <a:cs typeface="+mn-cs"/>
+              </a:defRPr>
+            </a:pPr>
+            <a:endParaRPr lang="en-US"/>
+          </a:p>
+        </c:txPr>
+        <c:crossAx val="-2097139088"/>
+        <c:crosses val="autoZero"/>
+        <c:crossBetween val="between"/>
+      </c:valAx>
+      <c:spPr>
+        <a:noFill/>
+        <a:ln>
+          <a:noFill/>
+        </a:ln>
+        <a:effectLst/>
+      </c:spPr>
+    </c:plotArea>
+    <c:legend>
+      <c:legendPos val="b"/>
+      <c:overlay val="0"/>
+      <c:spPr>
+        <a:noFill/>
+        <a:ln>
+          <a:noFill/>
+        </a:ln>
+        <a:effectLst/>
+      </c:spPr>
+      <c:txPr>
+        <a:bodyPr rot="0" spcFirstLastPara="1" vertOverflow="ellipsis" vert="horz" wrap="square" anchor="ctr" anchorCtr="1"/>
+        <a:lstStyle/>
+        <a:p>
+          <a:pPr>
+            <a:defRPr sz="1197" b="0" i="0" u="none" strike="noStrike" kern="1200" baseline="0">
+              <a:solidFill>
+                <a:schemeClr val="tx1">
+                  <a:lumMod val="65000"/>
+                  <a:lumOff val="35000"/>
+                </a:schemeClr>
+              </a:solidFill>
+              <a:latin typeface="+mn-lt"/>
+              <a:ea typeface="+mn-ea"/>
+              <a:cs typeface="+mn-cs"/>
+            </a:defRPr>
+          </a:pPr>
+          <a:endParaRPr lang="en-US"/>
+        </a:p>
+      </c:txPr>
+    </c:legend>
+    <c:plotVisOnly val="1"/>
+    <c:dispBlanksAs val="gap"/>
+    <c:showDLblsOverMax val="0"/>
+  </c:chart>
+  <c:spPr>
+    <a:noFill/>
+    <a:ln>
+      <a:noFill/>
+    </a:ln>
+    <a:effectLst/>
+  </c:spPr>
+  <c:txPr>
+    <a:bodyPr/>
+    <a:lstStyle/>
+    <a:p>
+      <a:pPr>
+        <a:defRPr/>
+      </a:pPr>
+      <a:endParaRPr lang="en-US"/>
+    </a:p>
+  </c:txPr>
+  <c:externalData r:id="rId3">
+    <c:autoUpdate val="0"/>
+  </c:externalData>
+</c:chartSpace>
+</file>
+
+<file path=ppt/charts/chart5.xml><?xml version="1.0" encoding="utf-8"?>
+<c:chartSpace xmlns:c="http://schemas.openxmlformats.org/drawingml/2006/chart" xmlns:a="http://schemas.openxmlformats.org/drawingml/2006/main" xmlns:r="http://schemas.openxmlformats.org/officeDocument/2006/relationships">
+  <c:date1904 val="0"/>
+  <c:lang val="en-US"/>
+  <c:roundedCorners val="0"/>
+  <mc:AlternateContent xmlns:mc="http://schemas.openxmlformats.org/markup-compatibility/2006">
+    <mc:Choice xmlns:c14="http://schemas.microsoft.com/office/drawing/2007/8/2/chart" Requires="c14">
+      <c14:style val="102"/>
+    </mc:Choice>
+    <mc:Fallback>
+      <c:style val="2"/>
+    </mc:Fallback>
+  </mc:AlternateContent>
+  <c:chart>
+    <c:title>
+      <c:tx>
+        <c:rich>
+          <a:bodyPr rot="0" spcFirstLastPara="1" vertOverflow="ellipsis" vert="horz" wrap="square" anchor="ctr" anchorCtr="1"/>
+          <a:lstStyle/>
+          <a:p>
+            <a:pPr>
+              <a:defRPr sz="1862" b="0" i="0" u="none" strike="noStrike" kern="1200" spc="0" baseline="0">
+                <a:solidFill>
+                  <a:schemeClr val="tx1">
+                    <a:lumMod val="65000"/>
+                    <a:lumOff val="35000"/>
+                  </a:schemeClr>
+                </a:solidFill>
+                <a:latin typeface="+mn-lt"/>
+                <a:ea typeface="+mn-ea"/>
+                <a:cs typeface="+mn-cs"/>
+              </a:defRPr>
+            </a:pPr>
+            <a:r>
+              <a:rPr lang="en-US" dirty="0" smtClean="0"/>
+              <a:t>Digit</a:t>
+            </a:r>
+            <a:r>
+              <a:rPr lang="en-US" baseline="0" dirty="0" smtClean="0"/>
+              <a:t> </a:t>
+            </a:r>
+            <a:r>
+              <a:rPr lang="en-US" dirty="0" smtClean="0"/>
+              <a:t>Recognition</a:t>
+            </a:r>
+            <a:endParaRPr lang="en-US" dirty="0"/>
+          </a:p>
+        </c:rich>
+      </c:tx>
+      <c:overlay val="0"/>
+      <c:spPr>
+        <a:noFill/>
+        <a:ln>
+          <a:noFill/>
+        </a:ln>
+        <a:effectLst/>
+      </c:spPr>
+      <c:txPr>
+        <a:bodyPr rot="0" spcFirstLastPara="1" vertOverflow="ellipsis" vert="horz" wrap="square" anchor="ctr" anchorCtr="1"/>
+        <a:lstStyle/>
+        <a:p>
+          <a:pPr>
+            <a:defRPr sz="1862" b="0" i="0" u="none" strike="noStrike" kern="1200" spc="0" baseline="0">
+              <a:solidFill>
+                <a:schemeClr val="tx1">
+                  <a:lumMod val="65000"/>
+                  <a:lumOff val="35000"/>
+                </a:schemeClr>
+              </a:solidFill>
+              <a:latin typeface="+mn-lt"/>
+              <a:ea typeface="+mn-ea"/>
+              <a:cs typeface="+mn-cs"/>
+            </a:defRPr>
+          </a:pPr>
+          <a:endParaRPr lang="en-US"/>
+        </a:p>
+      </c:txPr>
+    </c:title>
+    <c:autoTitleDeleted val="0"/>
+    <c:plotArea>
+      <c:layout/>
+      <c:barChart>
+        <c:barDir val="col"/>
+        <c:grouping val="clustered"/>
+        <c:varyColors val="0"/>
+        <c:ser>
+          <c:idx val="0"/>
+          <c:order val="0"/>
+          <c:tx>
+            <c:strRef>
+              <c:f>Sheet1!$B$1</c:f>
+              <c:strCache>
+                <c:ptCount val="1"/>
+                <c:pt idx="0">
+                  <c:v>Correctness</c:v>
+                </c:pt>
+              </c:strCache>
+            </c:strRef>
+          </c:tx>
+          <c:spPr>
+            <a:solidFill>
+              <a:schemeClr val="accent1"/>
+            </a:solidFill>
+            <a:ln>
+              <a:noFill/>
+            </a:ln>
+            <a:effectLst/>
+          </c:spPr>
+          <c:invertIfNegative val="0"/>
+          <c:cat>
+            <c:strRef>
+              <c:f>Sheet1!$A$2:$A$5</c:f>
+              <c:strCache>
+                <c:ptCount val="4"/>
+                <c:pt idx="0">
+                  <c:v>C=0.5</c:v>
+                </c:pt>
+                <c:pt idx="1">
+                  <c:v>C=1.0</c:v>
+                </c:pt>
+                <c:pt idx="2">
+                  <c:v>C=1.5</c:v>
+                </c:pt>
+                <c:pt idx="3">
+                  <c:v>C=2.0</c:v>
+                </c:pt>
+              </c:strCache>
+            </c:strRef>
+          </c:cat>
+          <c:val>
+            <c:numRef>
+              <c:f>Sheet1!$B$2:$B$5</c:f>
+              <c:numCache>
+                <c:formatCode>General</c:formatCode>
+                <c:ptCount val="4"/>
+                <c:pt idx="0">
+                  <c:v>98.2193</c:v>
+                </c:pt>
+                <c:pt idx="1">
+                  <c:v>98.2749</c:v>
+                </c:pt>
+                <c:pt idx="2">
+                  <c:v>98.2193</c:v>
+                </c:pt>
+                <c:pt idx="3">
+                  <c:v>98.2193</c:v>
+                </c:pt>
+              </c:numCache>
+            </c:numRef>
+          </c:val>
+        </c:ser>
+        <c:ser>
+          <c:idx val="1"/>
+          <c:order val="1"/>
+          <c:tx>
+            <c:strRef>
+              <c:f>Sheet1!$C$1</c:f>
+              <c:strCache>
+                <c:ptCount val="1"/>
+                <c:pt idx="0">
+                  <c:v>Root relative squared error</c:v>
+                </c:pt>
+              </c:strCache>
+            </c:strRef>
+          </c:tx>
+          <c:spPr>
+            <a:solidFill>
+              <a:schemeClr val="accent2"/>
+            </a:solidFill>
+            <a:ln>
+              <a:noFill/>
+            </a:ln>
+            <a:effectLst/>
+          </c:spPr>
+          <c:invertIfNegative val="0"/>
+          <c:cat>
+            <c:strRef>
+              <c:f>Sheet1!$A$2:$A$5</c:f>
+              <c:strCache>
+                <c:ptCount val="4"/>
+                <c:pt idx="0">
+                  <c:v>C=0.5</c:v>
+                </c:pt>
+                <c:pt idx="1">
+                  <c:v>C=1.0</c:v>
+                </c:pt>
+                <c:pt idx="2">
+                  <c:v>C=1.5</c:v>
+                </c:pt>
+                <c:pt idx="3">
+                  <c:v>C=2.0</c:v>
+                </c:pt>
+              </c:strCache>
+            </c:strRef>
+          </c:cat>
+          <c:val>
+            <c:numRef>
+              <c:f>Sheet1!$C$2:$C$5</c:f>
+              <c:numCache>
+                <c:formatCode>General</c:formatCode>
+                <c:ptCount val="4"/>
+                <c:pt idx="0">
+                  <c:v>90.6182</c:v>
+                </c:pt>
+                <c:pt idx="1">
+                  <c:v>90.5978</c:v>
+                </c:pt>
+                <c:pt idx="2">
+                  <c:v>90.5968</c:v>
+                </c:pt>
+                <c:pt idx="3">
+                  <c:v>90.5931</c:v>
+                </c:pt>
+              </c:numCache>
+            </c:numRef>
+          </c:val>
+        </c:ser>
+        <c:dLbls>
+          <c:showLegendKey val="0"/>
+          <c:showVal val="0"/>
+          <c:showCatName val="0"/>
+          <c:showSerName val="0"/>
+          <c:showPercent val="0"/>
+          <c:showBubbleSize val="0"/>
+        </c:dLbls>
+        <c:gapWidth val="219"/>
+        <c:overlap val="-27"/>
+        <c:axId val="-2094404560"/>
+        <c:axId val="-2094265088"/>
+      </c:barChart>
+      <c:catAx>
+        <c:axId val="-2094404560"/>
+        <c:scaling>
+          <c:orientation val="minMax"/>
+        </c:scaling>
+        <c:delete val="0"/>
+        <c:axPos val="b"/>
+        <c:numFmt formatCode="General" sourceLinked="1"/>
+        <c:majorTickMark val="none"/>
+        <c:minorTickMark val="none"/>
+        <c:tickLblPos val="nextTo"/>
+        <c:spPr>
+          <a:noFill/>
+          <a:ln w="9525" cap="flat" cmpd="sng" algn="ctr">
+            <a:solidFill>
+              <a:schemeClr val="tx1">
+                <a:lumMod val="15000"/>
+                <a:lumOff val="85000"/>
+              </a:schemeClr>
+            </a:solidFill>
+            <a:round/>
+          </a:ln>
+          <a:effectLst/>
+        </c:spPr>
+        <c:txPr>
+          <a:bodyPr rot="-60000000" spcFirstLastPara="1" vertOverflow="ellipsis" vert="horz" wrap="square" anchor="ctr" anchorCtr="1"/>
+          <a:lstStyle/>
+          <a:p>
+            <a:pPr>
+              <a:defRPr sz="1197" b="0" i="0" u="none" strike="noStrike" kern="1200" baseline="0">
+                <a:solidFill>
+                  <a:schemeClr val="tx1">
+                    <a:lumMod val="65000"/>
+                    <a:lumOff val="35000"/>
+                  </a:schemeClr>
+                </a:solidFill>
+                <a:latin typeface="+mn-lt"/>
+                <a:ea typeface="+mn-ea"/>
+                <a:cs typeface="+mn-cs"/>
+              </a:defRPr>
+            </a:pPr>
+            <a:endParaRPr lang="en-US"/>
+          </a:p>
+        </c:txPr>
+        <c:crossAx val="-2094265088"/>
+        <c:crosses val="autoZero"/>
+        <c:auto val="1"/>
+        <c:lblAlgn val="ctr"/>
+        <c:lblOffset val="100"/>
+        <c:noMultiLvlLbl val="0"/>
+      </c:catAx>
+      <c:valAx>
+        <c:axId val="-2094265088"/>
+        <c:scaling>
+          <c:orientation val="minMax"/>
+        </c:scaling>
+        <c:delete val="0"/>
+        <c:axPos val="l"/>
+        <c:majorGridlines>
+          <c:spPr>
+            <a:ln w="9525" cap="flat" cmpd="sng" algn="ctr">
+              <a:solidFill>
+                <a:schemeClr val="tx1">
+                  <a:lumMod val="15000"/>
+                  <a:lumOff val="85000"/>
+                </a:schemeClr>
+              </a:solidFill>
+              <a:round/>
+            </a:ln>
+            <a:effectLst/>
+          </c:spPr>
+        </c:majorGridlines>
+        <c:numFmt formatCode="General" sourceLinked="0"/>
+        <c:majorTickMark val="none"/>
+        <c:minorTickMark val="none"/>
+        <c:tickLblPos val="nextTo"/>
+        <c:spPr>
+          <a:noFill/>
+          <a:ln>
+            <a:noFill/>
+          </a:ln>
+          <a:effectLst/>
+        </c:spPr>
+        <c:txPr>
+          <a:bodyPr rot="-60000000" spcFirstLastPara="1" vertOverflow="ellipsis" vert="horz" wrap="square" anchor="ctr" anchorCtr="1"/>
+          <a:lstStyle/>
+          <a:p>
+            <a:pPr>
+              <a:defRPr sz="1197" b="0" i="0" u="none" strike="noStrike" kern="1200" baseline="0">
+                <a:solidFill>
+                  <a:schemeClr val="tx1">
+                    <a:lumMod val="65000"/>
+                    <a:lumOff val="35000"/>
+                  </a:schemeClr>
+                </a:solidFill>
+                <a:latin typeface="+mn-lt"/>
+                <a:ea typeface="+mn-ea"/>
+                <a:cs typeface="+mn-cs"/>
+              </a:defRPr>
+            </a:pPr>
+            <a:endParaRPr lang="en-US"/>
+          </a:p>
+        </c:txPr>
+        <c:crossAx val="-2094404560"/>
+        <c:crosses val="autoZero"/>
+        <c:crossBetween val="between"/>
+      </c:valAx>
+      <c:spPr>
+        <a:noFill/>
+        <a:ln>
+          <a:noFill/>
+        </a:ln>
+        <a:effectLst/>
+      </c:spPr>
+    </c:plotArea>
+    <c:legend>
+      <c:legendPos val="b"/>
       <c:overlay val="0"/>
       <c:spPr>
         <a:noFill/>
@@ -1379,6 +2172,86 @@
 </file>
 
 <file path=ppt/charts/colors3.xml><?xml version="1.0" encoding="utf-8"?>
+<cs:colorStyle xmlns:cs="http://schemas.microsoft.com/office/drawing/2012/chartStyle" xmlns:a="http://schemas.openxmlformats.org/drawingml/2006/main" meth="cycle" id="10">
+  <a:schemeClr val="accent1"/>
+  <a:schemeClr val="accent2"/>
+  <a:schemeClr val="accent3"/>
+  <a:schemeClr val="accent4"/>
+  <a:schemeClr val="accent5"/>
+  <a:schemeClr val="accent6"/>
+  <cs:variation/>
+  <cs:variation>
+    <a:lumMod val="60000"/>
+  </cs:variation>
+  <cs:variation>
+    <a:lumMod val="80000"/>
+    <a:lumOff val="20000"/>
+  </cs:variation>
+  <cs:variation>
+    <a:lumMod val="80000"/>
+  </cs:variation>
+  <cs:variation>
+    <a:lumMod val="60000"/>
+    <a:lumOff val="40000"/>
+  </cs:variation>
+  <cs:variation>
+    <a:lumMod val="50000"/>
+  </cs:variation>
+  <cs:variation>
+    <a:lumMod val="70000"/>
+    <a:lumOff val="30000"/>
+  </cs:variation>
+  <cs:variation>
+    <a:lumMod val="70000"/>
+  </cs:variation>
+  <cs:variation>
+    <a:lumMod val="50000"/>
+    <a:lumOff val="50000"/>
+  </cs:variation>
+</cs:colorStyle>
+</file>
+
+<file path=ppt/charts/colors4.xml><?xml version="1.0" encoding="utf-8"?>
+<cs:colorStyle xmlns:cs="http://schemas.microsoft.com/office/drawing/2012/chartStyle" xmlns:a="http://schemas.openxmlformats.org/drawingml/2006/main" meth="cycle" id="10">
+  <a:schemeClr val="accent1"/>
+  <a:schemeClr val="accent2"/>
+  <a:schemeClr val="accent3"/>
+  <a:schemeClr val="accent4"/>
+  <a:schemeClr val="accent5"/>
+  <a:schemeClr val="accent6"/>
+  <cs:variation/>
+  <cs:variation>
+    <a:lumMod val="60000"/>
+  </cs:variation>
+  <cs:variation>
+    <a:lumMod val="80000"/>
+    <a:lumOff val="20000"/>
+  </cs:variation>
+  <cs:variation>
+    <a:lumMod val="80000"/>
+  </cs:variation>
+  <cs:variation>
+    <a:lumMod val="60000"/>
+    <a:lumOff val="40000"/>
+  </cs:variation>
+  <cs:variation>
+    <a:lumMod val="50000"/>
+  </cs:variation>
+  <cs:variation>
+    <a:lumMod val="70000"/>
+    <a:lumOff val="30000"/>
+  </cs:variation>
+  <cs:variation>
+    <a:lumMod val="70000"/>
+  </cs:variation>
+  <cs:variation>
+    <a:lumMod val="50000"/>
+    <a:lumOff val="50000"/>
+  </cs:variation>
+</cs:colorStyle>
+</file>
+
+<file path=ppt/charts/colors5.xml><?xml version="1.0" encoding="utf-8"?>
 <cs:colorStyle xmlns:cs="http://schemas.microsoft.com/office/drawing/2012/chartStyle" xmlns:a="http://schemas.openxmlformats.org/drawingml/2006/main" meth="cycle" id="10">
   <a:schemeClr val="accent1"/>
   <a:schemeClr val="accent2"/>
@@ -2927,6 +3800,1012 @@
 </cs:chartStyle>
 </file>
 
+<file path=ppt/charts/style4.xml><?xml version="1.0" encoding="utf-8"?>
+<cs:chartStyle xmlns:cs="http://schemas.microsoft.com/office/drawing/2012/chartStyle" xmlns:a="http://schemas.openxmlformats.org/drawingml/2006/main" id="201">
+  <cs:axisTitle>
+    <cs:lnRef idx="0"/>
+    <cs:fillRef idx="0"/>
+    <cs:effectRef idx="0"/>
+    <cs:fontRef idx="minor">
+      <a:schemeClr val="tx1">
+        <a:lumMod val="65000"/>
+        <a:lumOff val="35000"/>
+      </a:schemeClr>
+    </cs:fontRef>
+    <cs:defRPr sz="1330" kern="1200"/>
+  </cs:axisTitle>
+  <cs:categoryAxis>
+    <cs:lnRef idx="0"/>
+    <cs:fillRef idx="0"/>
+    <cs:effectRef idx="0"/>
+    <cs:fontRef idx="minor">
+      <a:schemeClr val="tx1">
+        <a:lumMod val="65000"/>
+        <a:lumOff val="35000"/>
+      </a:schemeClr>
+    </cs:fontRef>
+    <cs:spPr>
+      <a:ln w="9525" cap="flat" cmpd="sng" algn="ctr">
+        <a:solidFill>
+          <a:schemeClr val="tx1">
+            <a:lumMod val="15000"/>
+            <a:lumOff val="85000"/>
+          </a:schemeClr>
+        </a:solidFill>
+        <a:round/>
+      </a:ln>
+    </cs:spPr>
+    <cs:defRPr sz="1197" kern="1200"/>
+  </cs:categoryAxis>
+  <cs:chartArea mods="allowNoFillOverride allowNoLineOverride">
+    <cs:lnRef idx="0"/>
+    <cs:fillRef idx="0"/>
+    <cs:effectRef idx="0"/>
+    <cs:fontRef idx="minor">
+      <a:schemeClr val="tx1"/>
+    </cs:fontRef>
+    <cs:spPr>
+      <a:solidFill>
+        <a:schemeClr val="bg1"/>
+      </a:solidFill>
+      <a:ln w="9525" cap="flat" cmpd="sng" algn="ctr">
+        <a:solidFill>
+          <a:schemeClr val="tx1">
+            <a:lumMod val="15000"/>
+            <a:lumOff val="85000"/>
+          </a:schemeClr>
+        </a:solidFill>
+        <a:round/>
+      </a:ln>
+    </cs:spPr>
+    <cs:defRPr sz="1330" kern="1200"/>
+  </cs:chartArea>
+  <cs:dataLabel>
+    <cs:lnRef idx="0"/>
+    <cs:fillRef idx="0"/>
+    <cs:effectRef idx="0"/>
+    <cs:fontRef idx="minor">
+      <a:schemeClr val="tx1">
+        <a:lumMod val="75000"/>
+        <a:lumOff val="25000"/>
+      </a:schemeClr>
+    </cs:fontRef>
+    <cs:defRPr sz="1197" kern="1200"/>
+  </cs:dataLabel>
+  <cs:dataLabelCallout>
+    <cs:lnRef idx="0"/>
+    <cs:fillRef idx="0"/>
+    <cs:effectRef idx="0"/>
+    <cs:fontRef idx="minor">
+      <a:schemeClr val="dk1">
+        <a:lumMod val="65000"/>
+        <a:lumOff val="35000"/>
+      </a:schemeClr>
+    </cs:fontRef>
+    <cs:spPr>
+      <a:solidFill>
+        <a:schemeClr val="lt1"/>
+      </a:solidFill>
+      <a:ln>
+        <a:solidFill>
+          <a:schemeClr val="dk1">
+            <a:lumMod val="25000"/>
+            <a:lumOff val="75000"/>
+          </a:schemeClr>
+        </a:solidFill>
+      </a:ln>
+    </cs:spPr>
+    <cs:defRPr sz="1197" kern="1200"/>
+    <cs:bodyPr rot="0" spcFirstLastPara="1" vertOverflow="clip" horzOverflow="clip" vert="horz" wrap="square" lIns="36576" tIns="18288" rIns="36576" bIns="18288" anchor="ctr" anchorCtr="1">
+      <a:spAutoFit/>
+    </cs:bodyPr>
+  </cs:dataLabelCallout>
+  <cs:dataPoint>
+    <cs:lnRef idx="0"/>
+    <cs:fillRef idx="1">
+      <cs:styleClr val="auto"/>
+    </cs:fillRef>
+    <cs:effectRef idx="0"/>
+    <cs:fontRef idx="minor">
+      <a:schemeClr val="tx1"/>
+    </cs:fontRef>
+  </cs:dataPoint>
+  <cs:dataPoint3D>
+    <cs:lnRef idx="0"/>
+    <cs:fillRef idx="1">
+      <cs:styleClr val="auto"/>
+    </cs:fillRef>
+    <cs:effectRef idx="0"/>
+    <cs:fontRef idx="minor">
+      <a:schemeClr val="tx1"/>
+    </cs:fontRef>
+  </cs:dataPoint3D>
+  <cs:dataPointLine>
+    <cs:lnRef idx="0">
+      <cs:styleClr val="auto"/>
+    </cs:lnRef>
+    <cs:fillRef idx="1"/>
+    <cs:effectRef idx="0"/>
+    <cs:fontRef idx="minor">
+      <a:schemeClr val="tx1"/>
+    </cs:fontRef>
+    <cs:spPr>
+      <a:ln w="28575" cap="rnd">
+        <a:solidFill>
+          <a:schemeClr val="phClr"/>
+        </a:solidFill>
+        <a:round/>
+      </a:ln>
+    </cs:spPr>
+  </cs:dataPointLine>
+  <cs:dataPointMarker>
+    <cs:lnRef idx="0">
+      <cs:styleClr val="auto"/>
+    </cs:lnRef>
+    <cs:fillRef idx="1">
+      <cs:styleClr val="auto"/>
+    </cs:fillRef>
+    <cs:effectRef idx="0"/>
+    <cs:fontRef idx="minor">
+      <a:schemeClr val="tx1"/>
+    </cs:fontRef>
+    <cs:spPr>
+      <a:ln w="9525">
+        <a:solidFill>
+          <a:schemeClr val="phClr"/>
+        </a:solidFill>
+      </a:ln>
+    </cs:spPr>
+  </cs:dataPointMarker>
+  <cs:dataPointMarkerLayout symbol="circle" size="5"/>
+  <cs:dataPointWireframe>
+    <cs:lnRef idx="0">
+      <cs:styleClr val="auto"/>
+    </cs:lnRef>
+    <cs:fillRef idx="1"/>
+    <cs:effectRef idx="0"/>
+    <cs:fontRef idx="minor">
+      <a:schemeClr val="tx1"/>
+    </cs:fontRef>
+    <cs:spPr>
+      <a:ln w="9525" cap="rnd">
+        <a:solidFill>
+          <a:schemeClr val="phClr"/>
+        </a:solidFill>
+        <a:round/>
+      </a:ln>
+    </cs:spPr>
+  </cs:dataPointWireframe>
+  <cs:dataTable>
+    <cs:lnRef idx="0"/>
+    <cs:fillRef idx="0"/>
+    <cs:effectRef idx="0"/>
+    <cs:fontRef idx="minor">
+      <a:schemeClr val="tx1">
+        <a:lumMod val="65000"/>
+        <a:lumOff val="35000"/>
+      </a:schemeClr>
+    </cs:fontRef>
+    <cs:spPr>
+      <a:noFill/>
+      <a:ln w="9525" cap="flat" cmpd="sng" algn="ctr">
+        <a:solidFill>
+          <a:schemeClr val="tx1">
+            <a:lumMod val="15000"/>
+            <a:lumOff val="85000"/>
+          </a:schemeClr>
+        </a:solidFill>
+        <a:round/>
+      </a:ln>
+    </cs:spPr>
+    <cs:defRPr sz="1197" kern="1200"/>
+  </cs:dataTable>
+  <cs:downBar>
+    <cs:lnRef idx="0"/>
+    <cs:fillRef idx="0"/>
+    <cs:effectRef idx="0"/>
+    <cs:fontRef idx="minor">
+      <a:schemeClr val="dk1"/>
+    </cs:fontRef>
+    <cs:spPr>
+      <a:solidFill>
+        <a:schemeClr val="dk1">
+          <a:lumMod val="65000"/>
+          <a:lumOff val="35000"/>
+        </a:schemeClr>
+      </a:solidFill>
+      <a:ln w="9525">
+        <a:solidFill>
+          <a:schemeClr val="tx1">
+            <a:lumMod val="65000"/>
+            <a:lumOff val="35000"/>
+          </a:schemeClr>
+        </a:solidFill>
+      </a:ln>
+    </cs:spPr>
+  </cs:downBar>
+  <cs:dropLine>
+    <cs:lnRef idx="0"/>
+    <cs:fillRef idx="0"/>
+    <cs:effectRef idx="0"/>
+    <cs:fontRef idx="minor">
+      <a:schemeClr val="tx1"/>
+    </cs:fontRef>
+    <cs:spPr>
+      <a:ln w="9525" cap="flat" cmpd="sng" algn="ctr">
+        <a:solidFill>
+          <a:schemeClr val="tx1">
+            <a:lumMod val="35000"/>
+            <a:lumOff val="65000"/>
+          </a:schemeClr>
+        </a:solidFill>
+        <a:round/>
+      </a:ln>
+    </cs:spPr>
+  </cs:dropLine>
+  <cs:errorBar>
+    <cs:lnRef idx="0"/>
+    <cs:fillRef idx="0"/>
+    <cs:effectRef idx="0"/>
+    <cs:fontRef idx="minor">
+      <a:schemeClr val="tx1"/>
+    </cs:fontRef>
+    <cs:spPr>
+      <a:ln w="9525" cap="flat" cmpd="sng" algn="ctr">
+        <a:solidFill>
+          <a:schemeClr val="tx1">
+            <a:lumMod val="65000"/>
+            <a:lumOff val="35000"/>
+          </a:schemeClr>
+        </a:solidFill>
+        <a:round/>
+      </a:ln>
+    </cs:spPr>
+  </cs:errorBar>
+  <cs:floor>
+    <cs:lnRef idx="0"/>
+    <cs:fillRef idx="0"/>
+    <cs:effectRef idx="0"/>
+    <cs:fontRef idx="minor">
+      <a:schemeClr val="tx1"/>
+    </cs:fontRef>
+    <cs:spPr>
+      <a:noFill/>
+      <a:ln>
+        <a:noFill/>
+      </a:ln>
+    </cs:spPr>
+  </cs:floor>
+  <cs:gridlineMajor>
+    <cs:lnRef idx="0"/>
+    <cs:fillRef idx="0"/>
+    <cs:effectRef idx="0"/>
+    <cs:fontRef idx="minor">
+      <a:schemeClr val="tx1"/>
+    </cs:fontRef>
+    <cs:spPr>
+      <a:ln w="9525" cap="flat" cmpd="sng" algn="ctr">
+        <a:solidFill>
+          <a:schemeClr val="tx1">
+            <a:lumMod val="15000"/>
+            <a:lumOff val="85000"/>
+          </a:schemeClr>
+        </a:solidFill>
+        <a:round/>
+      </a:ln>
+    </cs:spPr>
+  </cs:gridlineMajor>
+  <cs:gridlineMinor>
+    <cs:lnRef idx="0"/>
+    <cs:fillRef idx="0"/>
+    <cs:effectRef idx="0"/>
+    <cs:fontRef idx="minor">
+      <a:schemeClr val="tx1"/>
+    </cs:fontRef>
+    <cs:spPr>
+      <a:ln w="9525" cap="flat" cmpd="sng" algn="ctr">
+        <a:solidFill>
+          <a:schemeClr val="tx1">
+            <a:lumMod val="5000"/>
+            <a:lumOff val="95000"/>
+          </a:schemeClr>
+        </a:solidFill>
+        <a:round/>
+      </a:ln>
+    </cs:spPr>
+  </cs:gridlineMinor>
+  <cs:hiLoLine>
+    <cs:lnRef idx="0"/>
+    <cs:fillRef idx="0"/>
+    <cs:effectRef idx="0"/>
+    <cs:fontRef idx="minor">
+      <a:schemeClr val="tx1"/>
+    </cs:fontRef>
+    <cs:spPr>
+      <a:ln w="9525" cap="flat" cmpd="sng" algn="ctr">
+        <a:solidFill>
+          <a:schemeClr val="tx1">
+            <a:lumMod val="75000"/>
+            <a:lumOff val="25000"/>
+          </a:schemeClr>
+        </a:solidFill>
+        <a:round/>
+      </a:ln>
+    </cs:spPr>
+  </cs:hiLoLine>
+  <cs:leaderLine>
+    <cs:lnRef idx="0"/>
+    <cs:fillRef idx="0"/>
+    <cs:effectRef idx="0"/>
+    <cs:fontRef idx="minor">
+      <a:schemeClr val="tx1"/>
+    </cs:fontRef>
+    <cs:spPr>
+      <a:ln w="9525" cap="flat" cmpd="sng" algn="ctr">
+        <a:solidFill>
+          <a:schemeClr val="tx1">
+            <a:lumMod val="35000"/>
+            <a:lumOff val="65000"/>
+          </a:schemeClr>
+        </a:solidFill>
+        <a:round/>
+      </a:ln>
+    </cs:spPr>
+  </cs:leaderLine>
+  <cs:legend>
+    <cs:lnRef idx="0"/>
+    <cs:fillRef idx="0"/>
+    <cs:effectRef idx="0"/>
+    <cs:fontRef idx="minor">
+      <a:schemeClr val="tx1">
+        <a:lumMod val="65000"/>
+        <a:lumOff val="35000"/>
+      </a:schemeClr>
+    </cs:fontRef>
+    <cs:defRPr sz="1197" kern="1200"/>
+  </cs:legend>
+  <cs:plotArea mods="allowNoFillOverride allowNoLineOverride">
+    <cs:lnRef idx="0"/>
+    <cs:fillRef idx="0"/>
+    <cs:effectRef idx="0"/>
+    <cs:fontRef idx="minor">
+      <a:schemeClr val="tx1"/>
+    </cs:fontRef>
+  </cs:plotArea>
+  <cs:plotArea3D mods="allowNoFillOverride allowNoLineOverride">
+    <cs:lnRef idx="0"/>
+    <cs:fillRef idx="0"/>
+    <cs:effectRef idx="0"/>
+    <cs:fontRef idx="minor">
+      <a:schemeClr val="tx1"/>
+    </cs:fontRef>
+  </cs:plotArea3D>
+  <cs:seriesAxis>
+    <cs:lnRef idx="0"/>
+    <cs:fillRef idx="0"/>
+    <cs:effectRef idx="0"/>
+    <cs:fontRef idx="minor">
+      <a:schemeClr val="tx1">
+        <a:lumMod val="65000"/>
+        <a:lumOff val="35000"/>
+      </a:schemeClr>
+    </cs:fontRef>
+    <cs:defRPr sz="1197" kern="1200"/>
+  </cs:seriesAxis>
+  <cs:seriesLine>
+    <cs:lnRef idx="0"/>
+    <cs:fillRef idx="0"/>
+    <cs:effectRef idx="0"/>
+    <cs:fontRef idx="minor">
+      <a:schemeClr val="tx1"/>
+    </cs:fontRef>
+    <cs:spPr>
+      <a:ln w="9525" cap="flat" cmpd="sng" algn="ctr">
+        <a:solidFill>
+          <a:schemeClr val="tx1">
+            <a:lumMod val="35000"/>
+            <a:lumOff val="65000"/>
+          </a:schemeClr>
+        </a:solidFill>
+        <a:round/>
+      </a:ln>
+    </cs:spPr>
+  </cs:seriesLine>
+  <cs:title>
+    <cs:lnRef idx="0"/>
+    <cs:fillRef idx="0"/>
+    <cs:effectRef idx="0"/>
+    <cs:fontRef idx="minor">
+      <a:schemeClr val="tx1">
+        <a:lumMod val="65000"/>
+        <a:lumOff val="35000"/>
+      </a:schemeClr>
+    </cs:fontRef>
+    <cs:defRPr sz="1862" b="0" kern="1200" spc="0" baseline="0"/>
+  </cs:title>
+  <cs:trendline>
+    <cs:lnRef idx="0">
+      <cs:styleClr val="auto"/>
+    </cs:lnRef>
+    <cs:fillRef idx="0"/>
+    <cs:effectRef idx="0"/>
+    <cs:fontRef idx="minor">
+      <a:schemeClr val="tx1"/>
+    </cs:fontRef>
+    <cs:spPr>
+      <a:ln w="19050" cap="rnd">
+        <a:solidFill>
+          <a:schemeClr val="phClr"/>
+        </a:solidFill>
+        <a:prstDash val="sysDot"/>
+      </a:ln>
+    </cs:spPr>
+  </cs:trendline>
+  <cs:trendlineLabel>
+    <cs:lnRef idx="0"/>
+    <cs:fillRef idx="0"/>
+    <cs:effectRef idx="0"/>
+    <cs:fontRef idx="minor">
+      <a:schemeClr val="tx1">
+        <a:lumMod val="65000"/>
+        <a:lumOff val="35000"/>
+      </a:schemeClr>
+    </cs:fontRef>
+    <cs:defRPr sz="1197" kern="1200"/>
+  </cs:trendlineLabel>
+  <cs:upBar>
+    <cs:lnRef idx="0"/>
+    <cs:fillRef idx="0"/>
+    <cs:effectRef idx="0"/>
+    <cs:fontRef idx="minor">
+      <a:schemeClr val="dk1"/>
+    </cs:fontRef>
+    <cs:spPr>
+      <a:solidFill>
+        <a:schemeClr val="lt1"/>
+      </a:solidFill>
+      <a:ln w="9525">
+        <a:solidFill>
+          <a:schemeClr val="tx1">
+            <a:lumMod val="15000"/>
+            <a:lumOff val="85000"/>
+          </a:schemeClr>
+        </a:solidFill>
+      </a:ln>
+    </cs:spPr>
+  </cs:upBar>
+  <cs:valueAxis>
+    <cs:lnRef idx="0"/>
+    <cs:fillRef idx="0"/>
+    <cs:effectRef idx="0"/>
+    <cs:fontRef idx="minor">
+      <a:schemeClr val="tx1">
+        <a:lumMod val="65000"/>
+        <a:lumOff val="35000"/>
+      </a:schemeClr>
+    </cs:fontRef>
+    <cs:defRPr sz="1197" kern="1200"/>
+  </cs:valueAxis>
+  <cs:wall>
+    <cs:lnRef idx="0"/>
+    <cs:fillRef idx="0"/>
+    <cs:effectRef idx="0"/>
+    <cs:fontRef idx="minor">
+      <a:schemeClr val="tx1"/>
+    </cs:fontRef>
+    <cs:spPr>
+      <a:noFill/>
+      <a:ln>
+        <a:noFill/>
+      </a:ln>
+    </cs:spPr>
+  </cs:wall>
+</cs:chartStyle>
+</file>
+
+<file path=ppt/charts/style5.xml><?xml version="1.0" encoding="utf-8"?>
+<cs:chartStyle xmlns:cs="http://schemas.microsoft.com/office/drawing/2012/chartStyle" xmlns:a="http://schemas.openxmlformats.org/drawingml/2006/main" id="201">
+  <cs:axisTitle>
+    <cs:lnRef idx="0"/>
+    <cs:fillRef idx="0"/>
+    <cs:effectRef idx="0"/>
+    <cs:fontRef idx="minor">
+      <a:schemeClr val="tx1">
+        <a:lumMod val="65000"/>
+        <a:lumOff val="35000"/>
+      </a:schemeClr>
+    </cs:fontRef>
+    <cs:defRPr sz="1330" kern="1200"/>
+  </cs:axisTitle>
+  <cs:categoryAxis>
+    <cs:lnRef idx="0"/>
+    <cs:fillRef idx="0"/>
+    <cs:effectRef idx="0"/>
+    <cs:fontRef idx="minor">
+      <a:schemeClr val="tx1">
+        <a:lumMod val="65000"/>
+        <a:lumOff val="35000"/>
+      </a:schemeClr>
+    </cs:fontRef>
+    <cs:spPr>
+      <a:ln w="9525" cap="flat" cmpd="sng" algn="ctr">
+        <a:solidFill>
+          <a:schemeClr val="tx1">
+            <a:lumMod val="15000"/>
+            <a:lumOff val="85000"/>
+          </a:schemeClr>
+        </a:solidFill>
+        <a:round/>
+      </a:ln>
+    </cs:spPr>
+    <cs:defRPr sz="1197" kern="1200"/>
+  </cs:categoryAxis>
+  <cs:chartArea mods="allowNoFillOverride allowNoLineOverride">
+    <cs:lnRef idx="0"/>
+    <cs:fillRef idx="0"/>
+    <cs:effectRef idx="0"/>
+    <cs:fontRef idx="minor">
+      <a:schemeClr val="tx1"/>
+    </cs:fontRef>
+    <cs:spPr>
+      <a:solidFill>
+        <a:schemeClr val="bg1"/>
+      </a:solidFill>
+      <a:ln w="9525" cap="flat" cmpd="sng" algn="ctr">
+        <a:solidFill>
+          <a:schemeClr val="tx1">
+            <a:lumMod val="15000"/>
+            <a:lumOff val="85000"/>
+          </a:schemeClr>
+        </a:solidFill>
+        <a:round/>
+      </a:ln>
+    </cs:spPr>
+    <cs:defRPr sz="1330" kern="1200"/>
+  </cs:chartArea>
+  <cs:dataLabel>
+    <cs:lnRef idx="0"/>
+    <cs:fillRef idx="0"/>
+    <cs:effectRef idx="0"/>
+    <cs:fontRef idx="minor">
+      <a:schemeClr val="tx1">
+        <a:lumMod val="75000"/>
+        <a:lumOff val="25000"/>
+      </a:schemeClr>
+    </cs:fontRef>
+    <cs:defRPr sz="1197" kern="1200"/>
+  </cs:dataLabel>
+  <cs:dataLabelCallout>
+    <cs:lnRef idx="0"/>
+    <cs:fillRef idx="0"/>
+    <cs:effectRef idx="0"/>
+    <cs:fontRef idx="minor">
+      <a:schemeClr val="dk1">
+        <a:lumMod val="65000"/>
+        <a:lumOff val="35000"/>
+      </a:schemeClr>
+    </cs:fontRef>
+    <cs:spPr>
+      <a:solidFill>
+        <a:schemeClr val="lt1"/>
+      </a:solidFill>
+      <a:ln>
+        <a:solidFill>
+          <a:schemeClr val="dk1">
+            <a:lumMod val="25000"/>
+            <a:lumOff val="75000"/>
+          </a:schemeClr>
+        </a:solidFill>
+      </a:ln>
+    </cs:spPr>
+    <cs:defRPr sz="1197" kern="1200"/>
+    <cs:bodyPr rot="0" spcFirstLastPara="1" vertOverflow="clip" horzOverflow="clip" vert="horz" wrap="square" lIns="36576" tIns="18288" rIns="36576" bIns="18288" anchor="ctr" anchorCtr="1">
+      <a:spAutoFit/>
+    </cs:bodyPr>
+  </cs:dataLabelCallout>
+  <cs:dataPoint>
+    <cs:lnRef idx="0"/>
+    <cs:fillRef idx="1">
+      <cs:styleClr val="auto"/>
+    </cs:fillRef>
+    <cs:effectRef idx="0"/>
+    <cs:fontRef idx="minor">
+      <a:schemeClr val="tx1"/>
+    </cs:fontRef>
+  </cs:dataPoint>
+  <cs:dataPoint3D>
+    <cs:lnRef idx="0"/>
+    <cs:fillRef idx="1">
+      <cs:styleClr val="auto"/>
+    </cs:fillRef>
+    <cs:effectRef idx="0"/>
+    <cs:fontRef idx="minor">
+      <a:schemeClr val="tx1"/>
+    </cs:fontRef>
+  </cs:dataPoint3D>
+  <cs:dataPointLine>
+    <cs:lnRef idx="0">
+      <cs:styleClr val="auto"/>
+    </cs:lnRef>
+    <cs:fillRef idx="1"/>
+    <cs:effectRef idx="0"/>
+    <cs:fontRef idx="minor">
+      <a:schemeClr val="tx1"/>
+    </cs:fontRef>
+    <cs:spPr>
+      <a:ln w="28575" cap="rnd">
+        <a:solidFill>
+          <a:schemeClr val="phClr"/>
+        </a:solidFill>
+        <a:round/>
+      </a:ln>
+    </cs:spPr>
+  </cs:dataPointLine>
+  <cs:dataPointMarker>
+    <cs:lnRef idx="0">
+      <cs:styleClr val="auto"/>
+    </cs:lnRef>
+    <cs:fillRef idx="1">
+      <cs:styleClr val="auto"/>
+    </cs:fillRef>
+    <cs:effectRef idx="0"/>
+    <cs:fontRef idx="minor">
+      <a:schemeClr val="tx1"/>
+    </cs:fontRef>
+    <cs:spPr>
+      <a:ln w="9525">
+        <a:solidFill>
+          <a:schemeClr val="phClr"/>
+        </a:solidFill>
+      </a:ln>
+    </cs:spPr>
+  </cs:dataPointMarker>
+  <cs:dataPointMarkerLayout symbol="circle" size="5"/>
+  <cs:dataPointWireframe>
+    <cs:lnRef idx="0">
+      <cs:styleClr val="auto"/>
+    </cs:lnRef>
+    <cs:fillRef idx="1"/>
+    <cs:effectRef idx="0"/>
+    <cs:fontRef idx="minor">
+      <a:schemeClr val="tx1"/>
+    </cs:fontRef>
+    <cs:spPr>
+      <a:ln w="9525" cap="rnd">
+        <a:solidFill>
+          <a:schemeClr val="phClr"/>
+        </a:solidFill>
+        <a:round/>
+      </a:ln>
+    </cs:spPr>
+  </cs:dataPointWireframe>
+  <cs:dataTable>
+    <cs:lnRef idx="0"/>
+    <cs:fillRef idx="0"/>
+    <cs:effectRef idx="0"/>
+    <cs:fontRef idx="minor">
+      <a:schemeClr val="tx1">
+        <a:lumMod val="65000"/>
+        <a:lumOff val="35000"/>
+      </a:schemeClr>
+    </cs:fontRef>
+    <cs:spPr>
+      <a:noFill/>
+      <a:ln w="9525" cap="flat" cmpd="sng" algn="ctr">
+        <a:solidFill>
+          <a:schemeClr val="tx1">
+            <a:lumMod val="15000"/>
+            <a:lumOff val="85000"/>
+          </a:schemeClr>
+        </a:solidFill>
+        <a:round/>
+      </a:ln>
+    </cs:spPr>
+    <cs:defRPr sz="1197" kern="1200"/>
+  </cs:dataTable>
+  <cs:downBar>
+    <cs:lnRef idx="0"/>
+    <cs:fillRef idx="0"/>
+    <cs:effectRef idx="0"/>
+    <cs:fontRef idx="minor">
+      <a:schemeClr val="dk1"/>
+    </cs:fontRef>
+    <cs:spPr>
+      <a:solidFill>
+        <a:schemeClr val="dk1">
+          <a:lumMod val="65000"/>
+          <a:lumOff val="35000"/>
+        </a:schemeClr>
+      </a:solidFill>
+      <a:ln w="9525">
+        <a:solidFill>
+          <a:schemeClr val="tx1">
+            <a:lumMod val="65000"/>
+            <a:lumOff val="35000"/>
+          </a:schemeClr>
+        </a:solidFill>
+      </a:ln>
+    </cs:spPr>
+  </cs:downBar>
+  <cs:dropLine>
+    <cs:lnRef idx="0"/>
+    <cs:fillRef idx="0"/>
+    <cs:effectRef idx="0"/>
+    <cs:fontRef idx="minor">
+      <a:schemeClr val="tx1"/>
+    </cs:fontRef>
+    <cs:spPr>
+      <a:ln w="9525" cap="flat" cmpd="sng" algn="ctr">
+        <a:solidFill>
+          <a:schemeClr val="tx1">
+            <a:lumMod val="35000"/>
+            <a:lumOff val="65000"/>
+          </a:schemeClr>
+        </a:solidFill>
+        <a:round/>
+      </a:ln>
+    </cs:spPr>
+  </cs:dropLine>
+  <cs:errorBar>
+    <cs:lnRef idx="0"/>
+    <cs:fillRef idx="0"/>
+    <cs:effectRef idx="0"/>
+    <cs:fontRef idx="minor">
+      <a:schemeClr val="tx1"/>
+    </cs:fontRef>
+    <cs:spPr>
+      <a:ln w="9525" cap="flat" cmpd="sng" algn="ctr">
+        <a:solidFill>
+          <a:schemeClr val="tx1">
+            <a:lumMod val="65000"/>
+            <a:lumOff val="35000"/>
+          </a:schemeClr>
+        </a:solidFill>
+        <a:round/>
+      </a:ln>
+    </cs:spPr>
+  </cs:errorBar>
+  <cs:floor>
+    <cs:lnRef idx="0"/>
+    <cs:fillRef idx="0"/>
+    <cs:effectRef idx="0"/>
+    <cs:fontRef idx="minor">
+      <a:schemeClr val="tx1"/>
+    </cs:fontRef>
+    <cs:spPr>
+      <a:noFill/>
+      <a:ln>
+        <a:noFill/>
+      </a:ln>
+    </cs:spPr>
+  </cs:floor>
+  <cs:gridlineMajor>
+    <cs:lnRef idx="0"/>
+    <cs:fillRef idx="0"/>
+    <cs:effectRef idx="0"/>
+    <cs:fontRef idx="minor">
+      <a:schemeClr val="tx1"/>
+    </cs:fontRef>
+    <cs:spPr>
+      <a:ln w="9525" cap="flat" cmpd="sng" algn="ctr">
+        <a:solidFill>
+          <a:schemeClr val="tx1">
+            <a:lumMod val="15000"/>
+            <a:lumOff val="85000"/>
+          </a:schemeClr>
+        </a:solidFill>
+        <a:round/>
+      </a:ln>
+    </cs:spPr>
+  </cs:gridlineMajor>
+  <cs:gridlineMinor>
+    <cs:lnRef idx="0"/>
+    <cs:fillRef idx="0"/>
+    <cs:effectRef idx="0"/>
+    <cs:fontRef idx="minor">
+      <a:schemeClr val="tx1"/>
+    </cs:fontRef>
+    <cs:spPr>
+      <a:ln w="9525" cap="flat" cmpd="sng" algn="ctr">
+        <a:solidFill>
+          <a:schemeClr val="tx1">
+            <a:lumMod val="5000"/>
+            <a:lumOff val="95000"/>
+          </a:schemeClr>
+        </a:solidFill>
+        <a:round/>
+      </a:ln>
+    </cs:spPr>
+  </cs:gridlineMinor>
+  <cs:hiLoLine>
+    <cs:lnRef idx="0"/>
+    <cs:fillRef idx="0"/>
+    <cs:effectRef idx="0"/>
+    <cs:fontRef idx="minor">
+      <a:schemeClr val="tx1"/>
+    </cs:fontRef>
+    <cs:spPr>
+      <a:ln w="9525" cap="flat" cmpd="sng" algn="ctr">
+        <a:solidFill>
+          <a:schemeClr val="tx1">
+            <a:lumMod val="75000"/>
+            <a:lumOff val="25000"/>
+          </a:schemeClr>
+        </a:solidFill>
+        <a:round/>
+      </a:ln>
+    </cs:spPr>
+  </cs:hiLoLine>
+  <cs:leaderLine>
+    <cs:lnRef idx="0"/>
+    <cs:fillRef idx="0"/>
+    <cs:effectRef idx="0"/>
+    <cs:fontRef idx="minor">
+      <a:schemeClr val="tx1"/>
+    </cs:fontRef>
+    <cs:spPr>
+      <a:ln w="9525" cap="flat" cmpd="sng" algn="ctr">
+        <a:solidFill>
+          <a:schemeClr val="tx1">
+            <a:lumMod val="35000"/>
+            <a:lumOff val="65000"/>
+          </a:schemeClr>
+        </a:solidFill>
+        <a:round/>
+      </a:ln>
+    </cs:spPr>
+  </cs:leaderLine>
+  <cs:legend>
+    <cs:lnRef idx="0"/>
+    <cs:fillRef idx="0"/>
+    <cs:effectRef idx="0"/>
+    <cs:fontRef idx="minor">
+      <a:schemeClr val="tx1">
+        <a:lumMod val="65000"/>
+        <a:lumOff val="35000"/>
+      </a:schemeClr>
+    </cs:fontRef>
+    <cs:defRPr sz="1197" kern="1200"/>
+  </cs:legend>
+  <cs:plotArea mods="allowNoFillOverride allowNoLineOverride">
+    <cs:lnRef idx="0"/>
+    <cs:fillRef idx="0"/>
+    <cs:effectRef idx="0"/>
+    <cs:fontRef idx="minor">
+      <a:schemeClr val="tx1"/>
+    </cs:fontRef>
+  </cs:plotArea>
+  <cs:plotArea3D mods="allowNoFillOverride allowNoLineOverride">
+    <cs:lnRef idx="0"/>
+    <cs:fillRef idx="0"/>
+    <cs:effectRef idx="0"/>
+    <cs:fontRef idx="minor">
+      <a:schemeClr val="tx1"/>
+    </cs:fontRef>
+  </cs:plotArea3D>
+  <cs:seriesAxis>
+    <cs:lnRef idx="0"/>
+    <cs:fillRef idx="0"/>
+    <cs:effectRef idx="0"/>
+    <cs:fontRef idx="minor">
+      <a:schemeClr val="tx1">
+        <a:lumMod val="65000"/>
+        <a:lumOff val="35000"/>
+      </a:schemeClr>
+    </cs:fontRef>
+    <cs:defRPr sz="1197" kern="1200"/>
+  </cs:seriesAxis>
+  <cs:seriesLine>
+    <cs:lnRef idx="0"/>
+    <cs:fillRef idx="0"/>
+    <cs:effectRef idx="0"/>
+    <cs:fontRef idx="minor">
+      <a:schemeClr val="tx1"/>
+    </cs:fontRef>
+    <cs:spPr>
+      <a:ln w="9525" cap="flat" cmpd="sng" algn="ctr">
+        <a:solidFill>
+          <a:schemeClr val="tx1">
+            <a:lumMod val="35000"/>
+            <a:lumOff val="65000"/>
+          </a:schemeClr>
+        </a:solidFill>
+        <a:round/>
+      </a:ln>
+    </cs:spPr>
+  </cs:seriesLine>
+  <cs:title>
+    <cs:lnRef idx="0"/>
+    <cs:fillRef idx="0"/>
+    <cs:effectRef idx="0"/>
+    <cs:fontRef idx="minor">
+      <a:schemeClr val="tx1">
+        <a:lumMod val="65000"/>
+        <a:lumOff val="35000"/>
+      </a:schemeClr>
+    </cs:fontRef>
+    <cs:defRPr sz="1862" b="0" kern="1200" spc="0" baseline="0"/>
+  </cs:title>
+  <cs:trendline>
+    <cs:lnRef idx="0">
+      <cs:styleClr val="auto"/>
+    </cs:lnRef>
+    <cs:fillRef idx="0"/>
+    <cs:effectRef idx="0"/>
+    <cs:fontRef idx="minor">
+      <a:schemeClr val="tx1"/>
+    </cs:fontRef>
+    <cs:spPr>
+      <a:ln w="19050" cap="rnd">
+        <a:solidFill>
+          <a:schemeClr val="phClr"/>
+        </a:solidFill>
+        <a:prstDash val="sysDot"/>
+      </a:ln>
+    </cs:spPr>
+  </cs:trendline>
+  <cs:trendlineLabel>
+    <cs:lnRef idx="0"/>
+    <cs:fillRef idx="0"/>
+    <cs:effectRef idx="0"/>
+    <cs:fontRef idx="minor">
+      <a:schemeClr val="tx1">
+        <a:lumMod val="65000"/>
+        <a:lumOff val="35000"/>
+      </a:schemeClr>
+    </cs:fontRef>
+    <cs:defRPr sz="1197" kern="1200"/>
+  </cs:trendlineLabel>
+  <cs:upBar>
+    <cs:lnRef idx="0"/>
+    <cs:fillRef idx="0"/>
+    <cs:effectRef idx="0"/>
+    <cs:fontRef idx="minor">
+      <a:schemeClr val="dk1"/>
+    </cs:fontRef>
+    <cs:spPr>
+      <a:solidFill>
+        <a:schemeClr val="lt1"/>
+      </a:solidFill>
+      <a:ln w="9525">
+        <a:solidFill>
+          <a:schemeClr val="tx1">
+            <a:lumMod val="15000"/>
+            <a:lumOff val="85000"/>
+          </a:schemeClr>
+        </a:solidFill>
+      </a:ln>
+    </cs:spPr>
+  </cs:upBar>
+  <cs:valueAxis>
+    <cs:lnRef idx="0"/>
+    <cs:fillRef idx="0"/>
+    <cs:effectRef idx="0"/>
+    <cs:fontRef idx="minor">
+      <a:schemeClr val="tx1">
+        <a:lumMod val="65000"/>
+        <a:lumOff val="35000"/>
+      </a:schemeClr>
+    </cs:fontRef>
+    <cs:defRPr sz="1197" kern="1200"/>
+  </cs:valueAxis>
+  <cs:wall>
+    <cs:lnRef idx="0"/>
+    <cs:fillRef idx="0"/>
+    <cs:effectRef idx="0"/>
+    <cs:fontRef idx="minor">
+      <a:schemeClr val="tx1"/>
+    </cs:fontRef>
+    <cs:spPr>
+      <a:noFill/>
+      <a:ln>
+        <a:noFill/>
+      </a:ln>
+    </cs:spPr>
+  </cs:wall>
+</cs:chartStyle>
+</file>
+
 <file path=ppt/notesMasters/notesMaster1.xml><?xml version="1.0" encoding="utf-8"?>
 <p:notesMaster xmlns:a="http://schemas.openxmlformats.org/drawingml/2006/main" xmlns:r="http://schemas.openxmlformats.org/officeDocument/2006/relationships" xmlns:p="http://schemas.openxmlformats.org/presentationml/2006/main">
   <p:cSld>
@@ -3009,7 +4888,7 @@
           <a:p>
             <a:fld id="{921DB55A-F66E-884C-A409-CC81ACA880E7}" type="datetimeFigureOut">
               <a:rPr lang="en-US" smtClean="0"/>
-              <a:t>11/26/16</a:t>
+              <a:t>11/28/16</a:t>
             </a:fld>
             <a:endParaRPr lang="en-US"/>
           </a:p>
@@ -3565,7 +5444,7 @@
             <a:fld id="{B61BEF0D-F0BB-DE4B-95CE-6DB70DBA9567}" type="datetimeFigureOut">
               <a:rPr lang="en-US" dirty="0"/>
               <a:pPr/>
-              <a:t>11/26/16</a:t>
+              <a:t>11/28/16</a:t>
             </a:fld>
             <a:endParaRPr lang="en-US" dirty="0"/>
           </a:p>
@@ -3900,7 +5779,7 @@
             <a:fld id="{B61BEF0D-F0BB-DE4B-95CE-6DB70DBA9567}" type="datetimeFigureOut">
               <a:rPr lang="en-US" dirty="0"/>
               <a:pPr/>
-              <a:t>11/26/16</a:t>
+              <a:t>11/28/16</a:t>
             </a:fld>
             <a:endParaRPr lang="en-US" dirty="0"/>
           </a:p>
@@ -4298,7 +6177,7 @@
             <a:fld id="{B61BEF0D-F0BB-DE4B-95CE-6DB70DBA9567}" type="datetimeFigureOut">
               <a:rPr lang="en-US" dirty="0"/>
               <a:pPr/>
-              <a:t>11/26/16</a:t>
+              <a:t>11/28/16</a:t>
             </a:fld>
             <a:endParaRPr lang="en-US" dirty="0"/>
           </a:p>
@@ -4631,7 +6510,7 @@
             <a:fld id="{B61BEF0D-F0BB-DE4B-95CE-6DB70DBA9567}" type="datetimeFigureOut">
               <a:rPr lang="en-US" dirty="0"/>
               <a:pPr/>
-              <a:t>11/26/16</a:t>
+              <a:t>11/28/16</a:t>
             </a:fld>
             <a:endParaRPr lang="en-US" dirty="0"/>
           </a:p>
@@ -4948,7 +6827,7 @@
             <a:fld id="{B61BEF0D-F0BB-DE4B-95CE-6DB70DBA9567}" type="datetimeFigureOut">
               <a:rPr lang="en-US" dirty="0"/>
               <a:pPr/>
-              <a:t>11/26/16</a:t>
+              <a:t>11/28/16</a:t>
             </a:fld>
             <a:endParaRPr lang="en-US" dirty="0"/>
           </a:p>
@@ -5341,7 +7220,7 @@
             <a:fld id="{B61BEF0D-F0BB-DE4B-95CE-6DB70DBA9567}" type="datetimeFigureOut">
               <a:rPr lang="en-US" dirty="0"/>
               <a:pPr/>
-              <a:t>11/26/16</a:t>
+              <a:t>11/28/16</a:t>
             </a:fld>
             <a:endParaRPr lang="en-US" dirty="0"/>
           </a:p>
@@ -5595,7 +7474,7 @@
             <a:fld id="{B61BEF0D-F0BB-DE4B-95CE-6DB70DBA9567}" type="datetimeFigureOut">
               <a:rPr lang="en-US" dirty="0"/>
               <a:pPr/>
-              <a:t>11/26/16</a:t>
+              <a:t>11/28/16</a:t>
             </a:fld>
             <a:endParaRPr lang="en-US" dirty="0"/>
           </a:p>
@@ -5854,7 +7733,7 @@
             <a:fld id="{B61BEF0D-F0BB-DE4B-95CE-6DB70DBA9567}" type="datetimeFigureOut">
               <a:rPr lang="en-US" dirty="0"/>
               <a:pPr/>
-              <a:t>11/26/16</a:t>
+              <a:t>11/28/16</a:t>
             </a:fld>
             <a:endParaRPr lang="en-US" dirty="0"/>
           </a:p>
@@ -6113,7 +7992,7 @@
             <a:fld id="{B61BEF0D-F0BB-DE4B-95CE-6DB70DBA9567}" type="datetimeFigureOut">
               <a:rPr lang="en-US" dirty="0"/>
               <a:pPr/>
-              <a:t>11/26/16</a:t>
+              <a:t>11/28/16</a:t>
             </a:fld>
             <a:endParaRPr lang="en-US" dirty="0"/>
           </a:p>
@@ -6439,7 +8318,7 @@
             <a:fld id="{B61BEF0D-F0BB-DE4B-95CE-6DB70DBA9567}" type="datetimeFigureOut">
               <a:rPr lang="en-US" dirty="0"/>
               <a:pPr/>
-              <a:t>11/26/16</a:t>
+              <a:t>11/28/16</a:t>
             </a:fld>
             <a:endParaRPr lang="en-US" dirty="0"/>
           </a:p>
@@ -6759,7 +8638,7 @@
             <a:fld id="{B61BEF0D-F0BB-DE4B-95CE-6DB70DBA9567}" type="datetimeFigureOut">
               <a:rPr lang="en-US" dirty="0"/>
               <a:pPr/>
-              <a:t>11/26/16</a:t>
+              <a:t>11/28/16</a:t>
             </a:fld>
             <a:endParaRPr lang="en-US" dirty="0"/>
           </a:p>
@@ -7213,7 +9092,7 @@
             <a:fld id="{B61BEF0D-F0BB-DE4B-95CE-6DB70DBA9567}" type="datetimeFigureOut">
               <a:rPr lang="en-US" dirty="0"/>
               <a:pPr/>
-              <a:t>11/26/16</a:t>
+              <a:t>11/28/16</a:t>
             </a:fld>
             <a:endParaRPr lang="en-US" dirty="0"/>
           </a:p>
@@ -7415,7 +9294,7 @@
             <a:fld id="{B61BEF0D-F0BB-DE4B-95CE-6DB70DBA9567}" type="datetimeFigureOut">
               <a:rPr lang="en-US" dirty="0"/>
               <a:pPr/>
-              <a:t>11/26/16</a:t>
+              <a:t>11/28/16</a:t>
             </a:fld>
             <a:endParaRPr lang="en-US" dirty="0"/>
           </a:p>
@@ -7589,7 +9468,7 @@
             <a:fld id="{B61BEF0D-F0BB-DE4B-95CE-6DB70DBA9567}" type="datetimeFigureOut">
               <a:rPr lang="en-US" dirty="0"/>
               <a:pPr/>
-              <a:t>11/26/16</a:t>
+              <a:t>11/28/16</a:t>
             </a:fld>
             <a:endParaRPr lang="en-US" dirty="0"/>
           </a:p>
@@ -7919,7 +9798,7 @@
             <a:fld id="{B61BEF0D-F0BB-DE4B-95CE-6DB70DBA9567}" type="datetimeFigureOut">
               <a:rPr lang="en-US" dirty="0"/>
               <a:pPr/>
-              <a:t>11/26/16</a:t>
+              <a:t>11/28/16</a:t>
             </a:fld>
             <a:endParaRPr lang="en-US" dirty="0"/>
           </a:p>
@@ -8261,7 +10140,7 @@
             <a:fld id="{B61BEF0D-F0BB-DE4B-95CE-6DB70DBA9567}" type="datetimeFigureOut">
               <a:rPr lang="en-US" dirty="0"/>
               <a:pPr/>
-              <a:t>11/26/16</a:t>
+              <a:t>11/28/16</a:t>
             </a:fld>
             <a:endParaRPr lang="en-US" dirty="0"/>
           </a:p>
@@ -10375,7 +12254,7 @@
             <a:fld id="{B61BEF0D-F0BB-DE4B-95CE-6DB70DBA9567}" type="datetimeFigureOut">
               <a:rPr lang="en-US" dirty="0"/>
               <a:pPr/>
-              <a:t>11/26/16</a:t>
+              <a:t>11/28/16</a:t>
             </a:fld>
             <a:endParaRPr lang="en-US" dirty="0"/>
           </a:p>
@@ -11015,322 +12894,6 @@
           </a:bodyPr>
           <a:lstStyle/>
           <a:p>
-            <a:endParaRPr lang="en-US" sz="4400" dirty="0"/>
-          </a:p>
-        </p:txBody>
-      </p:sp>
-      <p:sp>
-        <p:nvSpPr>
-          <p:cNvPr id="3" name="Content Placeholder 2"/>
-          <p:cNvSpPr>
-            <a:spLocks noGrp="1"/>
-          </p:cNvSpPr>
-          <p:nvPr>
-            <p:ph idx="1"/>
-          </p:nvPr>
-        </p:nvSpPr>
-        <p:spPr/>
-        <p:txBody>
-          <a:bodyPr>
-            <a:normAutofit/>
-          </a:bodyPr>
-          <a:lstStyle/>
-          <a:p>
-            <a:endParaRPr lang="en-US" sz="2800" dirty="0"/>
-          </a:p>
-        </p:txBody>
-      </p:sp>
-    </p:spTree>
-    <p:extLst>
-      <p:ext uri="{BB962C8B-B14F-4D97-AF65-F5344CB8AC3E}">
-        <p14:creationId xmlns:p14="http://schemas.microsoft.com/office/powerpoint/2010/main" val="700108581"/>
-      </p:ext>
-    </p:extLst>
-  </p:cSld>
-  <p:clrMapOvr>
-    <a:masterClrMapping/>
-  </p:clrMapOvr>
-  <p:timing>
-    <p:tnLst>
-      <p:par>
-        <p:cTn id="1" dur="indefinite" restart="never" nodeType="tmRoot"/>
-      </p:par>
-    </p:tnLst>
-  </p:timing>
-</p:sld>
-</file>
-
-<file path=ppt/slides/slide11.xml><?xml version="1.0" encoding="utf-8"?>
-<p:sld xmlns:a="http://schemas.openxmlformats.org/drawingml/2006/main" xmlns:r="http://schemas.openxmlformats.org/officeDocument/2006/relationships" xmlns:p="http://schemas.openxmlformats.org/presentationml/2006/main">
-  <p:cSld>
-    <p:spTree>
-      <p:nvGrpSpPr>
-        <p:cNvPr id="1" name=""/>
-        <p:cNvGrpSpPr/>
-        <p:nvPr/>
-      </p:nvGrpSpPr>
-      <p:grpSpPr>
-        <a:xfrm>
-          <a:off x="0" y="0"/>
-          <a:ext cx="0" cy="0"/>
-          <a:chOff x="0" y="0"/>
-          <a:chExt cx="0" cy="0"/>
-        </a:xfrm>
-      </p:grpSpPr>
-      <p:sp>
-        <p:nvSpPr>
-          <p:cNvPr id="2" name="Title 1"/>
-          <p:cNvSpPr>
-            <a:spLocks noGrp="1"/>
-          </p:cNvSpPr>
-          <p:nvPr>
-            <p:ph type="title"/>
-          </p:nvPr>
-        </p:nvSpPr>
-        <p:spPr/>
-        <p:txBody>
-          <a:bodyPr>
-            <a:normAutofit/>
-          </a:bodyPr>
-          <a:lstStyle/>
-          <a:p>
-            <a:endParaRPr lang="en-US" sz="4400" dirty="0"/>
-          </a:p>
-        </p:txBody>
-      </p:sp>
-      <p:sp>
-        <p:nvSpPr>
-          <p:cNvPr id="3" name="Content Placeholder 2"/>
-          <p:cNvSpPr>
-            <a:spLocks noGrp="1"/>
-          </p:cNvSpPr>
-          <p:nvPr>
-            <p:ph idx="1"/>
-          </p:nvPr>
-        </p:nvSpPr>
-        <p:spPr/>
-        <p:txBody>
-          <a:bodyPr>
-            <a:normAutofit/>
-          </a:bodyPr>
-          <a:lstStyle/>
-          <a:p>
-            <a:endParaRPr lang="en-US" sz="2800" dirty="0"/>
-          </a:p>
-        </p:txBody>
-      </p:sp>
-    </p:spTree>
-    <p:extLst>
-      <p:ext uri="{BB962C8B-B14F-4D97-AF65-F5344CB8AC3E}">
-        <p14:creationId xmlns:p14="http://schemas.microsoft.com/office/powerpoint/2010/main" val="1371499336"/>
-      </p:ext>
-    </p:extLst>
-  </p:cSld>
-  <p:clrMapOvr>
-    <a:masterClrMapping/>
-  </p:clrMapOvr>
-  <p:timing>
-    <p:tnLst>
-      <p:par>
-        <p:cTn id="1" dur="indefinite" restart="never" nodeType="tmRoot"/>
-      </p:par>
-    </p:tnLst>
-  </p:timing>
-</p:sld>
-</file>
-
-<file path=ppt/slides/slide12.xml><?xml version="1.0" encoding="utf-8"?>
-<p:sld xmlns:a="http://schemas.openxmlformats.org/drawingml/2006/main" xmlns:r="http://schemas.openxmlformats.org/officeDocument/2006/relationships" xmlns:p="http://schemas.openxmlformats.org/presentationml/2006/main">
-  <p:cSld>
-    <p:spTree>
-      <p:nvGrpSpPr>
-        <p:cNvPr id="1" name=""/>
-        <p:cNvGrpSpPr/>
-        <p:nvPr/>
-      </p:nvGrpSpPr>
-      <p:grpSpPr>
-        <a:xfrm>
-          <a:off x="0" y="0"/>
-          <a:ext cx="0" cy="0"/>
-          <a:chOff x="0" y="0"/>
-          <a:chExt cx="0" cy="0"/>
-        </a:xfrm>
-      </p:grpSpPr>
-      <p:sp>
-        <p:nvSpPr>
-          <p:cNvPr id="2" name="Title 1"/>
-          <p:cNvSpPr>
-            <a:spLocks noGrp="1"/>
-          </p:cNvSpPr>
-          <p:nvPr>
-            <p:ph type="title"/>
-          </p:nvPr>
-        </p:nvSpPr>
-        <p:spPr/>
-        <p:txBody>
-          <a:bodyPr>
-            <a:normAutofit/>
-          </a:bodyPr>
-          <a:lstStyle/>
-          <a:p>
-            <a:endParaRPr lang="en-US" sz="4400" dirty="0"/>
-          </a:p>
-        </p:txBody>
-      </p:sp>
-      <p:sp>
-        <p:nvSpPr>
-          <p:cNvPr id="3" name="Content Placeholder 2"/>
-          <p:cNvSpPr>
-            <a:spLocks noGrp="1"/>
-          </p:cNvSpPr>
-          <p:nvPr>
-            <p:ph idx="1"/>
-          </p:nvPr>
-        </p:nvSpPr>
-        <p:spPr/>
-        <p:txBody>
-          <a:bodyPr>
-            <a:normAutofit/>
-          </a:bodyPr>
-          <a:lstStyle/>
-          <a:p>
-            <a:endParaRPr lang="en-US" sz="2800" dirty="0"/>
-          </a:p>
-        </p:txBody>
-      </p:sp>
-    </p:spTree>
-    <p:extLst>
-      <p:ext uri="{BB962C8B-B14F-4D97-AF65-F5344CB8AC3E}">
-        <p14:creationId xmlns:p14="http://schemas.microsoft.com/office/powerpoint/2010/main" val="726371155"/>
-      </p:ext>
-    </p:extLst>
-  </p:cSld>
-  <p:clrMapOvr>
-    <a:masterClrMapping/>
-  </p:clrMapOvr>
-  <p:timing>
-    <p:tnLst>
-      <p:par>
-        <p:cTn id="1" dur="indefinite" restart="never" nodeType="tmRoot"/>
-      </p:par>
-    </p:tnLst>
-  </p:timing>
-</p:sld>
-</file>
-
-<file path=ppt/slides/slide13.xml><?xml version="1.0" encoding="utf-8"?>
-<p:sld xmlns:a="http://schemas.openxmlformats.org/drawingml/2006/main" xmlns:r="http://schemas.openxmlformats.org/officeDocument/2006/relationships" xmlns:p="http://schemas.openxmlformats.org/presentationml/2006/main">
-  <p:cSld>
-    <p:spTree>
-      <p:nvGrpSpPr>
-        <p:cNvPr id="1" name=""/>
-        <p:cNvGrpSpPr/>
-        <p:nvPr/>
-      </p:nvGrpSpPr>
-      <p:grpSpPr>
-        <a:xfrm>
-          <a:off x="0" y="0"/>
-          <a:ext cx="0" cy="0"/>
-          <a:chOff x="0" y="0"/>
-          <a:chExt cx="0" cy="0"/>
-        </a:xfrm>
-      </p:grpSpPr>
-      <p:sp>
-        <p:nvSpPr>
-          <p:cNvPr id="4" name="Title 3"/>
-          <p:cNvSpPr>
-            <a:spLocks noGrp="1"/>
-          </p:cNvSpPr>
-          <p:nvPr>
-            <p:ph type="ctrTitle"/>
-          </p:nvPr>
-        </p:nvSpPr>
-        <p:spPr/>
-        <p:txBody>
-          <a:bodyPr/>
-          <a:lstStyle/>
-          <a:p>
-            <a:r>
-              <a:rPr lang="en-US" dirty="0" smtClean="0"/>
-              <a:t>Test result analysis</a:t>
-            </a:r>
-            <a:endParaRPr lang="en-US" dirty="0"/>
-          </a:p>
-        </p:txBody>
-      </p:sp>
-      <p:sp>
-        <p:nvSpPr>
-          <p:cNvPr id="5" name="Subtitle 4"/>
-          <p:cNvSpPr>
-            <a:spLocks noGrp="1"/>
-          </p:cNvSpPr>
-          <p:nvPr>
-            <p:ph type="subTitle" idx="1"/>
-          </p:nvPr>
-        </p:nvSpPr>
-        <p:spPr/>
-        <p:txBody>
-          <a:bodyPr/>
-          <a:lstStyle/>
-          <a:p>
-            <a:endParaRPr lang="en-US"/>
-          </a:p>
-        </p:txBody>
-      </p:sp>
-    </p:spTree>
-    <p:extLst>
-      <p:ext uri="{BB962C8B-B14F-4D97-AF65-F5344CB8AC3E}">
-        <p14:creationId xmlns:p14="http://schemas.microsoft.com/office/powerpoint/2010/main" val="292218004"/>
-      </p:ext>
-    </p:extLst>
-  </p:cSld>
-  <p:clrMapOvr>
-    <a:masterClrMapping/>
-  </p:clrMapOvr>
-  <p:timing>
-    <p:tnLst>
-      <p:par>
-        <p:cTn id="1" dur="indefinite" restart="never" nodeType="tmRoot"/>
-      </p:par>
-    </p:tnLst>
-  </p:timing>
-</p:sld>
-</file>
-
-<file path=ppt/slides/slide14.xml><?xml version="1.0" encoding="utf-8"?>
-<p:sld xmlns:a="http://schemas.openxmlformats.org/drawingml/2006/main" xmlns:r="http://schemas.openxmlformats.org/officeDocument/2006/relationships" xmlns:p="http://schemas.openxmlformats.org/presentationml/2006/main">
-  <p:cSld>
-    <p:spTree>
-      <p:nvGrpSpPr>
-        <p:cNvPr id="1" name=""/>
-        <p:cNvGrpSpPr/>
-        <p:nvPr/>
-      </p:nvGrpSpPr>
-      <p:grpSpPr>
-        <a:xfrm>
-          <a:off x="0" y="0"/>
-          <a:ext cx="0" cy="0"/>
-          <a:chOff x="0" y="0"/>
-          <a:chExt cx="0" cy="0"/>
-        </a:xfrm>
-      </p:grpSpPr>
-      <p:sp>
-        <p:nvSpPr>
-          <p:cNvPr id="2" name="Title 1"/>
-          <p:cNvSpPr>
-            <a:spLocks noGrp="1"/>
-          </p:cNvSpPr>
-          <p:nvPr>
-            <p:ph type="title"/>
-          </p:nvPr>
-        </p:nvSpPr>
-        <p:spPr/>
-        <p:txBody>
-          <a:bodyPr>
-            <a:normAutofit/>
-          </a:bodyPr>
-          <a:lstStyle/>
-          <a:p>
             <a:r>
               <a:rPr lang="en-US" sz="4400" dirty="0" smtClean="0"/>
               <a:t>Multilayer Perceptron</a:t>
@@ -11674,7 +13237,7 @@
 </p:sld>
 </file>
 
-<file path=ppt/slides/slide15.xml><?xml version="1.0" encoding="utf-8"?>
+<file path=ppt/slides/slide11.xml><?xml version="1.0" encoding="utf-8"?>
 <p:sld xmlns:a="http://schemas.openxmlformats.org/drawingml/2006/main" xmlns:r="http://schemas.openxmlformats.org/officeDocument/2006/relationships" xmlns:p="http://schemas.openxmlformats.org/presentationml/2006/main">
   <p:cSld>
     <p:spTree>
@@ -11773,7 +13336,7 @@
 </p:sld>
 </file>
 
-<file path=ppt/slides/slide16.xml><?xml version="1.0" encoding="utf-8"?>
+<file path=ppt/slides/slide12.xml><?xml version="1.0" encoding="utf-8"?>
 <p:sld xmlns:a="http://schemas.openxmlformats.org/drawingml/2006/main" xmlns:r="http://schemas.openxmlformats.org/officeDocument/2006/relationships" xmlns:p="http://schemas.openxmlformats.org/presentationml/2006/main">
   <p:cSld>
     <p:spTree>
@@ -12346,7 +13909,7 @@
 </p:sld>
 </file>
 
-<file path=ppt/slides/slide17.xml><?xml version="1.0" encoding="utf-8"?>
+<file path=ppt/slides/slide13.xml><?xml version="1.0" encoding="utf-8"?>
 <p:sld xmlns:a="http://schemas.openxmlformats.org/drawingml/2006/main" xmlns:r="http://schemas.openxmlformats.org/officeDocument/2006/relationships" xmlns:p="http://schemas.openxmlformats.org/presentationml/2006/main">
   <p:cSld>
     <p:spTree>
@@ -12445,7 +14008,7 @@
 </p:sld>
 </file>
 
-<file path=ppt/slides/slide18.xml><?xml version="1.0" encoding="utf-8"?>
+<file path=ppt/slides/slide14.xml><?xml version="1.0" encoding="utf-8"?>
 <p:sld xmlns:a="http://schemas.openxmlformats.org/drawingml/2006/main" xmlns:r="http://schemas.openxmlformats.org/officeDocument/2006/relationships" xmlns:p="http://schemas.openxmlformats.org/presentationml/2006/main">
   <p:cSld>
     <p:spTree>
@@ -12516,6 +14079,1133 @@
     <p:extLst>
       <p:ext uri="{BB962C8B-B14F-4D97-AF65-F5344CB8AC3E}">
         <p14:creationId xmlns:p14="http://schemas.microsoft.com/office/powerpoint/2010/main" val="964445884"/>
+      </p:ext>
+    </p:extLst>
+  </p:cSld>
+  <p:clrMapOvr>
+    <a:masterClrMapping/>
+  </p:clrMapOvr>
+  <p:timing>
+    <p:tnLst>
+      <p:par>
+        <p:cTn id="1" dur="indefinite" restart="never" nodeType="tmRoot"/>
+      </p:par>
+    </p:tnLst>
+  </p:timing>
+</p:sld>
+</file>
+
+<file path=ppt/slides/slide15.xml><?xml version="1.0" encoding="utf-8"?>
+<p:sld xmlns:a="http://schemas.openxmlformats.org/drawingml/2006/main" xmlns:r="http://schemas.openxmlformats.org/officeDocument/2006/relationships" xmlns:p="http://schemas.openxmlformats.org/presentationml/2006/main">
+  <p:cSld>
+    <p:spTree>
+      <p:nvGrpSpPr>
+        <p:cNvPr id="1" name=""/>
+        <p:cNvGrpSpPr/>
+        <p:nvPr/>
+      </p:nvGrpSpPr>
+      <p:grpSpPr>
+        <a:xfrm>
+          <a:off x="0" y="0"/>
+          <a:ext cx="0" cy="0"/>
+          <a:chOff x="0" y="0"/>
+          <a:chExt cx="0" cy="0"/>
+        </a:xfrm>
+      </p:grpSpPr>
+      <p:sp>
+        <p:nvSpPr>
+          <p:cNvPr id="2" name="Title 1"/>
+          <p:cNvSpPr>
+            <a:spLocks noGrp="1"/>
+          </p:cNvSpPr>
+          <p:nvPr>
+            <p:ph type="title"/>
+          </p:nvPr>
+        </p:nvSpPr>
+        <p:spPr/>
+        <p:txBody>
+          <a:bodyPr>
+            <a:normAutofit/>
+          </a:bodyPr>
+          <a:lstStyle/>
+          <a:p>
+            <a:r>
+              <a:rPr lang="en-US" sz="4400" dirty="0"/>
+              <a:t>Support Vector Machine</a:t>
+            </a:r>
+          </a:p>
+        </p:txBody>
+      </p:sp>
+      <p:sp>
+        <p:nvSpPr>
+          <p:cNvPr id="3" name="Content Placeholder 2"/>
+          <p:cNvSpPr>
+            <a:spLocks noGrp="1"/>
+          </p:cNvSpPr>
+          <p:nvPr>
+            <p:ph idx="1"/>
+          </p:nvPr>
+        </p:nvSpPr>
+        <p:spPr/>
+        <p:txBody>
+          <a:bodyPr>
+            <a:normAutofit/>
+          </a:bodyPr>
+          <a:lstStyle/>
+          <a:p>
+            <a:r>
+              <a:rPr lang="de-DE" sz="2800" dirty="0"/>
+              <a:t>-C 0.5 -L 0.001 -P 1.0E-12 -K </a:t>
+            </a:r>
+            <a:r>
+              <a:rPr lang="de-DE" sz="2800" dirty="0" err="1"/>
+              <a:t>PolyKernel</a:t>
+            </a:r>
+            <a:r>
+              <a:rPr lang="de-DE" sz="2800" dirty="0"/>
+              <a:t> </a:t>
+            </a:r>
+            <a:endParaRPr lang="de-DE" sz="2800" dirty="0" smtClean="0"/>
+          </a:p>
+          <a:p>
+            <a:r>
+              <a:rPr lang="de-DE" sz="2800" dirty="0" smtClean="0"/>
+              <a:t>-</a:t>
+            </a:r>
+            <a:r>
+              <a:rPr lang="de-DE" sz="2800" dirty="0"/>
+              <a:t>C </a:t>
+            </a:r>
+            <a:r>
+              <a:rPr lang="de-DE" sz="2800" dirty="0" smtClean="0"/>
+              <a:t>1.0 </a:t>
+            </a:r>
+            <a:r>
+              <a:rPr lang="de-DE" sz="2800" dirty="0"/>
+              <a:t>-L 0.001 -P 1.0E-12 -K </a:t>
+            </a:r>
+            <a:r>
+              <a:rPr lang="de-DE" sz="2800" dirty="0" err="1"/>
+              <a:t>PolyKernel</a:t>
+            </a:r>
+            <a:r>
+              <a:rPr lang="de-DE" sz="2800" dirty="0"/>
+              <a:t> </a:t>
+            </a:r>
+          </a:p>
+          <a:p>
+            <a:r>
+              <a:rPr lang="de-DE" sz="2800" dirty="0"/>
+              <a:t>-C </a:t>
+            </a:r>
+            <a:r>
+              <a:rPr lang="de-DE" sz="2800" dirty="0" smtClean="0"/>
+              <a:t>1.5 </a:t>
+            </a:r>
+            <a:r>
+              <a:rPr lang="de-DE" sz="2800" dirty="0"/>
+              <a:t>-L 0.001 -P 1.0E-12 -K </a:t>
+            </a:r>
+            <a:r>
+              <a:rPr lang="de-DE" sz="2800" dirty="0" err="1"/>
+              <a:t>PolyKernel</a:t>
+            </a:r>
+            <a:r>
+              <a:rPr lang="de-DE" sz="2800" dirty="0"/>
+              <a:t> </a:t>
+            </a:r>
+            <a:endParaRPr lang="de-DE" sz="2800" dirty="0" smtClean="0"/>
+          </a:p>
+          <a:p>
+            <a:r>
+              <a:rPr lang="de-DE" sz="2800" dirty="0" smtClean="0"/>
+              <a:t>-</a:t>
+            </a:r>
+            <a:r>
+              <a:rPr lang="de-DE" sz="2800" dirty="0"/>
+              <a:t>C </a:t>
+            </a:r>
+            <a:r>
+              <a:rPr lang="de-DE" sz="2800" dirty="0" smtClean="0"/>
+              <a:t>2.0 </a:t>
+            </a:r>
+            <a:r>
+              <a:rPr lang="de-DE" sz="2800" dirty="0"/>
+              <a:t>-L 0.001 -P 1.0E-12 -K </a:t>
+            </a:r>
+            <a:r>
+              <a:rPr lang="de-DE" sz="2800" dirty="0" err="1"/>
+              <a:t>PolyKernel</a:t>
+            </a:r>
+            <a:r>
+              <a:rPr lang="de-DE" sz="2800" dirty="0"/>
+              <a:t> </a:t>
+            </a:r>
+          </a:p>
+          <a:p>
+            <a:endParaRPr lang="en-US" sz="2800" dirty="0"/>
+          </a:p>
+        </p:txBody>
+      </p:sp>
+    </p:spTree>
+    <p:extLst>
+      <p:ext uri="{BB962C8B-B14F-4D97-AF65-F5344CB8AC3E}">
+        <p14:creationId xmlns:p14="http://schemas.microsoft.com/office/powerpoint/2010/main" val="1389705387"/>
+      </p:ext>
+    </p:extLst>
+  </p:cSld>
+  <p:clrMapOvr>
+    <a:masterClrMapping/>
+  </p:clrMapOvr>
+  <p:timing>
+    <p:tnLst>
+      <p:par>
+        <p:cTn id="1" dur="indefinite" restart="never" nodeType="tmRoot"/>
+      </p:par>
+    </p:tnLst>
+  </p:timing>
+</p:sld>
+</file>
+
+<file path=ppt/slides/slide16.xml><?xml version="1.0" encoding="utf-8"?>
+<p:sld xmlns:a="http://schemas.openxmlformats.org/drawingml/2006/main" xmlns:r="http://schemas.openxmlformats.org/officeDocument/2006/relationships" xmlns:p="http://schemas.openxmlformats.org/presentationml/2006/main">
+  <p:cSld>
+    <p:spTree>
+      <p:nvGrpSpPr>
+        <p:cNvPr id="1" name=""/>
+        <p:cNvGrpSpPr/>
+        <p:nvPr/>
+      </p:nvGrpSpPr>
+      <p:grpSpPr>
+        <a:xfrm>
+          <a:off x="0" y="0"/>
+          <a:ext cx="0" cy="0"/>
+          <a:chOff x="0" y="0"/>
+          <a:chExt cx="0" cy="0"/>
+        </a:xfrm>
+      </p:grpSpPr>
+      <p:sp>
+        <p:nvSpPr>
+          <p:cNvPr id="2" name="Title 1"/>
+          <p:cNvSpPr>
+            <a:spLocks noGrp="1"/>
+          </p:cNvSpPr>
+          <p:nvPr>
+            <p:ph type="title"/>
+          </p:nvPr>
+        </p:nvSpPr>
+        <p:spPr/>
+        <p:txBody>
+          <a:bodyPr>
+            <a:normAutofit fontScale="90000"/>
+          </a:bodyPr>
+          <a:lstStyle/>
+          <a:p>
+            <a:r>
+              <a:rPr lang="en-US" sz="4400" dirty="0"/>
+              <a:t>Test Results </a:t>
+            </a:r>
+            <a:r>
+              <a:rPr lang="en-US" sz="4400" dirty="0" smtClean="0"/>
+              <a:t>w/ </a:t>
+            </a:r>
+            <a:r>
+              <a:rPr lang="en-US" sz="4400" dirty="0"/>
+              <a:t>Different </a:t>
+            </a:r>
+            <a:r>
+              <a:rPr lang="en-US" sz="4400" dirty="0" smtClean="0"/>
+              <a:t>Parameters</a:t>
+            </a:r>
+            <a:endParaRPr lang="en-US" sz="4400" dirty="0"/>
+          </a:p>
+        </p:txBody>
+      </p:sp>
+      <p:graphicFrame>
+        <p:nvGraphicFramePr>
+          <p:cNvPr id="4" name="Content Placeholder 3"/>
+          <p:cNvGraphicFramePr>
+            <a:graphicFrameLocks noGrp="1"/>
+          </p:cNvGraphicFramePr>
+          <p:nvPr>
+            <p:ph idx="1"/>
+            <p:extLst>
+              <p:ext uri="{D42A27DB-BD31-4B8C-83A1-F6EECF244321}">
+                <p14:modId xmlns:p14="http://schemas.microsoft.com/office/powerpoint/2010/main" val="1023786602"/>
+              </p:ext>
+            </p:extLst>
+          </p:nvPr>
+        </p:nvGraphicFramePr>
+        <p:xfrm>
+          <a:off x="2589213" y="2133600"/>
+          <a:ext cx="8915400" cy="3778250"/>
+        </p:xfrm>
+        <a:graphic>
+          <a:graphicData uri="http://schemas.openxmlformats.org/drawingml/2006/chart">
+            <c:chart xmlns:c="http://schemas.openxmlformats.org/drawingml/2006/chart" xmlns:r="http://schemas.openxmlformats.org/officeDocument/2006/relationships" r:id="rId2"/>
+          </a:graphicData>
+        </a:graphic>
+      </p:graphicFrame>
+    </p:spTree>
+    <p:extLst>
+      <p:ext uri="{BB962C8B-B14F-4D97-AF65-F5344CB8AC3E}">
+        <p14:creationId xmlns:p14="http://schemas.microsoft.com/office/powerpoint/2010/main" val="1228388074"/>
+      </p:ext>
+    </p:extLst>
+  </p:cSld>
+  <p:clrMapOvr>
+    <a:masterClrMapping/>
+  </p:clrMapOvr>
+  <p:timing>
+    <p:tnLst>
+      <p:par>
+        <p:cTn id="1" dur="indefinite" restart="never" nodeType="tmRoot"/>
+      </p:par>
+    </p:tnLst>
+  </p:timing>
+</p:sld>
+</file>
+
+<file path=ppt/slides/slide17.xml><?xml version="1.0" encoding="utf-8"?>
+<p:sld xmlns:a="http://schemas.openxmlformats.org/drawingml/2006/main" xmlns:r="http://schemas.openxmlformats.org/officeDocument/2006/relationships" xmlns:p="http://schemas.openxmlformats.org/presentationml/2006/main">
+  <p:cSld>
+    <p:spTree>
+      <p:nvGrpSpPr>
+        <p:cNvPr id="1" name=""/>
+        <p:cNvGrpSpPr/>
+        <p:nvPr/>
+      </p:nvGrpSpPr>
+      <p:grpSpPr>
+        <a:xfrm>
+          <a:off x="0" y="0"/>
+          <a:ext cx="0" cy="0"/>
+          <a:chOff x="0" y="0"/>
+          <a:chExt cx="0" cy="0"/>
+        </a:xfrm>
+      </p:grpSpPr>
+      <p:sp>
+        <p:nvSpPr>
+          <p:cNvPr id="2" name="Title 1"/>
+          <p:cNvSpPr>
+            <a:spLocks noGrp="1"/>
+          </p:cNvSpPr>
+          <p:nvPr>
+            <p:ph type="title"/>
+          </p:nvPr>
+        </p:nvSpPr>
+        <p:spPr/>
+        <p:txBody>
+          <a:bodyPr>
+            <a:normAutofit/>
+          </a:bodyPr>
+          <a:lstStyle/>
+          <a:p>
+            <a:r>
+              <a:rPr lang="en-US" sz="4400" dirty="0" smtClean="0"/>
+              <a:t>Least Correct Class</a:t>
+            </a:r>
+            <a:endParaRPr lang="en-US" sz="4400" dirty="0"/>
+          </a:p>
+        </p:txBody>
+      </p:sp>
+      <p:graphicFrame>
+        <p:nvGraphicFramePr>
+          <p:cNvPr id="4" name="Content Placeholder 3"/>
+          <p:cNvGraphicFramePr>
+            <a:graphicFrameLocks noGrp="1"/>
+          </p:cNvGraphicFramePr>
+          <p:nvPr>
+            <p:ph idx="1"/>
+            <p:extLst>
+              <p:ext uri="{D42A27DB-BD31-4B8C-83A1-F6EECF244321}">
+                <p14:modId xmlns:p14="http://schemas.microsoft.com/office/powerpoint/2010/main" val="1584594876"/>
+              </p:ext>
+            </p:extLst>
+          </p:nvPr>
+        </p:nvGraphicFramePr>
+        <p:xfrm>
+          <a:off x="2769095" y="1816308"/>
+          <a:ext cx="8915400" cy="4815840"/>
+        </p:xfrm>
+        <a:graphic>
+          <a:graphicData uri="http://schemas.openxmlformats.org/drawingml/2006/table">
+            <a:tbl>
+              <a:tblPr firstRow="1" bandRow="1">
+                <a:tableStyleId>{5C22544A-7EE6-4342-B048-85BDC9FD1C3A}</a:tableStyleId>
+              </a:tblPr>
+              <a:tblGrid>
+                <a:gridCol w="2971800"/>
+                <a:gridCol w="2971800"/>
+                <a:gridCol w="2971800"/>
+              </a:tblGrid>
+              <a:tr h="0">
+                <a:tc>
+                  <a:txBody>
+                    <a:bodyPr/>
+                    <a:lstStyle/>
+                    <a:p>
+                      <a:r>
+                        <a:rPr lang="en-US" dirty="0" smtClean="0"/>
+                        <a:t>Parameters</a:t>
+                      </a:r>
+                      <a:endParaRPr lang="en-US" dirty="0"/>
+                    </a:p>
+                  </a:txBody>
+                  <a:tcPr/>
+                </a:tc>
+                <a:tc>
+                  <a:txBody>
+                    <a:bodyPr/>
+                    <a:lstStyle/>
+                    <a:p>
+                      <a:r>
+                        <a:rPr lang="en-US" dirty="0" smtClean="0"/>
+                        <a:t>Class</a:t>
+                      </a:r>
+                      <a:r>
+                        <a:rPr lang="en-US" baseline="0" dirty="0" smtClean="0"/>
+                        <a:t> (character)</a:t>
+                      </a:r>
+                      <a:endParaRPr lang="en-US" dirty="0"/>
+                    </a:p>
+                  </a:txBody>
+                  <a:tcPr/>
+                </a:tc>
+                <a:tc>
+                  <a:txBody>
+                    <a:bodyPr/>
+                    <a:lstStyle/>
+                    <a:p>
+                      <a:r>
+                        <a:rPr lang="en-US" dirty="0" smtClean="0"/>
+                        <a:t>Correctness</a:t>
+                      </a:r>
+                      <a:endParaRPr lang="en-US" dirty="0"/>
+                    </a:p>
+                  </a:txBody>
+                  <a:tcPr/>
+                </a:tc>
+              </a:tr>
+              <a:tr h="370840">
+                <a:tc rowSpan="3">
+                  <a:txBody>
+                    <a:bodyPr/>
+                    <a:lstStyle/>
+                    <a:p>
+                      <a:pPr algn="ctr"/>
+                      <a:r>
+                        <a:rPr lang="en-US" dirty="0" smtClean="0"/>
+                        <a:t>C=0.5</a:t>
+                      </a:r>
+                      <a:endParaRPr lang="en-US" dirty="0"/>
+                    </a:p>
+                  </a:txBody>
+                  <a:tcPr anchor="ctr"/>
+                </a:tc>
+                <a:tc>
+                  <a:txBody>
+                    <a:bodyPr/>
+                    <a:lstStyle/>
+                    <a:p>
+                      <a:pPr algn="ctr"/>
+                      <a:r>
+                        <a:rPr lang="en-US" dirty="0" smtClean="0"/>
+                        <a:t>H</a:t>
+                      </a:r>
+                      <a:endParaRPr lang="en-US" dirty="0"/>
+                    </a:p>
+                  </a:txBody>
+                  <a:tcPr anchor="ctr"/>
+                </a:tc>
+                <a:tc>
+                  <a:txBody>
+                    <a:bodyPr/>
+                    <a:lstStyle/>
+                    <a:p>
+                      <a:pPr algn="ctr"/>
+                      <a:r>
+                        <a:rPr lang="nb-NO" dirty="0" smtClean="0"/>
+                        <a:t>57.6</a:t>
+                      </a:r>
+                      <a:r>
+                        <a:rPr lang="en-US" dirty="0" smtClean="0"/>
+                        <a:t>%</a:t>
+                      </a:r>
+                      <a:endParaRPr lang="en-US" dirty="0"/>
+                    </a:p>
+                  </a:txBody>
+                  <a:tcPr anchor="ctr"/>
+                </a:tc>
+              </a:tr>
+              <a:tr h="370840">
+                <a:tc vMerge="1">
+                  <a:txBody>
+                    <a:bodyPr/>
+                    <a:lstStyle/>
+                    <a:p>
+                      <a:pPr algn="ctr"/>
+                      <a:endParaRPr lang="en-US" dirty="0"/>
+                    </a:p>
+                  </a:txBody>
+                  <a:tcPr anchor="ctr"/>
+                </a:tc>
+                <a:tc>
+                  <a:txBody>
+                    <a:bodyPr/>
+                    <a:lstStyle/>
+                    <a:p>
+                      <a:pPr algn="ctr"/>
+                      <a:r>
+                        <a:rPr lang="en-US" dirty="0" smtClean="0"/>
+                        <a:t>S</a:t>
+                      </a:r>
+                      <a:endParaRPr lang="en-US" dirty="0"/>
+                    </a:p>
+                  </a:txBody>
+                  <a:tcPr anchor="ctr"/>
+                </a:tc>
+                <a:tc>
+                  <a:txBody>
+                    <a:bodyPr/>
+                    <a:lstStyle/>
+                    <a:p>
+                      <a:pPr algn="ctr"/>
+                      <a:r>
+                        <a:rPr lang="en-US" dirty="0" smtClean="0"/>
+                        <a:t>72.1%</a:t>
+                      </a:r>
+                      <a:endParaRPr lang="en-US" dirty="0"/>
+                    </a:p>
+                  </a:txBody>
+                  <a:tcPr anchor="ctr"/>
+                </a:tc>
+              </a:tr>
+              <a:tr h="370840">
+                <a:tc vMerge="1">
+                  <a:txBody>
+                    <a:bodyPr/>
+                    <a:lstStyle/>
+                    <a:p>
+                      <a:pPr algn="ctr"/>
+                      <a:endParaRPr lang="en-US" dirty="0"/>
+                    </a:p>
+                  </a:txBody>
+                  <a:tcPr anchor="ctr"/>
+                </a:tc>
+                <a:tc>
+                  <a:txBody>
+                    <a:bodyPr/>
+                    <a:lstStyle/>
+                    <a:p>
+                      <a:pPr algn="ctr"/>
+                      <a:r>
+                        <a:rPr lang="en-US" dirty="0" smtClean="0"/>
+                        <a:t>Q</a:t>
+                      </a:r>
+                      <a:endParaRPr lang="en-US" dirty="0"/>
+                    </a:p>
+                  </a:txBody>
+                  <a:tcPr anchor="ctr"/>
+                </a:tc>
+                <a:tc>
+                  <a:txBody>
+                    <a:bodyPr/>
+                    <a:lstStyle/>
+                    <a:p>
+                      <a:pPr algn="ctr"/>
+                      <a:r>
+                        <a:rPr lang="en-US" dirty="0" smtClean="0"/>
+                        <a:t>72.5%</a:t>
+                      </a:r>
+                      <a:endParaRPr lang="en-US" dirty="0"/>
+                    </a:p>
+                  </a:txBody>
+                  <a:tcPr anchor="ctr"/>
+                </a:tc>
+              </a:tr>
+              <a:tr h="370840">
+                <a:tc rowSpan="3">
+                  <a:txBody>
+                    <a:bodyPr/>
+                    <a:lstStyle/>
+                    <a:p>
+                      <a:pPr marL="0" marR="0" indent="0" algn="ctr" defTabSz="457200" rtl="0" eaLnBrk="1" fontAlgn="auto" latinLnBrk="0" hangingPunct="1">
+                        <a:lnSpc>
+                          <a:spcPct val="100000"/>
+                        </a:lnSpc>
+                        <a:spcBef>
+                          <a:spcPts val="0"/>
+                        </a:spcBef>
+                        <a:spcAft>
+                          <a:spcPts val="0"/>
+                        </a:spcAft>
+                        <a:buClrTx/>
+                        <a:buSzTx/>
+                        <a:buFontTx/>
+                        <a:buNone/>
+                        <a:tabLst/>
+                        <a:defRPr/>
+                      </a:pPr>
+                      <a:r>
+                        <a:rPr lang="en-US" dirty="0" smtClean="0"/>
+                        <a:t>C=1.0</a:t>
+                      </a:r>
+                    </a:p>
+                  </a:txBody>
+                  <a:tcPr anchor="ctr"/>
+                </a:tc>
+                <a:tc>
+                  <a:txBody>
+                    <a:bodyPr/>
+                    <a:lstStyle/>
+                    <a:p>
+                      <a:pPr algn="ctr"/>
+                      <a:r>
+                        <a:rPr lang="en-US" dirty="0" smtClean="0"/>
+                        <a:t>H</a:t>
+                      </a:r>
+                      <a:endParaRPr lang="en-US" dirty="0"/>
+                    </a:p>
+                  </a:txBody>
+                  <a:tcPr anchor="ctr"/>
+                </a:tc>
+                <a:tc>
+                  <a:txBody>
+                    <a:bodyPr/>
+                    <a:lstStyle/>
+                    <a:p>
+                      <a:pPr algn="ctr"/>
+                      <a:r>
+                        <a:rPr lang="en-US" dirty="0" smtClean="0"/>
+                        <a:t>68.2%</a:t>
+                      </a:r>
+                      <a:endParaRPr lang="en-US" dirty="0"/>
+                    </a:p>
+                  </a:txBody>
+                  <a:tcPr anchor="ctr"/>
+                </a:tc>
+              </a:tr>
+              <a:tr h="370840">
+                <a:tc vMerge="1">
+                  <a:txBody>
+                    <a:bodyPr/>
+                    <a:lstStyle/>
+                    <a:p>
+                      <a:pPr algn="ctr"/>
+                      <a:endParaRPr lang="en-US" dirty="0"/>
+                    </a:p>
+                  </a:txBody>
+                  <a:tcPr anchor="ctr"/>
+                </a:tc>
+                <a:tc>
+                  <a:txBody>
+                    <a:bodyPr/>
+                    <a:lstStyle/>
+                    <a:p>
+                      <a:pPr algn="ctr"/>
+                      <a:r>
+                        <a:rPr lang="en-US" dirty="0" smtClean="0"/>
+                        <a:t>S</a:t>
+                      </a:r>
+                      <a:endParaRPr lang="en-US" dirty="0"/>
+                    </a:p>
+                  </a:txBody>
+                  <a:tcPr anchor="ctr"/>
+                </a:tc>
+                <a:tc>
+                  <a:txBody>
+                    <a:bodyPr/>
+                    <a:lstStyle/>
+                    <a:p>
+                      <a:pPr algn="ctr"/>
+                      <a:r>
+                        <a:rPr lang="en-US" dirty="0" smtClean="0"/>
+                        <a:t>73.3%</a:t>
+                      </a:r>
+                      <a:endParaRPr lang="en-US" dirty="0"/>
+                    </a:p>
+                  </a:txBody>
+                  <a:tcPr anchor="ctr"/>
+                </a:tc>
+              </a:tr>
+              <a:tr h="370840">
+                <a:tc vMerge="1">
+                  <a:txBody>
+                    <a:bodyPr/>
+                    <a:lstStyle/>
+                    <a:p>
+                      <a:pPr algn="ctr"/>
+                      <a:endParaRPr lang="en-US" dirty="0"/>
+                    </a:p>
+                  </a:txBody>
+                  <a:tcPr anchor="ctr"/>
+                </a:tc>
+                <a:tc>
+                  <a:txBody>
+                    <a:bodyPr/>
+                    <a:lstStyle/>
+                    <a:p>
+                      <a:pPr algn="ctr"/>
+                      <a:r>
+                        <a:rPr lang="en-US" dirty="0" smtClean="0"/>
+                        <a:t>G</a:t>
+                      </a:r>
+                      <a:endParaRPr lang="en-US" dirty="0"/>
+                    </a:p>
+                  </a:txBody>
+                  <a:tcPr anchor="ctr"/>
+                </a:tc>
+                <a:tc>
+                  <a:txBody>
+                    <a:bodyPr/>
+                    <a:lstStyle/>
+                    <a:p>
+                      <a:pPr algn="ctr"/>
+                      <a:r>
+                        <a:rPr lang="en-US" dirty="0" smtClean="0"/>
+                        <a:t>74.1%</a:t>
+                      </a:r>
+                      <a:endParaRPr lang="en-US" dirty="0"/>
+                    </a:p>
+                  </a:txBody>
+                  <a:tcPr anchor="ctr"/>
+                </a:tc>
+              </a:tr>
+              <a:tr h="370840">
+                <a:tc rowSpan="3">
+                  <a:txBody>
+                    <a:bodyPr/>
+                    <a:lstStyle/>
+                    <a:p>
+                      <a:pPr marL="0" marR="0" indent="0" algn="ctr" defTabSz="457200" rtl="0" eaLnBrk="1" fontAlgn="auto" latinLnBrk="0" hangingPunct="1">
+                        <a:lnSpc>
+                          <a:spcPct val="100000"/>
+                        </a:lnSpc>
+                        <a:spcBef>
+                          <a:spcPts val="0"/>
+                        </a:spcBef>
+                        <a:spcAft>
+                          <a:spcPts val="0"/>
+                        </a:spcAft>
+                        <a:buClrTx/>
+                        <a:buSzTx/>
+                        <a:buFontTx/>
+                        <a:buNone/>
+                        <a:tabLst/>
+                        <a:defRPr/>
+                      </a:pPr>
+                      <a:r>
+                        <a:rPr lang="en-US" dirty="0" smtClean="0"/>
+                        <a:t>C=1.5</a:t>
+                      </a:r>
+                    </a:p>
+                  </a:txBody>
+                  <a:tcPr anchor="ctr"/>
+                </a:tc>
+                <a:tc>
+                  <a:txBody>
+                    <a:bodyPr/>
+                    <a:lstStyle/>
+                    <a:p>
+                      <a:pPr algn="ctr"/>
+                      <a:r>
+                        <a:rPr lang="en-US" dirty="0" smtClean="0"/>
+                        <a:t>H</a:t>
+                      </a:r>
+                      <a:endParaRPr lang="en-US" dirty="0"/>
+                    </a:p>
+                  </a:txBody>
+                  <a:tcPr anchor="ctr"/>
+                </a:tc>
+                <a:tc>
+                  <a:txBody>
+                    <a:bodyPr/>
+                    <a:lstStyle/>
+                    <a:p>
+                      <a:pPr algn="ctr"/>
+                      <a:r>
+                        <a:rPr lang="en-US" dirty="0" smtClean="0"/>
+                        <a:t>60.9%</a:t>
+                      </a:r>
+                      <a:endParaRPr lang="en-US" dirty="0"/>
+                    </a:p>
+                  </a:txBody>
+                  <a:tcPr anchor="ctr"/>
+                </a:tc>
+              </a:tr>
+              <a:tr h="370840">
+                <a:tc vMerge="1">
+                  <a:txBody>
+                    <a:bodyPr/>
+                    <a:lstStyle/>
+                    <a:p>
+                      <a:pPr algn="ctr"/>
+                      <a:endParaRPr lang="en-US" dirty="0"/>
+                    </a:p>
+                  </a:txBody>
+                  <a:tcPr anchor="ctr"/>
+                </a:tc>
+                <a:tc>
+                  <a:txBody>
+                    <a:bodyPr/>
+                    <a:lstStyle/>
+                    <a:p>
+                      <a:pPr algn="ctr"/>
+                      <a:r>
+                        <a:rPr lang="en-US" dirty="0" smtClean="0"/>
+                        <a:t>S</a:t>
+                      </a:r>
+                      <a:endParaRPr lang="en-US" dirty="0"/>
+                    </a:p>
+                  </a:txBody>
+                  <a:tcPr anchor="ctr"/>
+                </a:tc>
+                <a:tc>
+                  <a:txBody>
+                    <a:bodyPr/>
+                    <a:lstStyle/>
+                    <a:p>
+                      <a:pPr algn="ctr"/>
+                      <a:r>
+                        <a:rPr lang="en-US" dirty="0" smtClean="0"/>
+                        <a:t>74.5%</a:t>
+                      </a:r>
+                      <a:endParaRPr lang="en-US" dirty="0"/>
+                    </a:p>
+                  </a:txBody>
+                  <a:tcPr anchor="ctr"/>
+                </a:tc>
+              </a:tr>
+              <a:tr h="370840">
+                <a:tc vMerge="1">
+                  <a:txBody>
+                    <a:bodyPr/>
+                    <a:lstStyle/>
+                    <a:p>
+                      <a:pPr algn="ctr"/>
+                      <a:endParaRPr lang="en-US" dirty="0"/>
+                    </a:p>
+                  </a:txBody>
+                  <a:tcPr anchor="ctr"/>
+                </a:tc>
+                <a:tc>
+                  <a:txBody>
+                    <a:bodyPr/>
+                    <a:lstStyle/>
+                    <a:p>
+                      <a:pPr algn="ctr"/>
+                      <a:r>
+                        <a:rPr lang="en-US" dirty="0" smtClean="0"/>
+                        <a:t>O</a:t>
+                      </a:r>
+                      <a:endParaRPr lang="en-US" dirty="0"/>
+                    </a:p>
+                  </a:txBody>
+                  <a:tcPr anchor="ctr"/>
+                </a:tc>
+                <a:tc>
+                  <a:txBody>
+                    <a:bodyPr/>
+                    <a:lstStyle/>
+                    <a:p>
+                      <a:pPr algn="ctr"/>
+                      <a:r>
+                        <a:rPr lang="en-US" dirty="0" smtClean="0"/>
+                        <a:t>74.5%</a:t>
+                      </a:r>
+                      <a:endParaRPr lang="en-US" dirty="0"/>
+                    </a:p>
+                  </a:txBody>
+                  <a:tcPr anchor="ctr"/>
+                </a:tc>
+              </a:tr>
+              <a:tr h="370840">
+                <a:tc rowSpan="3">
+                  <a:txBody>
+                    <a:bodyPr/>
+                    <a:lstStyle/>
+                    <a:p>
+                      <a:pPr marL="0" marR="0" indent="0" algn="ctr" defTabSz="457200" rtl="0" eaLnBrk="1" fontAlgn="auto" latinLnBrk="0" hangingPunct="1">
+                        <a:lnSpc>
+                          <a:spcPct val="100000"/>
+                        </a:lnSpc>
+                        <a:spcBef>
+                          <a:spcPts val="0"/>
+                        </a:spcBef>
+                        <a:spcAft>
+                          <a:spcPts val="0"/>
+                        </a:spcAft>
+                        <a:buClrTx/>
+                        <a:buSzTx/>
+                        <a:buFontTx/>
+                        <a:buNone/>
+                        <a:tabLst/>
+                        <a:defRPr/>
+                      </a:pPr>
+                      <a:r>
+                        <a:rPr lang="en-US" dirty="0" smtClean="0"/>
+                        <a:t>C=2.0</a:t>
+                      </a:r>
+                    </a:p>
+                  </a:txBody>
+                  <a:tcPr anchor="ctr"/>
+                </a:tc>
+                <a:tc>
+                  <a:txBody>
+                    <a:bodyPr/>
+                    <a:lstStyle/>
+                    <a:p>
+                      <a:pPr algn="ctr"/>
+                      <a:r>
+                        <a:rPr lang="en-US" dirty="0" smtClean="0"/>
+                        <a:t>H</a:t>
+                      </a:r>
+                      <a:endParaRPr lang="en-US" dirty="0"/>
+                    </a:p>
+                  </a:txBody>
+                  <a:tcPr anchor="ctr"/>
+                </a:tc>
+                <a:tc>
+                  <a:txBody>
+                    <a:bodyPr/>
+                    <a:lstStyle/>
+                    <a:p>
+                      <a:pPr algn="ctr"/>
+                      <a:r>
+                        <a:rPr lang="en-US" dirty="0" smtClean="0"/>
+                        <a:t>61.9%</a:t>
+                      </a:r>
+                      <a:endParaRPr lang="en-US" dirty="0"/>
+                    </a:p>
+                  </a:txBody>
+                  <a:tcPr anchor="ctr"/>
+                </a:tc>
+              </a:tr>
+              <a:tr h="370840">
+                <a:tc vMerge="1">
+                  <a:txBody>
+                    <a:bodyPr/>
+                    <a:lstStyle/>
+                    <a:p>
+                      <a:pPr marL="0" marR="0" indent="0" algn="ctr" defTabSz="457200" rtl="0" eaLnBrk="1" fontAlgn="auto" latinLnBrk="0" hangingPunct="1">
+                        <a:lnSpc>
+                          <a:spcPct val="100000"/>
+                        </a:lnSpc>
+                        <a:spcBef>
+                          <a:spcPts val="0"/>
+                        </a:spcBef>
+                        <a:spcAft>
+                          <a:spcPts val="0"/>
+                        </a:spcAft>
+                        <a:buClrTx/>
+                        <a:buSzTx/>
+                        <a:buFontTx/>
+                        <a:buNone/>
+                        <a:tabLst/>
+                        <a:defRPr/>
+                      </a:pPr>
+                      <a:endParaRPr lang="en-US" dirty="0" smtClean="0"/>
+                    </a:p>
+                  </a:txBody>
+                  <a:tcPr anchor="ctr"/>
+                </a:tc>
+                <a:tc>
+                  <a:txBody>
+                    <a:bodyPr/>
+                    <a:lstStyle/>
+                    <a:p>
+                      <a:pPr algn="ctr"/>
+                      <a:r>
+                        <a:rPr lang="en-US" dirty="0" smtClean="0"/>
+                        <a:t>S</a:t>
+                      </a:r>
+                      <a:endParaRPr lang="en-US" dirty="0"/>
+                    </a:p>
+                  </a:txBody>
+                  <a:tcPr anchor="ctr"/>
+                </a:tc>
+                <a:tc>
+                  <a:txBody>
+                    <a:bodyPr/>
+                    <a:lstStyle/>
+                    <a:p>
+                      <a:pPr algn="ctr"/>
+                      <a:r>
+                        <a:rPr lang="en-US" dirty="0" smtClean="0"/>
+                        <a:t>73.8%</a:t>
+                      </a:r>
+                      <a:endParaRPr lang="en-US" dirty="0"/>
+                    </a:p>
+                  </a:txBody>
+                  <a:tcPr anchor="ctr"/>
+                </a:tc>
+              </a:tr>
+              <a:tr h="370840">
+                <a:tc vMerge="1">
+                  <a:txBody>
+                    <a:bodyPr/>
+                    <a:lstStyle/>
+                    <a:p>
+                      <a:pPr marL="0" marR="0" indent="0" algn="ctr" defTabSz="457200" rtl="0" eaLnBrk="1" fontAlgn="auto" latinLnBrk="0" hangingPunct="1">
+                        <a:lnSpc>
+                          <a:spcPct val="100000"/>
+                        </a:lnSpc>
+                        <a:spcBef>
+                          <a:spcPts val="0"/>
+                        </a:spcBef>
+                        <a:spcAft>
+                          <a:spcPts val="0"/>
+                        </a:spcAft>
+                        <a:buClrTx/>
+                        <a:buSzTx/>
+                        <a:buFontTx/>
+                        <a:buNone/>
+                        <a:tabLst/>
+                        <a:defRPr/>
+                      </a:pPr>
+                      <a:endParaRPr lang="en-US" dirty="0" smtClean="0"/>
+                    </a:p>
+                  </a:txBody>
+                  <a:tcPr anchor="ctr"/>
+                </a:tc>
+                <a:tc>
+                  <a:txBody>
+                    <a:bodyPr/>
+                    <a:lstStyle/>
+                    <a:p>
+                      <a:pPr algn="ctr"/>
+                      <a:r>
+                        <a:rPr lang="en-US" dirty="0" smtClean="0"/>
+                        <a:t>O</a:t>
+                      </a:r>
+                      <a:endParaRPr lang="en-US" dirty="0"/>
+                    </a:p>
+                  </a:txBody>
+                  <a:tcPr anchor="ctr"/>
+                </a:tc>
+                <a:tc>
+                  <a:txBody>
+                    <a:bodyPr/>
+                    <a:lstStyle/>
+                    <a:p>
+                      <a:pPr algn="ctr"/>
+                      <a:r>
+                        <a:rPr lang="en-US" dirty="0" smtClean="0"/>
+                        <a:t>74.5%</a:t>
+                      </a:r>
+                      <a:endParaRPr lang="en-US" dirty="0"/>
+                    </a:p>
+                  </a:txBody>
+                  <a:tcPr anchor="ctr"/>
+                </a:tc>
+              </a:tr>
+            </a:tbl>
+          </a:graphicData>
+        </a:graphic>
+      </p:graphicFrame>
+    </p:spTree>
+    <p:extLst>
+      <p:ext uri="{BB962C8B-B14F-4D97-AF65-F5344CB8AC3E}">
+        <p14:creationId xmlns:p14="http://schemas.microsoft.com/office/powerpoint/2010/main" val="1758061107"/>
+      </p:ext>
+    </p:extLst>
+  </p:cSld>
+  <p:clrMapOvr>
+    <a:masterClrMapping/>
+  </p:clrMapOvr>
+  <p:timing>
+    <p:tnLst>
+      <p:par>
+        <p:cTn id="1" dur="indefinite" restart="never" nodeType="tmRoot"/>
+      </p:par>
+    </p:tnLst>
+  </p:timing>
+</p:sld>
+</file>
+
+<file path=ppt/slides/slide18.xml><?xml version="1.0" encoding="utf-8"?>
+<p:sld xmlns:a="http://schemas.openxmlformats.org/drawingml/2006/main" xmlns:r="http://schemas.openxmlformats.org/officeDocument/2006/relationships" xmlns:p="http://schemas.openxmlformats.org/presentationml/2006/main">
+  <p:cSld>
+    <p:spTree>
+      <p:nvGrpSpPr>
+        <p:cNvPr id="1" name=""/>
+        <p:cNvGrpSpPr/>
+        <p:nvPr/>
+      </p:nvGrpSpPr>
+      <p:grpSpPr>
+        <a:xfrm>
+          <a:off x="0" y="0"/>
+          <a:ext cx="0" cy="0"/>
+          <a:chOff x="0" y="0"/>
+          <a:chExt cx="0" cy="0"/>
+        </a:xfrm>
+      </p:grpSpPr>
+      <p:sp>
+        <p:nvSpPr>
+          <p:cNvPr id="2" name="Title 1"/>
+          <p:cNvSpPr>
+            <a:spLocks noGrp="1"/>
+          </p:cNvSpPr>
+          <p:nvPr>
+            <p:ph type="title"/>
+          </p:nvPr>
+        </p:nvSpPr>
+        <p:spPr/>
+        <p:txBody>
+          <a:bodyPr>
+            <a:normAutofit fontScale="90000"/>
+          </a:bodyPr>
+          <a:lstStyle/>
+          <a:p>
+            <a:r>
+              <a:rPr lang="en-US" sz="4400" dirty="0"/>
+              <a:t>Test Results </a:t>
+            </a:r>
+            <a:r>
+              <a:rPr lang="en-US" sz="4400" dirty="0" smtClean="0"/>
+              <a:t>w/ </a:t>
+            </a:r>
+            <a:r>
+              <a:rPr lang="en-US" sz="4400" dirty="0"/>
+              <a:t>Different </a:t>
+            </a:r>
+            <a:r>
+              <a:rPr lang="en-US" sz="4400" dirty="0" smtClean="0"/>
+              <a:t>Parameters</a:t>
+            </a:r>
+            <a:endParaRPr lang="en-US" sz="4400" dirty="0"/>
+          </a:p>
+        </p:txBody>
+      </p:sp>
+      <p:graphicFrame>
+        <p:nvGraphicFramePr>
+          <p:cNvPr id="4" name="Content Placeholder 3"/>
+          <p:cNvGraphicFramePr>
+            <a:graphicFrameLocks noGrp="1"/>
+          </p:cNvGraphicFramePr>
+          <p:nvPr>
+            <p:ph idx="1"/>
+            <p:extLst>
+              <p:ext uri="{D42A27DB-BD31-4B8C-83A1-F6EECF244321}">
+                <p14:modId xmlns:p14="http://schemas.microsoft.com/office/powerpoint/2010/main" val="802062037"/>
+              </p:ext>
+            </p:extLst>
+          </p:nvPr>
+        </p:nvGraphicFramePr>
+        <p:xfrm>
+          <a:off x="2589213" y="2133600"/>
+          <a:ext cx="8915400" cy="3778250"/>
+        </p:xfrm>
+        <a:graphic>
+          <a:graphicData uri="http://schemas.openxmlformats.org/drawingml/2006/chart">
+            <c:chart xmlns:c="http://schemas.openxmlformats.org/drawingml/2006/chart" xmlns:r="http://schemas.openxmlformats.org/officeDocument/2006/relationships" r:id="rId2"/>
+          </a:graphicData>
+        </a:graphic>
+      </p:graphicFrame>
+    </p:spTree>
+    <p:extLst>
+      <p:ext uri="{BB962C8B-B14F-4D97-AF65-F5344CB8AC3E}">
+        <p14:creationId xmlns:p14="http://schemas.microsoft.com/office/powerpoint/2010/main" val="1235489395"/>
       </p:ext>
     </p:extLst>
   </p:cSld>
@@ -14787,6 +17477,10 @@
           </a:bodyPr>
           <a:lstStyle/>
           <a:p>
+            <a:r>
+              <a:rPr lang="en-US" sz="4400" dirty="0" smtClean="0"/>
+              <a:t>Training Procedure</a:t>
+            </a:r>
             <a:endParaRPr lang="en-US" sz="4400" dirty="0"/>
           </a:p>
         </p:txBody>
@@ -14801,21 +17495,114 @@
             <p:ph idx="1"/>
           </p:nvPr>
         </p:nvSpPr>
-        <p:spPr/>
+        <p:spPr>
+          <a:xfrm>
+            <a:off x="2589212" y="2133600"/>
+            <a:ext cx="8915400" cy="4374776"/>
+          </a:xfrm>
+        </p:spPr>
         <p:txBody>
           <a:bodyPr>
-            <a:normAutofit/>
+            <a:normAutofit lnSpcReduction="10000"/>
           </a:bodyPr>
           <a:lstStyle/>
           <a:p>
-            <a:endParaRPr lang="en-US" sz="2800" dirty="0"/>
+            <a:r>
+              <a:rPr lang="en-US" sz="2800" dirty="0" smtClean="0"/>
+              <a:t>Choose a performance measure </a:t>
+            </a:r>
+          </a:p>
+          <a:p>
+            <a:pPr lvl="1"/>
+            <a:r>
+              <a:rPr lang="en-US" sz="2600" dirty="0" smtClean="0"/>
+              <a:t>Zero-one Loss for the classification problems</a:t>
+            </a:r>
+            <a:endParaRPr lang="en-US" sz="2600" dirty="0"/>
+          </a:p>
+          <a:p>
+            <a:r>
+              <a:rPr lang="en-US" sz="2800" dirty="0" smtClean="0"/>
+              <a:t>Choose hypothesis classes </a:t>
+            </a:r>
+            <a:r>
+              <a:rPr lang="en-US" sz="2800" dirty="0" err="1" smtClean="0"/>
+              <a:t>H</a:t>
+            </a:r>
+            <a:r>
+              <a:rPr lang="en-US" sz="2800" baseline="-25000" dirty="0" err="1" smtClean="0"/>
+              <a:t>n</a:t>
+            </a:r>
+            <a:endParaRPr lang="en-US" sz="2800" dirty="0" smtClean="0"/>
+          </a:p>
+          <a:p>
+            <a:pPr lvl="1"/>
+            <a:r>
+              <a:rPr lang="en-US" sz="2400" dirty="0" smtClean="0"/>
+              <a:t>Naïve Bayes</a:t>
+            </a:r>
+          </a:p>
+          <a:p>
+            <a:pPr lvl="1"/>
+            <a:r>
+              <a:rPr lang="en-US" sz="2400" dirty="0" smtClean="0"/>
+              <a:t>SVM</a:t>
+            </a:r>
+          </a:p>
+          <a:p>
+            <a:pPr lvl="1"/>
+            <a:r>
+              <a:rPr lang="en-US" sz="2400" dirty="0" smtClean="0"/>
+              <a:t>Multi-layer Perception</a:t>
+            </a:r>
+          </a:p>
+          <a:p>
+            <a:r>
+              <a:rPr lang="en-US" sz="2800" dirty="0" smtClean="0"/>
+              <a:t>For each H</a:t>
+            </a:r>
+            <a:r>
+              <a:rPr lang="en-US" sz="2800" baseline="-25000" dirty="0" smtClean="0"/>
+              <a:t>i</a:t>
+            </a:r>
+            <a:r>
+              <a:rPr lang="en-US" sz="2800" dirty="0" smtClean="0"/>
+              <a:t>, find f which </a:t>
+            </a:r>
+            <a:r>
+              <a:rPr lang="en-US" sz="2800" dirty="0"/>
+              <a:t>minimizes </a:t>
+            </a:r>
+            <a:r>
+              <a:rPr lang="en-US" sz="2800" dirty="0" smtClean="0"/>
+              <a:t>training error and test f on validation set</a:t>
+            </a:r>
+          </a:p>
+          <a:p>
+            <a:r>
+              <a:rPr lang="en-US" sz="2800" dirty="0" smtClean="0"/>
+              <a:t>Choose H</a:t>
+            </a:r>
+            <a:r>
+              <a:rPr lang="en-US" sz="2800" baseline="-25000" dirty="0" smtClean="0"/>
+              <a:t>i</a:t>
+            </a:r>
+            <a:r>
+              <a:rPr lang="en-US" sz="2800" dirty="0" smtClean="0"/>
+              <a:t> </a:t>
+            </a:r>
+            <a:r>
+              <a:rPr lang="en-US" sz="2800" dirty="0"/>
+              <a:t>with the least validation error</a:t>
+            </a:r>
+            <a:endParaRPr lang="en-US" sz="2800" dirty="0" smtClean="0"/>
           </a:p>
         </p:txBody>
       </p:sp>
     </p:spTree>
     <p:extLst>
       <p:ext uri="{BB962C8B-B14F-4D97-AF65-F5344CB8AC3E}">
-        <p14:creationId xmlns:p14="http://schemas.microsoft.com/office/powerpoint/2010/main" val="446340713"/>
+        <p14:creationId xmlns:p14="http://schemas.microsoft.com/office/powerpoint/2010/main" val="1371499336"/>
       </p:ext>
     </p:extLst>
   </p:cSld>
@@ -14866,6 +17653,10 @@
           </a:bodyPr>
           <a:lstStyle/>
           <a:p>
+            <a:r>
+              <a:rPr lang="en-US" sz="4400" dirty="0" smtClean="0"/>
+              <a:t>Classifiers</a:t>
+            </a:r>
             <a:endParaRPr lang="en-US" sz="4400" dirty="0"/>
           </a:p>
         </p:txBody>
@@ -14887,6 +17678,22 @@
           </a:bodyPr>
           <a:lstStyle/>
           <a:p>
+            <a:r>
+              <a:rPr lang="en-US" sz="2800" dirty="0" smtClean="0"/>
+              <a:t>Naïve Bayes</a:t>
+            </a:r>
+          </a:p>
+          <a:p>
+            <a:r>
+              <a:rPr lang="en-US" sz="2800" dirty="0" smtClean="0"/>
+              <a:t>Support Vector Machine</a:t>
+            </a:r>
+          </a:p>
+          <a:p>
+            <a:r>
+              <a:rPr lang="en-US" sz="2800" dirty="0" smtClean="0"/>
+              <a:t>Multi-layer Perception</a:t>
+            </a:r>
             <a:endParaRPr lang="en-US" sz="2800" dirty="0"/>
           </a:p>
         </p:txBody>
@@ -14894,7 +17701,7 @@
     </p:spTree>
     <p:extLst>
       <p:ext uri="{BB962C8B-B14F-4D97-AF65-F5344CB8AC3E}">
-        <p14:creationId xmlns:p14="http://schemas.microsoft.com/office/powerpoint/2010/main" val="915256190"/>
+        <p14:creationId xmlns:p14="http://schemas.microsoft.com/office/powerpoint/2010/main" val="446340713"/>
       </p:ext>
     </p:extLst>
   </p:cSld>
@@ -14930,50 +17737,50 @@
       </p:grpSpPr>
       <p:sp>
         <p:nvSpPr>
-          <p:cNvPr id="2" name="Title 1"/>
+          <p:cNvPr id="4" name="Title 3"/>
           <p:cNvSpPr>
             <a:spLocks noGrp="1"/>
           </p:cNvSpPr>
           <p:nvPr>
-            <p:ph type="title"/>
+            <p:ph type="ctrTitle"/>
           </p:nvPr>
         </p:nvSpPr>
         <p:spPr/>
         <p:txBody>
-          <a:bodyPr>
-            <a:normAutofit/>
-          </a:bodyPr>
+          <a:bodyPr/>
           <a:lstStyle/>
           <a:p>
-            <a:endParaRPr lang="en-US" sz="4400" dirty="0"/>
+            <a:r>
+              <a:rPr lang="en-US" dirty="0" smtClean="0"/>
+              <a:t>Test result analysis</a:t>
+            </a:r>
+            <a:endParaRPr lang="en-US" dirty="0"/>
           </a:p>
         </p:txBody>
       </p:sp>
       <p:sp>
         <p:nvSpPr>
-          <p:cNvPr id="3" name="Content Placeholder 2"/>
+          <p:cNvPr id="5" name="Subtitle 4"/>
           <p:cNvSpPr>
             <a:spLocks noGrp="1"/>
           </p:cNvSpPr>
           <p:nvPr>
-            <p:ph idx="1"/>
+            <p:ph type="subTitle" idx="1"/>
           </p:nvPr>
         </p:nvSpPr>
         <p:spPr/>
         <p:txBody>
-          <a:bodyPr>
-            <a:normAutofit/>
-          </a:bodyPr>
+          <a:bodyPr/>
           <a:lstStyle/>
           <a:p>
-            <a:endParaRPr lang="en-US" sz="2800" dirty="0"/>
+            <a:endParaRPr lang="en-US"/>
           </a:p>
         </p:txBody>
       </p:sp>
     </p:spTree>
     <p:extLst>
       <p:ext uri="{BB962C8B-B14F-4D97-AF65-F5344CB8AC3E}">
-        <p14:creationId xmlns:p14="http://schemas.microsoft.com/office/powerpoint/2010/main" val="846942590"/>
+        <p14:creationId xmlns:p14="http://schemas.microsoft.com/office/powerpoint/2010/main" val="292218004"/>
       </p:ext>
     </p:extLst>
   </p:cSld>

</xml_diff>

<commit_message>
finish part2 of ppt
</commit_message>
<xml_diff>
--- a/PPTGroup10.pptx
+++ b/PPTGroup10.pptx
@@ -5,7 +5,7 @@
     <p:sldMasterId id="2147483648" r:id="rId1"/>
   </p:sldMasterIdLst>
   <p:notesMasterIdLst>
-    <p:notesMasterId r:id="rId24"/>
+    <p:notesMasterId r:id="rId27"/>
   </p:notesMasterIdLst>
   <p:sldIdLst>
     <p:sldId id="256" r:id="rId2"/>
@@ -16,20 +16,23 @@
     <p:sldId id="261" r:id="rId7"/>
     <p:sldId id="266" r:id="rId8"/>
     <p:sldId id="262" r:id="rId9"/>
-    <p:sldId id="268" r:id="rId10"/>
-    <p:sldId id="269" r:id="rId11"/>
-    <p:sldId id="270" r:id="rId12"/>
-    <p:sldId id="271" r:id="rId13"/>
-    <p:sldId id="272" r:id="rId14"/>
-    <p:sldId id="273" r:id="rId15"/>
-    <p:sldId id="279" r:id="rId16"/>
-    <p:sldId id="275" r:id="rId17"/>
-    <p:sldId id="276" r:id="rId18"/>
-    <p:sldId id="280" r:id="rId19"/>
-    <p:sldId id="284" r:id="rId20"/>
-    <p:sldId id="281" r:id="rId21"/>
-    <p:sldId id="282" r:id="rId22"/>
-    <p:sldId id="283" r:id="rId23"/>
+    <p:sldId id="286" r:id="rId10"/>
+    <p:sldId id="287" r:id="rId11"/>
+    <p:sldId id="285" r:id="rId12"/>
+    <p:sldId id="268" r:id="rId13"/>
+    <p:sldId id="269" r:id="rId14"/>
+    <p:sldId id="270" r:id="rId15"/>
+    <p:sldId id="271" r:id="rId16"/>
+    <p:sldId id="272" r:id="rId17"/>
+    <p:sldId id="273" r:id="rId18"/>
+    <p:sldId id="279" r:id="rId19"/>
+    <p:sldId id="275" r:id="rId20"/>
+    <p:sldId id="276" r:id="rId21"/>
+    <p:sldId id="280" r:id="rId22"/>
+    <p:sldId id="284" r:id="rId23"/>
+    <p:sldId id="281" r:id="rId24"/>
+    <p:sldId id="282" r:id="rId25"/>
+    <p:sldId id="283" r:id="rId26"/>
   </p:sldIdLst>
   <p:sldSz cx="12192000" cy="6858000"/>
   <p:notesSz cx="6858000" cy="9144000"/>
@@ -368,11 +371,11 @@
         </c:dLbls>
         <c:gapWidth val="219"/>
         <c:overlap val="-27"/>
-        <c:axId val="2099314304"/>
-        <c:axId val="2099318544"/>
+        <c:axId val="-2096646400"/>
+        <c:axId val="-2096412336"/>
       </c:barChart>
       <c:catAx>
-        <c:axId val="2099314304"/>
+        <c:axId val="-2096646400"/>
         <c:scaling>
           <c:orientation val="minMax"/>
         </c:scaling>
@@ -415,7 +418,7 @@
             <a:endParaRPr lang="en-US"/>
           </a:p>
         </c:txPr>
-        <c:crossAx val="2099318544"/>
+        <c:crossAx val="-2096412336"/>
         <c:crosses val="autoZero"/>
         <c:auto val="1"/>
         <c:lblAlgn val="ctr"/>
@@ -423,7 +426,7 @@
         <c:noMultiLvlLbl val="0"/>
       </c:catAx>
       <c:valAx>
-        <c:axId val="2099318544"/>
+        <c:axId val="-2096412336"/>
         <c:scaling>
           <c:orientation val="minMax"/>
         </c:scaling>
@@ -474,7 +477,7 @@
             <a:endParaRPr lang="en-US"/>
           </a:p>
         </c:txPr>
-        <c:crossAx val="2099314304"/>
+        <c:crossAx val="-2096646400"/>
         <c:crosses val="autoZero"/>
         <c:crossBetween val="between"/>
       </c:valAx>
@@ -586,7 +589,6 @@
           </a:p>
         </c:rich>
       </c:tx>
-      <c:layout/>
       <c:overlay val="0"/>
       <c:spPr>
         <a:noFill/>
@@ -777,11 +779,11 @@
         </c:dLbls>
         <c:gapWidth val="219"/>
         <c:overlap val="-27"/>
-        <c:axId val="2112351168"/>
-        <c:axId val="2112384624"/>
+        <c:axId val="2120530160"/>
+        <c:axId val="-2095536096"/>
       </c:barChart>
       <c:catAx>
-        <c:axId val="2112351168"/>
+        <c:axId val="2120530160"/>
         <c:scaling>
           <c:orientation val="minMax"/>
         </c:scaling>
@@ -824,7 +826,7 @@
             <a:endParaRPr lang="en-US"/>
           </a:p>
         </c:txPr>
-        <c:crossAx val="2112384624"/>
+        <c:crossAx val="-2095536096"/>
         <c:crosses val="autoZero"/>
         <c:auto val="1"/>
         <c:lblAlgn val="ctr"/>
@@ -832,7 +834,7 @@
         <c:noMultiLvlLbl val="0"/>
       </c:catAx>
       <c:valAx>
-        <c:axId val="2112384624"/>
+        <c:axId val="-2095536096"/>
         <c:scaling>
           <c:orientation val="minMax"/>
         </c:scaling>
@@ -883,7 +885,7 @@
             <a:endParaRPr lang="en-US"/>
           </a:p>
         </c:txPr>
-        <c:crossAx val="2112351168"/>
+        <c:crossAx val="2120530160"/>
         <c:crosses val="autoZero"/>
         <c:crossBetween val="between"/>
       </c:valAx>
@@ -897,7 +899,6 @@
     </c:plotArea>
     <c:legend>
       <c:legendPos val="b"/>
-      <c:layout/>
       <c:overlay val="0"/>
       <c:spPr>
         <a:noFill/>
@@ -1124,11 +1125,11 @@
         </c:dLbls>
         <c:gapWidth val="219"/>
         <c:overlap val="-27"/>
-        <c:axId val="2079844448"/>
-        <c:axId val="2079901328"/>
+        <c:axId val="-2097044304"/>
+        <c:axId val="-2097053264"/>
       </c:barChart>
       <c:catAx>
-        <c:axId val="2079844448"/>
+        <c:axId val="-2097044304"/>
         <c:scaling>
           <c:orientation val="minMax"/>
         </c:scaling>
@@ -1171,7 +1172,7 @@
             <a:endParaRPr lang="en-US"/>
           </a:p>
         </c:txPr>
-        <c:crossAx val="2079901328"/>
+        <c:crossAx val="-2097053264"/>
         <c:crosses val="autoZero"/>
         <c:auto val="1"/>
         <c:lblAlgn val="ctr"/>
@@ -1179,7 +1180,7 @@
         <c:noMultiLvlLbl val="0"/>
       </c:catAx>
       <c:valAx>
-        <c:axId val="2079901328"/>
+        <c:axId val="-2097053264"/>
         <c:scaling>
           <c:orientation val="minMax"/>
           <c:max val="100.0"/>
@@ -1231,7 +1232,7 @@
             <a:endParaRPr lang="en-US"/>
           </a:p>
         </c:txPr>
-        <c:crossAx val="2079844448"/>
+        <c:crossAx val="-2097044304"/>
         <c:crosses val="autoZero"/>
         <c:crossBetween val="between"/>
       </c:valAx>
@@ -1522,11 +1523,11 @@
         </c:dLbls>
         <c:gapWidth val="219"/>
         <c:overlap val="-27"/>
-        <c:axId val="2112431360"/>
-        <c:axId val="2112325344"/>
+        <c:axId val="-2136627808"/>
+        <c:axId val="-2096596544"/>
       </c:barChart>
       <c:catAx>
-        <c:axId val="2112431360"/>
+        <c:axId val="-2136627808"/>
         <c:scaling>
           <c:orientation val="minMax"/>
         </c:scaling>
@@ -1569,7 +1570,7 @@
             <a:endParaRPr lang="en-US"/>
           </a:p>
         </c:txPr>
-        <c:crossAx val="2112325344"/>
+        <c:crossAx val="-2096596544"/>
         <c:crosses val="autoZero"/>
         <c:auto val="1"/>
         <c:lblAlgn val="ctr"/>
@@ -1577,7 +1578,7 @@
         <c:noMultiLvlLbl val="0"/>
       </c:catAx>
       <c:valAx>
-        <c:axId val="2112325344"/>
+        <c:axId val="-2096596544"/>
         <c:scaling>
           <c:orientation val="minMax"/>
         </c:scaling>
@@ -1628,7 +1629,7 @@
             <a:endParaRPr lang="en-US"/>
           </a:p>
         </c:txPr>
-        <c:crossAx val="2112431360"/>
+        <c:crossAx val="-2136627808"/>
         <c:crosses val="autoZero"/>
         <c:crossBetween val="between"/>
       </c:valAx>
@@ -1927,11 +1928,11 @@
         </c:dLbls>
         <c:gapWidth val="219"/>
         <c:overlap val="-27"/>
-        <c:axId val="2112515632"/>
-        <c:axId val="2112519008"/>
+        <c:axId val="-2094305968"/>
+        <c:axId val="-2094592336"/>
       </c:barChart>
       <c:catAx>
-        <c:axId val="2112515632"/>
+        <c:axId val="-2094305968"/>
         <c:scaling>
           <c:orientation val="minMax"/>
         </c:scaling>
@@ -1974,7 +1975,7 @@
             <a:endParaRPr lang="en-US"/>
           </a:p>
         </c:txPr>
-        <c:crossAx val="2112519008"/>
+        <c:crossAx val="-2094592336"/>
         <c:crosses val="autoZero"/>
         <c:auto val="1"/>
         <c:lblAlgn val="ctr"/>
@@ -1982,7 +1983,7 @@
         <c:noMultiLvlLbl val="0"/>
       </c:catAx>
       <c:valAx>
-        <c:axId val="2112519008"/>
+        <c:axId val="-2094592336"/>
         <c:scaling>
           <c:orientation val="minMax"/>
         </c:scaling>
@@ -2033,7 +2034,7 @@
             <a:endParaRPr lang="en-US"/>
           </a:p>
         </c:txPr>
-        <c:crossAx val="2112515632"/>
+        <c:crossAx val="-2094305968"/>
         <c:crosses val="autoZero"/>
         <c:crossBetween val="between"/>
       </c:valAx>
@@ -2233,7 +2234,7 @@
                   <c:v>64.1382</c:v>
                 </c:pt>
                 <c:pt idx="1">
-                  <c:v>74.1837</c:v>
+                  <c:v>74.18369999999998</c:v>
                 </c:pt>
                 <c:pt idx="2">
                   <c:v>74.03870000000001</c:v>
@@ -2312,11 +2313,11 @@
         </c:dLbls>
         <c:gapWidth val="219"/>
         <c:overlap val="-27"/>
-        <c:axId val="2107690608"/>
-        <c:axId val="2107693536"/>
+        <c:axId val="-2094557904"/>
+        <c:axId val="-2094386672"/>
       </c:barChart>
       <c:catAx>
-        <c:axId val="2107690608"/>
+        <c:axId val="-2094557904"/>
         <c:scaling>
           <c:orientation val="minMax"/>
         </c:scaling>
@@ -2359,7 +2360,7 @@
             <a:endParaRPr lang="en-US"/>
           </a:p>
         </c:txPr>
-        <c:crossAx val="2107693536"/>
+        <c:crossAx val="-2094386672"/>
         <c:crosses val="autoZero"/>
         <c:auto val="1"/>
         <c:lblAlgn val="ctr"/>
@@ -2367,7 +2368,7 @@
         <c:noMultiLvlLbl val="0"/>
       </c:catAx>
       <c:valAx>
-        <c:axId val="2107693536"/>
+        <c:axId val="-2094386672"/>
         <c:scaling>
           <c:orientation val="minMax"/>
           <c:max val="80.0"/>
@@ -2420,7 +2421,7 @@
             <a:endParaRPr lang="en-US"/>
           </a:p>
         </c:txPr>
-        <c:crossAx val="2107690608"/>
+        <c:crossAx val="-2094557904"/>
         <c:crosses val="autoZero"/>
         <c:crossBetween val="between"/>
       </c:valAx>
@@ -2707,11 +2708,11 @@
         </c:dLbls>
         <c:gapWidth val="219"/>
         <c:overlap val="-27"/>
-        <c:axId val="2118097504"/>
-        <c:axId val="2118100432"/>
+        <c:axId val="-2096502640"/>
+        <c:axId val="-2117694576"/>
       </c:barChart>
       <c:catAx>
-        <c:axId val="2118097504"/>
+        <c:axId val="-2096502640"/>
         <c:scaling>
           <c:orientation val="minMax"/>
         </c:scaling>
@@ -2754,7 +2755,7 @@
             <a:endParaRPr lang="en-US"/>
           </a:p>
         </c:txPr>
-        <c:crossAx val="2118100432"/>
+        <c:crossAx val="-2117694576"/>
         <c:crosses val="autoZero"/>
         <c:auto val="1"/>
         <c:lblAlgn val="ctr"/>
@@ -2762,7 +2763,7 @@
         <c:noMultiLvlLbl val="0"/>
       </c:catAx>
       <c:valAx>
-        <c:axId val="2118100432"/>
+        <c:axId val="-2117694576"/>
         <c:scaling>
           <c:orientation val="minMax"/>
         </c:scaling>
@@ -2813,7 +2814,7 @@
             <a:endParaRPr lang="en-US"/>
           </a:p>
         </c:txPr>
-        <c:crossAx val="2118097504"/>
+        <c:crossAx val="-2096502640"/>
         <c:crosses val="autoZero"/>
         <c:crossBetween val="between"/>
       </c:valAx>
@@ -7134,6 +7135,90 @@
 </p:notes>
 </file>
 
+<file path=ppt/notesSlides/notesSlide2.xml><?xml version="1.0" encoding="utf-8"?>
+<p:notes xmlns:a="http://schemas.openxmlformats.org/drawingml/2006/main" xmlns:r="http://schemas.openxmlformats.org/officeDocument/2006/relationships" xmlns:p="http://schemas.openxmlformats.org/presentationml/2006/main">
+  <p:cSld>
+    <p:spTree>
+      <p:nvGrpSpPr>
+        <p:cNvPr id="1" name=""/>
+        <p:cNvGrpSpPr/>
+        <p:nvPr/>
+      </p:nvGrpSpPr>
+      <p:grpSpPr>
+        <a:xfrm>
+          <a:off x="0" y="0"/>
+          <a:ext cx="0" cy="0"/>
+          <a:chOff x="0" y="0"/>
+          <a:chExt cx="0" cy="0"/>
+        </a:xfrm>
+      </p:grpSpPr>
+      <p:sp>
+        <p:nvSpPr>
+          <p:cNvPr id="2" name="Slide Image Placeholder 1"/>
+          <p:cNvSpPr>
+            <a:spLocks noGrp="1" noRot="1" noChangeAspect="1"/>
+          </p:cNvSpPr>
+          <p:nvPr>
+            <p:ph type="sldImg"/>
+          </p:nvPr>
+        </p:nvSpPr>
+        <p:spPr/>
+      </p:sp>
+      <p:sp>
+        <p:nvSpPr>
+          <p:cNvPr id="3" name="Notes Placeholder 2"/>
+          <p:cNvSpPr>
+            <a:spLocks noGrp="1"/>
+          </p:cNvSpPr>
+          <p:nvPr>
+            <p:ph type="body" idx="1"/>
+          </p:nvPr>
+        </p:nvSpPr>
+        <p:spPr/>
+        <p:txBody>
+          <a:bodyPr/>
+          <a:lstStyle/>
+          <a:p>
+            <a:endParaRPr lang="en-US" dirty="0"/>
+          </a:p>
+        </p:txBody>
+      </p:sp>
+      <p:sp>
+        <p:nvSpPr>
+          <p:cNvPr id="4" name="Slide Number Placeholder 3"/>
+          <p:cNvSpPr>
+            <a:spLocks noGrp="1"/>
+          </p:cNvSpPr>
+          <p:nvPr>
+            <p:ph type="sldNum" sz="quarter" idx="10"/>
+          </p:nvPr>
+        </p:nvSpPr>
+        <p:spPr/>
+        <p:txBody>
+          <a:bodyPr/>
+          <a:lstStyle/>
+          <a:p>
+            <a:fld id="{1C63729A-534C-874A-B073-5D3F38B81A78}" type="slidenum">
+              <a:rPr lang="en-US" smtClean="0"/>
+              <a:t>7</a:t>
+            </a:fld>
+            <a:endParaRPr lang="en-US"/>
+          </a:p>
+        </p:txBody>
+      </p:sp>
+    </p:spTree>
+    <p:extLst>
+      <p:ext uri="{BB962C8B-B14F-4D97-AF65-F5344CB8AC3E}">
+        <p14:creationId xmlns:p14="http://schemas.microsoft.com/office/powerpoint/2010/main" val="1846938652"/>
+      </p:ext>
+    </p:extLst>
+  </p:cSld>
+  <p:clrMapOvr>
+    <a:masterClrMapping/>
+  </p:clrMapOvr>
+</p:notes>
+</file>
+
 <file path=ppt/slideLayouts/slideLayout1.xml><?xml version="1.0" encoding="utf-8"?>
 <p:sldLayout xmlns:a="http://schemas.openxmlformats.org/drawingml/2006/main" xmlns:r="http://schemas.openxmlformats.org/officeDocument/2006/relationships" xmlns:p="http://schemas.openxmlformats.org/presentationml/2006/main" type="title" preserve="1">
   <p:cSld name="Title Slide">
@@ -14775,6 +14860,574 @@
           <a:p>
             <a:r>
               <a:rPr lang="en-US" sz="4400" dirty="0" smtClean="0"/>
+              <a:t>Classifiers Tuning</a:t>
+            </a:r>
+            <a:endParaRPr lang="en-US" sz="4400" dirty="0"/>
+          </a:p>
+        </p:txBody>
+      </p:sp>
+      <p:sp>
+        <p:nvSpPr>
+          <p:cNvPr id="3" name="Content Placeholder 2"/>
+          <p:cNvSpPr>
+            <a:spLocks noGrp="1"/>
+          </p:cNvSpPr>
+          <p:nvPr>
+            <p:ph idx="1"/>
+          </p:nvPr>
+        </p:nvSpPr>
+        <p:spPr/>
+        <p:txBody>
+          <a:bodyPr>
+            <a:normAutofit/>
+          </a:bodyPr>
+          <a:lstStyle/>
+          <a:p>
+            <a:r>
+              <a:rPr lang="en-US" sz="2800" dirty="0" smtClean="0"/>
+              <a:t>Naïve Bayes</a:t>
+            </a:r>
+          </a:p>
+          <a:p>
+            <a:r>
+              <a:rPr lang="en-US" sz="2800" dirty="0" smtClean="0"/>
+              <a:t>Support Vector </a:t>
+            </a:r>
+            <a:r>
+              <a:rPr lang="en-US" sz="2800" dirty="0" smtClean="0"/>
+              <a:t>Machine</a:t>
+            </a:r>
+          </a:p>
+          <a:p>
+            <a:r>
+              <a:rPr lang="en-US" sz="2800" b="1" dirty="0" smtClean="0"/>
+              <a:t>Multi-layer </a:t>
+            </a:r>
+            <a:r>
+              <a:rPr lang="en-US" sz="2800" b="1" dirty="0" smtClean="0"/>
+              <a:t>Perceptron</a:t>
+            </a:r>
+            <a:endParaRPr lang="en-US" sz="2800" b="1" dirty="0"/>
+          </a:p>
+        </p:txBody>
+      </p:sp>
+    </p:spTree>
+    <p:extLst>
+      <p:ext uri="{BB962C8B-B14F-4D97-AF65-F5344CB8AC3E}">
+        <p14:creationId xmlns:p14="http://schemas.microsoft.com/office/powerpoint/2010/main" val="393800334"/>
+      </p:ext>
+    </p:extLst>
+  </p:cSld>
+  <p:clrMapOvr>
+    <a:masterClrMapping/>
+  </p:clrMapOvr>
+  <p:timing>
+    <p:tnLst>
+      <p:par>
+        <p:cTn id="1" dur="indefinite" restart="never" nodeType="tmRoot"/>
+      </p:par>
+    </p:tnLst>
+  </p:timing>
+</p:sld>
+</file>
+
+<file path=ppt/slides/slide11.xml><?xml version="1.0" encoding="utf-8"?>
+<p:sld xmlns:a="http://schemas.openxmlformats.org/drawingml/2006/main" xmlns:r="http://schemas.openxmlformats.org/officeDocument/2006/relationships" xmlns:p="http://schemas.openxmlformats.org/presentationml/2006/main">
+  <p:cSld>
+    <p:spTree>
+      <p:nvGrpSpPr>
+        <p:cNvPr id="1" name=""/>
+        <p:cNvGrpSpPr/>
+        <p:nvPr/>
+      </p:nvGrpSpPr>
+      <p:grpSpPr>
+        <a:xfrm>
+          <a:off x="0" y="0"/>
+          <a:ext cx="0" cy="0"/>
+          <a:chOff x="0" y="0"/>
+          <a:chExt cx="0" cy="0"/>
+        </a:xfrm>
+      </p:grpSpPr>
+      <p:sp>
+        <p:nvSpPr>
+          <p:cNvPr id="2" name="Title 1"/>
+          <p:cNvSpPr>
+            <a:spLocks noGrp="1"/>
+          </p:cNvSpPr>
+          <p:nvPr>
+            <p:ph type="title"/>
+          </p:nvPr>
+        </p:nvSpPr>
+        <p:spPr/>
+        <p:txBody>
+          <a:bodyPr>
+            <a:normAutofit/>
+          </a:bodyPr>
+          <a:lstStyle/>
+          <a:p>
+            <a:r>
+              <a:rPr lang="en-US" sz="4400" dirty="0" smtClean="0"/>
+              <a:t>Test Setup</a:t>
+            </a:r>
+            <a:endParaRPr lang="en-US" sz="4400" dirty="0"/>
+          </a:p>
+        </p:txBody>
+      </p:sp>
+      <p:sp>
+        <p:nvSpPr>
+          <p:cNvPr id="3" name="Content Placeholder 2"/>
+          <p:cNvSpPr>
+            <a:spLocks noGrp="1"/>
+          </p:cNvSpPr>
+          <p:nvPr>
+            <p:ph idx="1"/>
+          </p:nvPr>
+        </p:nvSpPr>
+        <p:spPr/>
+        <p:txBody>
+          <a:bodyPr>
+            <a:normAutofit/>
+          </a:bodyPr>
+          <a:lstStyle/>
+          <a:p>
+            <a:r>
+              <a:rPr lang="en-US" sz="2800" dirty="0" smtClean="0"/>
+              <a:t>Cross-validation </a:t>
+            </a:r>
+          </a:p>
+          <a:p>
+            <a:pPr lvl="1"/>
+            <a:r>
+              <a:rPr lang="en-US" sz="2600" dirty="0" smtClean="0"/>
+              <a:t>The </a:t>
+            </a:r>
+            <a:r>
+              <a:rPr lang="en-US" sz="2600" dirty="0"/>
+              <a:t>classifier is evaluated by cross-validation, </a:t>
+            </a:r>
+            <a:r>
+              <a:rPr lang="en-US" sz="2600" dirty="0" smtClean="0"/>
+              <a:t>10 folds are used.</a:t>
+            </a:r>
+          </a:p>
+          <a:p>
+            <a:pPr lvl="1"/>
+            <a:r>
+              <a:rPr lang="en-US" sz="2600" dirty="0"/>
+              <a:t>C</a:t>
+            </a:r>
+            <a:r>
+              <a:rPr lang="en-US" sz="2600" dirty="0" smtClean="0"/>
+              <a:t>ross </a:t>
+            </a:r>
+            <a:r>
+              <a:rPr lang="en-US" sz="2600" dirty="0"/>
+              <a:t>validation </a:t>
+            </a:r>
+            <a:r>
+              <a:rPr lang="en-US" sz="2600" dirty="0" smtClean="0"/>
+              <a:t>aims to define </a:t>
+            </a:r>
+            <a:r>
+              <a:rPr lang="en-US" sz="2600" dirty="0"/>
+              <a:t>a dataset to "</a:t>
+            </a:r>
+            <a:r>
+              <a:rPr lang="en-US" sz="2600" dirty="0" smtClean="0"/>
+              <a:t>test” in </a:t>
+            </a:r>
+            <a:r>
+              <a:rPr lang="en-US" sz="2600" dirty="0"/>
+              <a:t>the training </a:t>
+            </a:r>
+            <a:r>
+              <a:rPr lang="en-US" sz="2600" dirty="0" smtClean="0"/>
+              <a:t>phase, </a:t>
+            </a:r>
+            <a:r>
+              <a:rPr lang="en-US" sz="2600" dirty="0"/>
+              <a:t>in order to limit problems like </a:t>
+            </a:r>
+            <a:r>
+              <a:rPr lang="en-US" sz="2600" dirty="0" err="1" smtClean="0"/>
+              <a:t>overfitting</a:t>
+            </a:r>
+            <a:r>
+              <a:rPr lang="en-US" sz="2600" dirty="0" smtClean="0"/>
+              <a:t>.</a:t>
+            </a:r>
+            <a:endParaRPr lang="en-US" sz="2600" baseline="-25000" dirty="0" smtClean="0"/>
+          </a:p>
+          <a:p>
+            <a:pPr lvl="1"/>
+            <a:r>
+              <a:rPr lang="en-US" sz="2600" dirty="0" smtClean="0"/>
+              <a:t>It gives </a:t>
+            </a:r>
+            <a:r>
+              <a:rPr lang="en-US" sz="2600" dirty="0"/>
+              <a:t>an insight on how the model will generalize to an independent </a:t>
+            </a:r>
+            <a:r>
+              <a:rPr lang="en-US" sz="2600" dirty="0" smtClean="0"/>
+              <a:t>dataset.</a:t>
+            </a:r>
+            <a:r>
+              <a:rPr lang="en-US" sz="2600" baseline="-25000" dirty="0" smtClean="0"/>
+              <a:t>[*]</a:t>
+            </a:r>
+            <a:endParaRPr lang="en-US" sz="2600" baseline="-25000" dirty="0" smtClean="0"/>
+          </a:p>
+        </p:txBody>
+      </p:sp>
+      <p:sp>
+        <p:nvSpPr>
+          <p:cNvPr id="4" name="Title 1"/>
+          <p:cNvSpPr txBox="1">
+            <a:spLocks/>
+          </p:cNvSpPr>
+          <p:nvPr/>
+        </p:nvSpPr>
+        <p:spPr>
+          <a:xfrm flipV="1">
+            <a:off x="842683" y="5617628"/>
+            <a:ext cx="8877953" cy="1044388"/>
+          </a:xfrm>
+          <a:prstGeom prst="rect">
+            <a:avLst/>
+          </a:prstGeom>
+        </p:spPr>
+        <p:txBody>
+          <a:bodyPr vert="horz" lIns="91440" tIns="45720" rIns="91440" bIns="45720" rtlCol="0" anchor="t">
+            <a:normAutofit/>
+          </a:bodyPr>
+          <a:lstStyle>
+            <a:lvl1pPr algn="l" defTabSz="457200" rtl="0" eaLnBrk="1" latinLnBrk="0" hangingPunct="1">
+              <a:spcBef>
+                <a:spcPct val="0"/>
+              </a:spcBef>
+              <a:buNone/>
+              <a:defRPr sz="3600" kern="1200">
+                <a:solidFill>
+                  <a:schemeClr val="tx1">
+                    <a:lumMod val="85000"/>
+                    <a:lumOff val="15000"/>
+                  </a:schemeClr>
+                </a:solidFill>
+                <a:latin typeface="+mj-lt"/>
+                <a:ea typeface="+mj-ea"/>
+                <a:cs typeface="+mj-cs"/>
+              </a:defRPr>
+            </a:lvl1pPr>
+            <a:lvl2pPr eaLnBrk="1" hangingPunct="1">
+              <a:defRPr>
+                <a:solidFill>
+                  <a:schemeClr val="tx2"/>
+                </a:solidFill>
+              </a:defRPr>
+            </a:lvl2pPr>
+            <a:lvl3pPr eaLnBrk="1" hangingPunct="1">
+              <a:defRPr>
+                <a:solidFill>
+                  <a:schemeClr val="tx2"/>
+                </a:solidFill>
+              </a:defRPr>
+            </a:lvl3pPr>
+            <a:lvl4pPr eaLnBrk="1" hangingPunct="1">
+              <a:defRPr>
+                <a:solidFill>
+                  <a:schemeClr val="tx2"/>
+                </a:solidFill>
+              </a:defRPr>
+            </a:lvl4pPr>
+            <a:lvl5pPr eaLnBrk="1" hangingPunct="1">
+              <a:defRPr>
+                <a:solidFill>
+                  <a:schemeClr val="tx2"/>
+                </a:solidFill>
+              </a:defRPr>
+            </a:lvl5pPr>
+            <a:lvl6pPr eaLnBrk="1" hangingPunct="1">
+              <a:defRPr>
+                <a:solidFill>
+                  <a:schemeClr val="tx2"/>
+                </a:solidFill>
+              </a:defRPr>
+            </a:lvl6pPr>
+            <a:lvl7pPr eaLnBrk="1" hangingPunct="1">
+              <a:defRPr>
+                <a:solidFill>
+                  <a:schemeClr val="tx2"/>
+                </a:solidFill>
+              </a:defRPr>
+            </a:lvl7pPr>
+            <a:lvl8pPr eaLnBrk="1" hangingPunct="1">
+              <a:defRPr>
+                <a:solidFill>
+                  <a:schemeClr val="tx2"/>
+                </a:solidFill>
+              </a:defRPr>
+            </a:lvl8pPr>
+            <a:lvl9pPr eaLnBrk="1" hangingPunct="1">
+              <a:defRPr>
+                <a:solidFill>
+                  <a:schemeClr val="tx2"/>
+                </a:solidFill>
+              </a:defRPr>
+            </a:lvl9pPr>
+          </a:lstStyle>
+          <a:p>
+            <a:endParaRPr lang="en-US" sz="4400" dirty="0"/>
+          </a:p>
+        </p:txBody>
+      </p:sp>
+      <p:sp>
+        <p:nvSpPr>
+          <p:cNvPr id="5" name="Title 1"/>
+          <p:cNvSpPr txBox="1">
+            <a:spLocks/>
+          </p:cNvSpPr>
+          <p:nvPr/>
+        </p:nvSpPr>
+        <p:spPr>
+          <a:xfrm>
+            <a:off x="5281659" y="6147647"/>
+            <a:ext cx="9083933" cy="578257"/>
+          </a:xfrm>
+          <a:prstGeom prst="rect">
+            <a:avLst/>
+          </a:prstGeom>
+        </p:spPr>
+        <p:txBody>
+          <a:bodyPr vert="horz" lIns="91440" tIns="45720" rIns="91440" bIns="45720" rtlCol="0" anchor="t">
+            <a:normAutofit/>
+          </a:bodyPr>
+          <a:lstStyle>
+            <a:lvl1pPr algn="l" defTabSz="457200" rtl="0" eaLnBrk="1" latinLnBrk="0" hangingPunct="1">
+              <a:spcBef>
+                <a:spcPct val="0"/>
+              </a:spcBef>
+              <a:buNone/>
+              <a:defRPr sz="3600" kern="1200">
+                <a:solidFill>
+                  <a:schemeClr val="tx1">
+                    <a:lumMod val="85000"/>
+                    <a:lumOff val="15000"/>
+                  </a:schemeClr>
+                </a:solidFill>
+                <a:latin typeface="+mj-lt"/>
+                <a:ea typeface="+mj-ea"/>
+                <a:cs typeface="+mj-cs"/>
+              </a:defRPr>
+            </a:lvl1pPr>
+            <a:lvl2pPr eaLnBrk="1" hangingPunct="1">
+              <a:defRPr>
+                <a:solidFill>
+                  <a:schemeClr val="tx2"/>
+                </a:solidFill>
+              </a:defRPr>
+            </a:lvl2pPr>
+            <a:lvl3pPr eaLnBrk="1" hangingPunct="1">
+              <a:defRPr>
+                <a:solidFill>
+                  <a:schemeClr val="tx2"/>
+                </a:solidFill>
+              </a:defRPr>
+            </a:lvl3pPr>
+            <a:lvl4pPr eaLnBrk="1" hangingPunct="1">
+              <a:defRPr>
+                <a:solidFill>
+                  <a:schemeClr val="tx2"/>
+                </a:solidFill>
+              </a:defRPr>
+            </a:lvl4pPr>
+            <a:lvl5pPr eaLnBrk="1" hangingPunct="1">
+              <a:defRPr>
+                <a:solidFill>
+                  <a:schemeClr val="tx2"/>
+                </a:solidFill>
+              </a:defRPr>
+            </a:lvl5pPr>
+            <a:lvl6pPr eaLnBrk="1" hangingPunct="1">
+              <a:defRPr>
+                <a:solidFill>
+                  <a:schemeClr val="tx2"/>
+                </a:solidFill>
+              </a:defRPr>
+            </a:lvl6pPr>
+            <a:lvl7pPr eaLnBrk="1" hangingPunct="1">
+              <a:defRPr>
+                <a:solidFill>
+                  <a:schemeClr val="tx2"/>
+                </a:solidFill>
+              </a:defRPr>
+            </a:lvl7pPr>
+            <a:lvl8pPr eaLnBrk="1" hangingPunct="1">
+              <a:defRPr>
+                <a:solidFill>
+                  <a:schemeClr val="tx2"/>
+                </a:solidFill>
+              </a:defRPr>
+            </a:lvl8pPr>
+            <a:lvl9pPr eaLnBrk="1" hangingPunct="1">
+              <a:defRPr>
+                <a:solidFill>
+                  <a:schemeClr val="tx2"/>
+                </a:solidFill>
+              </a:defRPr>
+            </a:lvl9pPr>
+          </a:lstStyle>
+          <a:p>
+            <a:r>
+              <a:rPr lang="en-US" sz="1800" dirty="0"/>
+              <a:t>[*] https://</a:t>
+            </a:r>
+            <a:r>
+              <a:rPr lang="en-US" sz="1800" dirty="0" err="1"/>
+              <a:t>en.wikipedia.org</a:t>
+            </a:r>
+            <a:r>
+              <a:rPr lang="en-US" sz="1800" dirty="0"/>
+              <a:t>/wiki/Cross-validation_(statistics)</a:t>
+            </a:r>
+          </a:p>
+        </p:txBody>
+      </p:sp>
+    </p:spTree>
+    <p:extLst>
+      <p:ext uri="{BB962C8B-B14F-4D97-AF65-F5344CB8AC3E}">
+        <p14:creationId xmlns:p14="http://schemas.microsoft.com/office/powerpoint/2010/main" val="846790584"/>
+      </p:ext>
+    </p:extLst>
+  </p:cSld>
+  <p:clrMapOvr>
+    <a:masterClrMapping/>
+  </p:clrMapOvr>
+  <p:timing>
+    <p:tnLst>
+      <p:par>
+        <p:cTn id="1" dur="indefinite" restart="never" nodeType="tmRoot"/>
+      </p:par>
+    </p:tnLst>
+  </p:timing>
+</p:sld>
+</file>
+
+<file path=ppt/slides/slide12.xml><?xml version="1.0" encoding="utf-8"?>
+<p:sld xmlns:a="http://schemas.openxmlformats.org/drawingml/2006/main" xmlns:r="http://schemas.openxmlformats.org/officeDocument/2006/relationships" xmlns:p="http://schemas.openxmlformats.org/presentationml/2006/main">
+  <p:cSld>
+    <p:spTree>
+      <p:nvGrpSpPr>
+        <p:cNvPr id="1" name=""/>
+        <p:cNvGrpSpPr/>
+        <p:nvPr/>
+      </p:nvGrpSpPr>
+      <p:grpSpPr>
+        <a:xfrm>
+          <a:off x="0" y="0"/>
+          <a:ext cx="0" cy="0"/>
+          <a:chOff x="0" y="0"/>
+          <a:chExt cx="0" cy="0"/>
+        </a:xfrm>
+      </p:grpSpPr>
+      <p:sp>
+        <p:nvSpPr>
+          <p:cNvPr id="4" name="Title 3"/>
+          <p:cNvSpPr>
+            <a:spLocks noGrp="1"/>
+          </p:cNvSpPr>
+          <p:nvPr>
+            <p:ph type="ctrTitle"/>
+          </p:nvPr>
+        </p:nvSpPr>
+        <p:spPr/>
+        <p:txBody>
+          <a:bodyPr/>
+          <a:lstStyle/>
+          <a:p>
+            <a:r>
+              <a:rPr lang="en-US" dirty="0" smtClean="0"/>
+              <a:t>Test result analysis</a:t>
+            </a:r>
+            <a:endParaRPr lang="en-US" dirty="0"/>
+          </a:p>
+        </p:txBody>
+      </p:sp>
+      <p:sp>
+        <p:nvSpPr>
+          <p:cNvPr id="5" name="Subtitle 4"/>
+          <p:cNvSpPr>
+            <a:spLocks noGrp="1"/>
+          </p:cNvSpPr>
+          <p:nvPr>
+            <p:ph type="subTitle" idx="1"/>
+          </p:nvPr>
+        </p:nvSpPr>
+        <p:spPr/>
+        <p:txBody>
+          <a:bodyPr/>
+          <a:lstStyle/>
+          <a:p>
+            <a:endParaRPr lang="en-US"/>
+          </a:p>
+        </p:txBody>
+      </p:sp>
+    </p:spTree>
+    <p:extLst>
+      <p:ext uri="{BB962C8B-B14F-4D97-AF65-F5344CB8AC3E}">
+        <p14:creationId xmlns:p14="http://schemas.microsoft.com/office/powerpoint/2010/main" val="292218004"/>
+      </p:ext>
+    </p:extLst>
+  </p:cSld>
+  <p:clrMapOvr>
+    <a:masterClrMapping/>
+  </p:clrMapOvr>
+  <p:timing>
+    <p:tnLst>
+      <p:par>
+        <p:cTn id="1" dur="indefinite" restart="never" nodeType="tmRoot"/>
+      </p:par>
+    </p:tnLst>
+  </p:timing>
+</p:sld>
+</file>
+
+<file path=ppt/slides/slide13.xml><?xml version="1.0" encoding="utf-8"?>
+<p:sld xmlns:a="http://schemas.openxmlformats.org/drawingml/2006/main" xmlns:r="http://schemas.openxmlformats.org/officeDocument/2006/relationships" xmlns:p="http://schemas.openxmlformats.org/presentationml/2006/main">
+  <p:cSld>
+    <p:spTree>
+      <p:nvGrpSpPr>
+        <p:cNvPr id="1" name=""/>
+        <p:cNvGrpSpPr/>
+        <p:nvPr/>
+      </p:nvGrpSpPr>
+      <p:grpSpPr>
+        <a:xfrm>
+          <a:off x="0" y="0"/>
+          <a:ext cx="0" cy="0"/>
+          <a:chOff x="0" y="0"/>
+          <a:chExt cx="0" cy="0"/>
+        </a:xfrm>
+      </p:grpSpPr>
+      <p:sp>
+        <p:nvSpPr>
+          <p:cNvPr id="2" name="Title 1"/>
+          <p:cNvSpPr>
+            <a:spLocks noGrp="1"/>
+          </p:cNvSpPr>
+          <p:nvPr>
+            <p:ph type="title"/>
+          </p:nvPr>
+        </p:nvSpPr>
+        <p:spPr/>
+        <p:txBody>
+          <a:bodyPr>
+            <a:normAutofit/>
+          </a:bodyPr>
+          <a:lstStyle/>
+          <a:p>
+            <a:r>
+              <a:rPr lang="en-US" sz="4400" dirty="0" smtClean="0"/>
               <a:t>Multilayer Perceptron</a:t>
             </a:r>
             <a:endParaRPr lang="en-US" sz="4400" dirty="0"/>
@@ -15116,7 +15769,7 @@
 </p:sld>
 </file>
 
-<file path=ppt/slides/slide11.xml><?xml version="1.0" encoding="utf-8"?>
+<file path=ppt/slides/slide14.xml><?xml version="1.0" encoding="utf-8"?>
 <p:sld xmlns:a="http://schemas.openxmlformats.org/drawingml/2006/main" xmlns:r="http://schemas.openxmlformats.org/officeDocument/2006/relationships" xmlns:p="http://schemas.openxmlformats.org/presentationml/2006/main">
   <p:cSld>
     <p:spTree>
@@ -15215,7 +15868,7 @@
 </p:sld>
 </file>
 
-<file path=ppt/slides/slide12.xml><?xml version="1.0" encoding="utf-8"?>
+<file path=ppt/slides/slide15.xml><?xml version="1.0" encoding="utf-8"?>
 <p:sld xmlns:a="http://schemas.openxmlformats.org/drawingml/2006/main" xmlns:r="http://schemas.openxmlformats.org/officeDocument/2006/relationships" xmlns:p="http://schemas.openxmlformats.org/presentationml/2006/main">
   <p:cSld>
     <p:spTree>
@@ -15788,7 +16441,7 @@
 </p:sld>
 </file>
 
-<file path=ppt/slides/slide13.xml><?xml version="1.0" encoding="utf-8"?>
+<file path=ppt/slides/slide16.xml><?xml version="1.0" encoding="utf-8"?>
 <p:sld xmlns:a="http://schemas.openxmlformats.org/drawingml/2006/main" xmlns:r="http://schemas.openxmlformats.org/officeDocument/2006/relationships" xmlns:p="http://schemas.openxmlformats.org/presentationml/2006/main">
   <p:cSld>
     <p:spTree>
@@ -15887,7 +16540,7 @@
 </p:sld>
 </file>
 
-<file path=ppt/slides/slide14.xml><?xml version="1.0" encoding="utf-8"?>
+<file path=ppt/slides/slide17.xml><?xml version="1.0" encoding="utf-8"?>
 <p:sld xmlns:a="http://schemas.openxmlformats.org/drawingml/2006/main" xmlns:r="http://schemas.openxmlformats.org/officeDocument/2006/relationships" xmlns:p="http://schemas.openxmlformats.org/presentationml/2006/main">
   <p:cSld>
     <p:spTree>
@@ -15974,7 +16627,7 @@
 </p:sld>
 </file>
 
-<file path=ppt/slides/slide15.xml><?xml version="1.0" encoding="utf-8"?>
+<file path=ppt/slides/slide18.xml><?xml version="1.0" encoding="utf-8"?>
 <p:sld xmlns:a="http://schemas.openxmlformats.org/drawingml/2006/main" xmlns:r="http://schemas.openxmlformats.org/officeDocument/2006/relationships" xmlns:p="http://schemas.openxmlformats.org/presentationml/2006/main">
   <p:cSld>
     <p:spTree>
@@ -16033,8 +16686,24 @@
           <a:lstStyle/>
           <a:p>
             <a:r>
+              <a:rPr lang="de-DE" sz="2800" dirty="0" smtClean="0"/>
+              <a:t>-</a:t>
+            </a:r>
+            <a:r>
               <a:rPr lang="de-DE" sz="2800" dirty="0"/>
-              <a:t>-C 0.5 -L 0.001 -P 1.0E-12 -K </a:t>
+              <a:t>C </a:t>
+            </a:r>
+            <a:r>
+              <a:rPr lang="de-DE" sz="2800" dirty="0" smtClean="0"/>
+              <a:t>0</a:t>
+            </a:r>
+            <a:r>
+              <a:rPr lang="de-DE" sz="2800" dirty="0" smtClean="0"/>
+              <a:t>.5 </a:t>
+            </a:r>
+            <a:r>
+              <a:rPr lang="de-DE" sz="2800" dirty="0"/>
+              <a:t>-L 0.001 -P 1.0E-12 -K </a:t>
             </a:r>
             <a:r>
               <a:rPr lang="de-DE" sz="2800" dirty="0" err="1"/>
@@ -16044,7 +16713,6 @@
               <a:rPr lang="de-DE" sz="2800" dirty="0"/>
               <a:t> </a:t>
             </a:r>
-            <a:endParaRPr lang="de-DE" sz="2800" dirty="0" smtClean="0"/>
           </a:p>
           <a:p>
             <a:r>
@@ -16057,13 +16725,36 @@
             </a:r>
             <a:r>
               <a:rPr lang="de-DE" sz="2800" dirty="0" smtClean="0"/>
-              <a:t>1.0 </a:t>
+              <a:t>1</a:t>
+            </a:r>
+            <a:r>
+              <a:rPr lang="de-DE" sz="2800" dirty="0" smtClean="0"/>
+              <a:t>.0 </a:t>
             </a:r>
             <a:r>
               <a:rPr lang="de-DE" sz="2800" dirty="0"/>
               <a:t>-L 0.001 -P 1.0E-12 -K </a:t>
             </a:r>
             <a:r>
+              <a:rPr lang="de-DE" sz="2800" dirty="0" err="1" smtClean="0"/>
+              <a:t>PolyKernel</a:t>
+            </a:r>
+            <a:endParaRPr lang="de-DE" sz="2800" dirty="0" smtClean="0"/>
+          </a:p>
+          <a:p>
+            <a:r>
+              <a:rPr lang="de-DE" sz="2800" dirty="0"/>
+              <a:t>-C </a:t>
+            </a:r>
+            <a:r>
+              <a:rPr lang="de-DE" sz="2800" dirty="0" smtClean="0"/>
+              <a:t>1.5 </a:t>
+            </a:r>
+            <a:r>
+              <a:rPr lang="de-DE" sz="2800" dirty="0"/>
+              <a:t>-L 0.001 -P 1.0E-12 -K </a:t>
+            </a:r>
+            <a:r>
               <a:rPr lang="de-DE" sz="2800" dirty="0" err="1"/>
               <a:t>PolyKernel</a:t>
             </a:r>
@@ -16075,51 +16766,53 @@
           <a:p>
             <a:r>
               <a:rPr lang="de-DE" sz="2800" dirty="0"/>
-              <a:t>-C </a:t>
-            </a:r>
+              <a:t>-C 2.0 -L 0.001 -P 1.0E-12 -K </a:t>
+            </a:r>
+            <a:r>
+              <a:rPr lang="de-DE" sz="2800" dirty="0" err="1" smtClean="0"/>
+              <a:t>PolyKernel</a:t>
+            </a:r>
+            <a:endParaRPr lang="de-DE" sz="2800" dirty="0" smtClean="0"/>
+          </a:p>
+          <a:p>
+            <a:endParaRPr lang="de-DE" sz="2800" dirty="0"/>
+          </a:p>
+          <a:p>
             <a:r>
               <a:rPr lang="de-DE" sz="2800" dirty="0" smtClean="0"/>
-              <a:t>1.5 </a:t>
-            </a:r>
-            <a:r>
-              <a:rPr lang="de-DE" sz="2800" dirty="0"/>
-              <a:t>-L 0.001 -P 1.0E-12 -K </a:t>
+              <a:t>C </a:t>
             </a:r>
             <a:r>
               <a:rPr lang="de-DE" sz="2800" dirty="0" err="1"/>
-              <a:t>PolyKernel</a:t>
+              <a:t>means</a:t>
             </a:r>
             <a:r>
               <a:rPr lang="de-DE" sz="2800" dirty="0"/>
               <a:t> </a:t>
             </a:r>
-            <a:endParaRPr lang="de-DE" sz="2800" dirty="0" smtClean="0"/>
-          </a:p>
-          <a:p>
+            <a:r>
+              <a:rPr lang="de-DE" sz="2800" dirty="0" err="1" smtClean="0"/>
+              <a:t>complexity</a:t>
+            </a:r>
             <a:r>
               <a:rPr lang="de-DE" sz="2800" dirty="0" smtClean="0"/>
-              <a:t>-</a:t>
-            </a:r>
-            <a:r>
-              <a:rPr lang="de-DE" sz="2800" dirty="0"/>
-              <a:t>C </a:t>
-            </a:r>
-            <a:r>
-              <a:rPr lang="de-DE" sz="2800" dirty="0" smtClean="0"/>
-              <a:t>2.0 </a:t>
-            </a:r>
-            <a:r>
-              <a:rPr lang="de-DE" sz="2800" dirty="0"/>
-              <a:t>-L 0.001 -P 1.0E-12 -K </a:t>
+              <a:t> </a:t>
             </a:r>
             <a:r>
               <a:rPr lang="de-DE" sz="2800" dirty="0" err="1"/>
-              <a:t>PolyKernel</a:t>
+              <a:t>parameter</a:t>
             </a:r>
             <a:r>
               <a:rPr lang="de-DE" sz="2800" dirty="0"/>
               <a:t> </a:t>
             </a:r>
+            <a:endParaRPr lang="de-DE" sz="2800" dirty="0"/>
+          </a:p>
+          <a:p>
+            <a:pPr marL="0" indent="0">
+              <a:buNone/>
+            </a:pPr>
+            <a:endParaRPr lang="de-DE" sz="2800" dirty="0"/>
           </a:p>
           <a:p>
             <a:endParaRPr lang="en-US" sz="2800" dirty="0"/>
@@ -16146,7 +16839,7 @@
 </p:sld>
 </file>
 
-<file path=ppt/slides/slide16.xml><?xml version="1.0" encoding="utf-8"?>
+<file path=ppt/slides/slide19.xml><?xml version="1.0" encoding="utf-8"?>
 <p:sld xmlns:a="http://schemas.openxmlformats.org/drawingml/2006/main" xmlns:r="http://schemas.openxmlformats.org/officeDocument/2006/relationships" xmlns:p="http://schemas.openxmlformats.org/presentationml/2006/main">
   <p:cSld>
     <p:spTree>
@@ -16245,7 +16938,330 @@
 </p:sld>
 </file>
 
-<file path=ppt/slides/slide17.xml><?xml version="1.0" encoding="utf-8"?>
+<file path=ppt/slides/slide2.xml><?xml version="1.0" encoding="utf-8"?>
+<p:sld xmlns:a="http://schemas.openxmlformats.org/drawingml/2006/main" xmlns:r="http://schemas.openxmlformats.org/officeDocument/2006/relationships" xmlns:p="http://schemas.openxmlformats.org/presentationml/2006/main">
+  <p:cSld>
+    <p:spTree>
+      <p:nvGrpSpPr>
+        <p:cNvPr id="1" name=""/>
+        <p:cNvGrpSpPr/>
+        <p:nvPr/>
+      </p:nvGrpSpPr>
+      <p:grpSpPr>
+        <a:xfrm>
+          <a:off x="0" y="0"/>
+          <a:ext cx="0" cy="0"/>
+          <a:chOff x="0" y="0"/>
+          <a:chExt cx="0" cy="0"/>
+        </a:xfrm>
+      </p:grpSpPr>
+      <p:sp>
+        <p:nvSpPr>
+          <p:cNvPr id="2" name="Title 1"/>
+          <p:cNvSpPr>
+            <a:spLocks noGrp="1"/>
+          </p:cNvSpPr>
+          <p:nvPr>
+            <p:ph type="title"/>
+          </p:nvPr>
+        </p:nvSpPr>
+        <p:spPr/>
+        <p:txBody>
+          <a:bodyPr>
+            <a:normAutofit/>
+          </a:bodyPr>
+          <a:lstStyle/>
+          <a:p>
+            <a:r>
+              <a:rPr lang="en-US" sz="4400" dirty="0" smtClean="0"/>
+              <a:t>Problem Description</a:t>
+            </a:r>
+            <a:endParaRPr lang="en-US" sz="4400" dirty="0"/>
+          </a:p>
+        </p:txBody>
+      </p:sp>
+      <p:sp>
+        <p:nvSpPr>
+          <p:cNvPr id="3" name="Content Placeholder 2"/>
+          <p:cNvSpPr>
+            <a:spLocks noGrp="1"/>
+          </p:cNvSpPr>
+          <p:nvPr>
+            <p:ph idx="1"/>
+          </p:nvPr>
+        </p:nvSpPr>
+        <p:spPr/>
+        <p:txBody>
+          <a:bodyPr>
+            <a:normAutofit/>
+          </a:bodyPr>
+          <a:lstStyle/>
+          <a:p>
+            <a:r>
+              <a:rPr lang="en-US" sz="2800" dirty="0" smtClean="0"/>
+              <a:t>Classifying hand-written digits (0-9)</a:t>
+            </a:r>
+          </a:p>
+          <a:p>
+            <a:endParaRPr lang="en-US" sz="2800" dirty="0"/>
+          </a:p>
+          <a:p>
+            <a:r>
+              <a:rPr lang="en-US" sz="2800" dirty="0"/>
+              <a:t>C</a:t>
+            </a:r>
+            <a:r>
+              <a:rPr lang="en-US" sz="2800" dirty="0" smtClean="0"/>
+              <a:t>lassifying </a:t>
+            </a:r>
+            <a:r>
+              <a:rPr lang="en-US" sz="2800" dirty="0"/>
+              <a:t>black-and-white rectangular pixel </a:t>
+            </a:r>
+            <a:r>
+              <a:rPr lang="en-US" sz="2800" dirty="0" smtClean="0"/>
+              <a:t>displayed capital letters (A-Z)</a:t>
+            </a:r>
+          </a:p>
+          <a:p>
+            <a:endParaRPr lang="en-US" sz="2800" dirty="0"/>
+          </a:p>
+          <a:p>
+            <a:r>
+              <a:rPr lang="en-US" sz="2800" dirty="0" smtClean="0"/>
+              <a:t>Two datasets retrieved from UCI ML repository</a:t>
+            </a:r>
+            <a:endParaRPr lang="en-US" sz="2800" dirty="0"/>
+          </a:p>
+        </p:txBody>
+      </p:sp>
+    </p:spTree>
+    <p:extLst>
+      <p:ext uri="{BB962C8B-B14F-4D97-AF65-F5344CB8AC3E}">
+        <p14:creationId xmlns:p14="http://schemas.microsoft.com/office/powerpoint/2010/main" val="719885386"/>
+      </p:ext>
+    </p:extLst>
+  </p:cSld>
+  <p:clrMapOvr>
+    <a:masterClrMapping/>
+  </p:clrMapOvr>
+  <p:timing>
+    <p:tnLst>
+      <p:par>
+        <p:cTn id="1" dur="indefinite" restart="never" nodeType="tmRoot">
+          <p:childTnLst>
+            <p:seq concurrent="1" nextAc="seek">
+              <p:cTn id="2" dur="indefinite" nodeType="mainSeq">
+                <p:childTnLst>
+                  <p:par>
+                    <p:cTn id="3" fill="hold">
+                      <p:stCondLst>
+                        <p:cond delay="indefinite"/>
+                      </p:stCondLst>
+                      <p:childTnLst>
+                        <p:par>
+                          <p:cTn id="4" fill="hold">
+                            <p:stCondLst>
+                              <p:cond delay="0"/>
+                            </p:stCondLst>
+                            <p:childTnLst>
+                              <p:par>
+                                <p:cTn id="5" presetID="9" presetClass="entr" presetSubtype="0" fill="hold" nodeType="clickEffect">
+                                  <p:stCondLst>
+                                    <p:cond delay="0"/>
+                                  </p:stCondLst>
+                                  <p:childTnLst>
+                                    <p:set>
+                                      <p:cBhvr>
+                                        <p:cTn id="6" dur="1" fill="hold">
+                                          <p:stCondLst>
+                                            <p:cond delay="0"/>
+                                          </p:stCondLst>
+                                        </p:cTn>
+                                        <p:tgtEl>
+                                          <p:spTgt spid="3">
+                                            <p:txEl>
+                                              <p:pRg st="0" end="0"/>
+                                            </p:txEl>
+                                          </p:spTgt>
+                                        </p:tgtEl>
+                                        <p:attrNameLst>
+                                          <p:attrName>style.visibility</p:attrName>
+                                        </p:attrNameLst>
+                                      </p:cBhvr>
+                                      <p:to>
+                                        <p:strVal val="visible"/>
+                                      </p:to>
+                                    </p:set>
+                                    <p:animEffect transition="in" filter="dissolve">
+                                      <p:cBhvr>
+                                        <p:cTn id="7" dur="500"/>
+                                        <p:tgtEl>
+                                          <p:spTgt spid="3">
+                                            <p:txEl>
+                                              <p:pRg st="0" end="0"/>
+                                            </p:txEl>
+                                          </p:spTgt>
+                                        </p:tgtEl>
+                                      </p:cBhvr>
+                                    </p:animEffect>
+                                  </p:childTnLst>
+                                </p:cTn>
+                              </p:par>
+                            </p:childTnLst>
+                          </p:cTn>
+                        </p:par>
+                      </p:childTnLst>
+                    </p:cTn>
+                  </p:par>
+                  <p:par>
+                    <p:cTn id="8" fill="hold">
+                      <p:stCondLst>
+                        <p:cond delay="indefinite"/>
+                      </p:stCondLst>
+                      <p:childTnLst>
+                        <p:par>
+                          <p:cTn id="9" fill="hold">
+                            <p:stCondLst>
+                              <p:cond delay="0"/>
+                            </p:stCondLst>
+                            <p:childTnLst>
+                              <p:par>
+                                <p:cTn id="10" presetID="9" presetClass="entr" presetSubtype="0" fill="hold" nodeType="clickEffect">
+                                  <p:stCondLst>
+                                    <p:cond delay="0"/>
+                                  </p:stCondLst>
+                                  <p:childTnLst>
+                                    <p:set>
+                                      <p:cBhvr>
+                                        <p:cTn id="11" dur="1" fill="hold">
+                                          <p:stCondLst>
+                                            <p:cond delay="0"/>
+                                          </p:stCondLst>
+                                        </p:cTn>
+                                        <p:tgtEl>
+                                          <p:spTgt spid="3">
+                                            <p:txEl>
+                                              <p:pRg st="2" end="2"/>
+                                            </p:txEl>
+                                          </p:spTgt>
+                                        </p:tgtEl>
+                                        <p:attrNameLst>
+                                          <p:attrName>style.visibility</p:attrName>
+                                        </p:attrNameLst>
+                                      </p:cBhvr>
+                                      <p:to>
+                                        <p:strVal val="visible"/>
+                                      </p:to>
+                                    </p:set>
+                                    <p:animEffect transition="in" filter="dissolve">
+                                      <p:cBhvr>
+                                        <p:cTn id="12" dur="500"/>
+                                        <p:tgtEl>
+                                          <p:spTgt spid="3">
+                                            <p:txEl>
+                                              <p:pRg st="2" end="2"/>
+                                            </p:txEl>
+                                          </p:spTgt>
+                                        </p:tgtEl>
+                                      </p:cBhvr>
+                                    </p:animEffect>
+                                  </p:childTnLst>
+                                </p:cTn>
+                              </p:par>
+                            </p:childTnLst>
+                          </p:cTn>
+                        </p:par>
+                      </p:childTnLst>
+                    </p:cTn>
+                  </p:par>
+                  <p:par>
+                    <p:cTn id="13" fill="hold">
+                      <p:stCondLst>
+                        <p:cond delay="indefinite"/>
+                      </p:stCondLst>
+                      <p:childTnLst>
+                        <p:par>
+                          <p:cTn id="14" fill="hold">
+                            <p:stCondLst>
+                              <p:cond delay="0"/>
+                            </p:stCondLst>
+                            <p:childTnLst>
+                              <p:par>
+                                <p:cTn id="15" presetID="9" presetClass="entr" presetSubtype="0" fill="hold" nodeType="clickEffect">
+                                  <p:stCondLst>
+                                    <p:cond delay="0"/>
+                                  </p:stCondLst>
+                                  <p:childTnLst>
+                                    <p:set>
+                                      <p:cBhvr>
+                                        <p:cTn id="16" dur="1" fill="hold">
+                                          <p:stCondLst>
+                                            <p:cond delay="0"/>
+                                          </p:stCondLst>
+                                        </p:cTn>
+                                        <p:tgtEl>
+                                          <p:spTgt spid="3">
+                                            <p:txEl>
+                                              <p:pRg st="4" end="4"/>
+                                            </p:txEl>
+                                          </p:spTgt>
+                                        </p:tgtEl>
+                                        <p:attrNameLst>
+                                          <p:attrName>style.visibility</p:attrName>
+                                        </p:attrNameLst>
+                                      </p:cBhvr>
+                                      <p:to>
+                                        <p:strVal val="visible"/>
+                                      </p:to>
+                                    </p:set>
+                                    <p:animEffect transition="in" filter="dissolve">
+                                      <p:cBhvr>
+                                        <p:cTn id="17" dur="500"/>
+                                        <p:tgtEl>
+                                          <p:spTgt spid="3">
+                                            <p:txEl>
+                                              <p:pRg st="4" end="4"/>
+                                            </p:txEl>
+                                          </p:spTgt>
+                                        </p:tgtEl>
+                                      </p:cBhvr>
+                                    </p:animEffect>
+                                  </p:childTnLst>
+                                </p:cTn>
+                              </p:par>
+                            </p:childTnLst>
+                          </p:cTn>
+                        </p:par>
+                      </p:childTnLst>
+                    </p:cTn>
+                  </p:par>
+                </p:childTnLst>
+              </p:cTn>
+              <p:prevCondLst>
+                <p:cond evt="onPrev" delay="0">
+                  <p:tgtEl>
+                    <p:sldTgt/>
+                  </p:tgtEl>
+                </p:cond>
+              </p:prevCondLst>
+              <p:nextCondLst>
+                <p:cond evt="onNext" delay="0">
+                  <p:tgtEl>
+                    <p:sldTgt/>
+                  </p:tgtEl>
+                </p:cond>
+              </p:nextCondLst>
+            </p:seq>
+          </p:childTnLst>
+        </p:cTn>
+      </p:par>
+    </p:tnLst>
+  </p:timing>
+</p:sld>
+</file>
+
+<file path=ppt/slides/slide20.xml><?xml version="1.0" encoding="utf-8"?>
 <p:sld xmlns:a="http://schemas.openxmlformats.org/drawingml/2006/main" xmlns:r="http://schemas.openxmlformats.org/officeDocument/2006/relationships" xmlns:p="http://schemas.openxmlformats.org/presentationml/2006/main">
   <p:cSld>
     <p:spTree>
@@ -17002,7 +18018,7 @@
 </p:sld>
 </file>
 
-<file path=ppt/slides/slide18.xml><?xml version="1.0" encoding="utf-8"?>
+<file path=ppt/slides/slide21.xml><?xml version="1.0" encoding="utf-8"?>
 <p:sld xmlns:a="http://schemas.openxmlformats.org/drawingml/2006/main" xmlns:r="http://schemas.openxmlformats.org/officeDocument/2006/relationships" xmlns:p="http://schemas.openxmlformats.org/presentationml/2006/main">
   <p:cSld>
     <p:spTree>
@@ -17101,7 +18117,7 @@
 </p:sld>
 </file>
 
-<file path=ppt/slides/slide19.xml><?xml version="1.0" encoding="utf-8"?>
+<file path=ppt/slides/slide22.xml><?xml version="1.0" encoding="utf-8"?>
 <p:sld xmlns:a="http://schemas.openxmlformats.org/drawingml/2006/main" xmlns:r="http://schemas.openxmlformats.org/officeDocument/2006/relationships" xmlns:p="http://schemas.openxmlformats.org/presentationml/2006/main">
   <p:cSld>
     <p:spTree>
@@ -17294,7 +18310,6 @@
               <a:rPr lang="de-DE" sz="2800" dirty="0" smtClean="0"/>
               <a:t>, D = True</a:t>
             </a:r>
-            <a:endParaRPr lang="de-DE" sz="2800" dirty="0" smtClean="0"/>
           </a:p>
           <a:p>
             <a:endParaRPr lang="en-US" sz="2800" dirty="0"/>
@@ -17321,330 +18336,7 @@
 </p:sld>
 </file>
 
-<file path=ppt/slides/slide2.xml><?xml version="1.0" encoding="utf-8"?>
-<p:sld xmlns:a="http://schemas.openxmlformats.org/drawingml/2006/main" xmlns:r="http://schemas.openxmlformats.org/officeDocument/2006/relationships" xmlns:p="http://schemas.openxmlformats.org/presentationml/2006/main">
-  <p:cSld>
-    <p:spTree>
-      <p:nvGrpSpPr>
-        <p:cNvPr id="1" name=""/>
-        <p:cNvGrpSpPr/>
-        <p:nvPr/>
-      </p:nvGrpSpPr>
-      <p:grpSpPr>
-        <a:xfrm>
-          <a:off x="0" y="0"/>
-          <a:ext cx="0" cy="0"/>
-          <a:chOff x="0" y="0"/>
-          <a:chExt cx="0" cy="0"/>
-        </a:xfrm>
-      </p:grpSpPr>
-      <p:sp>
-        <p:nvSpPr>
-          <p:cNvPr id="2" name="Title 1"/>
-          <p:cNvSpPr>
-            <a:spLocks noGrp="1"/>
-          </p:cNvSpPr>
-          <p:nvPr>
-            <p:ph type="title"/>
-          </p:nvPr>
-        </p:nvSpPr>
-        <p:spPr/>
-        <p:txBody>
-          <a:bodyPr>
-            <a:normAutofit/>
-          </a:bodyPr>
-          <a:lstStyle/>
-          <a:p>
-            <a:r>
-              <a:rPr lang="en-US" sz="4400" dirty="0" smtClean="0"/>
-              <a:t>Problem Description</a:t>
-            </a:r>
-            <a:endParaRPr lang="en-US" sz="4400" dirty="0"/>
-          </a:p>
-        </p:txBody>
-      </p:sp>
-      <p:sp>
-        <p:nvSpPr>
-          <p:cNvPr id="3" name="Content Placeholder 2"/>
-          <p:cNvSpPr>
-            <a:spLocks noGrp="1"/>
-          </p:cNvSpPr>
-          <p:nvPr>
-            <p:ph idx="1"/>
-          </p:nvPr>
-        </p:nvSpPr>
-        <p:spPr/>
-        <p:txBody>
-          <a:bodyPr>
-            <a:normAutofit/>
-          </a:bodyPr>
-          <a:lstStyle/>
-          <a:p>
-            <a:r>
-              <a:rPr lang="en-US" sz="2800" dirty="0" smtClean="0"/>
-              <a:t>Classifying hand-written digits (0-9)</a:t>
-            </a:r>
-          </a:p>
-          <a:p>
-            <a:endParaRPr lang="en-US" sz="2800" dirty="0"/>
-          </a:p>
-          <a:p>
-            <a:r>
-              <a:rPr lang="en-US" sz="2800" dirty="0"/>
-              <a:t>C</a:t>
-            </a:r>
-            <a:r>
-              <a:rPr lang="en-US" sz="2800" dirty="0" smtClean="0"/>
-              <a:t>lassifying </a:t>
-            </a:r>
-            <a:r>
-              <a:rPr lang="en-US" sz="2800" dirty="0"/>
-              <a:t>black-and-white rectangular pixel </a:t>
-            </a:r>
-            <a:r>
-              <a:rPr lang="en-US" sz="2800" dirty="0" smtClean="0"/>
-              <a:t>displayed capital letters (A-Z)</a:t>
-            </a:r>
-          </a:p>
-          <a:p>
-            <a:endParaRPr lang="en-US" sz="2800" dirty="0"/>
-          </a:p>
-          <a:p>
-            <a:r>
-              <a:rPr lang="en-US" sz="2800" dirty="0" smtClean="0"/>
-              <a:t>Two datasets retrieved from UCI ML repository</a:t>
-            </a:r>
-            <a:endParaRPr lang="en-US" sz="2800" dirty="0"/>
-          </a:p>
-        </p:txBody>
-      </p:sp>
-    </p:spTree>
-    <p:extLst>
-      <p:ext uri="{BB962C8B-B14F-4D97-AF65-F5344CB8AC3E}">
-        <p14:creationId xmlns:p14="http://schemas.microsoft.com/office/powerpoint/2010/main" val="719885386"/>
-      </p:ext>
-    </p:extLst>
-  </p:cSld>
-  <p:clrMapOvr>
-    <a:masterClrMapping/>
-  </p:clrMapOvr>
-  <p:timing>
-    <p:tnLst>
-      <p:par>
-        <p:cTn id="1" dur="indefinite" restart="never" nodeType="tmRoot">
-          <p:childTnLst>
-            <p:seq concurrent="1" nextAc="seek">
-              <p:cTn id="2" dur="indefinite" nodeType="mainSeq">
-                <p:childTnLst>
-                  <p:par>
-                    <p:cTn id="3" fill="hold">
-                      <p:stCondLst>
-                        <p:cond delay="indefinite"/>
-                      </p:stCondLst>
-                      <p:childTnLst>
-                        <p:par>
-                          <p:cTn id="4" fill="hold">
-                            <p:stCondLst>
-                              <p:cond delay="0"/>
-                            </p:stCondLst>
-                            <p:childTnLst>
-                              <p:par>
-                                <p:cTn id="5" presetID="9" presetClass="entr" presetSubtype="0" fill="hold" nodeType="clickEffect">
-                                  <p:stCondLst>
-                                    <p:cond delay="0"/>
-                                  </p:stCondLst>
-                                  <p:childTnLst>
-                                    <p:set>
-                                      <p:cBhvr>
-                                        <p:cTn id="6" dur="1" fill="hold">
-                                          <p:stCondLst>
-                                            <p:cond delay="0"/>
-                                          </p:stCondLst>
-                                        </p:cTn>
-                                        <p:tgtEl>
-                                          <p:spTgt spid="3">
-                                            <p:txEl>
-                                              <p:pRg st="0" end="0"/>
-                                            </p:txEl>
-                                          </p:spTgt>
-                                        </p:tgtEl>
-                                        <p:attrNameLst>
-                                          <p:attrName>style.visibility</p:attrName>
-                                        </p:attrNameLst>
-                                      </p:cBhvr>
-                                      <p:to>
-                                        <p:strVal val="visible"/>
-                                      </p:to>
-                                    </p:set>
-                                    <p:animEffect transition="in" filter="dissolve">
-                                      <p:cBhvr>
-                                        <p:cTn id="7" dur="500"/>
-                                        <p:tgtEl>
-                                          <p:spTgt spid="3">
-                                            <p:txEl>
-                                              <p:pRg st="0" end="0"/>
-                                            </p:txEl>
-                                          </p:spTgt>
-                                        </p:tgtEl>
-                                      </p:cBhvr>
-                                    </p:animEffect>
-                                  </p:childTnLst>
-                                </p:cTn>
-                              </p:par>
-                            </p:childTnLst>
-                          </p:cTn>
-                        </p:par>
-                      </p:childTnLst>
-                    </p:cTn>
-                  </p:par>
-                  <p:par>
-                    <p:cTn id="8" fill="hold">
-                      <p:stCondLst>
-                        <p:cond delay="indefinite"/>
-                      </p:stCondLst>
-                      <p:childTnLst>
-                        <p:par>
-                          <p:cTn id="9" fill="hold">
-                            <p:stCondLst>
-                              <p:cond delay="0"/>
-                            </p:stCondLst>
-                            <p:childTnLst>
-                              <p:par>
-                                <p:cTn id="10" presetID="9" presetClass="entr" presetSubtype="0" fill="hold" nodeType="clickEffect">
-                                  <p:stCondLst>
-                                    <p:cond delay="0"/>
-                                  </p:stCondLst>
-                                  <p:childTnLst>
-                                    <p:set>
-                                      <p:cBhvr>
-                                        <p:cTn id="11" dur="1" fill="hold">
-                                          <p:stCondLst>
-                                            <p:cond delay="0"/>
-                                          </p:stCondLst>
-                                        </p:cTn>
-                                        <p:tgtEl>
-                                          <p:spTgt spid="3">
-                                            <p:txEl>
-                                              <p:pRg st="2" end="2"/>
-                                            </p:txEl>
-                                          </p:spTgt>
-                                        </p:tgtEl>
-                                        <p:attrNameLst>
-                                          <p:attrName>style.visibility</p:attrName>
-                                        </p:attrNameLst>
-                                      </p:cBhvr>
-                                      <p:to>
-                                        <p:strVal val="visible"/>
-                                      </p:to>
-                                    </p:set>
-                                    <p:animEffect transition="in" filter="dissolve">
-                                      <p:cBhvr>
-                                        <p:cTn id="12" dur="500"/>
-                                        <p:tgtEl>
-                                          <p:spTgt spid="3">
-                                            <p:txEl>
-                                              <p:pRg st="2" end="2"/>
-                                            </p:txEl>
-                                          </p:spTgt>
-                                        </p:tgtEl>
-                                      </p:cBhvr>
-                                    </p:animEffect>
-                                  </p:childTnLst>
-                                </p:cTn>
-                              </p:par>
-                            </p:childTnLst>
-                          </p:cTn>
-                        </p:par>
-                      </p:childTnLst>
-                    </p:cTn>
-                  </p:par>
-                  <p:par>
-                    <p:cTn id="13" fill="hold">
-                      <p:stCondLst>
-                        <p:cond delay="indefinite"/>
-                      </p:stCondLst>
-                      <p:childTnLst>
-                        <p:par>
-                          <p:cTn id="14" fill="hold">
-                            <p:stCondLst>
-                              <p:cond delay="0"/>
-                            </p:stCondLst>
-                            <p:childTnLst>
-                              <p:par>
-                                <p:cTn id="15" presetID="9" presetClass="entr" presetSubtype="0" fill="hold" nodeType="clickEffect">
-                                  <p:stCondLst>
-                                    <p:cond delay="0"/>
-                                  </p:stCondLst>
-                                  <p:childTnLst>
-                                    <p:set>
-                                      <p:cBhvr>
-                                        <p:cTn id="16" dur="1" fill="hold">
-                                          <p:stCondLst>
-                                            <p:cond delay="0"/>
-                                          </p:stCondLst>
-                                        </p:cTn>
-                                        <p:tgtEl>
-                                          <p:spTgt spid="3">
-                                            <p:txEl>
-                                              <p:pRg st="4" end="4"/>
-                                            </p:txEl>
-                                          </p:spTgt>
-                                        </p:tgtEl>
-                                        <p:attrNameLst>
-                                          <p:attrName>style.visibility</p:attrName>
-                                        </p:attrNameLst>
-                                      </p:cBhvr>
-                                      <p:to>
-                                        <p:strVal val="visible"/>
-                                      </p:to>
-                                    </p:set>
-                                    <p:animEffect transition="in" filter="dissolve">
-                                      <p:cBhvr>
-                                        <p:cTn id="17" dur="500"/>
-                                        <p:tgtEl>
-                                          <p:spTgt spid="3">
-                                            <p:txEl>
-                                              <p:pRg st="4" end="4"/>
-                                            </p:txEl>
-                                          </p:spTgt>
-                                        </p:tgtEl>
-                                      </p:cBhvr>
-                                    </p:animEffect>
-                                  </p:childTnLst>
-                                </p:cTn>
-                              </p:par>
-                            </p:childTnLst>
-                          </p:cTn>
-                        </p:par>
-                      </p:childTnLst>
-                    </p:cTn>
-                  </p:par>
-                </p:childTnLst>
-              </p:cTn>
-              <p:prevCondLst>
-                <p:cond evt="onPrev" delay="0">
-                  <p:tgtEl>
-                    <p:sldTgt/>
-                  </p:tgtEl>
-                </p:cond>
-              </p:prevCondLst>
-              <p:nextCondLst>
-                <p:cond evt="onNext" delay="0">
-                  <p:tgtEl>
-                    <p:sldTgt/>
-                  </p:tgtEl>
-                </p:cond>
-              </p:nextCondLst>
-            </p:seq>
-          </p:childTnLst>
-        </p:cTn>
-      </p:par>
-    </p:tnLst>
-  </p:timing>
-</p:sld>
-</file>
-
-<file path=ppt/slides/slide20.xml><?xml version="1.0" encoding="utf-8"?>
+<file path=ppt/slides/slide23.xml><?xml version="1.0" encoding="utf-8"?>
 <p:sld xmlns:a="http://schemas.openxmlformats.org/drawingml/2006/main" xmlns:r="http://schemas.openxmlformats.org/officeDocument/2006/relationships" xmlns:p="http://schemas.openxmlformats.org/presentationml/2006/main">
   <p:cSld>
     <p:spTree>
@@ -17743,7 +18435,7 @@
 </p:sld>
 </file>
 
-<file path=ppt/slides/slide21.xml><?xml version="1.0" encoding="utf-8"?>
+<file path=ppt/slides/slide24.xml><?xml version="1.0" encoding="utf-8"?>
 <p:sld xmlns:a="http://schemas.openxmlformats.org/drawingml/2006/main" xmlns:r="http://schemas.openxmlformats.org/officeDocument/2006/relationships" xmlns:p="http://schemas.openxmlformats.org/presentationml/2006/main">
   <p:cSld>
     <p:spTree>
@@ -18334,7 +19026,7 @@
 </p:sld>
 </file>
 
-<file path=ppt/slides/slide22.xml><?xml version="1.0" encoding="utf-8"?>
+<file path=ppt/slides/slide25.xml><?xml version="1.0" encoding="utf-8"?>
 <p:sld xmlns:a="http://schemas.openxmlformats.org/drawingml/2006/main" xmlns:r="http://schemas.openxmlformats.org/officeDocument/2006/relationships" xmlns:p="http://schemas.openxmlformats.org/presentationml/2006/main">
   <p:cSld>
     <p:spTree>
@@ -20391,7 +21083,7 @@
         </p:spPr>
         <p:txBody>
           <a:bodyPr>
-            <a:normAutofit lnSpcReduction="10000"/>
+            <a:normAutofit/>
           </a:bodyPr>
           <a:lstStyle/>
           <a:p>
@@ -20404,22 +21096,26 @@
             <a:pPr lvl="1"/>
             <a:r>
               <a:rPr lang="en-US" sz="2600" dirty="0" smtClean="0"/>
-              <a:t>Zero-one Loss for the classification problems</a:t>
+              <a:t>Zero-one Loss for </a:t>
+            </a:r>
+            <a:r>
+              <a:rPr lang="en-US" sz="2600" dirty="0" smtClean="0"/>
+              <a:t>our classification </a:t>
+            </a:r>
+            <a:r>
+              <a:rPr lang="en-US" sz="2600" dirty="0" smtClean="0"/>
+              <a:t>problems</a:t>
             </a:r>
             <a:endParaRPr lang="en-US" sz="2600" dirty="0"/>
           </a:p>
           <a:p>
             <a:r>
               <a:rPr lang="en-US" sz="2800" dirty="0" smtClean="0"/>
-              <a:t>Choose hypothesis classes </a:t>
-            </a:r>
-            <a:r>
-              <a:rPr lang="en-US" sz="2800" dirty="0" err="1" smtClean="0"/>
-              <a:t>H</a:t>
-            </a:r>
-            <a:r>
-              <a:rPr lang="en-US" sz="2800" baseline="-25000" dirty="0" err="1" smtClean="0"/>
-              <a:t>n</a:t>
+              <a:t>Choose </a:t>
+            </a:r>
+            <a:r>
+              <a:rPr lang="en-US" sz="2800" dirty="0" smtClean="0"/>
+              <a:t>Classifiers</a:t>
             </a:r>
             <a:endParaRPr lang="en-US" sz="2800" dirty="0" smtClean="0"/>
           </a:p>
@@ -20427,18 +21123,16 @@
             <a:pPr lvl="1"/>
             <a:r>
               <a:rPr lang="en-US" sz="2400" dirty="0" smtClean="0"/>
-              <a:t>Naïve Bayes</a:t>
-            </a:r>
-          </a:p>
-          <a:p>
-            <a:pPr lvl="1"/>
+              <a:t>Naïve </a:t>
+            </a:r>
             <a:r>
               <a:rPr lang="en-US" sz="2400" dirty="0" smtClean="0"/>
-              <a:t>SVM</a:t>
-            </a:r>
-          </a:p>
-          <a:p>
-            <a:pPr lvl="1"/>
+              <a:t>Bayes, SVM</a:t>
+            </a:r>
+            <a:r>
+              <a:rPr lang="en-US" sz="2400" dirty="0" smtClean="0"/>
+              <a:t>, </a:t>
+            </a:r>
             <a:r>
               <a:rPr lang="en-US" sz="2400" dirty="0" smtClean="0"/>
               <a:t>Multi-layer </a:t>
@@ -20447,20 +21141,19 @@
               <a:rPr lang="en-US" sz="2400" dirty="0" smtClean="0"/>
               <a:t>Perceptron</a:t>
             </a:r>
-            <a:endParaRPr lang="en-US" sz="2400" dirty="0" smtClean="0"/>
           </a:p>
           <a:p>
             <a:r>
               <a:rPr lang="en-US" sz="2800" dirty="0" smtClean="0"/>
-              <a:t>For each H</a:t>
-            </a:r>
-            <a:r>
-              <a:rPr lang="en-US" sz="2800" baseline="-25000" dirty="0" smtClean="0"/>
-              <a:t>i</a:t>
+              <a:t>For each </a:t>
             </a:r>
             <a:r>
               <a:rPr lang="en-US" sz="2800" dirty="0" smtClean="0"/>
-              <a:t>, find f which </a:t>
+              <a:t>classifier, </a:t>
+            </a:r>
+            <a:r>
+              <a:rPr lang="en-US" sz="2800" dirty="0" smtClean="0"/>
+              <a:t>find f which </a:t>
             </a:r>
             <a:r>
               <a:rPr lang="en-US" sz="2800" dirty="0"/>
@@ -20474,15 +21167,11 @@
           <a:p>
             <a:r>
               <a:rPr lang="en-US" sz="2800" dirty="0" smtClean="0"/>
-              <a:t>Choose H</a:t>
-            </a:r>
-            <a:r>
-              <a:rPr lang="en-US" sz="2800" baseline="-25000" dirty="0" smtClean="0"/>
-              <a:t>i</a:t>
-            </a:r>
-            <a:r>
-              <a:rPr lang="en-US" sz="2800" dirty="0" smtClean="0"/>
-              <a:t> </a:t>
+              <a:t>Choose </a:t>
+            </a:r>
+            <a:r>
+              <a:rPr lang="en-US" sz="2800" dirty="0"/>
+              <a:t>classifier </a:t>
             </a:r>
             <a:r>
               <a:rPr lang="en-US" sz="2800" dirty="0"/>
@@ -20548,7 +21237,7 @@
           <a:p>
             <a:r>
               <a:rPr lang="en-US" sz="4400" dirty="0" smtClean="0"/>
-              <a:t>Classifiers</a:t>
+              <a:t>Classifier Tuning</a:t>
             </a:r>
             <a:endParaRPr lang="en-US" sz="4400" dirty="0"/>
           </a:p>
@@ -20572,14 +21261,114 @@
           <a:lstStyle/>
           <a:p>
             <a:r>
+              <a:rPr lang="en-US" sz="2800" b="1" dirty="0" smtClean="0"/>
+              <a:t>Naïve </a:t>
+            </a:r>
+            <a:r>
+              <a:rPr lang="en-US" sz="2800" b="1" dirty="0" smtClean="0"/>
+              <a:t>Bayes</a:t>
+            </a:r>
+          </a:p>
+          <a:p>
+            <a:pPr lvl="1"/>
+            <a:r>
+              <a:rPr lang="de-DE" sz="2800" dirty="0"/>
+              <a:t>K: </a:t>
+            </a:r>
+            <a:r>
+              <a:rPr lang="de-DE" sz="2800" dirty="0" err="1"/>
+              <a:t>whether</a:t>
+            </a:r>
+            <a:r>
+              <a:rPr lang="de-DE" sz="2800" dirty="0"/>
+              <a:t> </a:t>
+            </a:r>
+            <a:r>
+              <a:rPr lang="de-DE" sz="2800" dirty="0" err="1"/>
+              <a:t>to</a:t>
+            </a:r>
+            <a:r>
+              <a:rPr lang="de-DE" sz="2800" dirty="0"/>
+              <a:t> </a:t>
+            </a:r>
+            <a:r>
+              <a:rPr lang="de-DE" sz="2800" dirty="0" err="1"/>
+              <a:t>use</a:t>
+            </a:r>
+            <a:r>
+              <a:rPr lang="de-DE" sz="2800" dirty="0"/>
+              <a:t> </a:t>
+            </a:r>
+            <a:r>
+              <a:rPr lang="de-DE" sz="2800" dirty="0" err="1"/>
+              <a:t>kernel</a:t>
+            </a:r>
+            <a:r>
+              <a:rPr lang="de-DE" sz="2800" dirty="0"/>
+              <a:t> </a:t>
+            </a:r>
+            <a:r>
+              <a:rPr lang="de-DE" sz="2800" dirty="0" err="1" smtClean="0"/>
+              <a:t>estimator</a:t>
+            </a:r>
+            <a:endParaRPr lang="de-DE" sz="2800" dirty="0" smtClean="0"/>
+          </a:p>
+          <a:p>
+            <a:pPr lvl="1"/>
+            <a:r>
+              <a:rPr lang="de-DE" sz="2800" dirty="0"/>
+              <a:t>D: </a:t>
+            </a:r>
+            <a:r>
+              <a:rPr lang="de-DE" sz="2800" dirty="0" err="1"/>
+              <a:t>whether</a:t>
+            </a:r>
+            <a:r>
+              <a:rPr lang="de-DE" sz="2800" dirty="0"/>
+              <a:t> </a:t>
+            </a:r>
+            <a:r>
+              <a:rPr lang="de-DE" sz="2800" dirty="0" err="1"/>
+              <a:t>to</a:t>
+            </a:r>
+            <a:r>
+              <a:rPr lang="de-DE" sz="2800" dirty="0"/>
+              <a:t> </a:t>
+            </a:r>
+            <a:r>
+              <a:rPr lang="de-DE" sz="2800" dirty="0" err="1"/>
+              <a:t>use</a:t>
+            </a:r>
+            <a:r>
+              <a:rPr lang="de-DE" sz="2800" dirty="0"/>
+              <a:t> </a:t>
+            </a:r>
+            <a:r>
+              <a:rPr lang="de-DE" sz="2800" dirty="0" err="1"/>
+              <a:t>supervised</a:t>
+            </a:r>
+            <a:r>
+              <a:rPr lang="de-DE" sz="2800" dirty="0"/>
+              <a:t> </a:t>
+            </a:r>
+            <a:r>
+              <a:rPr lang="de-DE" sz="2800" dirty="0" err="1"/>
+              <a:t>discretization</a:t>
+            </a:r>
+            <a:endParaRPr lang="de-DE" sz="2800" dirty="0"/>
+          </a:p>
+          <a:p>
+            <a:r>
               <a:rPr lang="en-US" sz="2800" dirty="0" smtClean="0"/>
-              <a:t>Naïve Bayes</a:t>
-            </a:r>
-          </a:p>
-          <a:p>
+              <a:t>Support </a:t>
+            </a:r>
             <a:r>
               <a:rPr lang="en-US" sz="2800" dirty="0" smtClean="0"/>
-              <a:t>Support Vector Machine</a:t>
+              <a:t>Vector </a:t>
+            </a:r>
+            <a:r>
+              <a:rPr lang="en-US" sz="2800" dirty="0" smtClean="0"/>
+              <a:t>Machine</a:t>
             </a:r>
           </a:p>
           <a:p>
@@ -20634,50 +21423,109 @@
       </p:grpSpPr>
       <p:sp>
         <p:nvSpPr>
-          <p:cNvPr id="4" name="Title 3"/>
+          <p:cNvPr id="2" name="Title 1"/>
           <p:cNvSpPr>
             <a:spLocks noGrp="1"/>
           </p:cNvSpPr>
           <p:nvPr>
-            <p:ph type="ctrTitle"/>
+            <p:ph type="title"/>
           </p:nvPr>
         </p:nvSpPr>
         <p:spPr/>
         <p:txBody>
-          <a:bodyPr/>
+          <a:bodyPr>
+            <a:normAutofit/>
+          </a:bodyPr>
           <a:lstStyle/>
           <a:p>
             <a:r>
-              <a:rPr lang="en-US" dirty="0" smtClean="0"/>
-              <a:t>Test result analysis</a:t>
-            </a:r>
-            <a:endParaRPr lang="en-US" dirty="0"/>
+              <a:rPr lang="en-US" sz="4400" dirty="0" smtClean="0"/>
+              <a:t>Classifier Tuning</a:t>
+            </a:r>
+            <a:endParaRPr lang="en-US" sz="4400" dirty="0"/>
           </a:p>
         </p:txBody>
       </p:sp>
       <p:sp>
         <p:nvSpPr>
-          <p:cNvPr id="5" name="Subtitle 4"/>
+          <p:cNvPr id="3" name="Content Placeholder 2"/>
           <p:cNvSpPr>
             <a:spLocks noGrp="1"/>
           </p:cNvSpPr>
           <p:nvPr>
-            <p:ph type="subTitle" idx="1"/>
+            <p:ph idx="1"/>
           </p:nvPr>
         </p:nvSpPr>
         <p:spPr/>
         <p:txBody>
-          <a:bodyPr/>
+          <a:bodyPr>
+            <a:normAutofit fontScale="92500" lnSpcReduction="10000"/>
+          </a:bodyPr>
           <a:lstStyle/>
           <a:p>
-            <a:endParaRPr lang="en-US"/>
+            <a:r>
+              <a:rPr lang="en-US" sz="2800" dirty="0" smtClean="0"/>
+              <a:t>Naïve Bayes</a:t>
+            </a:r>
+          </a:p>
+          <a:p>
+            <a:r>
+              <a:rPr lang="en-US" sz="2800" b="1" dirty="0" smtClean="0"/>
+              <a:t>Support Vector </a:t>
+            </a:r>
+            <a:r>
+              <a:rPr lang="en-US" sz="2800" b="1" dirty="0" smtClean="0"/>
+              <a:t>Machine</a:t>
+            </a:r>
+          </a:p>
+          <a:p>
+            <a:pPr lvl="1"/>
+            <a:r>
+              <a:rPr lang="en-US" sz="2600" dirty="0" smtClean="0"/>
+              <a:t>Complexity Parameter C</a:t>
+            </a:r>
+          </a:p>
+          <a:p>
+            <a:pPr lvl="1"/>
+            <a:r>
+              <a:rPr lang="en-US" sz="2600" dirty="0"/>
+              <a:t>The C parameter </a:t>
+            </a:r>
+            <a:r>
+              <a:rPr lang="en-US" sz="2600" dirty="0" smtClean="0"/>
+              <a:t>tells SVM optimization how much misclassification should be avoided in training.</a:t>
+            </a:r>
+            <a:endParaRPr lang="en-US" sz="2600" dirty="0"/>
+          </a:p>
+          <a:p>
+            <a:pPr lvl="1"/>
+            <a:r>
+              <a:rPr lang="en-US" sz="2600" dirty="0" smtClean="0"/>
+              <a:t>For large values of C, optimization tends to choose a smaller-margin </a:t>
+            </a:r>
+            <a:r>
+              <a:rPr lang="en-US" sz="2600" dirty="0" err="1" smtClean="0"/>
+              <a:t>hyperplain</a:t>
+            </a:r>
+            <a:r>
+              <a:rPr lang="en-US" sz="2600" dirty="0" smtClean="0"/>
+              <a:t> if it does a better job in classifying training data.</a:t>
+            </a:r>
+            <a:endParaRPr lang="en-US" sz="2600" dirty="0" smtClean="0"/>
+          </a:p>
+          <a:p>
+            <a:r>
+              <a:rPr lang="en-US" sz="2800" dirty="0" smtClean="0"/>
+              <a:t>Multi-layer Perceptron</a:t>
+            </a:r>
+            <a:endParaRPr lang="en-US" sz="2800" dirty="0"/>
           </a:p>
         </p:txBody>
       </p:sp>
     </p:spTree>
     <p:extLst>
       <p:ext uri="{BB962C8B-B14F-4D97-AF65-F5344CB8AC3E}">
-        <p14:creationId xmlns:p14="http://schemas.microsoft.com/office/powerpoint/2010/main" val="292218004"/>
+        <p14:creationId xmlns:p14="http://schemas.microsoft.com/office/powerpoint/2010/main" val="1323524370"/>
       </p:ext>
     </p:extLst>
   </p:cSld>

</xml_diff>

<commit_message>
added conclusion in report; fixed all ann figures
</commit_message>
<xml_diff>
--- a/PPTGroup10.pptx
+++ b/PPTGroup10.pptx
@@ -349,11 +349,11 @@
         </c:dLbls>
         <c:gapWidth val="219"/>
         <c:overlap val="-27"/>
-        <c:axId val="2140893856"/>
-        <c:axId val="2140898944"/>
+        <c:axId val="1467638448"/>
+        <c:axId val="1467640496"/>
       </c:barChart>
       <c:catAx>
-        <c:axId val="2140893856"/>
+        <c:axId val="1467638448"/>
         <c:scaling>
           <c:orientation val="minMax"/>
         </c:scaling>
@@ -396,7 +396,7 @@
             <a:endParaRPr lang="en-US"/>
           </a:p>
         </c:txPr>
-        <c:crossAx val="2140898944"/>
+        <c:crossAx val="1467640496"/>
         <c:crosses val="autoZero"/>
         <c:auto val="1"/>
         <c:lblAlgn val="ctr"/>
@@ -404,7 +404,7 @@
         <c:noMultiLvlLbl val="0"/>
       </c:catAx>
       <c:valAx>
-        <c:axId val="2140898944"/>
+        <c:axId val="1467640496"/>
         <c:scaling>
           <c:orientation val="minMax"/>
           <c:max val="100.0"/>
@@ -457,7 +457,7 @@
             <a:endParaRPr lang="en-US"/>
           </a:p>
         </c:txPr>
-        <c:crossAx val="2140893856"/>
+        <c:crossAx val="1467638448"/>
         <c:crosses val="autoZero"/>
         <c:crossBetween val="between"/>
         <c:majorUnit val="10.0"/>
@@ -745,11 +745,11 @@
         </c:dLbls>
         <c:gapWidth val="219"/>
         <c:overlap val="-27"/>
-        <c:axId val="-2146250832"/>
-        <c:axId val="2146103984"/>
+        <c:axId val="1494253040"/>
+        <c:axId val="1494255088"/>
       </c:barChart>
       <c:catAx>
-        <c:axId val="-2146250832"/>
+        <c:axId val="1494253040"/>
         <c:scaling>
           <c:orientation val="minMax"/>
         </c:scaling>
@@ -792,7 +792,7 @@
             <a:endParaRPr lang="en-US"/>
           </a:p>
         </c:txPr>
-        <c:crossAx val="2146103984"/>
+        <c:crossAx val="1494255088"/>
         <c:crosses val="autoZero"/>
         <c:auto val="1"/>
         <c:lblAlgn val="ctr"/>
@@ -800,7 +800,7 @@
         <c:noMultiLvlLbl val="0"/>
       </c:catAx>
       <c:valAx>
-        <c:axId val="2146103984"/>
+        <c:axId val="1494255088"/>
         <c:scaling>
           <c:orientation val="minMax"/>
           <c:max val="100.0"/>
@@ -853,7 +853,7 @@
             <a:endParaRPr lang="en-US"/>
           </a:p>
         </c:txPr>
-        <c:crossAx val="-2146250832"/>
+        <c:crossAx val="1494253040"/>
         <c:crosses val="autoZero"/>
         <c:crossBetween val="between"/>
         <c:majorUnit val="10.0"/>
@@ -965,7 +965,6 @@
           </a:p>
         </c:rich>
       </c:tx>
-      <c:layout/>
       <c:overlay val="0"/>
       <c:spPr>
         <a:noFill/>
@@ -1144,11 +1143,11 @@
         </c:dLbls>
         <c:gapWidth val="219"/>
         <c:overlap val="-27"/>
-        <c:axId val="2146210432"/>
-        <c:axId val="2146213808"/>
+        <c:axId val="1380876016"/>
+        <c:axId val="1380870800"/>
       </c:barChart>
       <c:catAx>
-        <c:axId val="2146210432"/>
+        <c:axId val="1380876016"/>
         <c:scaling>
           <c:orientation val="minMax"/>
         </c:scaling>
@@ -1191,7 +1190,7 @@
             <a:endParaRPr lang="en-US"/>
           </a:p>
         </c:txPr>
-        <c:crossAx val="2146213808"/>
+        <c:crossAx val="1380870800"/>
         <c:crosses val="autoZero"/>
         <c:auto val="1"/>
         <c:lblAlgn val="ctr"/>
@@ -1199,7 +1198,7 @@
         <c:noMultiLvlLbl val="0"/>
       </c:catAx>
       <c:valAx>
-        <c:axId val="2146213808"/>
+        <c:axId val="1380870800"/>
         <c:scaling>
           <c:orientation val="minMax"/>
           <c:max val="100.0"/>
@@ -1252,7 +1251,7 @@
             <a:endParaRPr lang="en-US"/>
           </a:p>
         </c:txPr>
-        <c:crossAx val="2146210432"/>
+        <c:crossAx val="1380876016"/>
         <c:crosses val="autoZero"/>
         <c:crossBetween val="between"/>
         <c:majorUnit val="20.0"/>
@@ -1267,7 +1266,6 @@
     </c:plotArea>
     <c:legend>
       <c:legendPos val="b"/>
-      <c:layout/>
       <c:overlay val="0"/>
       <c:spPr>
         <a:noFill/>
@@ -1381,7 +1379,6 @@
           </a:p>
         </c:rich>
       </c:tx>
-      <c:layout/>
       <c:overlay val="0"/>
       <c:spPr>
         <a:noFill/>
@@ -1560,11 +1557,11 @@
         </c:dLbls>
         <c:gapWidth val="219"/>
         <c:overlap val="-27"/>
-        <c:axId val="-2146226016"/>
-        <c:axId val="-2146222784"/>
+        <c:axId val="1467113856"/>
+        <c:axId val="1467078688"/>
       </c:barChart>
       <c:catAx>
-        <c:axId val="-2146226016"/>
+        <c:axId val="1467113856"/>
         <c:scaling>
           <c:orientation val="minMax"/>
         </c:scaling>
@@ -1607,7 +1604,7 @@
             <a:endParaRPr lang="en-US"/>
           </a:p>
         </c:txPr>
-        <c:crossAx val="-2146222784"/>
+        <c:crossAx val="1467078688"/>
         <c:crosses val="autoZero"/>
         <c:auto val="1"/>
         <c:lblAlgn val="ctr"/>
@@ -1615,7 +1612,7 @@
         <c:noMultiLvlLbl val="0"/>
       </c:catAx>
       <c:valAx>
-        <c:axId val="-2146222784"/>
+        <c:axId val="1467078688"/>
         <c:scaling>
           <c:orientation val="minMax"/>
           <c:max val="100.0"/>
@@ -1668,7 +1665,7 @@
             <a:endParaRPr lang="en-US"/>
           </a:p>
         </c:txPr>
-        <c:crossAx val="-2146226016"/>
+        <c:crossAx val="1467113856"/>
         <c:crosses val="autoZero"/>
         <c:crossBetween val="between"/>
         <c:majorUnit val="20.0"/>
@@ -1683,7 +1680,6 @@
     </c:plotArea>
     <c:legend>
       <c:legendPos val="b"/>
-      <c:layout/>
       <c:overlay val="0"/>
       <c:spPr>
         <a:noFill/>
@@ -1780,7 +1776,6 @@
           </a:p>
         </c:rich>
       </c:tx>
-      <c:layout/>
       <c:overlay val="0"/>
       <c:spPr>
         <a:noFill/>
@@ -1959,11 +1954,11 @@
         </c:dLbls>
         <c:gapWidth val="219"/>
         <c:overlap val="-27"/>
-        <c:axId val="2147360544"/>
-        <c:axId val="2147363920"/>
+        <c:axId val="1467958976"/>
+        <c:axId val="1467482416"/>
       </c:barChart>
       <c:catAx>
-        <c:axId val="2147360544"/>
+        <c:axId val="1467958976"/>
         <c:scaling>
           <c:orientation val="minMax"/>
         </c:scaling>
@@ -2006,7 +2001,7 @@
             <a:endParaRPr lang="en-US"/>
           </a:p>
         </c:txPr>
-        <c:crossAx val="2147363920"/>
+        <c:crossAx val="1467482416"/>
         <c:crosses val="autoZero"/>
         <c:auto val="1"/>
         <c:lblAlgn val="ctr"/>
@@ -2014,7 +2009,7 @@
         <c:noMultiLvlLbl val="0"/>
       </c:catAx>
       <c:valAx>
-        <c:axId val="2147363920"/>
+        <c:axId val="1467482416"/>
         <c:scaling>
           <c:orientation val="minMax"/>
           <c:min val="0.0"/>
@@ -2066,7 +2061,7 @@
             <a:endParaRPr lang="en-US"/>
           </a:p>
         </c:txPr>
-        <c:crossAx val="2147360544"/>
+        <c:crossAx val="1467958976"/>
         <c:crosses val="autoZero"/>
         <c:crossBetween val="between"/>
         <c:majorUnit val="20.0"/>
@@ -2081,7 +2076,6 @@
     </c:plotArea>
     <c:legend>
       <c:legendPos val="b"/>
-      <c:layout/>
       <c:overlay val="0"/>
       <c:spPr>
         <a:noFill/>
@@ -2159,7 +2153,7 @@
           <a:lstStyle/>
           <a:p>
             <a:pPr>
-              <a:defRPr sz="1862" b="0" i="0" u="none" strike="noStrike" kern="1200" spc="0" baseline="0">
+              <a:defRPr sz="2400" b="0" i="0" u="none" strike="noStrike" kern="1200" spc="0" baseline="0">
                 <a:solidFill>
                   <a:schemeClr val="tx1">
                     <a:lumMod val="65000"/>
@@ -2172,10 +2166,9 @@
               </a:defRPr>
             </a:pPr>
             <a:r>
-              <a:rPr lang="en-US" dirty="0" smtClean="0"/>
+              <a:rPr lang="en-US"/>
               <a:t>Letter Recognition</a:t>
             </a:r>
-            <a:endParaRPr lang="en-US" dirty="0"/>
           </a:p>
         </c:rich>
       </c:tx>
@@ -2192,7 +2185,7 @@
         <a:lstStyle/>
         <a:p>
           <a:pPr>
-            <a:defRPr sz="1862" b="0" i="0" u="none" strike="noStrike" kern="1200" spc="0" baseline="0">
+            <a:defRPr sz="2400" b="0" i="0" u="none" strike="noStrike" kern="1200" spc="0" baseline="0">
               <a:solidFill>
                 <a:schemeClr val="tx1">
                   <a:lumMod val="65000"/>
@@ -2224,7 +2217,7 @@
               <c:strCache>
                 <c:ptCount val="1"/>
                 <c:pt idx="0">
-                  <c:v>Correctness</c:v>
+                  <c:v>Accuracy</c:v>
                 </c:pt>
               </c:strCache>
             </c:strRef>
@@ -2296,7 +2289,7 @@
               <c:strCache>
                 <c:ptCount val="1"/>
                 <c:pt idx="0">
-                  <c:v>Root relative squared error</c:v>
+                  <c:v>F-measure</c:v>
                 </c:pt>
               </c:strCache>
             </c:strRef>
@@ -2369,11 +2362,11 @@
         </c:dLbls>
         <c:gapWidth val="219"/>
         <c:overlap val="-27"/>
-        <c:axId val="-2145185552"/>
-        <c:axId val="-2145182160"/>
+        <c:axId val="1467822208"/>
+        <c:axId val="1467824528"/>
       </c:barChart>
       <c:catAx>
-        <c:axId val="-2145185552"/>
+        <c:axId val="1467822208"/>
         <c:scaling>
           <c:orientation val="minMax"/>
         </c:scaling>
@@ -2401,7 +2394,7 @@
           <a:lstStyle/>
           <a:p>
             <a:pPr>
-              <a:defRPr sz="1197" b="0" i="0" u="none" strike="noStrike" kern="1200" baseline="0">
+              <a:defRPr sz="2000" b="0" i="0" u="none" strike="noStrike" kern="1200" baseline="0">
                 <a:solidFill>
                   <a:schemeClr val="tx1">
                     <a:lumMod val="65000"/>
@@ -2416,7 +2409,7 @@
             <a:endParaRPr lang="en-US"/>
           </a:p>
         </c:txPr>
-        <c:crossAx val="-2145182160"/>
+        <c:crossAx val="1467824528"/>
         <c:crosses val="autoZero"/>
         <c:auto val="1"/>
         <c:lblAlgn val="ctr"/>
@@ -2424,7 +2417,7 @@
         <c:noMultiLvlLbl val="0"/>
       </c:catAx>
       <c:valAx>
-        <c:axId val="-2145182160"/>
+        <c:axId val="1467824528"/>
         <c:scaling>
           <c:orientation val="minMax"/>
         </c:scaling>
@@ -2460,7 +2453,7 @@
           <a:lstStyle/>
           <a:p>
             <a:pPr>
-              <a:defRPr sz="1197" b="0" i="0" u="none" strike="noStrike" kern="1200" baseline="0">
+              <a:defRPr sz="2000" b="0" i="0" u="none" strike="noStrike" kern="1200" baseline="0">
                 <a:solidFill>
                   <a:schemeClr val="tx1">
                     <a:lumMod val="65000"/>
@@ -2475,7 +2468,7 @@
             <a:endParaRPr lang="en-US"/>
           </a:p>
         </c:txPr>
-        <c:crossAx val="-2145185552"/>
+        <c:crossAx val="1467822208"/>
         <c:crosses val="autoZero"/>
         <c:crossBetween val="between"/>
       </c:valAx>
@@ -2502,7 +2495,7 @@
         <a:lstStyle/>
         <a:p>
           <a:pPr>
-            <a:defRPr sz="1197" b="0" i="0" u="none" strike="noStrike" kern="1200" baseline="0">
+            <a:defRPr sz="2000" b="0" i="0" u="none" strike="noStrike" kern="1200" baseline="0">
               <a:solidFill>
                 <a:schemeClr val="tx1">
                   <a:lumMod val="65000"/>
@@ -2534,7 +2527,7 @@
     <a:lstStyle/>
     <a:p>
       <a:pPr>
-        <a:defRPr/>
+        <a:defRPr sz="2000" baseline="0"/>
       </a:pPr>
       <a:endParaRPr lang="en-US"/>
     </a:p>
@@ -2565,13 +2558,27 @@
           <a:bodyPr rot="0" spcFirstLastPara="1" vertOverflow="ellipsis" vert="horz" wrap="square" anchor="ctr" anchorCtr="1"/>
           <a:lstStyle/>
           <a:p>
-            <a:pPr>
-              <a:defRPr sz="1862" b="0" i="0" u="none" strike="noStrike" kern="1200" spc="0" baseline="0">
+            <a:pPr marL="0" marR="0" indent="0" algn="ctr" defTabSz="914400" rtl="0" eaLnBrk="1" fontAlgn="auto" latinLnBrk="0" hangingPunct="1">
+              <a:lnSpc>
+                <a:spcPct val="100000"/>
+              </a:lnSpc>
+              <a:spcBef>
+                <a:spcPts val="0"/>
+              </a:spcBef>
+              <a:spcAft>
+                <a:spcPts val="0"/>
+              </a:spcAft>
+              <a:buClrTx/>
+              <a:buSzTx/>
+              <a:buFontTx/>
+              <a:buNone/>
+              <a:tabLst/>
+              <a:defRPr sz="2400" b="0" i="0" u="none" strike="noStrike" kern="1200" spc="0" baseline="0">
                 <a:solidFill>
-                  <a:schemeClr val="tx1">
+                  <a:prstClr val="black">
                     <a:lumMod val="65000"/>
                     <a:lumOff val="35000"/>
-                  </a:schemeClr>
+                  </a:prstClr>
                 </a:solidFill>
                 <a:latin typeface="+mn-lt"/>
                 <a:ea typeface="+mn-ea"/>
@@ -2580,9 +2587,8 @@
             </a:pPr>
             <a:r>
               <a:rPr lang="en-US" dirty="0" smtClean="0"/>
-              <a:t>Digit Recognition</a:t>
-            </a:r>
-            <a:endParaRPr lang="en-US" dirty="0"/>
+              <a:t>Digit Classification</a:t>
+            </a:r>
           </a:p>
         </c:rich>
       </c:tx>
@@ -2599,13 +2605,27 @@
         <a:bodyPr rot="0" spcFirstLastPara="1" vertOverflow="ellipsis" vert="horz" wrap="square" anchor="ctr" anchorCtr="1"/>
         <a:lstStyle/>
         <a:p>
-          <a:pPr>
-            <a:defRPr sz="1862" b="0" i="0" u="none" strike="noStrike" kern="1200" spc="0" baseline="0">
+          <a:pPr marL="0" marR="0" indent="0" algn="ctr" defTabSz="914400" rtl="0" eaLnBrk="1" fontAlgn="auto" latinLnBrk="0" hangingPunct="1">
+            <a:lnSpc>
+              <a:spcPct val="100000"/>
+            </a:lnSpc>
+            <a:spcBef>
+              <a:spcPts val="0"/>
+            </a:spcBef>
+            <a:spcAft>
+              <a:spcPts val="0"/>
+            </a:spcAft>
+            <a:buClrTx/>
+            <a:buSzTx/>
+            <a:buFontTx/>
+            <a:buNone/>
+            <a:tabLst/>
+            <a:defRPr sz="2400" b="0" i="0" u="none" strike="noStrike" kern="1200" spc="0" baseline="0">
               <a:solidFill>
-                <a:schemeClr val="tx1">
+                <a:prstClr val="black">
                   <a:lumMod val="65000"/>
                   <a:lumOff val="35000"/>
-                </a:schemeClr>
+                </a:prstClr>
               </a:solidFill>
               <a:latin typeface="+mn-lt"/>
               <a:ea typeface="+mn-ea"/>
@@ -2632,7 +2652,7 @@
               <c:strCache>
                 <c:ptCount val="1"/>
                 <c:pt idx="0">
-                  <c:v>Correctness</c:v>
+                  <c:v>Accuracy</c:v>
                 </c:pt>
               </c:strCache>
             </c:strRef>
@@ -2704,7 +2724,7 @@
               <c:strCache>
                 <c:ptCount val="1"/>
                 <c:pt idx="0">
-                  <c:v>Root relative squared error</c:v>
+                  <c:v>F-measure</c:v>
                 </c:pt>
               </c:strCache>
             </c:strRef>
@@ -2777,11 +2797,11 @@
         </c:dLbls>
         <c:gapWidth val="219"/>
         <c:overlap val="-27"/>
-        <c:axId val="2146240992"/>
-        <c:axId val="-2138568528"/>
+        <c:axId val="1380866704"/>
+        <c:axId val="1467646336"/>
       </c:barChart>
       <c:catAx>
-        <c:axId val="2146240992"/>
+        <c:axId val="1380866704"/>
         <c:scaling>
           <c:orientation val="minMax"/>
         </c:scaling>
@@ -2809,7 +2829,7 @@
           <a:lstStyle/>
           <a:p>
             <a:pPr>
-              <a:defRPr sz="1197" b="0" i="0" u="none" strike="noStrike" kern="1200" baseline="0">
+              <a:defRPr sz="2000" b="0" i="0" u="none" strike="noStrike" kern="1200" baseline="0">
                 <a:solidFill>
                   <a:schemeClr val="tx1">
                     <a:lumMod val="65000"/>
@@ -2824,7 +2844,7 @@
             <a:endParaRPr lang="en-US"/>
           </a:p>
         </c:txPr>
-        <c:crossAx val="-2138568528"/>
+        <c:crossAx val="1467646336"/>
         <c:crosses val="autoZero"/>
         <c:auto val="1"/>
         <c:lblAlgn val="ctr"/>
@@ -2832,7 +2852,7 @@
         <c:noMultiLvlLbl val="0"/>
       </c:catAx>
       <c:valAx>
-        <c:axId val="-2138568528"/>
+        <c:axId val="1467646336"/>
         <c:scaling>
           <c:orientation val="minMax"/>
         </c:scaling>
@@ -2868,7 +2888,7 @@
           <a:lstStyle/>
           <a:p>
             <a:pPr>
-              <a:defRPr sz="1197" b="0" i="0" u="none" strike="noStrike" kern="1200" baseline="0">
+              <a:defRPr sz="2000" b="0" i="0" u="none" strike="noStrike" kern="1200" baseline="0">
                 <a:solidFill>
                   <a:schemeClr val="tx1">
                     <a:lumMod val="65000"/>
@@ -2883,7 +2903,7 @@
             <a:endParaRPr lang="en-US"/>
           </a:p>
         </c:txPr>
-        <c:crossAx val="2146240992"/>
+        <c:crossAx val="1380866704"/>
         <c:crosses val="autoZero"/>
         <c:crossBetween val="between"/>
       </c:valAx>
@@ -2911,7 +2931,7 @@
         <a:lstStyle/>
         <a:p>
           <a:pPr>
-            <a:defRPr sz="1197" b="0" i="0" u="none" strike="noStrike" kern="1200" baseline="0">
+            <a:defRPr sz="2000" b="0" i="0" u="none" strike="noStrike" kern="1200" baseline="0">
               <a:solidFill>
                 <a:schemeClr val="tx1">
                   <a:lumMod val="65000"/>
@@ -2943,7 +2963,7 @@
     <a:lstStyle/>
     <a:p>
       <a:pPr>
-        <a:defRPr/>
+        <a:defRPr sz="2000" baseline="0"/>
       </a:pPr>
       <a:endParaRPr lang="en-US"/>
     </a:p>
@@ -2975,7 +2995,7 @@
           <a:lstStyle/>
           <a:p>
             <a:pPr>
-              <a:defRPr sz="1862" b="0" i="0" u="none" strike="noStrike" kern="1200" spc="0" baseline="0">
+              <a:defRPr sz="2400" b="0" i="0" u="none" strike="noStrike" kern="1200" spc="0" baseline="0">
                 <a:solidFill>
                   <a:schemeClr val="tx1">
                     <a:lumMod val="65000"/>
@@ -2988,14 +3008,9 @@
               </a:defRPr>
             </a:pPr>
             <a:r>
-              <a:rPr lang="en-US" dirty="0" smtClean="0"/>
-              <a:t>Two times</a:t>
-            </a:r>
-            <a:r>
-              <a:rPr lang="en-US" baseline="0" dirty="0" smtClean="0"/>
-              <a:t> tests with L=0.6</a:t>
-            </a:r>
-            <a:endParaRPr lang="en-US" dirty="0"/>
+              <a:rPr lang="en-US"/>
+              <a:t>Two times tests with L=0.6</a:t>
+            </a:r>
           </a:p>
         </c:rich>
       </c:tx>
@@ -3012,7 +3027,7 @@
         <a:lstStyle/>
         <a:p>
           <a:pPr>
-            <a:defRPr sz="1862" b="0" i="0" u="none" strike="noStrike" kern="1200" spc="0" baseline="0">
+            <a:defRPr sz="2400" b="0" i="0" u="none" strike="noStrike" kern="1200" spc="0" baseline="0">
               <a:solidFill>
                 <a:schemeClr val="tx1">
                   <a:lumMod val="65000"/>
@@ -3044,7 +3059,7 @@
               <c:strCache>
                 <c:ptCount val="1"/>
                 <c:pt idx="0">
-                  <c:v>Correctness</c:v>
+                  <c:v>Accuracy</c:v>
                 </c:pt>
               </c:strCache>
             </c:strRef>
@@ -3098,7 +3113,7 @@
               <c:strCache>
                 <c:ptCount val="1"/>
                 <c:pt idx="0">
-                  <c:v>Root relative squared error</c:v>
+                  <c:v>F-measure</c:v>
                 </c:pt>
               </c:strCache>
             </c:strRef>
@@ -3153,11 +3168,11 @@
         </c:dLbls>
         <c:gapWidth val="219"/>
         <c:overlap val="-27"/>
-        <c:axId val="2147111936"/>
-        <c:axId val="2147129232"/>
+        <c:axId val="1380062464"/>
+        <c:axId val="1462106048"/>
       </c:barChart>
       <c:catAx>
-        <c:axId val="2147111936"/>
+        <c:axId val="1380062464"/>
         <c:scaling>
           <c:orientation val="minMax"/>
         </c:scaling>
@@ -3185,7 +3200,7 @@
           <a:lstStyle/>
           <a:p>
             <a:pPr>
-              <a:defRPr sz="1197" b="0" i="0" u="none" strike="noStrike" kern="1200" baseline="0">
+              <a:defRPr sz="2000" b="0" i="0" u="none" strike="noStrike" kern="1200" baseline="0">
                 <a:solidFill>
                   <a:schemeClr val="tx1">
                     <a:lumMod val="65000"/>
@@ -3200,7 +3215,7 @@
             <a:endParaRPr lang="en-US"/>
           </a:p>
         </c:txPr>
-        <c:crossAx val="2147129232"/>
+        <c:crossAx val="1462106048"/>
         <c:crosses val="autoZero"/>
         <c:auto val="1"/>
         <c:lblAlgn val="ctr"/>
@@ -3208,7 +3223,7 @@
         <c:noMultiLvlLbl val="0"/>
       </c:catAx>
       <c:valAx>
-        <c:axId val="2147129232"/>
+        <c:axId val="1462106048"/>
         <c:scaling>
           <c:orientation val="minMax"/>
           <c:max val="100.0"/>
@@ -3245,7 +3260,7 @@
           <a:lstStyle/>
           <a:p>
             <a:pPr>
-              <a:defRPr sz="1197" b="0" i="0" u="none" strike="noStrike" kern="1200" baseline="0">
+              <a:defRPr sz="2000" b="0" i="0" u="none" strike="noStrike" kern="1200" baseline="0">
                 <a:solidFill>
                   <a:schemeClr val="tx1">
                     <a:lumMod val="65000"/>
@@ -3260,7 +3275,7 @@
             <a:endParaRPr lang="en-US"/>
           </a:p>
         </c:txPr>
-        <c:crossAx val="2147111936"/>
+        <c:crossAx val="1380062464"/>
         <c:crosses val="autoZero"/>
         <c:crossBetween val="between"/>
       </c:valAx>
@@ -3287,7 +3302,7 @@
         <a:lstStyle/>
         <a:p>
           <a:pPr>
-            <a:defRPr sz="1197" b="0" i="0" u="none" strike="noStrike" kern="1200" baseline="0">
+            <a:defRPr sz="2000" b="0" i="0" u="none" strike="noStrike" kern="1200" baseline="0">
               <a:solidFill>
                 <a:schemeClr val="tx1">
                   <a:lumMod val="65000"/>
@@ -3319,7 +3334,7 @@
     <a:lstStyle/>
     <a:p>
       <a:pPr>
-        <a:defRPr/>
+        <a:defRPr sz="2000" baseline="0"/>
       </a:pPr>
       <a:endParaRPr lang="en-US"/>
     </a:p>
@@ -19548,7 +19563,7 @@
             <p:ph idx="1"/>
             <p:extLst>
               <p:ext uri="{D42A27DB-BD31-4B8C-83A1-F6EECF244321}">
-                <p14:modId xmlns:p14="http://schemas.microsoft.com/office/powerpoint/2010/main" val="1918265136"/>
+                <p14:modId xmlns:p14="http://schemas.microsoft.com/office/powerpoint/2010/main" val="1861452544"/>
               </p:ext>
             </p:extLst>
           </p:nvPr>
@@ -20183,7 +20198,7 @@
             <p:ph idx="1"/>
             <p:extLst>
               <p:ext uri="{D42A27DB-BD31-4B8C-83A1-F6EECF244321}">
-                <p14:modId xmlns:p14="http://schemas.microsoft.com/office/powerpoint/2010/main" val="1967832537"/>
+                <p14:modId xmlns:p14="http://schemas.microsoft.com/office/powerpoint/2010/main" val="1455404246"/>
               </p:ext>
             </p:extLst>
           </p:nvPr>
@@ -20337,7 +20352,7 @@
             <p:ph idx="1"/>
             <p:extLst>
               <p:ext uri="{D42A27DB-BD31-4B8C-83A1-F6EECF244321}">
-                <p14:modId xmlns:p14="http://schemas.microsoft.com/office/powerpoint/2010/main" val="336355854"/>
+                <p14:modId xmlns:p14="http://schemas.microsoft.com/office/powerpoint/2010/main" val="797210006"/>
               </p:ext>
             </p:extLst>
           </p:nvPr>

</xml_diff>

<commit_message>
fixed all ann figures
</commit_message>
<xml_diff>
--- a/PPTGroup10.pptx
+++ b/PPTGroup10.pptx
@@ -349,11 +349,11 @@
         </c:dLbls>
         <c:gapWidth val="219"/>
         <c:overlap val="-27"/>
-        <c:axId val="1467638448"/>
-        <c:axId val="1467640496"/>
+        <c:axId val="1463988752"/>
+        <c:axId val="1418293328"/>
       </c:barChart>
       <c:catAx>
-        <c:axId val="1467638448"/>
+        <c:axId val="1463988752"/>
         <c:scaling>
           <c:orientation val="minMax"/>
         </c:scaling>
@@ -396,7 +396,7 @@
             <a:endParaRPr lang="en-US"/>
           </a:p>
         </c:txPr>
-        <c:crossAx val="1467640496"/>
+        <c:crossAx val="1418293328"/>
         <c:crosses val="autoZero"/>
         <c:auto val="1"/>
         <c:lblAlgn val="ctr"/>
@@ -404,7 +404,7 @@
         <c:noMultiLvlLbl val="0"/>
       </c:catAx>
       <c:valAx>
-        <c:axId val="1467640496"/>
+        <c:axId val="1418293328"/>
         <c:scaling>
           <c:orientation val="minMax"/>
           <c:max val="100.0"/>
@@ -457,7 +457,7 @@
             <a:endParaRPr lang="en-US"/>
           </a:p>
         </c:txPr>
-        <c:crossAx val="1467638448"/>
+        <c:crossAx val="1463988752"/>
         <c:crosses val="autoZero"/>
         <c:crossBetween val="between"/>
         <c:majorUnit val="10.0"/>
@@ -745,11 +745,11 @@
         </c:dLbls>
         <c:gapWidth val="219"/>
         <c:overlap val="-27"/>
-        <c:axId val="1494253040"/>
-        <c:axId val="1494255088"/>
+        <c:axId val="1380953552"/>
+        <c:axId val="1380955328"/>
       </c:barChart>
       <c:catAx>
-        <c:axId val="1494253040"/>
+        <c:axId val="1380953552"/>
         <c:scaling>
           <c:orientation val="minMax"/>
         </c:scaling>
@@ -792,7 +792,7 @@
             <a:endParaRPr lang="en-US"/>
           </a:p>
         </c:txPr>
-        <c:crossAx val="1494255088"/>
+        <c:crossAx val="1380955328"/>
         <c:crosses val="autoZero"/>
         <c:auto val="1"/>
         <c:lblAlgn val="ctr"/>
@@ -800,7 +800,7 @@
         <c:noMultiLvlLbl val="0"/>
       </c:catAx>
       <c:valAx>
-        <c:axId val="1494255088"/>
+        <c:axId val="1380955328"/>
         <c:scaling>
           <c:orientation val="minMax"/>
           <c:max val="100.0"/>
@@ -853,7 +853,7 @@
             <a:endParaRPr lang="en-US"/>
           </a:p>
         </c:txPr>
-        <c:crossAx val="1494253040"/>
+        <c:crossAx val="1380953552"/>
         <c:crosses val="autoZero"/>
         <c:crossBetween val="between"/>
         <c:majorUnit val="10.0"/>
@@ -965,6 +965,7 @@
           </a:p>
         </c:rich>
       </c:tx>
+      <c:layout/>
       <c:overlay val="0"/>
       <c:spPr>
         <a:noFill/>
@@ -1143,11 +1144,11 @@
         </c:dLbls>
         <c:gapWidth val="219"/>
         <c:overlap val="-27"/>
-        <c:axId val="1380876016"/>
-        <c:axId val="1380870800"/>
+        <c:axId val="1467756608"/>
+        <c:axId val="1467758928"/>
       </c:barChart>
       <c:catAx>
-        <c:axId val="1380876016"/>
+        <c:axId val="1467756608"/>
         <c:scaling>
           <c:orientation val="minMax"/>
         </c:scaling>
@@ -1190,7 +1191,7 @@
             <a:endParaRPr lang="en-US"/>
           </a:p>
         </c:txPr>
-        <c:crossAx val="1380870800"/>
+        <c:crossAx val="1467758928"/>
         <c:crosses val="autoZero"/>
         <c:auto val="1"/>
         <c:lblAlgn val="ctr"/>
@@ -1198,7 +1199,7 @@
         <c:noMultiLvlLbl val="0"/>
       </c:catAx>
       <c:valAx>
-        <c:axId val="1380870800"/>
+        <c:axId val="1467758928"/>
         <c:scaling>
           <c:orientation val="minMax"/>
           <c:max val="100.0"/>
@@ -1251,7 +1252,7 @@
             <a:endParaRPr lang="en-US"/>
           </a:p>
         </c:txPr>
-        <c:crossAx val="1380876016"/>
+        <c:crossAx val="1467756608"/>
         <c:crosses val="autoZero"/>
         <c:crossBetween val="between"/>
         <c:majorUnit val="20.0"/>
@@ -1266,6 +1267,7 @@
     </c:plotArea>
     <c:legend>
       <c:legendPos val="b"/>
+      <c:layout/>
       <c:overlay val="0"/>
       <c:spPr>
         <a:noFill/>
@@ -1379,6 +1381,7 @@
           </a:p>
         </c:rich>
       </c:tx>
+      <c:layout/>
       <c:overlay val="0"/>
       <c:spPr>
         <a:noFill/>
@@ -1557,11 +1560,11 @@
         </c:dLbls>
         <c:gapWidth val="219"/>
         <c:overlap val="-27"/>
-        <c:axId val="1467113856"/>
-        <c:axId val="1467078688"/>
+        <c:axId val="1418565632"/>
+        <c:axId val="1418567408"/>
       </c:barChart>
       <c:catAx>
-        <c:axId val="1467113856"/>
+        <c:axId val="1418565632"/>
         <c:scaling>
           <c:orientation val="minMax"/>
         </c:scaling>
@@ -1604,7 +1607,7 @@
             <a:endParaRPr lang="en-US"/>
           </a:p>
         </c:txPr>
-        <c:crossAx val="1467078688"/>
+        <c:crossAx val="1418567408"/>
         <c:crosses val="autoZero"/>
         <c:auto val="1"/>
         <c:lblAlgn val="ctr"/>
@@ -1612,7 +1615,7 @@
         <c:noMultiLvlLbl val="0"/>
       </c:catAx>
       <c:valAx>
-        <c:axId val="1467078688"/>
+        <c:axId val="1418567408"/>
         <c:scaling>
           <c:orientation val="minMax"/>
           <c:max val="100.0"/>
@@ -1665,7 +1668,7 @@
             <a:endParaRPr lang="en-US"/>
           </a:p>
         </c:txPr>
-        <c:crossAx val="1467113856"/>
+        <c:crossAx val="1418565632"/>
         <c:crosses val="autoZero"/>
         <c:crossBetween val="between"/>
         <c:majorUnit val="20.0"/>
@@ -1680,6 +1683,7 @@
     </c:plotArea>
     <c:legend>
       <c:legendPos val="b"/>
+      <c:layout/>
       <c:overlay val="0"/>
       <c:spPr>
         <a:noFill/>
@@ -1776,6 +1780,7 @@
           </a:p>
         </c:rich>
       </c:tx>
+      <c:layout/>
       <c:overlay val="0"/>
       <c:spPr>
         <a:noFill/>
@@ -1954,11 +1959,11 @@
         </c:dLbls>
         <c:gapWidth val="219"/>
         <c:overlap val="-27"/>
-        <c:axId val="1467958976"/>
-        <c:axId val="1467482416"/>
+        <c:axId val="1467310352"/>
+        <c:axId val="1461880288"/>
       </c:barChart>
       <c:catAx>
-        <c:axId val="1467958976"/>
+        <c:axId val="1467310352"/>
         <c:scaling>
           <c:orientation val="minMax"/>
         </c:scaling>
@@ -2001,7 +2006,7 @@
             <a:endParaRPr lang="en-US"/>
           </a:p>
         </c:txPr>
-        <c:crossAx val="1467482416"/>
+        <c:crossAx val="1461880288"/>
         <c:crosses val="autoZero"/>
         <c:auto val="1"/>
         <c:lblAlgn val="ctr"/>
@@ -2009,7 +2014,7 @@
         <c:noMultiLvlLbl val="0"/>
       </c:catAx>
       <c:valAx>
-        <c:axId val="1467482416"/>
+        <c:axId val="1461880288"/>
         <c:scaling>
           <c:orientation val="minMax"/>
           <c:min val="0.0"/>
@@ -2061,7 +2066,7 @@
             <a:endParaRPr lang="en-US"/>
           </a:p>
         </c:txPr>
-        <c:crossAx val="1467958976"/>
+        <c:crossAx val="1467310352"/>
         <c:crosses val="autoZero"/>
         <c:crossBetween val="between"/>
         <c:majorUnit val="20.0"/>
@@ -2076,6 +2081,7 @@
     </c:plotArea>
     <c:legend>
       <c:legendPos val="b"/>
+      <c:layout/>
       <c:overlay val="0"/>
       <c:spPr>
         <a:noFill/>
@@ -2172,6 +2178,7 @@
           </a:p>
         </c:rich>
       </c:tx>
+      <c:layout/>
       <c:overlay val="0"/>
       <c:spPr>
         <a:noFill/>
@@ -2289,7 +2296,7 @@
               <c:strCache>
                 <c:ptCount val="1"/>
                 <c:pt idx="0">
-                  <c:v>F-measure</c:v>
+                  <c:v>Root relative squared error</c:v>
                 </c:pt>
               </c:strCache>
             </c:strRef>
@@ -2362,11 +2369,11 @@
         </c:dLbls>
         <c:gapWidth val="219"/>
         <c:overlap val="-27"/>
-        <c:axId val="1467822208"/>
-        <c:axId val="1467824528"/>
+        <c:axId val="1467954080"/>
+        <c:axId val="1467955856"/>
       </c:barChart>
       <c:catAx>
-        <c:axId val="1467822208"/>
+        <c:axId val="1467954080"/>
         <c:scaling>
           <c:orientation val="minMax"/>
         </c:scaling>
@@ -2409,7 +2416,7 @@
             <a:endParaRPr lang="en-US"/>
           </a:p>
         </c:txPr>
-        <c:crossAx val="1467824528"/>
+        <c:crossAx val="1467955856"/>
         <c:crosses val="autoZero"/>
         <c:auto val="1"/>
         <c:lblAlgn val="ctr"/>
@@ -2417,7 +2424,7 @@
         <c:noMultiLvlLbl val="0"/>
       </c:catAx>
       <c:valAx>
-        <c:axId val="1467824528"/>
+        <c:axId val="1467955856"/>
         <c:scaling>
           <c:orientation val="minMax"/>
         </c:scaling>
@@ -2468,7 +2475,7 @@
             <a:endParaRPr lang="en-US"/>
           </a:p>
         </c:txPr>
-        <c:crossAx val="1467822208"/>
+        <c:crossAx val="1467954080"/>
         <c:crosses val="autoZero"/>
         <c:crossBetween val="between"/>
       </c:valAx>
@@ -2482,6 +2489,7 @@
     </c:plotArea>
     <c:legend>
       <c:legendPos val="b"/>
+      <c:layout/>
       <c:overlay val="0"/>
       <c:spPr>
         <a:noFill/>
@@ -2724,7 +2732,7 @@
               <c:strCache>
                 <c:ptCount val="1"/>
                 <c:pt idx="0">
-                  <c:v>F-measure</c:v>
+                  <c:v>Root relative squared error</c:v>
                 </c:pt>
               </c:strCache>
             </c:strRef>
@@ -2797,11 +2805,11 @@
         </c:dLbls>
         <c:gapWidth val="219"/>
         <c:overlap val="-27"/>
-        <c:axId val="1380866704"/>
-        <c:axId val="1467646336"/>
+        <c:axId val="1464079296"/>
+        <c:axId val="1464584240"/>
       </c:barChart>
       <c:catAx>
-        <c:axId val="1380866704"/>
+        <c:axId val="1464079296"/>
         <c:scaling>
           <c:orientation val="minMax"/>
         </c:scaling>
@@ -2844,7 +2852,7 @@
             <a:endParaRPr lang="en-US"/>
           </a:p>
         </c:txPr>
-        <c:crossAx val="1467646336"/>
+        <c:crossAx val="1464584240"/>
         <c:crosses val="autoZero"/>
         <c:auto val="1"/>
         <c:lblAlgn val="ctr"/>
@@ -2852,7 +2860,7 @@
         <c:noMultiLvlLbl val="0"/>
       </c:catAx>
       <c:valAx>
-        <c:axId val="1467646336"/>
+        <c:axId val="1464584240"/>
         <c:scaling>
           <c:orientation val="minMax"/>
         </c:scaling>
@@ -2903,7 +2911,7 @@
             <a:endParaRPr lang="en-US"/>
           </a:p>
         </c:txPr>
-        <c:crossAx val="1380866704"/>
+        <c:crossAx val="1464079296"/>
         <c:crosses val="autoZero"/>
         <c:crossBetween val="between"/>
       </c:valAx>
@@ -3014,6 +3022,7 @@
           </a:p>
         </c:rich>
       </c:tx>
+      <c:layout/>
       <c:overlay val="0"/>
       <c:spPr>
         <a:noFill/>
@@ -3098,7 +3107,7 @@
                   <c:v>74.77</c:v>
                 </c:pt>
                 <c:pt idx="1">
-                  <c:v>98.36239999999998</c:v>
+                  <c:v>98.36239999999999</c:v>
                 </c:pt>
               </c:numCache>
             </c:numRef>
@@ -3113,7 +3122,7 @@
               <c:strCache>
                 <c:ptCount val="1"/>
                 <c:pt idx="0">
-                  <c:v>F-measure</c:v>
+                  <c:v>Root relative squared error</c:v>
                 </c:pt>
               </c:strCache>
             </c:strRef>
@@ -3168,11 +3177,11 @@
         </c:dLbls>
         <c:gapWidth val="219"/>
         <c:overlap val="-27"/>
-        <c:axId val="1380062464"/>
-        <c:axId val="1462106048"/>
+        <c:axId val="1467858912"/>
+        <c:axId val="1467860272"/>
       </c:barChart>
       <c:catAx>
-        <c:axId val="1380062464"/>
+        <c:axId val="1467858912"/>
         <c:scaling>
           <c:orientation val="minMax"/>
         </c:scaling>
@@ -3215,7 +3224,7 @@
             <a:endParaRPr lang="en-US"/>
           </a:p>
         </c:txPr>
-        <c:crossAx val="1462106048"/>
+        <c:crossAx val="1467860272"/>
         <c:crosses val="autoZero"/>
         <c:auto val="1"/>
         <c:lblAlgn val="ctr"/>
@@ -3223,7 +3232,7 @@
         <c:noMultiLvlLbl val="0"/>
       </c:catAx>
       <c:valAx>
-        <c:axId val="1462106048"/>
+        <c:axId val="1467860272"/>
         <c:scaling>
           <c:orientation val="minMax"/>
           <c:max val="100.0"/>
@@ -3275,7 +3284,7 @@
             <a:endParaRPr lang="en-US"/>
           </a:p>
         </c:txPr>
-        <c:crossAx val="1380062464"/>
+        <c:crossAx val="1467858912"/>
         <c:crosses val="autoZero"/>
         <c:crossBetween val="between"/>
       </c:valAx>
@@ -3289,6 +3298,7 @@
     </c:plotArea>
     <c:legend>
       <c:legendPos val="b"/>
+      <c:layout/>
       <c:overlay val="0"/>
       <c:spPr>
         <a:noFill/>
@@ -19563,7 +19573,7 @@
             <p:ph idx="1"/>
             <p:extLst>
               <p:ext uri="{D42A27DB-BD31-4B8C-83A1-F6EECF244321}">
-                <p14:modId xmlns:p14="http://schemas.microsoft.com/office/powerpoint/2010/main" val="1861452544"/>
+                <p14:modId xmlns:p14="http://schemas.microsoft.com/office/powerpoint/2010/main" val="44259302"/>
               </p:ext>
             </p:extLst>
           </p:nvPr>
@@ -20198,7 +20208,7 @@
             <p:ph idx="1"/>
             <p:extLst>
               <p:ext uri="{D42A27DB-BD31-4B8C-83A1-F6EECF244321}">
-                <p14:modId xmlns:p14="http://schemas.microsoft.com/office/powerpoint/2010/main" val="1455404246"/>
+                <p14:modId xmlns:p14="http://schemas.microsoft.com/office/powerpoint/2010/main" val="836746852"/>
               </p:ext>
             </p:extLst>
           </p:nvPr>
@@ -20352,7 +20362,7 @@
             <p:ph idx="1"/>
             <p:extLst>
               <p:ext uri="{D42A27DB-BD31-4B8C-83A1-F6EECF244321}">
-                <p14:modId xmlns:p14="http://schemas.microsoft.com/office/powerpoint/2010/main" val="797210006"/>
+                <p14:modId xmlns:p14="http://schemas.microsoft.com/office/powerpoint/2010/main" val="1481421008"/>
               </p:ext>
             </p:extLst>
           </p:nvPr>

</xml_diff>

<commit_message>
correct svm pic and table, and finish'Different Libraries of SVM'
</commit_message>
<xml_diff>
--- a/PPTGroup10.pptx
+++ b/PPTGroup10.pptx
@@ -347,11 +347,11 @@
         </c:dLbls>
         <c:gapWidth val="219"/>
         <c:overlap val="-27"/>
-        <c:axId val="1463626416"/>
-        <c:axId val="1463628192"/>
+        <c:axId val="-2121546288"/>
+        <c:axId val="-2052000480"/>
       </c:barChart>
       <c:catAx>
-        <c:axId val="1463626416"/>
+        <c:axId val="-2121546288"/>
         <c:scaling>
           <c:orientation val="minMax"/>
         </c:scaling>
@@ -394,7 +394,7 @@
             <a:endParaRPr lang="en-US"/>
           </a:p>
         </c:txPr>
-        <c:crossAx val="1463628192"/>
+        <c:crossAx val="-2052000480"/>
         <c:crosses val="autoZero"/>
         <c:auto val="1"/>
         <c:lblAlgn val="ctr"/>
@@ -402,7 +402,7 @@
         <c:noMultiLvlLbl val="0"/>
       </c:catAx>
       <c:valAx>
-        <c:axId val="1463628192"/>
+        <c:axId val="-2052000480"/>
         <c:scaling>
           <c:orientation val="minMax"/>
           <c:max val="100.0"/>
@@ -455,7 +455,7 @@
             <a:endParaRPr lang="en-US"/>
           </a:p>
         </c:txPr>
-        <c:crossAx val="1463626416"/>
+        <c:crossAx val="-2121546288"/>
         <c:crosses val="autoZero"/>
         <c:crossBetween val="between"/>
         <c:majorUnit val="10.0"/>
@@ -732,11 +732,11 @@
         </c:dLbls>
         <c:gapWidth val="219"/>
         <c:overlap val="-27"/>
-        <c:axId val="1462868384"/>
-        <c:axId val="1462870704"/>
+        <c:axId val="-2127319744"/>
+        <c:axId val="-2055869520"/>
       </c:barChart>
       <c:catAx>
-        <c:axId val="1462868384"/>
+        <c:axId val="-2127319744"/>
         <c:scaling>
           <c:orientation val="minMax"/>
         </c:scaling>
@@ -779,7 +779,7 @@
             <a:endParaRPr lang="en-US"/>
           </a:p>
         </c:txPr>
-        <c:crossAx val="1462870704"/>
+        <c:crossAx val="-2055869520"/>
         <c:crosses val="autoZero"/>
         <c:auto val="1"/>
         <c:lblAlgn val="ctr"/>
@@ -787,7 +787,7 @@
         <c:noMultiLvlLbl val="0"/>
       </c:catAx>
       <c:valAx>
-        <c:axId val="1462870704"/>
+        <c:axId val="-2055869520"/>
         <c:scaling>
           <c:orientation val="minMax"/>
           <c:max val="100.0"/>
@@ -840,7 +840,7 @@
             <a:endParaRPr lang="en-US"/>
           </a:p>
         </c:txPr>
-        <c:crossAx val="1462868384"/>
+        <c:crossAx val="-2127319744"/>
         <c:crosses val="autoZero"/>
         <c:crossBetween val="between"/>
         <c:majorUnit val="10.0"/>
@@ -946,11 +946,25 @@
             </a:pPr>
             <a:r>
               <a:rPr lang="en-US" dirty="0"/>
-              <a:t>Letter Recognition</a:t>
-            </a:r>
+              <a:t>Letter </a:t>
+            </a:r>
+            <a:r>
+              <a:rPr lang="en-US" dirty="0" smtClean="0"/>
+              <a:t>Recognition (</a:t>
+            </a:r>
+            <a:r>
+              <a:rPr lang="en-US" dirty="0" err="1" smtClean="0"/>
+              <a:t>LibSVM</a:t>
+            </a:r>
+            <a:r>
+              <a:rPr lang="en-US" dirty="0" smtClean="0"/>
+              <a:t>)</a:t>
+            </a:r>
+            <a:endParaRPr lang="en-US" dirty="0"/>
           </a:p>
         </c:rich>
       </c:tx>
+      <c:layout/>
       <c:overlay val="0"/>
       <c:spPr>
         <a:noFill/>
@@ -1129,11 +1143,11 @@
         </c:dLbls>
         <c:gapWidth val="219"/>
         <c:overlap val="-27"/>
-        <c:axId val="1464321456"/>
-        <c:axId val="1382665888"/>
+        <c:axId val="-2096089392"/>
+        <c:axId val="-2051368000"/>
       </c:barChart>
       <c:catAx>
-        <c:axId val="1464321456"/>
+        <c:axId val="-2096089392"/>
         <c:scaling>
           <c:orientation val="minMax"/>
         </c:scaling>
@@ -1176,7 +1190,7 @@
             <a:endParaRPr lang="en-US"/>
           </a:p>
         </c:txPr>
-        <c:crossAx val="1382665888"/>
+        <c:crossAx val="-2051368000"/>
         <c:crosses val="autoZero"/>
         <c:auto val="1"/>
         <c:lblAlgn val="ctr"/>
@@ -1184,11 +1198,11 @@
         <c:noMultiLvlLbl val="0"/>
       </c:catAx>
       <c:valAx>
-        <c:axId val="1382665888"/>
+        <c:axId val="-2051368000"/>
         <c:scaling>
           <c:orientation val="minMax"/>
           <c:max val="100.0"/>
-          <c:min val="0.0"/>
+          <c:min val="50.0"/>
         </c:scaling>
         <c:delete val="0"/>
         <c:axPos val="l"/>
@@ -1237,10 +1251,10 @@
             <a:endParaRPr lang="en-US"/>
           </a:p>
         </c:txPr>
-        <c:crossAx val="1464321456"/>
+        <c:crossAx val="-2096089392"/>
         <c:crosses val="autoZero"/>
         <c:crossBetween val="between"/>
-        <c:majorUnit val="20.0"/>
+        <c:majorUnit val="10.0"/>
       </c:valAx>
       <c:spPr>
         <a:noFill/>
@@ -1252,6 +1266,7 @@
     </c:plotArea>
     <c:legend>
       <c:legendPos val="b"/>
+      <c:layout/>
       <c:overlay val="0"/>
       <c:spPr>
         <a:noFill/>
@@ -1544,11 +1559,11 @@
         </c:dLbls>
         <c:gapWidth val="219"/>
         <c:overlap val="-27"/>
-        <c:axId val="1465764704"/>
-        <c:axId val="1465760096"/>
+        <c:axId val="-2053741536"/>
+        <c:axId val="-2115447792"/>
       </c:barChart>
       <c:catAx>
-        <c:axId val="1465764704"/>
+        <c:axId val="-2053741536"/>
         <c:scaling>
           <c:orientation val="minMax"/>
         </c:scaling>
@@ -1591,7 +1606,7 @@
             <a:endParaRPr lang="en-US"/>
           </a:p>
         </c:txPr>
-        <c:crossAx val="1465760096"/>
+        <c:crossAx val="-2115447792"/>
         <c:crosses val="autoZero"/>
         <c:auto val="1"/>
         <c:lblAlgn val="ctr"/>
@@ -1599,11 +1614,11 @@
         <c:noMultiLvlLbl val="0"/>
       </c:catAx>
       <c:valAx>
-        <c:axId val="1465760096"/>
+        <c:axId val="-2115447792"/>
         <c:scaling>
           <c:orientation val="minMax"/>
           <c:max val="100.0"/>
-          <c:min val="0.0"/>
+          <c:min val="50.0"/>
         </c:scaling>
         <c:delete val="0"/>
         <c:axPos val="l"/>
@@ -1652,10 +1667,10 @@
             <a:endParaRPr lang="en-US"/>
           </a:p>
         </c:txPr>
-        <c:crossAx val="1465764704"/>
+        <c:crossAx val="-2053741536"/>
         <c:crosses val="autoZero"/>
         <c:crossBetween val="between"/>
-        <c:majorUnit val="20.0"/>
+        <c:majorUnit val="10.0"/>
       </c:valAx>
       <c:spPr>
         <a:noFill/>
@@ -1758,12 +1773,26 @@
               </a:defRPr>
             </a:pPr>
             <a:r>
-              <a:rPr lang="en-US"/>
-              <a:t>Digit Classification</a:t>
-            </a:r>
+              <a:rPr lang="en-US" dirty="0"/>
+              <a:t>Digit </a:t>
+            </a:r>
+            <a:r>
+              <a:rPr lang="en-US" dirty="0" smtClean="0"/>
+              <a:t>Classification (</a:t>
+            </a:r>
+            <a:r>
+              <a:rPr lang="en-US" dirty="0" err="1" smtClean="0"/>
+              <a:t>LibSVM</a:t>
+            </a:r>
+            <a:r>
+              <a:rPr lang="en-US" dirty="0" smtClean="0"/>
+              <a:t>)</a:t>
+            </a:r>
+            <a:endParaRPr lang="en-US" dirty="0"/>
           </a:p>
         </c:rich>
       </c:tx>
+      <c:layout/>
       <c:overlay val="0"/>
       <c:spPr>
         <a:noFill/>
@@ -1942,11 +1971,11 @@
         </c:dLbls>
         <c:gapWidth val="219"/>
         <c:overlap val="-27"/>
-        <c:axId val="1465657888"/>
-        <c:axId val="1465644432"/>
+        <c:axId val="-2094334992"/>
+        <c:axId val="-2094395760"/>
       </c:barChart>
       <c:catAx>
-        <c:axId val="1465657888"/>
+        <c:axId val="-2094334992"/>
         <c:scaling>
           <c:orientation val="minMax"/>
         </c:scaling>
@@ -1989,7 +2018,7 @@
             <a:endParaRPr lang="en-US"/>
           </a:p>
         </c:txPr>
-        <c:crossAx val="1465644432"/>
+        <c:crossAx val="-2094395760"/>
         <c:crosses val="autoZero"/>
         <c:auto val="1"/>
         <c:lblAlgn val="ctr"/>
@@ -1997,10 +2026,10 @@
         <c:noMultiLvlLbl val="0"/>
       </c:catAx>
       <c:valAx>
-        <c:axId val="1465644432"/>
+        <c:axId val="-2094395760"/>
         <c:scaling>
           <c:orientation val="minMax"/>
-          <c:min val="0.0"/>
+          <c:min val="50.0"/>
         </c:scaling>
         <c:delete val="0"/>
         <c:axPos val="l"/>
@@ -2049,10 +2078,10 @@
             <a:endParaRPr lang="en-US"/>
           </a:p>
         </c:txPr>
-        <c:crossAx val="1465657888"/>
+        <c:crossAx val="-2094334992"/>
         <c:crosses val="autoZero"/>
         <c:crossBetween val="between"/>
-        <c:majorUnit val="20.0"/>
+        <c:majorUnit val="10.0"/>
       </c:valAx>
       <c:spPr>
         <a:noFill/>
@@ -2064,6 +2093,7 @@
     </c:plotArea>
     <c:legend>
       <c:legendPos val="b"/>
+      <c:layout/>
       <c:overlay val="0"/>
       <c:spPr>
         <a:noFill/>
@@ -2422,11 +2452,11 @@
         </c:dLbls>
         <c:gapWidth val="219"/>
         <c:overlap val="-27"/>
-        <c:axId val="1380850480"/>
-        <c:axId val="1380404416"/>
+        <c:axId val="-2131568896"/>
+        <c:axId val="-2054488944"/>
       </c:barChart>
       <c:catAx>
-        <c:axId val="1380850480"/>
+        <c:axId val="-2131568896"/>
         <c:scaling>
           <c:orientation val="minMax"/>
         </c:scaling>
@@ -2469,7 +2499,7 @@
             <a:endParaRPr lang="en-US"/>
           </a:p>
         </c:txPr>
-        <c:crossAx val="1380404416"/>
+        <c:crossAx val="-2054488944"/>
         <c:crosses val="autoZero"/>
         <c:auto val="1"/>
         <c:lblAlgn val="ctr"/>
@@ -2477,7 +2507,7 @@
         <c:noMultiLvlLbl val="0"/>
       </c:catAx>
       <c:valAx>
-        <c:axId val="1380404416"/>
+        <c:axId val="-2054488944"/>
         <c:scaling>
           <c:orientation val="minMax"/>
         </c:scaling>
@@ -2528,7 +2558,7 @@
             <a:endParaRPr lang="en-US"/>
           </a:p>
         </c:txPr>
-        <c:crossAx val="1380850480"/>
+        <c:crossAx val="-2131568896"/>
         <c:crosses val="autoZero"/>
         <c:crossBetween val="between"/>
       </c:valAx>
@@ -2642,7 +2672,6 @@
           </a:p>
         </c:rich>
       </c:tx>
-      <c:layout/>
       <c:overlay val="0"/>
       <c:spPr>
         <a:noFill/>
@@ -2905,11 +2934,11 @@
         </c:dLbls>
         <c:gapWidth val="219"/>
         <c:overlap val="-27"/>
-        <c:axId val="1465581776"/>
-        <c:axId val="1465576480"/>
+        <c:axId val="-2117720000"/>
+        <c:axId val="-2117633952"/>
       </c:barChart>
       <c:catAx>
-        <c:axId val="1465581776"/>
+        <c:axId val="-2117720000"/>
         <c:scaling>
           <c:orientation val="minMax"/>
         </c:scaling>
@@ -2952,7 +2981,7 @@
             <a:endParaRPr lang="en-US"/>
           </a:p>
         </c:txPr>
-        <c:crossAx val="1465576480"/>
+        <c:crossAx val="-2117633952"/>
         <c:crosses val="autoZero"/>
         <c:auto val="1"/>
         <c:lblAlgn val="ctr"/>
@@ -2960,7 +2989,7 @@
         <c:noMultiLvlLbl val="0"/>
       </c:catAx>
       <c:valAx>
-        <c:axId val="1465576480"/>
+        <c:axId val="-2117633952"/>
         <c:scaling>
           <c:orientation val="minMax"/>
         </c:scaling>
@@ -3011,7 +3040,7 @@
             <a:endParaRPr lang="en-US"/>
           </a:p>
         </c:txPr>
-        <c:crossAx val="1465581776"/>
+        <c:crossAx val="-2117720000"/>
         <c:crosses val="autoZero"/>
         <c:crossBetween val="between"/>
       </c:valAx>
@@ -3025,7 +3054,6 @@
     </c:plotArea>
     <c:legend>
       <c:legendPos val="b"/>
-      <c:layout/>
       <c:overlay val="0"/>
       <c:spPr>
         <a:noFill/>
@@ -3330,11 +3358,11 @@
         </c:dLbls>
         <c:gapWidth val="219"/>
         <c:overlap val="-27"/>
-        <c:axId val="1418653024"/>
-        <c:axId val="1382577616"/>
+        <c:axId val="-2096100208"/>
+        <c:axId val="-2050491216"/>
       </c:barChart>
       <c:catAx>
-        <c:axId val="1418653024"/>
+        <c:axId val="-2096100208"/>
         <c:scaling>
           <c:orientation val="minMax"/>
         </c:scaling>
@@ -3377,7 +3405,7 @@
             <a:endParaRPr lang="en-US"/>
           </a:p>
         </c:txPr>
-        <c:crossAx val="1382577616"/>
+        <c:crossAx val="-2050491216"/>
         <c:crosses val="autoZero"/>
         <c:auto val="1"/>
         <c:lblAlgn val="ctr"/>
@@ -3385,7 +3413,7 @@
         <c:noMultiLvlLbl val="0"/>
       </c:catAx>
       <c:valAx>
-        <c:axId val="1382577616"/>
+        <c:axId val="-2050491216"/>
         <c:scaling>
           <c:orientation val="minMax"/>
           <c:max val="100.0"/>
@@ -3437,7 +3465,7 @@
             <a:endParaRPr lang="en-US"/>
           </a:p>
         </c:txPr>
-        <c:crossAx val="1418653024"/>
+        <c:crossAx val="-2096100208"/>
         <c:crosses val="autoZero"/>
         <c:crossBetween val="between"/>
       </c:valAx>
@@ -18327,7 +18355,7 @@
             <p:ph idx="1"/>
             <p:extLst>
               <p:ext uri="{D42A27DB-BD31-4B8C-83A1-F6EECF244321}">
-                <p14:modId xmlns:p14="http://schemas.microsoft.com/office/powerpoint/2010/main" val="830359506"/>
+                <p14:modId xmlns:p14="http://schemas.microsoft.com/office/powerpoint/2010/main" val="830494299"/>
               </p:ext>
             </p:extLst>
           </p:nvPr>
@@ -18756,7 +18784,7 @@
             <p:ph idx="1"/>
             <p:extLst>
               <p:ext uri="{D42A27DB-BD31-4B8C-83A1-F6EECF244321}">
-                <p14:modId xmlns:p14="http://schemas.microsoft.com/office/powerpoint/2010/main" val="148347321"/>
+                <p14:modId xmlns:p14="http://schemas.microsoft.com/office/powerpoint/2010/main" val="2066048963"/>
               </p:ext>
             </p:extLst>
           </p:nvPr>
@@ -19619,7 +19647,7 @@
             <p:ph idx="1"/>
             <p:extLst>
               <p:ext uri="{D42A27DB-BD31-4B8C-83A1-F6EECF244321}">
-                <p14:modId xmlns:p14="http://schemas.microsoft.com/office/powerpoint/2010/main" val="1777675879"/>
+                <p14:modId xmlns:p14="http://schemas.microsoft.com/office/powerpoint/2010/main" val="2053116012"/>
               </p:ext>
             </p:extLst>
           </p:nvPr>

</xml_diff>

<commit_message>
correct 1st fig of svm
</commit_message>
<xml_diff>
--- a/PPTGroup10.pptx
+++ b/PPTGroup10.pptx
@@ -347,11 +347,11 @@
         </c:dLbls>
         <c:gapWidth val="219"/>
         <c:overlap val="-27"/>
-        <c:axId val="-2121546288"/>
-        <c:axId val="-2052000480"/>
+        <c:axId val="-2056005696"/>
+        <c:axId val="-2117937040"/>
       </c:barChart>
       <c:catAx>
-        <c:axId val="-2121546288"/>
+        <c:axId val="-2056005696"/>
         <c:scaling>
           <c:orientation val="minMax"/>
         </c:scaling>
@@ -394,7 +394,7 @@
             <a:endParaRPr lang="en-US"/>
           </a:p>
         </c:txPr>
-        <c:crossAx val="-2052000480"/>
+        <c:crossAx val="-2117937040"/>
         <c:crosses val="autoZero"/>
         <c:auto val="1"/>
         <c:lblAlgn val="ctr"/>
@@ -402,7 +402,7 @@
         <c:noMultiLvlLbl val="0"/>
       </c:catAx>
       <c:valAx>
-        <c:axId val="-2052000480"/>
+        <c:axId val="-2117937040"/>
         <c:scaling>
           <c:orientation val="minMax"/>
           <c:max val="100.0"/>
@@ -455,7 +455,7 @@
             <a:endParaRPr lang="en-US"/>
           </a:p>
         </c:txPr>
-        <c:crossAx val="-2121546288"/>
+        <c:crossAx val="-2056005696"/>
         <c:crosses val="autoZero"/>
         <c:crossBetween val="between"/>
         <c:majorUnit val="10.0"/>
@@ -566,6 +566,7 @@
           </a:p>
         </c:rich>
       </c:tx>
+      <c:layout/>
       <c:overlay val="0"/>
       <c:spPr>
         <a:noFill/>
@@ -732,11 +733,11 @@
         </c:dLbls>
         <c:gapWidth val="219"/>
         <c:overlap val="-27"/>
-        <c:axId val="-2127319744"/>
-        <c:axId val="-2055869520"/>
+        <c:axId val="-2095594704"/>
+        <c:axId val="-2054042288"/>
       </c:barChart>
       <c:catAx>
-        <c:axId val="-2127319744"/>
+        <c:axId val="-2095594704"/>
         <c:scaling>
           <c:orientation val="minMax"/>
         </c:scaling>
@@ -779,7 +780,7 @@
             <a:endParaRPr lang="en-US"/>
           </a:p>
         </c:txPr>
-        <c:crossAx val="-2055869520"/>
+        <c:crossAx val="-2054042288"/>
         <c:crosses val="autoZero"/>
         <c:auto val="1"/>
         <c:lblAlgn val="ctr"/>
@@ -787,7 +788,7 @@
         <c:noMultiLvlLbl val="0"/>
       </c:catAx>
       <c:valAx>
-        <c:axId val="-2055869520"/>
+        <c:axId val="-2054042288"/>
         <c:scaling>
           <c:orientation val="minMax"/>
           <c:max val="100.0"/>
@@ -840,7 +841,7 @@
             <a:endParaRPr lang="en-US"/>
           </a:p>
         </c:txPr>
-        <c:crossAx val="-2127319744"/>
+        <c:crossAx val="-2095594704"/>
         <c:crosses val="autoZero"/>
         <c:crossBetween val="between"/>
         <c:majorUnit val="10.0"/>
@@ -855,6 +856,7 @@
     </c:plotArea>
     <c:legend>
       <c:legendPos val="b"/>
+      <c:layout/>
       <c:overlay val="0"/>
       <c:spPr>
         <a:noFill/>
@@ -1143,11 +1145,11 @@
         </c:dLbls>
         <c:gapWidth val="219"/>
         <c:overlap val="-27"/>
-        <c:axId val="-2096089392"/>
-        <c:axId val="-2051368000"/>
+        <c:axId val="-2127880464"/>
+        <c:axId val="-2127988784"/>
       </c:barChart>
       <c:catAx>
-        <c:axId val="-2096089392"/>
+        <c:axId val="-2127880464"/>
         <c:scaling>
           <c:orientation val="minMax"/>
         </c:scaling>
@@ -1190,7 +1192,7 @@
             <a:endParaRPr lang="en-US"/>
           </a:p>
         </c:txPr>
-        <c:crossAx val="-2051368000"/>
+        <c:crossAx val="-2127988784"/>
         <c:crosses val="autoZero"/>
         <c:auto val="1"/>
         <c:lblAlgn val="ctr"/>
@@ -1198,7 +1200,7 @@
         <c:noMultiLvlLbl val="0"/>
       </c:catAx>
       <c:valAx>
-        <c:axId val="-2051368000"/>
+        <c:axId val="-2127988784"/>
         <c:scaling>
           <c:orientation val="minMax"/>
           <c:max val="100.0"/>
@@ -1251,7 +1253,7 @@
             <a:endParaRPr lang="en-US"/>
           </a:p>
         </c:txPr>
-        <c:crossAx val="-2096089392"/>
+        <c:crossAx val="-2127880464"/>
         <c:crosses val="autoZero"/>
         <c:crossBetween val="between"/>
         <c:majorUnit val="10.0"/>
@@ -1559,11 +1561,11 @@
         </c:dLbls>
         <c:gapWidth val="219"/>
         <c:overlap val="-27"/>
-        <c:axId val="-2053741536"/>
-        <c:axId val="-2115447792"/>
+        <c:axId val="-2126613360"/>
+        <c:axId val="-2127613984"/>
       </c:barChart>
       <c:catAx>
-        <c:axId val="-2053741536"/>
+        <c:axId val="-2126613360"/>
         <c:scaling>
           <c:orientation val="minMax"/>
         </c:scaling>
@@ -1606,7 +1608,7 @@
             <a:endParaRPr lang="en-US"/>
           </a:p>
         </c:txPr>
-        <c:crossAx val="-2115447792"/>
+        <c:crossAx val="-2127613984"/>
         <c:crosses val="autoZero"/>
         <c:auto val="1"/>
         <c:lblAlgn val="ctr"/>
@@ -1614,7 +1616,7 @@
         <c:noMultiLvlLbl val="0"/>
       </c:catAx>
       <c:valAx>
-        <c:axId val="-2115447792"/>
+        <c:axId val="-2127613984"/>
         <c:scaling>
           <c:orientation val="minMax"/>
           <c:max val="100.0"/>
@@ -1667,7 +1669,7 @@
             <a:endParaRPr lang="en-US"/>
           </a:p>
         </c:txPr>
-        <c:crossAx val="-2053741536"/>
+        <c:crossAx val="-2126613360"/>
         <c:crosses val="autoZero"/>
         <c:crossBetween val="between"/>
         <c:majorUnit val="10.0"/>
@@ -1971,11 +1973,11 @@
         </c:dLbls>
         <c:gapWidth val="219"/>
         <c:overlap val="-27"/>
-        <c:axId val="-2094334992"/>
-        <c:axId val="-2094395760"/>
+        <c:axId val="-2127228864"/>
+        <c:axId val="-2130390624"/>
       </c:barChart>
       <c:catAx>
-        <c:axId val="-2094334992"/>
+        <c:axId val="-2127228864"/>
         <c:scaling>
           <c:orientation val="minMax"/>
         </c:scaling>
@@ -2018,7 +2020,7 @@
             <a:endParaRPr lang="en-US"/>
           </a:p>
         </c:txPr>
-        <c:crossAx val="-2094395760"/>
+        <c:crossAx val="-2130390624"/>
         <c:crosses val="autoZero"/>
         <c:auto val="1"/>
         <c:lblAlgn val="ctr"/>
@@ -2026,9 +2028,10 @@
         <c:noMultiLvlLbl val="0"/>
       </c:catAx>
       <c:valAx>
-        <c:axId val="-2094395760"/>
+        <c:axId val="-2130390624"/>
         <c:scaling>
           <c:orientation val="minMax"/>
+          <c:max val="100.0"/>
           <c:min val="50.0"/>
         </c:scaling>
         <c:delete val="0"/>
@@ -2078,7 +2081,7 @@
             <a:endParaRPr lang="en-US"/>
           </a:p>
         </c:txPr>
-        <c:crossAx val="-2094334992"/>
+        <c:crossAx val="-2127228864"/>
         <c:crosses val="autoZero"/>
         <c:crossBetween val="between"/>
         <c:majorUnit val="10.0"/>
@@ -2452,11 +2455,11 @@
         </c:dLbls>
         <c:gapWidth val="219"/>
         <c:overlap val="-27"/>
-        <c:axId val="-2131568896"/>
-        <c:axId val="-2054488944"/>
+        <c:axId val="-2058886928"/>
+        <c:axId val="-2056772160"/>
       </c:barChart>
       <c:catAx>
-        <c:axId val="-2131568896"/>
+        <c:axId val="-2058886928"/>
         <c:scaling>
           <c:orientation val="minMax"/>
         </c:scaling>
@@ -2499,7 +2502,7 @@
             <a:endParaRPr lang="en-US"/>
           </a:p>
         </c:txPr>
-        <c:crossAx val="-2054488944"/>
+        <c:crossAx val="-2056772160"/>
         <c:crosses val="autoZero"/>
         <c:auto val="1"/>
         <c:lblAlgn val="ctr"/>
@@ -2507,7 +2510,7 @@
         <c:noMultiLvlLbl val="0"/>
       </c:catAx>
       <c:valAx>
-        <c:axId val="-2054488944"/>
+        <c:axId val="-2056772160"/>
         <c:scaling>
           <c:orientation val="minMax"/>
         </c:scaling>
@@ -2558,7 +2561,7 @@
             <a:endParaRPr lang="en-US"/>
           </a:p>
         </c:txPr>
-        <c:crossAx val="-2131568896"/>
+        <c:crossAx val="-2058886928"/>
         <c:crosses val="autoZero"/>
         <c:crossBetween val="between"/>
       </c:valAx>
@@ -2934,11 +2937,11 @@
         </c:dLbls>
         <c:gapWidth val="219"/>
         <c:overlap val="-27"/>
-        <c:axId val="-2117720000"/>
-        <c:axId val="-2117633952"/>
+        <c:axId val="-2094924896"/>
+        <c:axId val="-2094038624"/>
       </c:barChart>
       <c:catAx>
-        <c:axId val="-2117720000"/>
+        <c:axId val="-2094924896"/>
         <c:scaling>
           <c:orientation val="minMax"/>
         </c:scaling>
@@ -2981,7 +2984,7 @@
             <a:endParaRPr lang="en-US"/>
           </a:p>
         </c:txPr>
-        <c:crossAx val="-2117633952"/>
+        <c:crossAx val="-2094038624"/>
         <c:crosses val="autoZero"/>
         <c:auto val="1"/>
         <c:lblAlgn val="ctr"/>
@@ -2989,7 +2992,7 @@
         <c:noMultiLvlLbl val="0"/>
       </c:catAx>
       <c:valAx>
-        <c:axId val="-2117633952"/>
+        <c:axId val="-2094038624"/>
         <c:scaling>
           <c:orientation val="minMax"/>
         </c:scaling>
@@ -3040,7 +3043,7 @@
             <a:endParaRPr lang="en-US"/>
           </a:p>
         </c:txPr>
-        <c:crossAx val="-2117720000"/>
+        <c:crossAx val="-2094924896"/>
         <c:crosses val="autoZero"/>
         <c:crossBetween val="between"/>
       </c:valAx>
@@ -3358,11 +3361,11 @@
         </c:dLbls>
         <c:gapWidth val="219"/>
         <c:overlap val="-27"/>
-        <c:axId val="-2096100208"/>
-        <c:axId val="-2050491216"/>
+        <c:axId val="-2118352080"/>
+        <c:axId val="-2118536464"/>
       </c:barChart>
       <c:catAx>
-        <c:axId val="-2096100208"/>
+        <c:axId val="-2118352080"/>
         <c:scaling>
           <c:orientation val="minMax"/>
         </c:scaling>
@@ -3405,7 +3408,7 @@
             <a:endParaRPr lang="en-US"/>
           </a:p>
         </c:txPr>
-        <c:crossAx val="-2050491216"/>
+        <c:crossAx val="-2118536464"/>
         <c:crosses val="autoZero"/>
         <c:auto val="1"/>
         <c:lblAlgn val="ctr"/>
@@ -3413,7 +3416,7 @@
         <c:noMultiLvlLbl val="0"/>
       </c:catAx>
       <c:valAx>
-        <c:axId val="-2050491216"/>
+        <c:axId val="-2118536464"/>
         <c:scaling>
           <c:orientation val="minMax"/>
           <c:max val="100.0"/>
@@ -3465,7 +3468,7 @@
             <a:endParaRPr lang="en-US"/>
           </a:p>
         </c:txPr>
-        <c:crossAx val="-2096100208"/>
+        <c:crossAx val="-2118352080"/>
         <c:crosses val="autoZero"/>
         <c:crossBetween val="between"/>
       </c:valAx>
@@ -19647,7 +19650,7 @@
             <p:ph idx="1"/>
             <p:extLst>
               <p:ext uri="{D42A27DB-BD31-4B8C-83A1-F6EECF244321}">
-                <p14:modId xmlns:p14="http://schemas.microsoft.com/office/powerpoint/2010/main" val="2053116012"/>
+                <p14:modId xmlns:p14="http://schemas.microsoft.com/office/powerpoint/2010/main" val="2145278866"/>
               </p:ext>
             </p:extLst>
           </p:nvPr>

</xml_diff>